<commit_message>
Added results to presentation and added PDFs of PXTP and FMCAD papers for reference
</commit_message>
<xml_diff>
--- a/Presentation.pptx
+++ b/Presentation.pptx
@@ -12,8 +12,9 @@
     <p:sldId id="261" r:id="rId6"/>
     <p:sldId id="260" r:id="rId7"/>
     <p:sldId id="264" r:id="rId8"/>
-    <p:sldId id="262" r:id="rId9"/>
-    <p:sldId id="263" r:id="rId10"/>
+    <p:sldId id="265" r:id="rId9"/>
+    <p:sldId id="266" r:id="rId10"/>
+    <p:sldId id="263" r:id="rId11"/>
   </p:sldIdLst>
   <p:sldSz cx="12192000" cy="6858000"/>
   <p:notesSz cx="6858000" cy="9144000"/>
@@ -267,7 +268,7 @@
           <a:p>
             <a:fld id="{C8A3F418-5BE6-4764-B372-575D89EC1E3D}" type="datetimeFigureOut">
               <a:rPr lang="en-US" smtClean="0"/>
-              <a:t>7/15/2019</a:t>
+              <a:t>7/28/2019</a:t>
             </a:fld>
             <a:endParaRPr lang="en-US"/>
           </a:p>
@@ -465,7 +466,7 @@
           <a:p>
             <a:fld id="{C8A3F418-5BE6-4764-B372-575D89EC1E3D}" type="datetimeFigureOut">
               <a:rPr lang="en-US" smtClean="0"/>
-              <a:t>7/15/2019</a:t>
+              <a:t>7/28/2019</a:t>
             </a:fld>
             <a:endParaRPr lang="en-US"/>
           </a:p>
@@ -673,7 +674,7 @@
           <a:p>
             <a:fld id="{C8A3F418-5BE6-4764-B372-575D89EC1E3D}" type="datetimeFigureOut">
               <a:rPr lang="en-US" smtClean="0"/>
-              <a:t>7/15/2019</a:t>
+              <a:t>7/28/2019</a:t>
             </a:fld>
             <a:endParaRPr lang="en-US"/>
           </a:p>
@@ -871,7 +872,7 @@
           <a:p>
             <a:fld id="{C8A3F418-5BE6-4764-B372-575D89EC1E3D}" type="datetimeFigureOut">
               <a:rPr lang="en-US" smtClean="0"/>
-              <a:t>7/15/2019</a:t>
+              <a:t>7/28/2019</a:t>
             </a:fld>
             <a:endParaRPr lang="en-US"/>
           </a:p>
@@ -1146,7 +1147,7 @@
           <a:p>
             <a:fld id="{C8A3F418-5BE6-4764-B372-575D89EC1E3D}" type="datetimeFigureOut">
               <a:rPr lang="en-US" smtClean="0"/>
-              <a:t>7/15/2019</a:t>
+              <a:t>7/28/2019</a:t>
             </a:fld>
             <a:endParaRPr lang="en-US"/>
           </a:p>
@@ -1411,7 +1412,7 @@
           <a:p>
             <a:fld id="{C8A3F418-5BE6-4764-B372-575D89EC1E3D}" type="datetimeFigureOut">
               <a:rPr lang="en-US" smtClean="0"/>
-              <a:t>7/15/2019</a:t>
+              <a:t>7/28/2019</a:t>
             </a:fld>
             <a:endParaRPr lang="en-US"/>
           </a:p>
@@ -1823,7 +1824,7 @@
           <a:p>
             <a:fld id="{C8A3F418-5BE6-4764-B372-575D89EC1E3D}" type="datetimeFigureOut">
               <a:rPr lang="en-US" smtClean="0"/>
-              <a:t>7/15/2019</a:t>
+              <a:t>7/28/2019</a:t>
             </a:fld>
             <a:endParaRPr lang="en-US"/>
           </a:p>
@@ -1964,7 +1965,7 @@
           <a:p>
             <a:fld id="{C8A3F418-5BE6-4764-B372-575D89EC1E3D}" type="datetimeFigureOut">
               <a:rPr lang="en-US" smtClean="0"/>
-              <a:t>7/15/2019</a:t>
+              <a:t>7/28/2019</a:t>
             </a:fld>
             <a:endParaRPr lang="en-US"/>
           </a:p>
@@ -2077,7 +2078,7 @@
           <a:p>
             <a:fld id="{C8A3F418-5BE6-4764-B372-575D89EC1E3D}" type="datetimeFigureOut">
               <a:rPr lang="en-US" smtClean="0"/>
-              <a:t>7/15/2019</a:t>
+              <a:t>7/28/2019</a:t>
             </a:fld>
             <a:endParaRPr lang="en-US"/>
           </a:p>
@@ -2388,7 +2389,7 @@
           <a:p>
             <a:fld id="{C8A3F418-5BE6-4764-B372-575D89EC1E3D}" type="datetimeFigureOut">
               <a:rPr lang="en-US" smtClean="0"/>
-              <a:t>7/15/2019</a:t>
+              <a:t>7/28/2019</a:t>
             </a:fld>
             <a:endParaRPr lang="en-US"/>
           </a:p>
@@ -2676,7 +2677,7 @@
           <a:p>
             <a:fld id="{C8A3F418-5BE6-4764-B372-575D89EC1E3D}" type="datetimeFigureOut">
               <a:rPr lang="en-US" smtClean="0"/>
-              <a:t>7/15/2019</a:t>
+              <a:t>7/28/2019</a:t>
             </a:fld>
             <a:endParaRPr lang="en-US"/>
           </a:p>
@@ -2917,7 +2918,7 @@
           <a:p>
             <a:fld id="{C8A3F418-5BE6-4764-B372-575D89EC1E3D}" type="datetimeFigureOut">
               <a:rPr lang="en-US" smtClean="0"/>
-              <a:t>7/15/2019</a:t>
+              <a:t>7/28/2019</a:t>
             </a:fld>
             <a:endParaRPr lang="en-US"/>
           </a:p>
@@ -3622,6 +3623,133 @@
 </p:sld>
 </file>
 
+<file path=ppt/slides/slide10.xml><?xml version="1.0" encoding="utf-8"?>
+<p:sld xmlns:a="http://schemas.openxmlformats.org/drawingml/2006/main" xmlns:r="http://schemas.openxmlformats.org/officeDocument/2006/relationships" xmlns:p="http://schemas.openxmlformats.org/presentationml/2006/main">
+  <p:cSld>
+    <p:spTree>
+      <p:nvGrpSpPr>
+        <p:cNvPr id="1" name=""/>
+        <p:cNvGrpSpPr/>
+        <p:nvPr/>
+      </p:nvGrpSpPr>
+      <p:grpSpPr>
+        <a:xfrm>
+          <a:off x="0" y="0"/>
+          <a:ext cx="0" cy="0"/>
+          <a:chOff x="0" y="0"/>
+          <a:chExt cx="0" cy="0"/>
+        </a:xfrm>
+      </p:grpSpPr>
+      <p:sp>
+        <p:nvSpPr>
+          <p:cNvPr id="2" name="Title 1">
+            <a:extLst>
+              <a:ext uri="{FF2B5EF4-FFF2-40B4-BE49-F238E27FC236}">
+                <a16:creationId xmlns:a16="http://schemas.microsoft.com/office/drawing/2014/main" id="{9B8AE531-BE0A-47C4-A97A-0228506D2F66}"/>
+              </a:ext>
+            </a:extLst>
+          </p:cNvPr>
+          <p:cNvSpPr>
+            <a:spLocks noGrp="1"/>
+          </p:cNvSpPr>
+          <p:nvPr>
+            <p:ph type="title"/>
+          </p:nvPr>
+        </p:nvSpPr>
+        <p:spPr/>
+        <p:txBody>
+          <a:bodyPr/>
+          <a:lstStyle/>
+          <a:p>
+            <a:r>
+              <a:rPr lang="en-US" dirty="0"/>
+              <a:t>References</a:t>
+            </a:r>
+          </a:p>
+        </p:txBody>
+      </p:sp>
+      <p:sp>
+        <p:nvSpPr>
+          <p:cNvPr id="3" name="Content Placeholder 2">
+            <a:extLst>
+              <a:ext uri="{FF2B5EF4-FFF2-40B4-BE49-F238E27FC236}">
+                <a16:creationId xmlns:a16="http://schemas.microsoft.com/office/drawing/2014/main" id="{C1639CB6-0E1A-4ACF-9658-4FB11AF819AF}"/>
+              </a:ext>
+            </a:extLst>
+          </p:cNvPr>
+          <p:cNvSpPr>
+            <a:spLocks noGrp="1"/>
+          </p:cNvSpPr>
+          <p:nvPr>
+            <p:ph idx="1"/>
+          </p:nvPr>
+        </p:nvSpPr>
+        <p:spPr/>
+        <p:txBody>
+          <a:bodyPr>
+            <a:normAutofit fontScale="92500" lnSpcReduction="10000"/>
+          </a:bodyPr>
+          <a:lstStyle/>
+          <a:p>
+            <a:r>
+              <a:rPr lang="en-US" dirty="0"/>
+              <a:t>Aarti Gupta, Allan L. Fisher. Representation and Symbolic Manipulation of Linearly Inductive Boolean Functions. In proceedings of ICCAD '93 of the 1993 IEEE/ACM international conference on Computer-aided design, pages 192-199.</a:t>
+            </a:r>
+          </a:p>
+          <a:p>
+            <a:r>
+              <a:rPr lang="en-US" dirty="0"/>
+              <a:t>Alessandro Armando, Jacopo </a:t>
+            </a:r>
+            <a:r>
+              <a:rPr lang="en-US" dirty="0" err="1"/>
+              <a:t>Mantovani</a:t>
+            </a:r>
+            <a:r>
+              <a:rPr lang="en-US" dirty="0"/>
+              <a:t>, Lorenzo </a:t>
+            </a:r>
+            <a:r>
+              <a:rPr lang="en-US" dirty="0" err="1"/>
+              <a:t>Platania</a:t>
+            </a:r>
+            <a:r>
+              <a:rPr lang="en-US" dirty="0"/>
+              <a:t>. Bounded Model Checking of Software Using SMT Solvers Instead of SAT Solvers. In proceedings of International SPIN Workshop on Model Checking of Software. SPIN 2006: Model Checking Software, pages 146-162.</a:t>
+            </a:r>
+          </a:p>
+          <a:p>
+            <a:r>
+              <a:rPr lang="en-US" dirty="0"/>
+              <a:t>Cristian </a:t>
+            </a:r>
+            <a:r>
+              <a:rPr lang="en-US" dirty="0" err="1"/>
+              <a:t>Cadar</a:t>
+            </a:r>
+            <a:r>
+              <a:rPr lang="en-US" dirty="0"/>
+              <a:t>, Vijay Ganesh, Peter M. Pawlowski, David L. Dill, Dawson R. Engler. EXE: Automatically Generating Inputs of Death.  In proceedings of CCS '06 Proceedings of the 13th ACM conference on Computer and communications security, pages 322-335.</a:t>
+            </a:r>
+          </a:p>
+          <a:p>
+            <a:endParaRPr lang="en-US" dirty="0"/>
+          </a:p>
+        </p:txBody>
+      </p:sp>
+    </p:spTree>
+    <p:extLst>
+      <p:ext uri="{BB962C8B-B14F-4D97-AF65-F5344CB8AC3E}">
+        <p14:creationId xmlns:p14="http://schemas.microsoft.com/office/powerpoint/2010/main" val="1805401439"/>
+      </p:ext>
+    </p:extLst>
+  </p:cSld>
+  <p:clrMapOvr>
+    <a:masterClrMapping/>
+  </p:clrMapOvr>
+</p:sld>
+</file>
+
 <file path=ppt/slides/slide2.xml><?xml version="1.0" encoding="utf-8"?>
 <p:sld xmlns:a="http://schemas.openxmlformats.org/drawingml/2006/main" xmlns:r="http://schemas.openxmlformats.org/officeDocument/2006/relationships" xmlns:p="http://schemas.openxmlformats.org/presentationml/2006/main">
   <p:cSld>
@@ -4236,7 +4364,7 @@
           <a:p>
             <a:r>
               <a:rPr lang="en-US" dirty="0"/>
-              <a:t>Previous Work</a:t>
+              <a:t>Previous Work &amp; Contributions</a:t>
             </a:r>
           </a:p>
         </p:txBody>
@@ -4259,26 +4387,41 @@
         </p:nvSpPr>
         <p:spPr/>
         <p:txBody>
-          <a:bodyPr/>
+          <a:bodyPr>
+            <a:normAutofit lnSpcReduction="10000"/>
+          </a:bodyPr>
           <a:lstStyle/>
           <a:p>
             <a:r>
               <a:rPr lang="en-US" dirty="0"/>
-              <a:t>Previous work generated 162 of these invertibility equivalences, and proved them using SMT-solvers for bit-widths </a:t>
-            </a:r>
-            <a:r>
-              <a:rPr lang="en-US" dirty="0" err="1"/>
-              <a:t>upto</a:t>
-            </a:r>
-            <a:r>
-              <a:rPr lang="en-US" dirty="0"/>
-              <a:t> 65.</a:t>
+              <a:t>Previous work generated 162 of these invertibility equivalences, and proved them using SMT-solvers for bit-widths up to 65.</a:t>
             </a:r>
           </a:p>
           <a:p>
             <a:r>
               <a:rPr lang="en-US" dirty="0"/>
               <a:t>Another approach was to encode the equivalences in theories supported by SMT-solvers to reason about parametric bit-widths. However, this approach failed on over a quarter of the equivalences.</a:t>
+            </a:r>
+          </a:p>
+          <a:p>
+            <a:pPr marL="0" indent="0">
+              <a:buNone/>
+            </a:pPr>
+            <a:r>
+              <a:rPr lang="en-US" dirty="0"/>
+              <a:t>Contributions:</a:t>
+            </a:r>
+          </a:p>
+          <a:p>
+            <a:r>
+              <a:rPr lang="en-US" dirty="0"/>
+              <a:t>Represented a subset of the 162 invertibility equivalences in Coq, and proved them for arbitrary bit-width.</a:t>
+            </a:r>
+          </a:p>
+          <a:p>
+            <a:r>
+              <a:rPr lang="en-US" dirty="0"/>
+              <a:t>Extended a Coq bit-vector library to support some of these equivalences.</a:t>
             </a:r>
           </a:p>
           <a:p>
@@ -4360,18 +4503,196 @@
             <p:ph idx="1"/>
           </p:nvPr>
         </p:nvSpPr>
-        <p:spPr/>
-        <p:txBody>
-          <a:bodyPr/>
-          <a:lstStyle/>
-          <a:p>
+        <p:spPr>
+          <a:xfrm>
+            <a:off x="1468073" y="1775291"/>
+            <a:ext cx="9118834" cy="4482896"/>
+          </a:xfrm>
+        </p:spPr>
+        <p:txBody>
+          <a:bodyPr>
+            <a:normAutofit lnSpcReduction="10000"/>
+          </a:bodyPr>
+          <a:lstStyle/>
+          <a:p>
+            <a:pPr marL="0" indent="0">
+              <a:buNone/>
+            </a:pPr>
             <a:r>
               <a:rPr lang="en-US" dirty="0"/>
-              <a:t>An invertibility condition (IC) for a variable x in a bit-vector literal over </a:t>
-            </a:r>
-          </a:p>
-        </p:txBody>
-      </p:sp>
+              <a:t>An invertibility condition (IC) for a variable x in a bit-vector literal </a:t>
+            </a:r>
+          </a:p>
+          <a:p>
+            <a:endParaRPr lang="en-US" dirty="0"/>
+          </a:p>
+          <a:p>
+            <a:pPr marL="0" indent="0">
+              <a:buNone/>
+            </a:pPr>
+            <a:r>
+              <a:rPr lang="en-US" dirty="0"/>
+              <a:t>is a formula </a:t>
+            </a:r>
+          </a:p>
+          <a:p>
+            <a:pPr marL="0" indent="0">
+              <a:buNone/>
+            </a:pPr>
+            <a:endParaRPr lang="en-US" dirty="0"/>
+          </a:p>
+          <a:p>
+            <a:pPr marL="0" indent="0">
+              <a:buNone/>
+            </a:pPr>
+            <a:r>
+              <a:rPr lang="en-US" dirty="0"/>
+              <a:t>such that the following equivalence is valid in the theory of bit-vectors</a:t>
+            </a:r>
+          </a:p>
+          <a:p>
+            <a:pPr marL="0" indent="0">
+              <a:buNone/>
+            </a:pPr>
+            <a:endParaRPr lang="en-US" dirty="0"/>
+          </a:p>
+          <a:p>
+            <a:pPr marL="0" indent="0">
+              <a:buNone/>
+            </a:pPr>
+            <a:endParaRPr lang="en-US" dirty="0"/>
+          </a:p>
+          <a:p>
+            <a:pPr marL="0" indent="0">
+              <a:buNone/>
+            </a:pPr>
+            <a:r>
+              <a:rPr lang="en-US" dirty="0"/>
+              <a:t>We call this equivalence an invertibility equivalence (IE).</a:t>
+            </a:r>
+          </a:p>
+        </p:txBody>
+      </p:sp>
+      <p:pic>
+        <p:nvPicPr>
+          <p:cNvPr id="17" name="Picture 16">
+            <a:extLst>
+              <a:ext uri="{FF2B5EF4-FFF2-40B4-BE49-F238E27FC236}">
+                <a16:creationId xmlns:a16="http://schemas.microsoft.com/office/drawing/2014/main" id="{8C42671C-56B2-452A-8F17-52C6D884568E}"/>
+              </a:ext>
+            </a:extLst>
+          </p:cNvPr>
+          <p:cNvPicPr>
+            <a:picLocks noChangeAspect="1"/>
+          </p:cNvPicPr>
+          <p:nvPr>
+            <p:custDataLst>
+              <p:tags r:id="rId1"/>
+            </p:custDataLst>
+          </p:nvPr>
+        </p:nvPicPr>
+        <p:blipFill>
+          <a:blip r:embed="rId5">
+            <a:extLst>
+              <a:ext uri="{28A0092B-C50C-407E-A947-70E740481C1C}">
+                <a14:useLocalDpi xmlns:a14="http://schemas.microsoft.com/office/drawing/2010/main" val="0"/>
+              </a:ext>
+            </a:extLst>
+          </a:blip>
+          <a:stretch>
+            <a:fillRect/>
+          </a:stretch>
+        </p:blipFill>
+        <p:spPr>
+          <a:xfrm>
+            <a:off x="4721094" y="2567486"/>
+            <a:ext cx="1939201" cy="352000"/>
+          </a:xfrm>
+          <a:prstGeom prst="rect">
+            <a:avLst/>
+          </a:prstGeom>
+        </p:spPr>
+      </p:pic>
+      <p:pic>
+        <p:nvPicPr>
+          <p:cNvPr id="21" name="Picture 20">
+            <a:extLst>
+              <a:ext uri="{FF2B5EF4-FFF2-40B4-BE49-F238E27FC236}">
+                <a16:creationId xmlns:a16="http://schemas.microsoft.com/office/drawing/2014/main" id="{03C0F2DB-9C55-4642-8E9F-E2B9639F7317}"/>
+              </a:ext>
+            </a:extLst>
+          </p:cNvPr>
+          <p:cNvPicPr>
+            <a:picLocks noChangeAspect="1"/>
+          </p:cNvPicPr>
+          <p:nvPr>
+            <p:custDataLst>
+              <p:tags r:id="rId2"/>
+            </p:custDataLst>
+          </p:nvPr>
+        </p:nvPicPr>
+        <p:blipFill>
+          <a:blip r:embed="rId6">
+            <a:extLst>
+              <a:ext uri="{28A0092B-C50C-407E-A947-70E740481C1C}">
+                <a14:useLocalDpi xmlns:a14="http://schemas.microsoft.com/office/drawing/2010/main" val="0"/>
+              </a:ext>
+            </a:extLst>
+          </a:blip>
+          <a:stretch>
+            <a:fillRect/>
+          </a:stretch>
+        </p:blipFill>
+        <p:spPr>
+          <a:xfrm>
+            <a:off x="4866161" y="3535681"/>
+            <a:ext cx="1649066" cy="352000"/>
+          </a:xfrm>
+          <a:prstGeom prst="rect">
+            <a:avLst/>
+          </a:prstGeom>
+        </p:spPr>
+      </p:pic>
+      <p:pic>
+        <p:nvPicPr>
+          <p:cNvPr id="29" name="Picture 28">
+            <a:extLst>
+              <a:ext uri="{FF2B5EF4-FFF2-40B4-BE49-F238E27FC236}">
+                <a16:creationId xmlns:a16="http://schemas.microsoft.com/office/drawing/2014/main" id="{4E416828-A050-4A25-8837-F7CCD29CC6EE}"/>
+              </a:ext>
+            </a:extLst>
+          </p:cNvPr>
+          <p:cNvPicPr>
+            <a:picLocks noChangeAspect="1"/>
+          </p:cNvPicPr>
+          <p:nvPr>
+            <p:custDataLst>
+              <p:tags r:id="rId3"/>
+            </p:custDataLst>
+          </p:nvPr>
+        </p:nvPicPr>
+        <p:blipFill>
+          <a:blip r:embed="rId7">
+            <a:extLst>
+              <a:ext uri="{28A0092B-C50C-407E-A947-70E740481C1C}">
+                <a14:useLocalDpi xmlns:a14="http://schemas.microsoft.com/office/drawing/2010/main" val="0"/>
+              </a:ext>
+            </a:extLst>
+          </a:blip>
+          <a:stretch>
+            <a:fillRect/>
+          </a:stretch>
+        </p:blipFill>
+        <p:spPr>
+          <a:xfrm>
+            <a:off x="2318934" y="5119944"/>
+            <a:ext cx="7554132" cy="390400"/>
+          </a:xfrm>
+          <a:prstGeom prst="rect">
+            <a:avLst/>
+          </a:prstGeom>
+        </p:spPr>
+      </p:pic>
     </p:spTree>
     <p:extLst>
       <p:ext uri="{BB962C8B-B14F-4D97-AF65-F5344CB8AC3E}">
@@ -4407,7 +4728,7 @@
           <p:cNvPr id="2" name="Title 1">
             <a:extLst>
               <a:ext uri="{FF2B5EF4-FFF2-40B4-BE49-F238E27FC236}">
-                <a16:creationId xmlns:a16="http://schemas.microsoft.com/office/drawing/2014/main" id="{EC54E7DA-CDC1-413C-8425-9D8CBDEB5FDD}"/>
+                <a16:creationId xmlns:a16="http://schemas.microsoft.com/office/drawing/2014/main" id="{90C50612-7218-47A4-BAAF-295374B569F6}"/>
               </a:ext>
             </a:extLst>
           </p:cNvPr>
@@ -4425,57 +4746,95 @@
           <a:p>
             <a:r>
               <a:rPr lang="en-US" dirty="0"/>
-              <a:t>Contributions</a:t>
-            </a:r>
-          </a:p>
-        </p:txBody>
-      </p:sp>
-      <p:sp>
-        <p:nvSpPr>
-          <p:cNvPr id="3" name="Content Placeholder 2">
-            <a:extLst>
-              <a:ext uri="{FF2B5EF4-FFF2-40B4-BE49-F238E27FC236}">
-                <a16:creationId xmlns:a16="http://schemas.microsoft.com/office/drawing/2014/main" id="{AC900DFD-D313-4D26-A2E9-34F5CA109B3E}"/>
-              </a:ext>
-            </a:extLst>
-          </p:cNvPr>
-          <p:cNvSpPr>
-            <a:spLocks noGrp="1"/>
-          </p:cNvSpPr>
-          <p:nvPr>
-            <p:ph idx="1"/>
-          </p:nvPr>
-        </p:nvSpPr>
-        <p:spPr/>
-        <p:txBody>
-          <a:bodyPr>
-            <a:normAutofit/>
-          </a:bodyPr>
-          <a:lstStyle/>
-          <a:p>
-            <a:r>
-              <a:rPr lang="en-US" sz="3500" dirty="0"/>
-              <a:t>Represented a subset of the 162 invertibility equivalences in Coq, and proved them.</a:t>
-            </a:r>
-          </a:p>
-          <a:p>
-            <a:r>
-              <a:rPr lang="en-US" sz="3500" dirty="0"/>
-              <a:t>Extended a Coq bit-vector library to support some of these equivalences.</a:t>
-            </a:r>
-          </a:p>
-          <a:p>
-            <a:pPr marL="0" indent="0">
-              <a:buNone/>
-            </a:pPr>
-            <a:endParaRPr lang="en-US" sz="3500" dirty="0"/>
-          </a:p>
-        </p:txBody>
-      </p:sp>
+              <a:t>Results</a:t>
+            </a:r>
+          </a:p>
+        </p:txBody>
+      </p:sp>
+      <p:pic>
+        <p:nvPicPr>
+          <p:cNvPr id="35" name="Picture 34">
+            <a:extLst>
+              <a:ext uri="{FF2B5EF4-FFF2-40B4-BE49-F238E27FC236}">
+                <a16:creationId xmlns:a16="http://schemas.microsoft.com/office/drawing/2014/main" id="{41AA85CF-1E45-407E-92D9-CBFB10D13F06}"/>
+              </a:ext>
+            </a:extLst>
+          </p:cNvPr>
+          <p:cNvPicPr>
+            <a:picLocks noChangeAspect="1"/>
+          </p:cNvPicPr>
+          <p:nvPr>
+            <p:custDataLst>
+              <p:tags r:id="rId1"/>
+            </p:custDataLst>
+          </p:nvPr>
+        </p:nvPicPr>
+        <p:blipFill>
+          <a:blip r:embed="rId4">
+            <a:extLst>
+              <a:ext uri="{28A0092B-C50C-407E-A947-70E740481C1C}">
+                <a14:useLocalDpi xmlns:a14="http://schemas.microsoft.com/office/drawing/2010/main" val="0"/>
+              </a:ext>
+            </a:extLst>
+          </a:blip>
+          <a:stretch>
+            <a:fillRect/>
+          </a:stretch>
+        </p:blipFill>
+        <p:spPr>
+          <a:xfrm>
+            <a:off x="804644" y="1674398"/>
+            <a:ext cx="5752816" cy="4499899"/>
+          </a:xfrm>
+          <a:prstGeom prst="rect">
+            <a:avLst/>
+          </a:prstGeom>
+        </p:spPr>
+      </p:pic>
+      <p:pic>
+        <p:nvPicPr>
+          <p:cNvPr id="37" name="Picture 36">
+            <a:extLst>
+              <a:ext uri="{FF2B5EF4-FFF2-40B4-BE49-F238E27FC236}">
+                <a16:creationId xmlns:a16="http://schemas.microsoft.com/office/drawing/2014/main" id="{D58457BC-F5E1-4515-8BDF-0942D9F52FA1}"/>
+              </a:ext>
+            </a:extLst>
+          </p:cNvPr>
+          <p:cNvPicPr>
+            <a:picLocks noChangeAspect="1"/>
+          </p:cNvPicPr>
+          <p:nvPr>
+            <p:custDataLst>
+              <p:tags r:id="rId2"/>
+            </p:custDataLst>
+          </p:nvPr>
+        </p:nvPicPr>
+        <p:blipFill>
+          <a:blip r:embed="rId5">
+            <a:extLst>
+              <a:ext uri="{28A0092B-C50C-407E-A947-70E740481C1C}">
+                <a14:useLocalDpi xmlns:a14="http://schemas.microsoft.com/office/drawing/2010/main" val="0"/>
+              </a:ext>
+            </a:extLst>
+          </a:blip>
+          <a:stretch>
+            <a:fillRect/>
+          </a:stretch>
+        </p:blipFill>
+        <p:spPr>
+          <a:xfrm>
+            <a:off x="6845416" y="5156013"/>
+            <a:ext cx="5117285" cy="1018284"/>
+          </a:xfrm>
+          <a:prstGeom prst="rect">
+            <a:avLst/>
+          </a:prstGeom>
+        </p:spPr>
+      </p:pic>
     </p:spTree>
     <p:extLst>
       <p:ext uri="{BB962C8B-B14F-4D97-AF65-F5344CB8AC3E}">
-        <p14:creationId xmlns:p14="http://schemas.microsoft.com/office/powerpoint/2010/main" val="1406460588"/>
+        <p14:creationId xmlns:p14="http://schemas.microsoft.com/office/powerpoint/2010/main" val="4039500786"/>
       </p:ext>
     </p:extLst>
   </p:cSld>
@@ -4507,7 +4866,7 @@
           <p:cNvPr id="2" name="Title 1">
             <a:extLst>
               <a:ext uri="{FF2B5EF4-FFF2-40B4-BE49-F238E27FC236}">
-                <a16:creationId xmlns:a16="http://schemas.microsoft.com/office/drawing/2014/main" id="{9B8AE531-BE0A-47C4-A97A-0228506D2F66}"/>
+                <a16:creationId xmlns:a16="http://schemas.microsoft.com/office/drawing/2014/main" id="{71908CC3-014E-4E5E-AA2C-2910D4E932DF}"/>
               </a:ext>
             </a:extLst>
           </p:cNvPr>
@@ -4525,7 +4884,7 @@
           <a:p>
             <a:r>
               <a:rPr lang="en-US" dirty="0"/>
-              <a:t>References</a:t>
+              <a:t>Bit-vector Library</a:t>
             </a:r>
           </a:p>
         </p:txBody>
@@ -4535,7 +4894,7 @@
           <p:cNvPr id="3" name="Content Placeholder 2">
             <a:extLst>
               <a:ext uri="{FF2B5EF4-FFF2-40B4-BE49-F238E27FC236}">
-                <a16:creationId xmlns:a16="http://schemas.microsoft.com/office/drawing/2014/main" id="{C1639CB6-0E1A-4ACF-9658-4FB11AF819AF}"/>
+                <a16:creationId xmlns:a16="http://schemas.microsoft.com/office/drawing/2014/main" id="{BFF69D3C-F813-4E85-A9C2-E3CA57814E36}"/>
               </a:ext>
             </a:extLst>
           </p:cNvPr>
@@ -4548,61 +4907,28 @@
         </p:nvSpPr>
         <p:spPr/>
         <p:txBody>
-          <a:bodyPr>
-            <a:normAutofit fontScale="92500" lnSpcReduction="10000"/>
-          </a:bodyPr>
+          <a:bodyPr/>
           <a:lstStyle/>
           <a:p>
             <a:r>
               <a:rPr lang="en-US" dirty="0"/>
-              <a:t>Aarti Gupta, Allan L. Fisher. Representation and Symbolic Manipulation of Linearly Inductive Boolean Functions. In proceedings of ICCAD '93 of the 1993 IEEE/ACM international conference on Computer-aided design, pages 192-199.</a:t>
-            </a:r>
-          </a:p>
-          <a:p>
+              <a:t>We used a bit-vector library originally developed for </a:t>
+            </a:r>
+            <a:r>
+              <a:rPr lang="en-US" dirty="0" err="1"/>
+              <a:t>SMTCoq</a:t>
+            </a:r>
             <a:r>
               <a:rPr lang="en-US" dirty="0"/>
-              <a:t>Alessandro Armando, Jacopo </a:t>
-            </a:r>
-            <a:r>
-              <a:rPr lang="en-US" dirty="0" err="1"/>
-              <a:t>Mantovani</a:t>
-            </a:r>
-            <a:r>
-              <a:rPr lang="en-US" dirty="0"/>
-              <a:t>, Lorenzo </a:t>
-            </a:r>
-            <a:r>
-              <a:rPr lang="en-US" dirty="0" err="1"/>
-              <a:t>Platania</a:t>
-            </a:r>
-            <a:r>
-              <a:rPr lang="en-US" dirty="0"/>
-              <a:t>. Bounded Model Checking of Software Using SMT Solvers Instead of SAT Solvers. In proceedings of International SPIN Workshop on Model Checking of Software. SPIN 2006: Model Checking Software, pages 146-162.</a:t>
-            </a:r>
-          </a:p>
-          <a:p>
-            <a:r>
-              <a:rPr lang="en-US" dirty="0"/>
-              <a:t>Cristian </a:t>
-            </a:r>
-            <a:r>
-              <a:rPr lang="en-US" dirty="0" err="1"/>
-              <a:t>Cadar</a:t>
-            </a:r>
-            <a:r>
-              <a:rPr lang="en-US" dirty="0"/>
-              <a:t>, Vijay Ganesh, Peter M. Pawlowski, David L. Dill, Dawson R. Engler. EXE: Automatically Generating Inputs of Death.  In proceedings of CCS '06 Proceedings of the 13th ACM conference on Computer and communications security, pages 322-335.</a:t>
-            </a:r>
-          </a:p>
-          <a:p>
-            <a:endParaRPr lang="en-US" dirty="0"/>
+              <a:t> – a Coq plugin </a:t>
+            </a:r>
           </a:p>
         </p:txBody>
       </p:sp>
     </p:spTree>
     <p:extLst>
       <p:ext uri="{BB962C8B-B14F-4D97-AF65-F5344CB8AC3E}">
-        <p14:creationId xmlns:p14="http://schemas.microsoft.com/office/powerpoint/2010/main" val="1805401439"/>
+        <p14:creationId xmlns:p14="http://schemas.microsoft.com/office/powerpoint/2010/main" val="1739621109"/>
       </p:ext>
     </p:extLst>
   </p:cSld>
@@ -4658,6 +4984,101 @@
   <p:tag name="LATEXADDIN" val="\documentclass{article}&#10;\usepackage{amsmath}&#10;\pagestyle{empty}&#10;\begin{document}&#10;$x\ \&amp;\ s = t \iff t\ \&amp;\ s = t$&#10;&#10;&#10;&#10;\end{document}"/>
   <p:tag name="IGUANATEXSIZE" val="28"/>
   <p:tag name="IGUANATEXCURSOR" val="111"/>
+  <p:tag name="TRANSPARENCY" val="True"/>
+  <p:tag name="FILENAME" val=""/>
+  <p:tag name="LATEXENGINEID" val="0"/>
+  <p:tag name="TEMPFOLDER" val="c:\temp\"/>
+  <p:tag name="LATEXFORMHEIGHT" val="312"/>
+  <p:tag name="LATEXFORMWIDTH" val="384"/>
+  <p:tag name="LATEXFORMWRAP" val="True"/>
+  <p:tag name="BITMAPVECTOR" val="0"/>
+</p:tagLst>
+</file>
+
+<file path=ppt/tags/tag4.xml><?xml version="1.0" encoding="utf-8"?>
+<p:tagLst xmlns:a="http://schemas.openxmlformats.org/drawingml/2006/main" xmlns:r="http://schemas.openxmlformats.org/officeDocument/2006/relationships" xmlns:p="http://schemas.openxmlformats.org/presentationml/2006/main">
+  <p:tag name="OUTPUTDPI" val="1200"/>
+  <p:tag name="ORIGINALHEIGHT" val="123.7346"/>
+  <p:tag name="ORIGINALWIDTH" val="681.6648"/>
+  <p:tag name="LATEXADDIN" val="\documentclass{article}&#10;\usepackage{amsmath}&#10;\pagestyle{empty}&#10;\begin{document}&#10;$\ell\ [\ x\ ,\ s\ ,\ t\ ]$&#10;\end{document}"/>
+  <p:tag name="IGUANATEXSIZE" val="28"/>
+  <p:tag name="IGUANATEXCURSOR" val="105"/>
+  <p:tag name="TRANSPARENCY" val="True"/>
+  <p:tag name="FILENAME" val=""/>
+  <p:tag name="LATEXENGINEID" val="0"/>
+  <p:tag name="TEMPFOLDER" val="c:\temp\"/>
+  <p:tag name="LATEXFORMHEIGHT" val="312"/>
+  <p:tag name="LATEXFORMWIDTH" val="384"/>
+  <p:tag name="LATEXFORMWRAP" val="True"/>
+  <p:tag name="BITMAPVECTOR" val="0"/>
+</p:tagLst>
+</file>
+
+<file path=ppt/tags/tag5.xml><?xml version="1.0" encoding="utf-8"?>
+<p:tagLst xmlns:a="http://schemas.openxmlformats.org/drawingml/2006/main" xmlns:r="http://schemas.openxmlformats.org/officeDocument/2006/relationships" xmlns:p="http://schemas.openxmlformats.org/presentationml/2006/main">
+  <p:tag name="OUTPUTDPI" val="1200"/>
+  <p:tag name="ORIGINALHEIGHT" val="123.7346"/>
+  <p:tag name="ORIGINALWIDTH" val="579.6776"/>
+  <p:tag name="LATEXADDIN" val="\documentclass{article}&#10;\usepackage{amsmath}&#10;\pagestyle{empty}&#10;\begin{document}&#10;$IC\ [\ s\ ,\ t\ ]$&#10;\end{document}"/>
+  <p:tag name="IGUANATEXSIZE" val="28"/>
+  <p:tag name="IGUANATEXCURSOR" val="91"/>
+  <p:tag name="TRANSPARENCY" val="True"/>
+  <p:tag name="FILENAME" val=""/>
+  <p:tag name="LATEXENGINEID" val="0"/>
+  <p:tag name="TEMPFOLDER" val="c:\temp\"/>
+  <p:tag name="LATEXFORMHEIGHT" val="312"/>
+  <p:tag name="LATEXFORMWIDTH" val="384"/>
+  <p:tag name="LATEXFORMWRAP" val="True"/>
+  <p:tag name="BITMAPVECTOR" val="0"/>
+</p:tagLst>
+</file>
+
+<file path=ppt/tags/tag6.xml><?xml version="1.0" encoding="utf-8"?>
+<p:tagLst xmlns:a="http://schemas.openxmlformats.org/drawingml/2006/main" xmlns:r="http://schemas.openxmlformats.org/officeDocument/2006/relationships" xmlns:p="http://schemas.openxmlformats.org/presentationml/2006/main">
+  <p:tag name="OUTPUTDPI" val="1200"/>
+  <p:tag name="ORIGINALHEIGHT" val="137.2328"/>
+  <p:tag name="ORIGINALWIDTH" val="2655.418"/>
+  <p:tag name="LATEXADDIN" val="\documentclass{article}&#10;\usepackage{amsmath}&#10;\pagestyle{empty}&#10;\begin{document}&#10;$\forall s : \sigma_{[n]}.\ \forall t : \sigma_{[n]}.\ IC[s,t] \iff \exists x : \sigma_{[n]}.\ \ell[x,s,t]$&#10;\end{document}"/>
+  <p:tag name="IGUANATEXSIZE" val="28"/>
+  <p:tag name="IGUANATEXCURSOR" val="175"/>
+  <p:tag name="TRANSPARENCY" val="True"/>
+  <p:tag name="FILENAME" val=""/>
+  <p:tag name="LATEXENGINEID" val="0"/>
+  <p:tag name="TEMPFOLDER" val="c:\temp\"/>
+  <p:tag name="LATEXFORMHEIGHT" val="312"/>
+  <p:tag name="LATEXFORMWIDTH" val="384"/>
+  <p:tag name="LATEXFORMWRAP" val="True"/>
+  <p:tag name="BITMAPVECTOR" val="0"/>
+</p:tagLst>
+</file>
+
+<file path=ppt/tags/tag7.xml><?xml version="1.0" encoding="utf-8"?>
+<p:tagLst xmlns:a="http://schemas.openxmlformats.org/drawingml/2006/main" xmlns:r="http://schemas.openxmlformats.org/officeDocument/2006/relationships" xmlns:p="http://schemas.openxmlformats.org/presentationml/2006/main">
+  <p:tag name="OUTPUTDPI" val="1200"/>
+  <p:tag name="ORIGINALHEIGHT" val="2235.47"/>
+  <p:tag name="ORIGINALWIDTH" val="2857.893"/>
+  <p:tag name="LATEXADDIN" val="\documentclass{article}&#10;\usepackage{amsmath}&#10;\usepackage{xcolor}&#10;\usepackage{xspace}&#10;\usepackage{pifont}&#10;\usepackage{amssymb}&#10;\pagestyle{empty}&#10;\begin{document}&#10;\begin{table}&#10;\begin{center}&#10;{%&#10;  \renewcommand{\arraystretch}{1.2}%&#10;  \begin{tabular}{r@{\hspace{2.0em}}c@{\hspace{1.0em}}c@{\hspace{1.5em}}c@{\hspace{1.0em}}c@{\hspace{1.5em}}c@{\hspace{1.0em}}c}&#10;    \hline&#10;    \\[-2.5ex]&#10;    $\ell[x]$ &amp; $=$ &amp; $\not =$ &amp; $&lt;_u$ &amp; $&gt;_u$ &amp; $&lt;=_u$ &amp; $&gt;=_u$&#10;    \\[.5ex]&#10;    \hline&#10;    \\[-2.5ex]&#10;    $- x \bowtie t$ &amp; \color{blue}{$\checkmark$}\nolinebreak\kern-0.7em\xspace\color{green}{$\checkmark$} &amp; \color{green}{$\checkmark$} &amp; \color{green}{$\checkmark$} &amp; \color{green}{$\checkmark$}  &#10;     &amp; \color{green}{$\checkmark$} &amp; \color{green}{$\checkmark$} \\&#10;    $\sim x  \bowtie t$ &amp; \color{blue}{$\checkmark$}\nolinebreak\kern-0.7em\xspace\color{green}{$\checkmark$} &amp; \color{green}{$\checkmark$} &amp; \color{green}{$\checkmark$} &amp; \color{green}{$\checkmark$}  &#10;     &amp; \color{green}{$\checkmark$} &amp; \color{green}{$\checkmark$}  \\&#10;    $x\ \&amp;\ s \bowtie t$ &amp; \color{blue}{$\checkmark$} &amp; \color{green}{$\checkmark$} &amp; \color{green}{$\checkmark$} &amp; \color{green}{$\checkmark$}  &#10;     &amp; \color{green}{$\checkmark$} &amp; \color{green}{$\checkmark$} \\&#10;    $x \mid s   \bowtie t$ &amp; \color{blue}{$\checkmark$} &amp; \color{green}{$\checkmark$} &amp; \color{green}{$\checkmark$} &amp; \color{green}{$\checkmark$} &#10;     &amp; \color{green}{$\checkmark$} &amp; \color{green}{$\checkmark$} \\&#10;    $x \mathop{&lt;\kern-.3em&lt;} s  \bowtie t$ &amp; \color{blue}{$\checkmark$} &amp; \color{blue}{$\checkmark$} &amp; \color{green}{$\checkmark$} &amp; \color{blue}{$\checkmark$}   &#10;     &amp; \color{green}{$\checkmark$} &amp; \color{blue}{$\checkmark$} \\&#10;    $s \mathop{&lt;\kern-.3em&lt;} x  \bowtie t$ &amp; \color{blue}{$\checkmark$}\nolinebreak\kern-0.7em\xspace\color{green}{$\checkmark$} &amp; \color{green}{$\checkmark$} &amp; \color{green}{$\checkmark$} &amp; \color{green}{$\checkmark$} &#10;     &amp; \color{green}{$\checkmark$} &amp; \color{green}{$\checkmark$} \\&#10;    $x \mathop{&gt;\kern-.3em&gt;} s \bowtie t$ &amp; \color{blue}{$\checkmark$}\nolinebreak\kern-0.7em\xspace\color{green}{$\checkmark$} &amp; \color{green}{$\checkmark$} &amp; \color{green}{$\checkmark$} &amp; \color{red}\ding{53} &#10;     &amp; \color{green}{$\checkmark$} &amp; \color{green}{$\checkmark$} \\&#10;    $s \mathop{&gt;\kern-.3em&gt;} x \bowtie t$ &amp; \color{blue}{$\checkmark$}\nolinebreak\kern-0.7em\xspace\color{green}{$\checkmark$} &amp; \color{green}{$\checkmark$} &amp; \color{green}{$\checkmark$} &amp; \color{green}{$\checkmark$} &#10;     &amp; \color{green}{$\checkmark$} &amp; \color{green}{$\checkmark$} \\&#10;    $x \mathop{&gt;\kern-.3em&gt;_a} s \bowtie t$ &amp; \color{blue}{$\checkmark$} &amp; \color{green}{$\checkmark$} &amp; \color{green}{$\checkmark$} &amp; \color{green}{$\checkmark$} &#10;     &amp; \color{green}{$\checkmark$} &amp; \color{green}{$\checkmark$} \\&#10;    $s \mathop{&gt;\kern-.3em&gt;_a} x \bowtie t$ &amp; \color{blue}{$\checkmark$}\nolinebreak\kern-0.7em\xspace\color{green}{$\checkmark$} &amp; \color{green}{$\checkmark$} &amp; \color{blue}{$\checkmark$} &amp; \color{blue}{$\checkmark$}  &#10;     &amp; \color{blue}{$\checkmark$} &amp; \color{blue}{$\checkmark$} \\&#10;    $x + s   \bowtie t$ &amp; \color{blue}{$\checkmark$}\nolinebreak\kern-0.7em\xspace\color{green}{$\checkmark$} &amp; \color{green}{$\checkmark$} &amp; \color{green}{$\checkmark$} &amp; \color{green}{$\checkmark$} &#10;     &amp; \color{green}{$\checkmark$} &amp; \color{green}{$\checkmark$} \\&#10;  \end{tabular}%&#10;}&#10;\end{center}&#10;\end{table} &#10;\end{document}"/>
+  <p:tag name="IGUANATEXSIZE" val="28"/>
+  <p:tag name="IGUANATEXCURSOR" val="3386"/>
+  <p:tag name="TRANSPARENCY" val="True"/>
+  <p:tag name="FILENAME" val=""/>
+  <p:tag name="LATEXENGINEID" val="0"/>
+  <p:tag name="TEMPFOLDER" val="c:\temp\"/>
+  <p:tag name="LATEXFORMHEIGHT" val="312"/>
+  <p:tag name="LATEXFORMWIDTH" val="384"/>
+  <p:tag name="LATEXFORMWRAP" val="True"/>
+  <p:tag name="BITMAPVECTOR" val="0"/>
+</p:tagLst>
+</file>
+
+<file path=ppt/tags/tag8.xml><?xml version="1.0" encoding="utf-8"?>
+<p:tagLst xmlns:a="http://schemas.openxmlformats.org/drawingml/2006/main" xmlns:r="http://schemas.openxmlformats.org/officeDocument/2006/relationships" xmlns:p="http://schemas.openxmlformats.org/presentationml/2006/main">
+  <p:tag name="OUTPUTDPI" val="1200"/>
+  <p:tag name="ORIGINALHEIGHT" val="560.9299"/>
+  <p:tag name="ORIGINALWIDTH" val="2818.898"/>
+  <p:tag name="LATEXADDIN" val="\documentclass{article}&#10;\usepackage[a4paper]{geometry}&#10;\geometry{textwidth=\paperwidth, textheight=\paperheight, noheadfoot, nomarginpar}&#10;\setlength{\topskip}{0mm}&#10;\setlength{\parindent}{0mm}&#10;\usepackage{amsmath}&#10;\usepackage{xcolor}&#10;\usepackage{xspace}&#10;\usepackage{pifont}&#10;\usepackage{amssymb}&#10;\pagestyle{empty}&#10;\begin{document}&#10;{\color{blue}{$\checkmark$}} - Verified by us in Coq for arbitrary bit-width. \\&#10;{\color{green}{$\checkmark$}} - Verified by Niemetz et al. using SMT encoding. \\&#10;{\color{blue}{$\checkmark$}\nolinebreak\kern-0.7em\xspace\color{green}{$\checkmark$}} - Verified by both us and Niemetz et al. \\&#10;{\color{red}\ding{53}} - Verified by neither us nor Niemetz et al.&#10;\end{document}"/>
+  <p:tag name="IGUANATEXSIZE" val="20"/>
+  <p:tag name="IGUANATEXCURSOR" val="621"/>
   <p:tag name="TRANSPARENCY" val="True"/>
   <p:tag name="FILENAME" val=""/>
   <p:tag name="LATEXENGINEID" val="0"/>

</xml_diff>

<commit_message>
More slides talking about the library
</commit_message>
<xml_diff>
--- a/Presentation.pptx
+++ b/Presentation.pptx
@@ -14,7 +14,8 @@
     <p:sldId id="264" r:id="rId8"/>
     <p:sldId id="265" r:id="rId9"/>
     <p:sldId id="266" r:id="rId10"/>
-    <p:sldId id="263" r:id="rId11"/>
+    <p:sldId id="267" r:id="rId11"/>
+    <p:sldId id="263" r:id="rId12"/>
   </p:sldIdLst>
   <p:sldSz cx="12192000" cy="6858000"/>
   <p:notesSz cx="6858000" cy="9144000"/>
@@ -3645,6 +3646,263 @@
           <p:cNvPr id="2" name="Title 1">
             <a:extLst>
               <a:ext uri="{FF2B5EF4-FFF2-40B4-BE49-F238E27FC236}">
+                <a16:creationId xmlns:a16="http://schemas.microsoft.com/office/drawing/2014/main" id="{687BB2D5-94FF-4BCA-8CD4-E5FA09D0DDB2}"/>
+              </a:ext>
+            </a:extLst>
+          </p:cNvPr>
+          <p:cNvSpPr>
+            <a:spLocks noGrp="1"/>
+          </p:cNvSpPr>
+          <p:nvPr>
+            <p:ph type="title"/>
+          </p:nvPr>
+        </p:nvSpPr>
+        <p:spPr/>
+        <p:txBody>
+          <a:bodyPr/>
+          <a:lstStyle/>
+          <a:p>
+            <a:r>
+              <a:rPr lang="en-US" dirty="0"/>
+              <a:t>Bit-vector Library</a:t>
+            </a:r>
+          </a:p>
+        </p:txBody>
+      </p:sp>
+      <p:sp>
+        <p:nvSpPr>
+          <p:cNvPr id="3" name="Content Placeholder 2">
+            <a:extLst>
+              <a:ext uri="{FF2B5EF4-FFF2-40B4-BE49-F238E27FC236}">
+                <a16:creationId xmlns:a16="http://schemas.microsoft.com/office/drawing/2014/main" id="{A8D7B1DF-8AB3-455D-B534-942C5A38FA71}"/>
+              </a:ext>
+            </a:extLst>
+          </p:cNvPr>
+          <p:cNvSpPr>
+            <a:spLocks noGrp="1"/>
+          </p:cNvSpPr>
+          <p:nvPr>
+            <p:ph idx="1"/>
+          </p:nvPr>
+        </p:nvSpPr>
+        <p:spPr/>
+        <p:txBody>
+          <a:bodyPr>
+            <a:normAutofit fontScale="92500" lnSpcReduction="10000"/>
+          </a:bodyPr>
+          <a:lstStyle/>
+          <a:p>
+            <a:pPr marL="0" indent="0">
+              <a:buNone/>
+            </a:pPr>
+            <a:r>
+              <a:rPr lang="en-US" dirty="0"/>
+              <a:t>The library had support for the following operators and predicates:</a:t>
+            </a:r>
+          </a:p>
+          <a:p>
+            <a:pPr lvl="1"/>
+            <a:r>
+              <a:rPr lang="en-US" dirty="0"/>
+              <a:t>Addition, negation, multiplication.</a:t>
+            </a:r>
+          </a:p>
+          <a:p>
+            <a:pPr lvl="1"/>
+            <a:r>
+              <a:rPr lang="en-US" dirty="0"/>
+              <a:t>Bit-wise conjunction, disjunction, negation.</a:t>
+            </a:r>
+          </a:p>
+          <a:p>
+            <a:pPr lvl="1"/>
+            <a:r>
+              <a:rPr lang="en-US" dirty="0"/>
+              <a:t>Logical left and right shift.</a:t>
+            </a:r>
+          </a:p>
+          <a:p>
+            <a:pPr lvl="1"/>
+            <a:r>
+              <a:rPr lang="en-US" dirty="0"/>
+              <a:t>Concatenation.</a:t>
+            </a:r>
+          </a:p>
+          <a:p>
+            <a:pPr lvl="1"/>
+            <a:r>
+              <a:rPr lang="en-US" dirty="0"/>
+              <a:t>Equality, </a:t>
+            </a:r>
+            <a:r>
+              <a:rPr lang="en-US" dirty="0" err="1"/>
+              <a:t>unequality</a:t>
+            </a:r>
+            <a:r>
+              <a:rPr lang="en-US" dirty="0"/>
+              <a:t>.</a:t>
+            </a:r>
+          </a:p>
+          <a:p>
+            <a:pPr lvl="1"/>
+            <a:r>
+              <a:rPr lang="en-US" dirty="0"/>
+              <a:t>Signed and unsigned less than and greater than.</a:t>
+            </a:r>
+          </a:p>
+          <a:p>
+            <a:pPr marL="0" indent="0">
+              <a:buNone/>
+            </a:pPr>
+            <a:r>
+              <a:rPr lang="en-US" dirty="0"/>
+              <a:t>We extended the library with the following:</a:t>
+            </a:r>
+          </a:p>
+          <a:p>
+            <a:pPr lvl="1"/>
+            <a:r>
+              <a:rPr lang="en-US" dirty="0"/>
+              <a:t>Unsigned weak inequalities.</a:t>
+            </a:r>
+          </a:p>
+          <a:p>
+            <a:pPr lvl="1"/>
+            <a:r>
+              <a:rPr lang="en-US" dirty="0"/>
+              <a:t>Arithmetic right shift.</a:t>
+            </a:r>
+          </a:p>
+          <a:p>
+            <a:pPr lvl="1"/>
+            <a:r>
+              <a:rPr lang="en-US" dirty="0"/>
+              <a:t>New definitions of all shift operators and a proof of equivalence between the two sets of definitions.</a:t>
+            </a:r>
+          </a:p>
+          <a:p>
+            <a:pPr marL="457200" lvl="1" indent="0">
+              <a:buNone/>
+            </a:pPr>
+            <a:endParaRPr lang="en-US" dirty="0"/>
+          </a:p>
+        </p:txBody>
+      </p:sp>
+      <p:pic>
+        <p:nvPicPr>
+          <p:cNvPr id="15" name="Picture 14">
+            <a:extLst>
+              <a:ext uri="{FF2B5EF4-FFF2-40B4-BE49-F238E27FC236}">
+                <a16:creationId xmlns:a16="http://schemas.microsoft.com/office/drawing/2014/main" id="{FA9685FE-3DE6-493A-9414-3352CC95D703}"/>
+              </a:ext>
+            </a:extLst>
+          </p:cNvPr>
+          <p:cNvPicPr>
+            <a:picLocks noChangeAspect="1"/>
+          </p:cNvPicPr>
+          <p:nvPr>
+            <p:custDataLst>
+              <p:tags r:id="rId1"/>
+            </p:custDataLst>
+          </p:nvPr>
+        </p:nvPicPr>
+        <p:blipFill>
+          <a:blip r:embed="rId4">
+            <a:extLst>
+              <a:ext uri="{28A0092B-C50C-407E-A947-70E740481C1C}">
+                <a14:useLocalDpi xmlns:a14="http://schemas.microsoft.com/office/drawing/2010/main" val="0"/>
+              </a:ext>
+            </a:extLst>
+          </a:blip>
+          <a:stretch>
+            <a:fillRect/>
+          </a:stretch>
+        </p:blipFill>
+        <p:spPr>
+          <a:xfrm>
+            <a:off x="4655239" y="1047134"/>
+            <a:ext cx="7536761" cy="2780954"/>
+          </a:xfrm>
+          <a:prstGeom prst="rect">
+            <a:avLst/>
+          </a:prstGeom>
+        </p:spPr>
+      </p:pic>
+      <p:pic>
+        <p:nvPicPr>
+          <p:cNvPr id="19" name="Picture 18">
+            <a:extLst>
+              <a:ext uri="{FF2B5EF4-FFF2-40B4-BE49-F238E27FC236}">
+                <a16:creationId xmlns:a16="http://schemas.microsoft.com/office/drawing/2014/main" id="{E3A1C621-711F-4F78-A3A9-B79763939C8D}"/>
+              </a:ext>
+            </a:extLst>
+          </p:cNvPr>
+          <p:cNvPicPr>
+            <a:picLocks noChangeAspect="1"/>
+          </p:cNvPicPr>
+          <p:nvPr>
+            <p:custDataLst>
+              <p:tags r:id="rId2"/>
+            </p:custDataLst>
+          </p:nvPr>
+        </p:nvPicPr>
+        <p:blipFill>
+          <a:blip r:embed="rId5">
+            <a:extLst>
+              <a:ext uri="{28A0092B-C50C-407E-A947-70E740481C1C}">
+                <a14:useLocalDpi xmlns:a14="http://schemas.microsoft.com/office/drawing/2010/main" val="0"/>
+              </a:ext>
+            </a:extLst>
+          </a:blip>
+          <a:stretch>
+            <a:fillRect/>
+          </a:stretch>
+        </p:blipFill>
+        <p:spPr>
+          <a:xfrm>
+            <a:off x="838200" y="5053534"/>
+            <a:ext cx="8329142" cy="1507047"/>
+          </a:xfrm>
+          <a:prstGeom prst="rect">
+            <a:avLst/>
+          </a:prstGeom>
+        </p:spPr>
+      </p:pic>
+    </p:spTree>
+    <p:extLst>
+      <p:ext uri="{BB962C8B-B14F-4D97-AF65-F5344CB8AC3E}">
+        <p14:creationId xmlns:p14="http://schemas.microsoft.com/office/powerpoint/2010/main" val="783522755"/>
+      </p:ext>
+    </p:extLst>
+  </p:cSld>
+  <p:clrMapOvr>
+    <a:masterClrMapping/>
+  </p:clrMapOvr>
+</p:sld>
+</file>
+
+<file path=ppt/slides/slide11.xml><?xml version="1.0" encoding="utf-8"?>
+<p:sld xmlns:a="http://schemas.openxmlformats.org/drawingml/2006/main" xmlns:r="http://schemas.openxmlformats.org/officeDocument/2006/relationships" xmlns:p="http://schemas.openxmlformats.org/presentationml/2006/main">
+  <p:cSld>
+    <p:spTree>
+      <p:nvGrpSpPr>
+        <p:cNvPr id="1" name=""/>
+        <p:cNvGrpSpPr/>
+        <p:nvPr/>
+      </p:nvGrpSpPr>
+      <p:grpSpPr>
+        <a:xfrm>
+          <a:off x="0" y="0"/>
+          <a:ext cx="0" cy="0"/>
+          <a:chOff x="0" y="0"/>
+          <a:chExt cx="0" cy="0"/>
+        </a:xfrm>
+      </p:grpSpPr>
+      <p:sp>
+        <p:nvSpPr>
+          <p:cNvPr id="2" name="Title 1">
+            <a:extLst>
+              <a:ext uri="{FF2B5EF4-FFF2-40B4-BE49-F238E27FC236}">
                 <a16:creationId xmlns:a16="http://schemas.microsoft.com/office/drawing/2014/main" id="{9B8AE531-BE0A-47C4-A97A-0228506D2F66}"/>
               </a:ext>
             </a:extLst>
@@ -4905,7 +5163,12 @@
             <p:ph idx="1"/>
           </p:nvPr>
         </p:nvSpPr>
-        <p:spPr/>
+        <p:spPr>
+          <a:xfrm>
+            <a:off x="838200" y="1561370"/>
+            <a:ext cx="10515600" cy="4351338"/>
+          </a:xfrm>
+        </p:spPr>
         <p:txBody>
           <a:bodyPr/>
           <a:lstStyle/>
@@ -4920,7 +5183,359 @@
             </a:r>
             <a:r>
               <a:rPr lang="en-US" dirty="0"/>
-              <a:t> – a Coq plugin </a:t>
+              <a:t> – a Coq plugin that uses external SMT solvers to complete proof goals.</a:t>
+            </a:r>
+          </a:p>
+          <a:p>
+            <a:r>
+              <a:rPr lang="en-US" dirty="0"/>
+              <a:t>Bit-vectors are represented as lists of Booleans.</a:t>
+            </a:r>
+          </a:p>
+        </p:txBody>
+      </p:sp>
+      <p:sp>
+        <p:nvSpPr>
+          <p:cNvPr id="4" name="Rectangle 3">
+            <a:extLst>
+              <a:ext uri="{FF2B5EF4-FFF2-40B4-BE49-F238E27FC236}">
+                <a16:creationId xmlns:a16="http://schemas.microsoft.com/office/drawing/2014/main" id="{BE634451-17F3-4158-9072-41C45AC6E7B5}"/>
+              </a:ext>
+            </a:extLst>
+          </p:cNvPr>
+          <p:cNvSpPr/>
+          <p:nvPr/>
+        </p:nvSpPr>
+        <p:spPr>
+          <a:xfrm>
+            <a:off x="2223081" y="3380764"/>
+            <a:ext cx="3951215" cy="780176"/>
+          </a:xfrm>
+          <a:prstGeom prst="rect">
+            <a:avLst/>
+          </a:prstGeom>
+        </p:spPr>
+        <p:style>
+          <a:lnRef idx="2">
+            <a:schemeClr val="accent1">
+              <a:shade val="50000"/>
+            </a:schemeClr>
+          </a:lnRef>
+          <a:fillRef idx="1">
+            <a:schemeClr val="accent1"/>
+          </a:fillRef>
+          <a:effectRef idx="0">
+            <a:schemeClr val="accent1"/>
+          </a:effectRef>
+          <a:fontRef idx="minor">
+            <a:schemeClr val="lt1"/>
+          </a:fontRef>
+        </p:style>
+        <p:txBody>
+          <a:bodyPr rtlCol="0" anchor="ctr"/>
+          <a:lstStyle/>
+          <a:p>
+            <a:pPr algn="ctr"/>
+            <a:r>
+              <a:rPr lang="en-US" dirty="0"/>
+              <a:t>Raw (Non-dependent) Bit-vector</a:t>
+            </a:r>
+          </a:p>
+        </p:txBody>
+      </p:sp>
+      <p:sp>
+        <p:nvSpPr>
+          <p:cNvPr id="5" name="Arrow: Right 4">
+            <a:extLst>
+              <a:ext uri="{FF2B5EF4-FFF2-40B4-BE49-F238E27FC236}">
+                <a16:creationId xmlns:a16="http://schemas.microsoft.com/office/drawing/2014/main" id="{9F11DEA4-3754-44FE-83DA-7BAA3722071F}"/>
+              </a:ext>
+            </a:extLst>
+          </p:cNvPr>
+          <p:cNvSpPr/>
+          <p:nvPr/>
+        </p:nvSpPr>
+        <p:spPr>
+          <a:xfrm rot="5400000">
+            <a:off x="3662173" y="4525225"/>
+            <a:ext cx="1161111" cy="381698"/>
+          </a:xfrm>
+          <a:prstGeom prst="rightArrow">
+            <a:avLst/>
+          </a:prstGeom>
+        </p:spPr>
+        <p:style>
+          <a:lnRef idx="2">
+            <a:schemeClr val="accent1">
+              <a:shade val="50000"/>
+            </a:schemeClr>
+          </a:lnRef>
+          <a:fillRef idx="1">
+            <a:schemeClr val="accent1"/>
+          </a:fillRef>
+          <a:effectRef idx="0">
+            <a:schemeClr val="accent1"/>
+          </a:effectRef>
+          <a:fontRef idx="minor">
+            <a:schemeClr val="lt1"/>
+          </a:fontRef>
+        </p:style>
+        <p:txBody>
+          <a:bodyPr rtlCol="0" anchor="ctr"/>
+          <a:lstStyle/>
+          <a:p>
+            <a:pPr algn="ctr"/>
+            <a:endParaRPr lang="en-US"/>
+          </a:p>
+        </p:txBody>
+      </p:sp>
+      <p:sp>
+        <p:nvSpPr>
+          <p:cNvPr id="6" name="Rectangle 5">
+            <a:extLst>
+              <a:ext uri="{FF2B5EF4-FFF2-40B4-BE49-F238E27FC236}">
+                <a16:creationId xmlns:a16="http://schemas.microsoft.com/office/drawing/2014/main" id="{DF77DAB2-2365-4F95-81BF-93A906419D6F}"/>
+              </a:ext>
+            </a:extLst>
+          </p:cNvPr>
+          <p:cNvSpPr/>
+          <p:nvPr/>
+        </p:nvSpPr>
+        <p:spPr>
+          <a:xfrm>
+            <a:off x="2223081" y="5296629"/>
+            <a:ext cx="3951215" cy="780176"/>
+          </a:xfrm>
+          <a:prstGeom prst="rect">
+            <a:avLst/>
+          </a:prstGeom>
+        </p:spPr>
+        <p:style>
+          <a:lnRef idx="2">
+            <a:schemeClr val="accent1">
+              <a:shade val="50000"/>
+            </a:schemeClr>
+          </a:lnRef>
+          <a:fillRef idx="1">
+            <a:schemeClr val="accent1"/>
+          </a:fillRef>
+          <a:effectRef idx="0">
+            <a:schemeClr val="accent1"/>
+          </a:effectRef>
+          <a:fontRef idx="minor">
+            <a:schemeClr val="lt1"/>
+          </a:fontRef>
+        </p:style>
+        <p:txBody>
+          <a:bodyPr rtlCol="0" anchor="ctr"/>
+          <a:lstStyle/>
+          <a:p>
+            <a:pPr algn="ctr"/>
+            <a:r>
+              <a:rPr lang="en-US" dirty="0"/>
+              <a:t>Dependently Typed Bit-vector</a:t>
+            </a:r>
+          </a:p>
+        </p:txBody>
+      </p:sp>
+      <p:sp>
+        <p:nvSpPr>
+          <p:cNvPr id="7" name="TextBox 6">
+            <a:extLst>
+              <a:ext uri="{FF2B5EF4-FFF2-40B4-BE49-F238E27FC236}">
+                <a16:creationId xmlns:a16="http://schemas.microsoft.com/office/drawing/2014/main" id="{EB72097E-A4CC-4339-AFD8-AF88E0FF33ED}"/>
+              </a:ext>
+            </a:extLst>
+          </p:cNvPr>
+          <p:cNvSpPr txBox="1"/>
+          <p:nvPr/>
+        </p:nvSpPr>
+        <p:spPr>
+          <a:xfrm>
+            <a:off x="6560192" y="4471333"/>
+            <a:ext cx="2407640" cy="369332"/>
+          </a:xfrm>
+          <a:prstGeom prst="rect">
+            <a:avLst/>
+          </a:prstGeom>
+          <a:noFill/>
+        </p:spPr>
+        <p:txBody>
+          <a:bodyPr wrap="square" rtlCol="0">
+            <a:spAutoFit/>
+          </a:bodyPr>
+          <a:lstStyle/>
+          <a:p>
+            <a:r>
+              <a:rPr lang="en-US" dirty="0" err="1"/>
+              <a:t>Functor</a:t>
+            </a:r>
+            <a:r>
+              <a:rPr lang="en-US" dirty="0"/>
+              <a:t>: Raw2Bitvector</a:t>
+            </a:r>
+          </a:p>
+        </p:txBody>
+      </p:sp>
+      <p:sp>
+        <p:nvSpPr>
+          <p:cNvPr id="8" name="TextBox 7">
+            <a:extLst>
+              <a:ext uri="{FF2B5EF4-FFF2-40B4-BE49-F238E27FC236}">
+                <a16:creationId xmlns:a16="http://schemas.microsoft.com/office/drawing/2014/main" id="{B5C2AC9C-39FD-4251-95D8-EB7760EF0424}"/>
+              </a:ext>
+            </a:extLst>
+          </p:cNvPr>
+          <p:cNvSpPr txBox="1"/>
+          <p:nvPr/>
+        </p:nvSpPr>
+        <p:spPr>
+          <a:xfrm>
+            <a:off x="3712126" y="2894915"/>
+            <a:ext cx="2072080" cy="376792"/>
+          </a:xfrm>
+          <a:prstGeom prst="rect">
+            <a:avLst/>
+          </a:prstGeom>
+          <a:noFill/>
+        </p:spPr>
+        <p:txBody>
+          <a:bodyPr wrap="square" rtlCol="0">
+            <a:spAutoFit/>
+          </a:bodyPr>
+          <a:lstStyle/>
+          <a:p>
+            <a:r>
+              <a:rPr lang="en-US" i="1" dirty="0"/>
+              <a:t>Modules</a:t>
+            </a:r>
+          </a:p>
+        </p:txBody>
+      </p:sp>
+      <p:sp>
+        <p:nvSpPr>
+          <p:cNvPr id="9" name="TextBox 8">
+            <a:extLst>
+              <a:ext uri="{FF2B5EF4-FFF2-40B4-BE49-F238E27FC236}">
+                <a16:creationId xmlns:a16="http://schemas.microsoft.com/office/drawing/2014/main" id="{E82CFB3E-6FB2-4B3E-9AD6-1F15997C39B5}"/>
+              </a:ext>
+            </a:extLst>
+          </p:cNvPr>
+          <p:cNvSpPr txBox="1"/>
+          <p:nvPr/>
+        </p:nvSpPr>
+        <p:spPr>
+          <a:xfrm>
+            <a:off x="6599339" y="2894915"/>
+            <a:ext cx="2072080" cy="376792"/>
+          </a:xfrm>
+          <a:prstGeom prst="rect">
+            <a:avLst/>
+          </a:prstGeom>
+          <a:noFill/>
+        </p:spPr>
+        <p:txBody>
+          <a:bodyPr wrap="square" rtlCol="0">
+            <a:spAutoFit/>
+          </a:bodyPr>
+          <a:lstStyle/>
+          <a:p>
+            <a:r>
+              <a:rPr lang="en-US" i="1" dirty="0"/>
+              <a:t>Types</a:t>
+            </a:r>
+          </a:p>
+        </p:txBody>
+      </p:sp>
+      <p:sp>
+        <p:nvSpPr>
+          <p:cNvPr id="10" name="TextBox 9">
+            <a:extLst>
+              <a:ext uri="{FF2B5EF4-FFF2-40B4-BE49-F238E27FC236}">
+                <a16:creationId xmlns:a16="http://schemas.microsoft.com/office/drawing/2014/main" id="{CF70B984-F3C6-4E7E-9435-D927A4563380}"/>
+              </a:ext>
+            </a:extLst>
+          </p:cNvPr>
+          <p:cNvSpPr txBox="1"/>
+          <p:nvPr/>
+        </p:nvSpPr>
+        <p:spPr>
+          <a:xfrm>
+            <a:off x="6578368" y="5445855"/>
+            <a:ext cx="2407640" cy="369332"/>
+          </a:xfrm>
+          <a:prstGeom prst="rect">
+            <a:avLst/>
+          </a:prstGeom>
+          <a:noFill/>
+        </p:spPr>
+        <p:txBody>
+          <a:bodyPr wrap="square" rtlCol="0">
+            <a:spAutoFit/>
+          </a:bodyPr>
+          <a:lstStyle/>
+          <a:p>
+            <a:r>
+              <a:rPr lang="en-US" dirty="0" err="1"/>
+              <a:t>bitvector</a:t>
+            </a:r>
+            <a:r>
+              <a:rPr lang="en-US" dirty="0"/>
+              <a:t> : N -&gt; Type</a:t>
+            </a:r>
+          </a:p>
+        </p:txBody>
+      </p:sp>
+      <p:sp>
+        <p:nvSpPr>
+          <p:cNvPr id="11" name="TextBox 10">
+            <a:extLst>
+              <a:ext uri="{FF2B5EF4-FFF2-40B4-BE49-F238E27FC236}">
+                <a16:creationId xmlns:a16="http://schemas.microsoft.com/office/drawing/2014/main" id="{18156261-D172-4DEE-8A65-89E86833C6BE}"/>
+              </a:ext>
+            </a:extLst>
+          </p:cNvPr>
+          <p:cNvSpPr txBox="1"/>
+          <p:nvPr/>
+        </p:nvSpPr>
+        <p:spPr>
+          <a:xfrm>
+            <a:off x="6546210" y="3433893"/>
+            <a:ext cx="2407640" cy="646331"/>
+          </a:xfrm>
+          <a:prstGeom prst="rect">
+            <a:avLst/>
+          </a:prstGeom>
+          <a:noFill/>
+        </p:spPr>
+        <p:txBody>
+          <a:bodyPr wrap="square" rtlCol="0">
+            <a:spAutoFit/>
+          </a:bodyPr>
+          <a:lstStyle/>
+          <a:p>
+            <a:r>
+              <a:rPr lang="en-US" dirty="0" err="1"/>
+              <a:t>bitvector</a:t>
+            </a:r>
+            <a:r>
+              <a:rPr lang="en-US" dirty="0"/>
+              <a:t> : Type</a:t>
+            </a:r>
+            <a:br>
+              <a:rPr lang="en-US" dirty="0"/>
+            </a:br>
+            <a:r>
+              <a:rPr lang="en-US" dirty="0"/>
+              <a:t>size : </a:t>
+            </a:r>
+            <a:r>
+              <a:rPr lang="en-US" dirty="0" err="1"/>
+              <a:t>bitvector</a:t>
+            </a:r>
+            <a:r>
+              <a:rPr lang="en-US" dirty="0"/>
+              <a:t> -&gt; N</a:t>
             </a:r>
           </a:p>
         </p:txBody>
@@ -4946,6 +5561,25 @@
   <p:tag name="LATEXADDIN" val="\documentclass{article}&#10;\usepackage{amsmath}&#10;\pagestyle{empty}&#10;\begin{document}&#10;$x + s = t \iff \top$&#10;\end{document}"/>
   <p:tag name="IGUANATEXSIZE" val="28"/>
   <p:tag name="IGUANATEXCURSOR" val="101"/>
+  <p:tag name="TRANSPARENCY" val="True"/>
+  <p:tag name="FILENAME" val=""/>
+  <p:tag name="LATEXENGINEID" val="0"/>
+  <p:tag name="TEMPFOLDER" val="c:\temp\"/>
+  <p:tag name="LATEXFORMHEIGHT" val="312"/>
+  <p:tag name="LATEXFORMWIDTH" val="384"/>
+  <p:tag name="LATEXFORMWRAP" val="True"/>
+  <p:tag name="BITMAPVECTOR" val="0"/>
+</p:tagLst>
+</file>
+
+<file path=ppt/tags/tag10.xml><?xml version="1.0" encoding="utf-8"?>
+<p:tagLst xmlns:a="http://schemas.openxmlformats.org/drawingml/2006/main" xmlns:r="http://schemas.openxmlformats.org/officeDocument/2006/relationships" xmlns:p="http://schemas.openxmlformats.org/presentationml/2006/main">
+  <p:tag name="OUTPUTDPI" val="1200"/>
+  <p:tag name="ORIGINALHEIGHT" val="741.6573"/>
+  <p:tag name="ORIGINALWIDTH" val="4098.988"/>
+  <p:tag name="LATEXADDIN" val="\documentclass{article}&#10;\usepackage{amsmath}&#10;\pagestyle{empty}&#10;\begin{document}&#10;\begin{itemize}&#10;\item unsigned weak inequalities ($&lt;=_u$, $&gt;=_u$)..&#10;\item arithmetic right shift ($\mathop{&gt;\kern-.3em&gt;_a}$).&#10;\item new definitions ofo all shift operators and a proof of equivalence between the two sets of definitions.&#10;\end{itemize}&#10;\end{document}"/>
+  <p:tag name="IGUANATEXSIZE" val="20"/>
+  <p:tag name="IGUANATEXCURSOR" val="315"/>
   <p:tag name="TRANSPARENCY" val="True"/>
   <p:tag name="FILENAME" val=""/>
   <p:tag name="LATEXENGINEID" val="0"/>
@@ -5079,6 +5713,25 @@
   <p:tag name="LATEXADDIN" val="\documentclass{article}&#10;\usepackage[a4paper]{geometry}&#10;\geometry{textwidth=\paperwidth, textheight=\paperheight, noheadfoot, nomarginpar}&#10;\setlength{\topskip}{0mm}&#10;\setlength{\parindent}{0mm}&#10;\usepackage{amsmath}&#10;\usepackage{xcolor}&#10;\usepackage{xspace}&#10;\usepackage{pifont}&#10;\usepackage{amssymb}&#10;\pagestyle{empty}&#10;\begin{document}&#10;{\color{blue}{$\checkmark$}} - Verified by us in Coq for arbitrary bit-width. \\&#10;{\color{green}{$\checkmark$}} - Verified by Niemetz et al. using SMT encoding. \\&#10;{\color{blue}{$\checkmark$}\nolinebreak\kern-0.7em\xspace\color{green}{$\checkmark$}} - Verified by both us and Niemetz et al. \\&#10;{\color{red}\ding{53}} - Verified by neither us nor Niemetz et al.&#10;\end{document}"/>
   <p:tag name="IGUANATEXSIZE" val="20"/>
   <p:tag name="IGUANATEXCURSOR" val="621"/>
+  <p:tag name="TRANSPARENCY" val="True"/>
+  <p:tag name="FILENAME" val=""/>
+  <p:tag name="LATEXENGINEID" val="0"/>
+  <p:tag name="TEMPFOLDER" val="c:\temp\"/>
+  <p:tag name="LATEXFORMHEIGHT" val="312"/>
+  <p:tag name="LATEXFORMWIDTH" val="384"/>
+  <p:tag name="LATEXFORMWRAP" val="True"/>
+  <p:tag name="BITMAPVECTOR" val="0"/>
+</p:tagLst>
+</file>
+
+<file path=ppt/tags/tag9.xml><?xml version="1.0" encoding="utf-8"?>
+<p:tagLst xmlns:a="http://schemas.openxmlformats.org/drawingml/2006/main" xmlns:r="http://schemas.openxmlformats.org/officeDocument/2006/relationships" xmlns:p="http://schemas.openxmlformats.org/presentationml/2006/main">
+  <p:tag name="OUTPUTDPI" val="1200"/>
+  <p:tag name="ORIGINALHEIGHT" val="1368.579"/>
+  <p:tag name="ORIGINALWIDTH" val="3709.036"/>
+  <p:tag name="LATEXADDIN" val="\documentclass{article}&#10;\usepackage{amsmath}&#10;\pagestyle{empty}&#10;\begin{document}&#10;\begin{itemize}&#10;\item addition ($+$), negation ($-$), multiplication ($\cdot$).&#10;\item bit-wise conjunction ($\&amp;$), disjunction ($\mid$), negation ($\sim$).&#10;\item logical left ($\mathop{&lt;\kern-.3em&lt;}$) and right ($\mathop{&gt;\kern-.3em&gt;}$) shift.&#10;\item concatenation ($\circ$).&#10;\item equality ($=$), disequality ($\not=$).&#10;\item unsigned and signed less than and greater than ($&lt;_u$, $&gt;_u$, $&lt;_s$, $&gt;_s$).&#10;\end{itemize}&#10;\end{document}"/>
+  <p:tag name="IGUANATEXSIZE" val="20"/>
+  <p:tag name="IGUANATEXCURSOR" val="482"/>
   <p:tag name="TRANSPARENCY" val="True"/>
   <p:tag name="FILENAME" val=""/>
   <p:tag name="LATEXENGINEID" val="0"/>

</xml_diff>

<commit_message>
Changes using feedback from Cesare and Yoni
</commit_message>
<xml_diff>
--- a/Presentation.pptx
+++ b/Presentation.pptx
@@ -4,19 +4,22 @@
   <p:sldMasterIdLst>
     <p:sldMasterId id="2147483725" r:id="rId1"/>
   </p:sldMasterIdLst>
+  <p:notesMasterIdLst>
+    <p:notesMasterId r:id="rId15"/>
+  </p:notesMasterIdLst>
   <p:sldIdLst>
     <p:sldId id="256" r:id="rId2"/>
     <p:sldId id="257" r:id="rId3"/>
     <p:sldId id="258" r:id="rId4"/>
-    <p:sldId id="259" r:id="rId5"/>
-    <p:sldId id="261" r:id="rId6"/>
-    <p:sldId id="260" r:id="rId7"/>
-    <p:sldId id="268" r:id="rId8"/>
-    <p:sldId id="264" r:id="rId9"/>
+    <p:sldId id="264" r:id="rId5"/>
+    <p:sldId id="259" r:id="rId6"/>
+    <p:sldId id="261" r:id="rId7"/>
+    <p:sldId id="260" r:id="rId8"/>
+    <p:sldId id="268" r:id="rId9"/>
     <p:sldId id="265" r:id="rId10"/>
     <p:sldId id="266" r:id="rId11"/>
-    <p:sldId id="267" r:id="rId12"/>
-    <p:sldId id="269" r:id="rId13"/>
+    <p:sldId id="270" r:id="rId12"/>
+    <p:sldId id="267" r:id="rId13"/>
     <p:sldId id="263" r:id="rId14"/>
   </p:sldIdLst>
   <p:sldSz cx="12192000" cy="6858000"/>
@@ -124,6 +127,450 @@
 </p:presentation>
 </file>
 
+<file path=ppt/notesMasters/notesMaster1.xml><?xml version="1.0" encoding="utf-8"?>
+<p:notesMaster xmlns:a="http://schemas.openxmlformats.org/drawingml/2006/main" xmlns:r="http://schemas.openxmlformats.org/officeDocument/2006/relationships" xmlns:p="http://schemas.openxmlformats.org/presentationml/2006/main">
+  <p:cSld>
+    <p:bg>
+      <p:bgRef idx="1001">
+        <a:schemeClr val="bg1"/>
+      </p:bgRef>
+    </p:bg>
+    <p:spTree>
+      <p:nvGrpSpPr>
+        <p:cNvPr id="1" name=""/>
+        <p:cNvGrpSpPr/>
+        <p:nvPr/>
+      </p:nvGrpSpPr>
+      <p:grpSpPr>
+        <a:xfrm>
+          <a:off x="0" y="0"/>
+          <a:ext cx="0" cy="0"/>
+          <a:chOff x="0" y="0"/>
+          <a:chExt cx="0" cy="0"/>
+        </a:xfrm>
+      </p:grpSpPr>
+      <p:sp>
+        <p:nvSpPr>
+          <p:cNvPr id="2" name="Header Placeholder 1"/>
+          <p:cNvSpPr>
+            <a:spLocks noGrp="1"/>
+          </p:cNvSpPr>
+          <p:nvPr>
+            <p:ph type="hdr" sz="quarter"/>
+          </p:nvPr>
+        </p:nvSpPr>
+        <p:spPr>
+          <a:xfrm>
+            <a:off x="0" y="0"/>
+            <a:ext cx="2971800" cy="458788"/>
+          </a:xfrm>
+          <a:prstGeom prst="rect">
+            <a:avLst/>
+          </a:prstGeom>
+        </p:spPr>
+        <p:txBody>
+          <a:bodyPr vert="horz" lIns="91440" tIns="45720" rIns="91440" bIns="45720" rtlCol="0"/>
+          <a:lstStyle>
+            <a:lvl1pPr algn="l">
+              <a:defRPr sz="1200"/>
+            </a:lvl1pPr>
+          </a:lstStyle>
+          <a:p>
+            <a:endParaRPr lang="en-US"/>
+          </a:p>
+        </p:txBody>
+      </p:sp>
+      <p:sp>
+        <p:nvSpPr>
+          <p:cNvPr id="3" name="Date Placeholder 2"/>
+          <p:cNvSpPr>
+            <a:spLocks noGrp="1"/>
+          </p:cNvSpPr>
+          <p:nvPr>
+            <p:ph type="dt" idx="1"/>
+          </p:nvPr>
+        </p:nvSpPr>
+        <p:spPr>
+          <a:xfrm>
+            <a:off x="3884613" y="0"/>
+            <a:ext cx="2971800" cy="458788"/>
+          </a:xfrm>
+          <a:prstGeom prst="rect">
+            <a:avLst/>
+          </a:prstGeom>
+        </p:spPr>
+        <p:txBody>
+          <a:bodyPr vert="horz" lIns="91440" tIns="45720" rIns="91440" bIns="45720" rtlCol="0"/>
+          <a:lstStyle>
+            <a:lvl1pPr algn="r">
+              <a:defRPr sz="1200"/>
+            </a:lvl1pPr>
+          </a:lstStyle>
+          <a:p>
+            <a:fld id="{4F5BAD48-3E9D-44CA-B663-82E68EEB1E08}" type="datetimeFigureOut">
+              <a:rPr lang="en-US" smtClean="0"/>
+              <a:t>7/31/2019</a:t>
+            </a:fld>
+            <a:endParaRPr lang="en-US"/>
+          </a:p>
+        </p:txBody>
+      </p:sp>
+      <p:sp>
+        <p:nvSpPr>
+          <p:cNvPr id="4" name="Slide Image Placeholder 3"/>
+          <p:cNvSpPr>
+            <a:spLocks noGrp="1" noRot="1" noChangeAspect="1"/>
+          </p:cNvSpPr>
+          <p:nvPr>
+            <p:ph type="sldImg" idx="2"/>
+          </p:nvPr>
+        </p:nvSpPr>
+        <p:spPr>
+          <a:xfrm>
+            <a:off x="685800" y="1143000"/>
+            <a:ext cx="5486400" cy="3086100"/>
+          </a:xfrm>
+          <a:prstGeom prst="rect">
+            <a:avLst/>
+          </a:prstGeom>
+          <a:noFill/>
+          <a:ln w="12700">
+            <a:solidFill>
+              <a:prstClr val="black"/>
+            </a:solidFill>
+          </a:ln>
+        </p:spPr>
+        <p:txBody>
+          <a:bodyPr vert="horz" lIns="91440" tIns="45720" rIns="91440" bIns="45720" rtlCol="0" anchor="ctr"/>
+          <a:lstStyle/>
+          <a:p>
+            <a:endParaRPr lang="en-US"/>
+          </a:p>
+        </p:txBody>
+      </p:sp>
+      <p:sp>
+        <p:nvSpPr>
+          <p:cNvPr id="5" name="Notes Placeholder 4"/>
+          <p:cNvSpPr>
+            <a:spLocks noGrp="1"/>
+          </p:cNvSpPr>
+          <p:nvPr>
+            <p:ph type="body" sz="quarter" idx="3"/>
+          </p:nvPr>
+        </p:nvSpPr>
+        <p:spPr>
+          <a:xfrm>
+            <a:off x="685800" y="4400550"/>
+            <a:ext cx="5486400" cy="3600450"/>
+          </a:xfrm>
+          <a:prstGeom prst="rect">
+            <a:avLst/>
+          </a:prstGeom>
+        </p:spPr>
+        <p:txBody>
+          <a:bodyPr vert="horz" lIns="91440" tIns="45720" rIns="91440" bIns="45720" rtlCol="0"/>
+          <a:lstStyle/>
+          <a:p>
+            <a:pPr lvl="0"/>
+            <a:r>
+              <a:rPr lang="en-US"/>
+              <a:t>Click to edit Master text styles</a:t>
+            </a:r>
+          </a:p>
+          <a:p>
+            <a:pPr lvl="1"/>
+            <a:r>
+              <a:rPr lang="en-US"/>
+              <a:t>Second level</a:t>
+            </a:r>
+          </a:p>
+          <a:p>
+            <a:pPr lvl="2"/>
+            <a:r>
+              <a:rPr lang="en-US"/>
+              <a:t>Third level</a:t>
+            </a:r>
+          </a:p>
+          <a:p>
+            <a:pPr lvl="3"/>
+            <a:r>
+              <a:rPr lang="en-US"/>
+              <a:t>Fourth level</a:t>
+            </a:r>
+          </a:p>
+          <a:p>
+            <a:pPr lvl="4"/>
+            <a:r>
+              <a:rPr lang="en-US"/>
+              <a:t>Fifth level</a:t>
+            </a:r>
+          </a:p>
+        </p:txBody>
+      </p:sp>
+      <p:sp>
+        <p:nvSpPr>
+          <p:cNvPr id="6" name="Footer Placeholder 5"/>
+          <p:cNvSpPr>
+            <a:spLocks noGrp="1"/>
+          </p:cNvSpPr>
+          <p:nvPr>
+            <p:ph type="ftr" sz="quarter" idx="4"/>
+          </p:nvPr>
+        </p:nvSpPr>
+        <p:spPr>
+          <a:xfrm>
+            <a:off x="0" y="8685213"/>
+            <a:ext cx="2971800" cy="458787"/>
+          </a:xfrm>
+          <a:prstGeom prst="rect">
+            <a:avLst/>
+          </a:prstGeom>
+        </p:spPr>
+        <p:txBody>
+          <a:bodyPr vert="horz" lIns="91440" tIns="45720" rIns="91440" bIns="45720" rtlCol="0" anchor="b"/>
+          <a:lstStyle>
+            <a:lvl1pPr algn="l">
+              <a:defRPr sz="1200"/>
+            </a:lvl1pPr>
+          </a:lstStyle>
+          <a:p>
+            <a:endParaRPr lang="en-US"/>
+          </a:p>
+        </p:txBody>
+      </p:sp>
+      <p:sp>
+        <p:nvSpPr>
+          <p:cNvPr id="7" name="Slide Number Placeholder 6"/>
+          <p:cNvSpPr>
+            <a:spLocks noGrp="1"/>
+          </p:cNvSpPr>
+          <p:nvPr>
+            <p:ph type="sldNum" sz="quarter" idx="5"/>
+          </p:nvPr>
+        </p:nvSpPr>
+        <p:spPr>
+          <a:xfrm>
+            <a:off x="3884613" y="8685213"/>
+            <a:ext cx="2971800" cy="458787"/>
+          </a:xfrm>
+          <a:prstGeom prst="rect">
+            <a:avLst/>
+          </a:prstGeom>
+        </p:spPr>
+        <p:txBody>
+          <a:bodyPr vert="horz" lIns="91440" tIns="45720" rIns="91440" bIns="45720" rtlCol="0" anchor="b"/>
+          <a:lstStyle>
+            <a:lvl1pPr algn="r">
+              <a:defRPr sz="1200"/>
+            </a:lvl1pPr>
+          </a:lstStyle>
+          <a:p>
+            <a:fld id="{354FD78B-5075-4CBB-A78B-67D8560C3DC5}" type="slidenum">
+              <a:rPr lang="en-US" smtClean="0"/>
+              <a:t>‹#›</a:t>
+            </a:fld>
+            <a:endParaRPr lang="en-US"/>
+          </a:p>
+        </p:txBody>
+      </p:sp>
+    </p:spTree>
+    <p:extLst>
+      <p:ext uri="{BB962C8B-B14F-4D97-AF65-F5344CB8AC3E}">
+        <p14:creationId xmlns:p14="http://schemas.microsoft.com/office/powerpoint/2010/main" val="524041262"/>
+      </p:ext>
+    </p:extLst>
+  </p:cSld>
+  <p:clrMap bg1="lt1" tx1="dk1" bg2="lt2" tx2="dk2" accent1="accent1" accent2="accent2" accent3="accent3" accent4="accent4" accent5="accent5" accent6="accent6" hlink="hlink" folHlink="folHlink"/>
+  <p:notesStyle>
+    <a:lvl1pPr marL="0" algn="l" defTabSz="914400" rtl="0" eaLnBrk="1" latinLnBrk="0" hangingPunct="1">
+      <a:defRPr sz="1200" kern="1200">
+        <a:solidFill>
+          <a:schemeClr val="tx1"/>
+        </a:solidFill>
+        <a:latin typeface="+mn-lt"/>
+        <a:ea typeface="+mn-ea"/>
+        <a:cs typeface="+mn-cs"/>
+      </a:defRPr>
+    </a:lvl1pPr>
+    <a:lvl2pPr marL="457200" algn="l" defTabSz="914400" rtl="0" eaLnBrk="1" latinLnBrk="0" hangingPunct="1">
+      <a:defRPr sz="1200" kern="1200">
+        <a:solidFill>
+          <a:schemeClr val="tx1"/>
+        </a:solidFill>
+        <a:latin typeface="+mn-lt"/>
+        <a:ea typeface="+mn-ea"/>
+        <a:cs typeface="+mn-cs"/>
+      </a:defRPr>
+    </a:lvl2pPr>
+    <a:lvl3pPr marL="914400" algn="l" defTabSz="914400" rtl="0" eaLnBrk="1" latinLnBrk="0" hangingPunct="1">
+      <a:defRPr sz="1200" kern="1200">
+        <a:solidFill>
+          <a:schemeClr val="tx1"/>
+        </a:solidFill>
+        <a:latin typeface="+mn-lt"/>
+        <a:ea typeface="+mn-ea"/>
+        <a:cs typeface="+mn-cs"/>
+      </a:defRPr>
+    </a:lvl3pPr>
+    <a:lvl4pPr marL="1371600" algn="l" defTabSz="914400" rtl="0" eaLnBrk="1" latinLnBrk="0" hangingPunct="1">
+      <a:defRPr sz="1200" kern="1200">
+        <a:solidFill>
+          <a:schemeClr val="tx1"/>
+        </a:solidFill>
+        <a:latin typeface="+mn-lt"/>
+        <a:ea typeface="+mn-ea"/>
+        <a:cs typeface="+mn-cs"/>
+      </a:defRPr>
+    </a:lvl4pPr>
+    <a:lvl5pPr marL="1828800" algn="l" defTabSz="914400" rtl="0" eaLnBrk="1" latinLnBrk="0" hangingPunct="1">
+      <a:defRPr sz="1200" kern="1200">
+        <a:solidFill>
+          <a:schemeClr val="tx1"/>
+        </a:solidFill>
+        <a:latin typeface="+mn-lt"/>
+        <a:ea typeface="+mn-ea"/>
+        <a:cs typeface="+mn-cs"/>
+      </a:defRPr>
+    </a:lvl5pPr>
+    <a:lvl6pPr marL="2286000" algn="l" defTabSz="914400" rtl="0" eaLnBrk="1" latinLnBrk="0" hangingPunct="1">
+      <a:defRPr sz="1200" kern="1200">
+        <a:solidFill>
+          <a:schemeClr val="tx1"/>
+        </a:solidFill>
+        <a:latin typeface="+mn-lt"/>
+        <a:ea typeface="+mn-ea"/>
+        <a:cs typeface="+mn-cs"/>
+      </a:defRPr>
+    </a:lvl6pPr>
+    <a:lvl7pPr marL="2743200" algn="l" defTabSz="914400" rtl="0" eaLnBrk="1" latinLnBrk="0" hangingPunct="1">
+      <a:defRPr sz="1200" kern="1200">
+        <a:solidFill>
+          <a:schemeClr val="tx1"/>
+        </a:solidFill>
+        <a:latin typeface="+mn-lt"/>
+        <a:ea typeface="+mn-ea"/>
+        <a:cs typeface="+mn-cs"/>
+      </a:defRPr>
+    </a:lvl7pPr>
+    <a:lvl8pPr marL="3200400" algn="l" defTabSz="914400" rtl="0" eaLnBrk="1" latinLnBrk="0" hangingPunct="1">
+      <a:defRPr sz="1200" kern="1200">
+        <a:solidFill>
+          <a:schemeClr val="tx1"/>
+        </a:solidFill>
+        <a:latin typeface="+mn-lt"/>
+        <a:ea typeface="+mn-ea"/>
+        <a:cs typeface="+mn-cs"/>
+      </a:defRPr>
+    </a:lvl8pPr>
+    <a:lvl9pPr marL="3657600" algn="l" defTabSz="914400" rtl="0" eaLnBrk="1" latinLnBrk="0" hangingPunct="1">
+      <a:defRPr sz="1200" kern="1200">
+        <a:solidFill>
+          <a:schemeClr val="tx1"/>
+        </a:solidFill>
+        <a:latin typeface="+mn-lt"/>
+        <a:ea typeface="+mn-ea"/>
+        <a:cs typeface="+mn-cs"/>
+      </a:defRPr>
+    </a:lvl9pPr>
+  </p:notesStyle>
+</p:notesMaster>
+</file>
+
+<file path=ppt/notesSlides/notesSlide1.xml><?xml version="1.0" encoding="utf-8"?>
+<p:notes xmlns:a="http://schemas.openxmlformats.org/drawingml/2006/main" xmlns:r="http://schemas.openxmlformats.org/officeDocument/2006/relationships" xmlns:p="http://schemas.openxmlformats.org/presentationml/2006/main">
+  <p:cSld>
+    <p:spTree>
+      <p:nvGrpSpPr>
+        <p:cNvPr id="1" name=""/>
+        <p:cNvGrpSpPr/>
+        <p:nvPr/>
+      </p:nvGrpSpPr>
+      <p:grpSpPr>
+        <a:xfrm>
+          <a:off x="0" y="0"/>
+          <a:ext cx="0" cy="0"/>
+          <a:chOff x="0" y="0"/>
+          <a:chExt cx="0" cy="0"/>
+        </a:xfrm>
+      </p:grpSpPr>
+      <p:sp>
+        <p:nvSpPr>
+          <p:cNvPr id="2" name="Slide Image Placeholder 1"/>
+          <p:cNvSpPr>
+            <a:spLocks noGrp="1" noRot="1" noChangeAspect="1"/>
+          </p:cNvSpPr>
+          <p:nvPr>
+            <p:ph type="sldImg"/>
+          </p:nvPr>
+        </p:nvSpPr>
+        <p:spPr/>
+      </p:sp>
+      <p:sp>
+        <p:nvSpPr>
+          <p:cNvPr id="3" name="Notes Placeholder 2"/>
+          <p:cNvSpPr>
+            <a:spLocks noGrp="1"/>
+          </p:cNvSpPr>
+          <p:nvPr>
+            <p:ph type="body" idx="1"/>
+          </p:nvPr>
+        </p:nvSpPr>
+        <p:spPr/>
+        <p:txBody>
+          <a:bodyPr/>
+          <a:lstStyle/>
+          <a:p>
+            <a:r>
+              <a:rPr lang="en-US" dirty="0"/>
+              <a:t>For general correctness, the quantifier instantiation technique introduced by [</a:t>
+            </a:r>
+            <a:r>
+              <a:rPr lang="en-US" dirty="0" err="1"/>
+              <a:t>Niemetz</a:t>
+            </a:r>
+            <a:r>
+              <a:rPr lang="en-US" dirty="0"/>
+              <a:t> et al.] requires the equivalences to be true.</a:t>
+            </a:r>
+          </a:p>
+        </p:txBody>
+      </p:sp>
+      <p:sp>
+        <p:nvSpPr>
+          <p:cNvPr id="4" name="Slide Number Placeholder 3"/>
+          <p:cNvSpPr>
+            <a:spLocks noGrp="1"/>
+          </p:cNvSpPr>
+          <p:nvPr>
+            <p:ph type="sldNum" sz="quarter" idx="5"/>
+          </p:nvPr>
+        </p:nvSpPr>
+        <p:spPr/>
+        <p:txBody>
+          <a:bodyPr/>
+          <a:lstStyle/>
+          <a:p>
+            <a:fld id="{354FD78B-5075-4CBB-A78B-67D8560C3DC5}" type="slidenum">
+              <a:rPr lang="en-US" smtClean="0"/>
+              <a:t>6</a:t>
+            </a:fld>
+            <a:endParaRPr lang="en-US"/>
+          </a:p>
+        </p:txBody>
+      </p:sp>
+    </p:spTree>
+    <p:extLst>
+      <p:ext uri="{BB962C8B-B14F-4D97-AF65-F5344CB8AC3E}">
+        <p14:creationId xmlns:p14="http://schemas.microsoft.com/office/powerpoint/2010/main" val="3304338321"/>
+      </p:ext>
+    </p:extLst>
+  </p:cSld>
+  <p:clrMapOvr>
+    <a:masterClrMapping/>
+  </p:clrMapOvr>
+</p:notes>
+</file>
+
 <file path=ppt/slideLayouts/slideLayout1.xml><?xml version="1.0" encoding="utf-8"?>
 <p:sldLayout xmlns:a="http://schemas.openxmlformats.org/drawingml/2006/main" xmlns:r="http://schemas.openxmlformats.org/officeDocument/2006/relationships" xmlns:p="http://schemas.openxmlformats.org/presentationml/2006/main" type="title" preserve="1">
   <p:cSld name="Title Slide">
@@ -255,7 +702,7 @@
           <a:p>
             <a:fld id="{C8A3F418-5BE6-4764-B372-575D89EC1E3D}" type="datetimeFigureOut">
               <a:rPr lang="en-US" smtClean="0"/>
-              <a:t>7/29/2019</a:t>
+              <a:t>7/31/2019</a:t>
             </a:fld>
             <a:endParaRPr lang="en-US"/>
           </a:p>
@@ -425,7 +872,7 @@
           <a:p>
             <a:fld id="{C8A3F418-5BE6-4764-B372-575D89EC1E3D}" type="datetimeFigureOut">
               <a:rPr lang="en-US" smtClean="0"/>
-              <a:t>7/29/2019</a:t>
+              <a:t>7/31/2019</a:t>
             </a:fld>
             <a:endParaRPr lang="en-US"/>
           </a:p>
@@ -605,7 +1052,7 @@
           <a:p>
             <a:fld id="{C8A3F418-5BE6-4764-B372-575D89EC1E3D}" type="datetimeFigureOut">
               <a:rPr lang="en-US" smtClean="0"/>
-              <a:t>7/29/2019</a:t>
+              <a:t>7/31/2019</a:t>
             </a:fld>
             <a:endParaRPr lang="en-US"/>
           </a:p>
@@ -775,7 +1222,7 @@
           <a:p>
             <a:fld id="{C8A3F418-5BE6-4764-B372-575D89EC1E3D}" type="datetimeFigureOut">
               <a:rPr lang="en-US" smtClean="0"/>
-              <a:t>7/29/2019</a:t>
+              <a:t>7/31/2019</a:t>
             </a:fld>
             <a:endParaRPr lang="en-US"/>
           </a:p>
@@ -1021,7 +1468,7 @@
           <a:p>
             <a:fld id="{C8A3F418-5BE6-4764-B372-575D89EC1E3D}" type="datetimeFigureOut">
               <a:rPr lang="en-US" smtClean="0"/>
-              <a:t>7/29/2019</a:t>
+              <a:t>7/31/2019</a:t>
             </a:fld>
             <a:endParaRPr lang="en-US"/>
           </a:p>
@@ -1253,7 +1700,7 @@
           <a:p>
             <a:fld id="{C8A3F418-5BE6-4764-B372-575D89EC1E3D}" type="datetimeFigureOut">
               <a:rPr lang="en-US" smtClean="0"/>
-              <a:t>7/29/2019</a:t>
+              <a:t>7/31/2019</a:t>
             </a:fld>
             <a:endParaRPr lang="en-US"/>
           </a:p>
@@ -1620,7 +2067,7 @@
           <a:p>
             <a:fld id="{C8A3F418-5BE6-4764-B372-575D89EC1E3D}" type="datetimeFigureOut">
               <a:rPr lang="en-US" smtClean="0"/>
-              <a:t>7/29/2019</a:t>
+              <a:t>7/31/2019</a:t>
             </a:fld>
             <a:endParaRPr lang="en-US"/>
           </a:p>
@@ -1738,7 +2185,7 @@
           <a:p>
             <a:fld id="{C8A3F418-5BE6-4764-B372-575D89EC1E3D}" type="datetimeFigureOut">
               <a:rPr lang="en-US" smtClean="0"/>
-              <a:t>7/29/2019</a:t>
+              <a:t>7/31/2019</a:t>
             </a:fld>
             <a:endParaRPr lang="en-US"/>
           </a:p>
@@ -1833,7 +2280,7 @@
           <a:p>
             <a:fld id="{C8A3F418-5BE6-4764-B372-575D89EC1E3D}" type="datetimeFigureOut">
               <a:rPr lang="en-US" smtClean="0"/>
-              <a:t>7/29/2019</a:t>
+              <a:t>7/31/2019</a:t>
             </a:fld>
             <a:endParaRPr lang="en-US"/>
           </a:p>
@@ -2110,7 +2557,7 @@
           <a:p>
             <a:fld id="{C8A3F418-5BE6-4764-B372-575D89EC1E3D}" type="datetimeFigureOut">
               <a:rPr lang="en-US" smtClean="0"/>
-              <a:t>7/29/2019</a:t>
+              <a:t>7/31/2019</a:t>
             </a:fld>
             <a:endParaRPr lang="en-US"/>
           </a:p>
@@ -2367,7 +2814,7 @@
           <a:p>
             <a:fld id="{C8A3F418-5BE6-4764-B372-575D89EC1E3D}" type="datetimeFigureOut">
               <a:rPr lang="en-US" smtClean="0"/>
-              <a:t>7/29/2019</a:t>
+              <a:t>7/31/2019</a:t>
             </a:fld>
             <a:endParaRPr lang="en-US"/>
           </a:p>
@@ -2580,7 +3027,7 @@
           <a:p>
             <a:fld id="{C8A3F418-5BE6-4764-B372-575D89EC1E3D}" type="datetimeFigureOut">
               <a:rPr lang="en-US" smtClean="0"/>
-              <a:t>7/29/2019</a:t>
+              <a:t>7/31/2019</a:t>
             </a:fld>
             <a:endParaRPr lang="en-US"/>
           </a:p>
@@ -3163,7 +3610,7 @@
         </p:blipFill>
         <p:spPr>
           <a:xfrm>
-            <a:off x="2528644" y="5137566"/>
+            <a:off x="4912063" y="4928560"/>
             <a:ext cx="2398633" cy="1367099"/>
           </a:xfrm>
           <a:prstGeom prst="rect">
@@ -3201,7 +3648,7 @@
         </p:blipFill>
         <p:spPr>
           <a:xfrm>
-            <a:off x="4719993" y="5041575"/>
+            <a:off x="7441133" y="4823144"/>
             <a:ext cx="2804843" cy="1577930"/>
           </a:xfrm>
           <a:prstGeom prst="rect">
@@ -3242,7 +3689,7 @@
         </p:blipFill>
         <p:spPr bwMode="auto">
           <a:xfrm>
-            <a:off x="7580554" y="4993321"/>
+            <a:off x="1946024" y="4927784"/>
             <a:ext cx="2159064" cy="1511344"/>
           </a:xfrm>
           <a:prstGeom prst="rect">
@@ -3354,13 +3801,23 @@
             </a:r>
             <a:r>
               <a:rPr lang="en-US" dirty="0"/>
-              <a:t> – a Coq plugin that uses external SMT solvers to complete proof goals.</a:t>
-            </a:r>
-          </a:p>
-          <a:p>
-            <a:r>
-              <a:rPr lang="en-US" dirty="0"/>
-              <a:t>Bit-vectors are represented as lists of Booleans.</a:t>
+              <a:t> </a:t>
+            </a:r>
+          </a:p>
+          <a:p>
+            <a:r>
+              <a:rPr lang="en-US" dirty="0" err="1"/>
+              <a:t>SMTCoq</a:t>
+            </a:r>
+            <a:r>
+              <a:rPr lang="en-US" dirty="0"/>
+              <a:t> is a Coq plugin that uses external SMT solvers to complete proof goals</a:t>
+            </a:r>
+          </a:p>
+          <a:p>
+            <a:r>
+              <a:rPr lang="en-US" dirty="0"/>
+              <a:t>Bit-vectors are represented as lists of Booleans</a:t>
             </a:r>
           </a:p>
         </p:txBody>
@@ -3379,7 +3836,7 @@
         </p:nvSpPr>
         <p:spPr>
           <a:xfrm>
-            <a:off x="2223081" y="3380764"/>
+            <a:off x="2223081" y="3859743"/>
             <a:ext cx="3951215" cy="780176"/>
           </a:xfrm>
           <a:prstGeom prst="rect">
@@ -3428,7 +3885,7 @@
         </p:nvSpPr>
         <p:spPr>
           <a:xfrm rot="5400000">
-            <a:off x="3662173" y="4525225"/>
+            <a:off x="3662173" y="5004204"/>
             <a:ext cx="1161111" cy="381698"/>
           </a:xfrm>
           <a:prstGeom prst="rightArrow">
@@ -3474,7 +3931,7 @@
         </p:nvSpPr>
         <p:spPr>
           <a:xfrm>
-            <a:off x="2223081" y="5296629"/>
+            <a:off x="2223081" y="5775608"/>
             <a:ext cx="3951215" cy="780176"/>
           </a:xfrm>
           <a:prstGeom prst="rect">
@@ -3523,7 +3980,7 @@
         </p:nvSpPr>
         <p:spPr>
           <a:xfrm>
-            <a:off x="6560192" y="4471333"/>
+            <a:off x="6560192" y="4950312"/>
             <a:ext cx="2407640" cy="369332"/>
           </a:xfrm>
           <a:prstGeom prst="rect">
@@ -3538,11 +3995,23 @@
           <a:lstStyle/>
           <a:p>
             <a:r>
-              <a:rPr lang="en-US" dirty="0" err="1"/>
+              <a:rPr lang="en-US" dirty="0" err="1">
+                <a:solidFill>
+                  <a:schemeClr val="accent6">
+                    <a:lumMod val="75000"/>
+                  </a:schemeClr>
+                </a:solidFill>
+              </a:rPr>
               <a:t>Functor</a:t>
             </a:r>
             <a:r>
-              <a:rPr lang="en-US" dirty="0"/>
+              <a:rPr lang="en-US" dirty="0">
+                <a:solidFill>
+                  <a:schemeClr val="accent6">
+                    <a:lumMod val="75000"/>
+                  </a:schemeClr>
+                </a:solidFill>
+              </a:rPr>
               <a:t>: Raw2Bitvector</a:t>
             </a:r>
           </a:p>
@@ -3562,7 +4031,7 @@
         </p:nvSpPr>
         <p:spPr>
           <a:xfrm>
-            <a:off x="3712126" y="2894915"/>
+            <a:off x="3712126" y="3373894"/>
             <a:ext cx="2072080" cy="376792"/>
           </a:xfrm>
           <a:prstGeom prst="rect">
@@ -3597,7 +4066,7 @@
         </p:nvSpPr>
         <p:spPr>
           <a:xfrm>
-            <a:off x="6599339" y="2894915"/>
+            <a:off x="6599339" y="3373894"/>
             <a:ext cx="2072080" cy="376792"/>
           </a:xfrm>
           <a:prstGeom prst="rect">
@@ -3632,7 +4101,7 @@
         </p:nvSpPr>
         <p:spPr>
           <a:xfrm>
-            <a:off x="6578368" y="5445855"/>
+            <a:off x="6578368" y="5924834"/>
             <a:ext cx="2407640" cy="369332"/>
           </a:xfrm>
           <a:prstGeom prst="rect">
@@ -3647,11 +4116,23 @@
           <a:lstStyle/>
           <a:p>
             <a:r>
-              <a:rPr lang="en-US" dirty="0" err="1"/>
+              <a:rPr lang="en-US" dirty="0" err="1">
+                <a:solidFill>
+                  <a:schemeClr val="accent6">
+                    <a:lumMod val="75000"/>
+                  </a:schemeClr>
+                </a:solidFill>
+              </a:rPr>
               <a:t>bitvector</a:t>
             </a:r>
             <a:r>
-              <a:rPr lang="en-US" dirty="0"/>
+              <a:rPr lang="en-US" dirty="0">
+                <a:solidFill>
+                  <a:schemeClr val="accent6">
+                    <a:lumMod val="75000"/>
+                  </a:schemeClr>
+                </a:solidFill>
+              </a:rPr>
               <a:t> : N -&gt; Type</a:t>
             </a:r>
           </a:p>
@@ -3671,7 +4152,7 @@
         </p:nvSpPr>
         <p:spPr>
           <a:xfrm>
-            <a:off x="6546210" y="3433893"/>
+            <a:off x="6546210" y="3912872"/>
             <a:ext cx="2407640" cy="646331"/>
           </a:xfrm>
           <a:prstGeom prst="rect">
@@ -3782,7 +4263,7 @@
           <p:cNvPr id="2" name="Title 1">
             <a:extLst>
               <a:ext uri="{FF2B5EF4-FFF2-40B4-BE49-F238E27FC236}">
-                <a16:creationId xmlns:a16="http://schemas.microsoft.com/office/drawing/2014/main" id="{687BB2D5-94FF-4BCA-8CD4-E5FA09D0DDB2}"/>
+                <a16:creationId xmlns:a16="http://schemas.microsoft.com/office/drawing/2014/main" id="{E5722FDC-ABC6-452E-BE8E-E09BA2A4705D}"/>
               </a:ext>
             </a:extLst>
           </p:cNvPr>
@@ -3800,134 +4281,322 @@
           <a:p>
             <a:r>
               <a:rPr lang="en-US" dirty="0"/>
-              <a:t>Bit-vector Library</a:t>
-            </a:r>
-          </a:p>
-        </p:txBody>
-      </p:sp>
-      <p:sp>
-        <p:nvSpPr>
-          <p:cNvPr id="3" name="Content Placeholder 2">
+              <a:t>Bit-vector Representations</a:t>
+            </a:r>
+          </a:p>
+        </p:txBody>
+      </p:sp>
+      <p:graphicFrame>
+        <p:nvGraphicFramePr>
+          <p:cNvPr id="4" name="Content Placeholder 3">
             <a:extLst>
               <a:ext uri="{FF2B5EF4-FFF2-40B4-BE49-F238E27FC236}">
-                <a16:creationId xmlns:a16="http://schemas.microsoft.com/office/drawing/2014/main" id="{A8D7B1DF-8AB3-455D-B534-942C5A38FA71}"/>
+                <a16:creationId xmlns:a16="http://schemas.microsoft.com/office/drawing/2014/main" id="{F6E9B470-C65D-4D30-874E-E1AA18A84475}"/>
               </a:ext>
             </a:extLst>
           </p:cNvPr>
-          <p:cNvSpPr>
-            <a:spLocks noGrp="1"/>
-          </p:cNvSpPr>
+          <p:cNvGraphicFramePr>
+            <a:graphicFrameLocks noGrp="1"/>
+          </p:cNvGraphicFramePr>
           <p:nvPr>
             <p:ph idx="1"/>
-          </p:nvPr>
-        </p:nvSpPr>
-        <p:spPr/>
-        <p:txBody>
-          <a:bodyPr>
-            <a:normAutofit fontScale="92500" lnSpcReduction="10000"/>
-          </a:bodyPr>
-          <a:lstStyle/>
-          <a:p>
-            <a:pPr marL="0" indent="0">
-              <a:buNone/>
-            </a:pPr>
-            <a:r>
-              <a:rPr lang="en-US" dirty="0"/>
-              <a:t>The library had support for the following operators and predicates:</a:t>
-            </a:r>
-          </a:p>
-          <a:p>
-            <a:pPr lvl="1"/>
-            <a:r>
-              <a:rPr lang="en-US" dirty="0"/>
-              <a:t>Addition, negation, multiplication.</a:t>
-            </a:r>
-          </a:p>
-          <a:p>
-            <a:pPr lvl="1"/>
-            <a:r>
-              <a:rPr lang="en-US" dirty="0"/>
-              <a:t>Bit-wise conjunction, disjunction, negation.</a:t>
-            </a:r>
-          </a:p>
-          <a:p>
-            <a:pPr lvl="1"/>
-            <a:r>
-              <a:rPr lang="en-US" dirty="0"/>
-              <a:t>Logical left and right shift.</a:t>
-            </a:r>
-          </a:p>
-          <a:p>
-            <a:pPr lvl="1"/>
-            <a:r>
-              <a:rPr lang="en-US" dirty="0"/>
-              <a:t>Concatenation.</a:t>
-            </a:r>
-          </a:p>
-          <a:p>
-            <a:pPr lvl="1"/>
-            <a:r>
-              <a:rPr lang="en-US" dirty="0"/>
-              <a:t>Equality, </a:t>
-            </a:r>
-            <a:r>
-              <a:rPr lang="en-US" dirty="0" err="1"/>
-              <a:t>unequality</a:t>
-            </a:r>
-            <a:r>
-              <a:rPr lang="en-US" dirty="0"/>
-              <a:t>.</a:t>
-            </a:r>
-          </a:p>
-          <a:p>
-            <a:pPr lvl="1"/>
-            <a:r>
-              <a:rPr lang="en-US" dirty="0"/>
-              <a:t>Signed and unsigned less than and greater than.</a:t>
-            </a:r>
-          </a:p>
-          <a:p>
-            <a:pPr marL="0" indent="0">
-              <a:buNone/>
-            </a:pPr>
-            <a:r>
-              <a:rPr lang="en-US" dirty="0"/>
-              <a:t>We extended the library with the following:</a:t>
-            </a:r>
-          </a:p>
-          <a:p>
-            <a:pPr lvl="1"/>
-            <a:r>
-              <a:rPr lang="en-US" dirty="0"/>
-              <a:t>Unsigned weak inequalities.</a:t>
-            </a:r>
-          </a:p>
-          <a:p>
-            <a:pPr lvl="1"/>
-            <a:r>
-              <a:rPr lang="en-US" dirty="0"/>
-              <a:t>Arithmetic right shift.</a:t>
-            </a:r>
-          </a:p>
-          <a:p>
-            <a:pPr lvl="1"/>
-            <a:r>
-              <a:rPr lang="en-US" dirty="0"/>
-              <a:t>New definitions of all shift operators and a proof of equivalence between the two sets of definitions.</a:t>
-            </a:r>
-          </a:p>
-          <a:p>
-            <a:pPr marL="457200" lvl="1" indent="0">
-              <a:buNone/>
-            </a:pPr>
-            <a:endParaRPr lang="en-US" dirty="0"/>
-          </a:p>
-        </p:txBody>
-      </p:sp>
+            <p:extLst>
+              <p:ext uri="{D42A27DB-BD31-4B8C-83A1-F6EECF244321}">
+                <p14:modId xmlns:p14="http://schemas.microsoft.com/office/powerpoint/2010/main" val="2690988068"/>
+              </p:ext>
+            </p:extLst>
+          </p:nvPr>
+        </p:nvGraphicFramePr>
+        <p:xfrm>
+          <a:off x="838200" y="1825625"/>
+          <a:ext cx="10515600" cy="4507176"/>
+        </p:xfrm>
+        <a:graphic>
+          <a:graphicData uri="http://schemas.openxmlformats.org/drawingml/2006/table">
+            <a:tbl>
+              <a:tblPr firstRow="1" bandRow="1">
+                <a:tableStyleId>{5C22544A-7EE6-4342-B048-85BDC9FD1C3A}</a:tableStyleId>
+              </a:tblPr>
+              <a:tblGrid>
+                <a:gridCol w="3505200">
+                  <a:extLst>
+                    <a:ext uri="{9D8B030D-6E8A-4147-A177-3AD203B41FA5}">
+                      <a16:colId xmlns:a16="http://schemas.microsoft.com/office/drawing/2014/main" val="959673736"/>
+                    </a:ext>
+                  </a:extLst>
+                </a:gridCol>
+                <a:gridCol w="3505200">
+                  <a:extLst>
+                    <a:ext uri="{9D8B030D-6E8A-4147-A177-3AD203B41FA5}">
+                      <a16:colId xmlns:a16="http://schemas.microsoft.com/office/drawing/2014/main" val="1592678677"/>
+                    </a:ext>
+                  </a:extLst>
+                </a:gridCol>
+                <a:gridCol w="3505200">
+                  <a:extLst>
+                    <a:ext uri="{9D8B030D-6E8A-4147-A177-3AD203B41FA5}">
+                      <a16:colId xmlns:a16="http://schemas.microsoft.com/office/drawing/2014/main" val="238322844"/>
+                    </a:ext>
+                  </a:extLst>
+                </a:gridCol>
+              </a:tblGrid>
+              <a:tr h="727656">
+                <a:tc>
+                  <a:txBody>
+                    <a:bodyPr/>
+                    <a:lstStyle/>
+                    <a:p>
+                      <a:r>
+                        <a:rPr lang="en-US" sz="2200" dirty="0" err="1"/>
+                        <a:t>SMTLib</a:t>
+                      </a:r>
+                      <a:endParaRPr lang="en-US" sz="2200" dirty="0"/>
+                    </a:p>
+                  </a:txBody>
+                  <a:tcPr/>
+                </a:tc>
+                <a:tc>
+                  <a:txBody>
+                    <a:bodyPr/>
+                    <a:lstStyle/>
+                    <a:p>
+                      <a:r>
+                        <a:rPr lang="en-US" sz="2200" dirty="0" err="1"/>
+                        <a:t>Preiner</a:t>
+                      </a:r>
+                      <a:r>
+                        <a:rPr lang="en-US" sz="2200" dirty="0"/>
+                        <a:t> et al.</a:t>
+                      </a:r>
+                    </a:p>
+                  </a:txBody>
+                  <a:tcPr/>
+                </a:tc>
+                <a:tc>
+                  <a:txBody>
+                    <a:bodyPr/>
+                    <a:lstStyle/>
+                    <a:p>
+                      <a:r>
+                        <a:rPr lang="en-US" sz="2200" dirty="0"/>
+                        <a:t>Coq Library</a:t>
+                      </a:r>
+                    </a:p>
+                  </a:txBody>
+                  <a:tcPr/>
+                </a:tc>
+                <a:extLst>
+                  <a:ext uri="{0D108BD9-81ED-4DB2-BD59-A6C34878D82A}">
+                    <a16:rowId xmlns:a16="http://schemas.microsoft.com/office/drawing/2014/main" val="2417334338"/>
+                  </a:ext>
+                </a:extLst>
+              </a:tr>
+              <a:tr h="3603679">
+                <a:tc>
+                  <a:txBody>
+                    <a:bodyPr/>
+                    <a:lstStyle/>
+                    <a:p>
+                      <a:pPr marL="285750" indent="-285750">
+                        <a:buFont typeface="Arial" panose="020B0604020202020204" pitchFamily="34" charset="0"/>
+                        <a:buChar char="•"/>
+                      </a:pPr>
+                      <a:r>
+                        <a:rPr lang="en-US" sz="2200" dirty="0">
+                          <a:solidFill>
+                            <a:schemeClr val="tx2"/>
+                          </a:solidFill>
+                        </a:rPr>
+                        <a:t>Bit-vector n, with one sort for each n</a:t>
+                      </a:r>
+                    </a:p>
+                    <a:p>
+                      <a:pPr marL="285750" indent="-285750">
+                        <a:buFont typeface="Arial" panose="020B0604020202020204" pitchFamily="34" charset="0"/>
+                        <a:buChar char="•"/>
+                      </a:pPr>
+                      <a:r>
+                        <a:rPr lang="en-US" sz="2200" dirty="0">
+                          <a:solidFill>
+                            <a:schemeClr val="tx2"/>
+                          </a:solidFill>
+                        </a:rPr>
+                        <a:t>No dependent types</a:t>
+                      </a:r>
+                    </a:p>
+                    <a:p>
+                      <a:pPr marL="285750" indent="-285750">
+                        <a:buFont typeface="Arial" panose="020B0604020202020204" pitchFamily="34" charset="0"/>
+                        <a:buChar char="•"/>
+                      </a:pPr>
+                      <a:r>
+                        <a:rPr lang="en-US" sz="2200" dirty="0">
+                          <a:solidFill>
+                            <a:schemeClr val="tx2"/>
+                          </a:solidFill>
+                        </a:rPr>
+                        <a:t>n can’t be symbolic</a:t>
+                      </a:r>
+                    </a:p>
+                    <a:p>
+                      <a:pPr marL="285750" indent="-285750">
+                        <a:buFont typeface="Arial" panose="020B0604020202020204" pitchFamily="34" charset="0"/>
+                        <a:buChar char="•"/>
+                      </a:pPr>
+                      <a:r>
+                        <a:rPr lang="en-US" sz="2200" dirty="0">
+                          <a:solidFill>
+                            <a:schemeClr val="tx2"/>
+                          </a:solidFill>
+                        </a:rPr>
+                        <a:t>Automatic proofs using SMT-solvers for all equivalences over values of n = 1 to 65</a:t>
+                      </a:r>
+                    </a:p>
+                  </a:txBody>
+                  <a:tcPr/>
+                </a:tc>
+                <a:tc>
+                  <a:txBody>
+                    <a:bodyPr/>
+                    <a:lstStyle/>
+                    <a:p>
+                      <a:pPr marL="285750" indent="-285750">
+                        <a:buFont typeface="Arial" panose="020B0604020202020204" pitchFamily="34" charset="0"/>
+                        <a:buChar char="•"/>
+                      </a:pPr>
+                      <a:r>
+                        <a:rPr lang="en-US" sz="2200" dirty="0">
+                          <a:solidFill>
+                            <a:schemeClr val="tx2"/>
+                          </a:solidFill>
+                        </a:rPr>
+                        <a:t>Bit-vector n, translated to non-linear integer arithmetic and uninterpreted functions</a:t>
+                      </a:r>
+                    </a:p>
+                    <a:p>
+                      <a:pPr marL="285750" indent="-285750">
+                        <a:buFont typeface="Arial" panose="020B0604020202020204" pitchFamily="34" charset="0"/>
+                        <a:buChar char="•"/>
+                      </a:pPr>
+                      <a:r>
+                        <a:rPr lang="en-US" sz="2200" dirty="0">
+                          <a:solidFill>
+                            <a:schemeClr val="tx2"/>
+                          </a:solidFill>
+                        </a:rPr>
+                        <a:t>This translation allows quantification over n</a:t>
+                      </a:r>
+                    </a:p>
+                    <a:p>
+                      <a:pPr marL="285750" indent="-285750">
+                        <a:buFont typeface="Arial" panose="020B0604020202020204" pitchFamily="34" charset="0"/>
+                        <a:buChar char="•"/>
+                      </a:pPr>
+                      <a:r>
+                        <a:rPr lang="en-US" sz="2200" dirty="0">
+                          <a:solidFill>
+                            <a:schemeClr val="tx2"/>
+                          </a:solidFill>
+                        </a:rPr>
+                        <a:t>Automatic proofs using SMT-solvers for around 75% of the invertibility equivalences</a:t>
+                      </a:r>
+                    </a:p>
+                  </a:txBody>
+                  <a:tcPr/>
+                </a:tc>
+                <a:tc>
+                  <a:txBody>
+                    <a:bodyPr/>
+                    <a:lstStyle/>
+                    <a:p>
+                      <a:pPr marL="285750" indent="-285750">
+                        <a:buFont typeface="Arial" panose="020B0604020202020204" pitchFamily="34" charset="0"/>
+                        <a:buChar char="•"/>
+                      </a:pPr>
+                      <a:r>
+                        <a:rPr lang="en-US" sz="2200" dirty="0">
+                          <a:solidFill>
+                            <a:schemeClr val="tx2"/>
+                          </a:solidFill>
+                        </a:rPr>
+                        <a:t>Bit-vector n, represented as list of Booleans over 2 layers</a:t>
+                      </a:r>
+                    </a:p>
+                    <a:p>
+                      <a:pPr marL="285750" indent="-285750">
+                        <a:buFont typeface="Arial" panose="020B0604020202020204" pitchFamily="34" charset="0"/>
+                        <a:buChar char="•"/>
+                      </a:pPr>
+                      <a:r>
+                        <a:rPr lang="en-US" sz="2200" dirty="0">
+                          <a:solidFill>
+                            <a:schemeClr val="tx2"/>
+                          </a:solidFill>
+                        </a:rPr>
+                        <a:t>Raw bit-vectors are non-dependent bit-vectors with external size guarantees</a:t>
+                      </a:r>
+                    </a:p>
+                    <a:p>
+                      <a:pPr marL="285750" indent="-285750">
+                        <a:buFont typeface="Arial" panose="020B0604020202020204" pitchFamily="34" charset="0"/>
+                        <a:buChar char="•"/>
+                      </a:pPr>
+                      <a:r>
+                        <a:rPr lang="en-US" sz="2200" dirty="0">
+                          <a:solidFill>
+                            <a:schemeClr val="tx2"/>
+                          </a:solidFill>
+                        </a:rPr>
+                        <a:t>Dependent bit-vectors are built over raw-</a:t>
+                      </a:r>
+                      <a:r>
+                        <a:rPr lang="en-US" sz="2200" dirty="0" err="1">
+                          <a:solidFill>
+                            <a:schemeClr val="tx2"/>
+                          </a:solidFill>
+                        </a:rPr>
+                        <a:t>bitvectors</a:t>
+                      </a:r>
+                      <a:r>
+                        <a:rPr lang="en-US" sz="2200" dirty="0">
+                          <a:solidFill>
+                            <a:schemeClr val="tx2"/>
+                          </a:solidFill>
+                        </a:rPr>
+                        <a:t>.</a:t>
+                      </a:r>
+                    </a:p>
+                    <a:p>
+                      <a:pPr marL="285750" indent="-285750">
+                        <a:buFont typeface="Arial" panose="020B0604020202020204" pitchFamily="34" charset="0"/>
+                        <a:buChar char="•"/>
+                      </a:pPr>
+                      <a:r>
+                        <a:rPr lang="en-US" sz="2200" dirty="0">
+                          <a:solidFill>
+                            <a:schemeClr val="tx2"/>
+                          </a:solidFill>
+                        </a:rPr>
+                        <a:t>Manual proofs in Coq for a subset of the equivalences</a:t>
+                      </a:r>
+                    </a:p>
+                  </a:txBody>
+                  <a:tcPr/>
+                </a:tc>
+                <a:extLst>
+                  <a:ext uri="{0D108BD9-81ED-4DB2-BD59-A6C34878D82A}">
+                    <a16:rowId xmlns:a16="http://schemas.microsoft.com/office/drawing/2014/main" val="2812025875"/>
+                  </a:ext>
+                </a:extLst>
+              </a:tr>
+            </a:tbl>
+          </a:graphicData>
+        </a:graphic>
+      </p:graphicFrame>
     </p:spTree>
     <p:extLst>
       <p:ext uri="{BB962C8B-B14F-4D97-AF65-F5344CB8AC3E}">
-        <p14:creationId xmlns:p14="http://schemas.microsoft.com/office/powerpoint/2010/main" val="783522755"/>
+        <p14:creationId xmlns:p14="http://schemas.microsoft.com/office/powerpoint/2010/main" val="283661049"/>
       </p:ext>
     </p:extLst>
   </p:cSld>
@@ -3959,7 +4628,7 @@
           <p:cNvPr id="2" name="Title 1">
             <a:extLst>
               <a:ext uri="{FF2B5EF4-FFF2-40B4-BE49-F238E27FC236}">
-                <a16:creationId xmlns:a16="http://schemas.microsoft.com/office/drawing/2014/main" id="{6AFADB5B-36E9-4FA7-973B-813104295E45}"/>
+                <a16:creationId xmlns:a16="http://schemas.microsoft.com/office/drawing/2014/main" id="{687BB2D5-94FF-4BCA-8CD4-E5FA09D0DDB2}"/>
               </a:ext>
             </a:extLst>
           </p:cNvPr>
@@ -3975,94 +4644,197 @@
           <a:bodyPr/>
           <a:lstStyle/>
           <a:p>
-            <a:endParaRPr lang="en-US"/>
-          </a:p>
-        </p:txBody>
-      </p:sp>
-      <p:pic>
-        <p:nvPicPr>
-          <p:cNvPr id="4" name="Picture 3">
+            <a:r>
+              <a:rPr lang="en-US" dirty="0"/>
+              <a:t>Bit-vector Library</a:t>
+            </a:r>
+          </a:p>
+        </p:txBody>
+      </p:sp>
+      <p:sp>
+        <p:nvSpPr>
+          <p:cNvPr id="3" name="Content Placeholder 2">
             <a:extLst>
               <a:ext uri="{FF2B5EF4-FFF2-40B4-BE49-F238E27FC236}">
-                <a16:creationId xmlns:a16="http://schemas.microsoft.com/office/drawing/2014/main" id="{989FE69E-BFCE-4ADD-9CA7-4154DFC300F1}"/>
+                <a16:creationId xmlns:a16="http://schemas.microsoft.com/office/drawing/2014/main" id="{A8D7B1DF-8AB3-455D-B534-942C5A38FA71}"/>
               </a:ext>
             </a:extLst>
           </p:cNvPr>
-          <p:cNvPicPr>
-            <a:picLocks noChangeAspect="1"/>
-          </p:cNvPicPr>
-          <p:nvPr>
-            <p:custDataLst>
-              <p:tags r:id="rId1"/>
-            </p:custDataLst>
-          </p:nvPr>
-        </p:nvPicPr>
-        <p:blipFill>
-          <a:blip r:embed="rId4">
-            <a:extLst>
-              <a:ext uri="{28A0092B-C50C-407E-A947-70E740481C1C}">
-                <a14:useLocalDpi xmlns:a14="http://schemas.microsoft.com/office/drawing/2010/main" val="0"/>
-              </a:ext>
-            </a:extLst>
-          </a:blip>
-          <a:stretch>
-            <a:fillRect/>
-          </a:stretch>
-        </p:blipFill>
+          <p:cNvSpPr>
+            <a:spLocks noGrp="1"/>
+          </p:cNvSpPr>
+          <p:nvPr>
+            <p:ph idx="1"/>
+          </p:nvPr>
+        </p:nvSpPr>
         <p:spPr>
           <a:xfrm>
-            <a:off x="838200" y="1566070"/>
-            <a:ext cx="7536761" cy="2780954"/>
+            <a:off x="838200" y="1747243"/>
+            <a:ext cx="10515600" cy="4853849"/>
           </a:xfrm>
-          <a:prstGeom prst="rect">
-            <a:avLst/>
-          </a:prstGeom>
         </p:spPr>
-      </p:pic>
-      <p:pic>
-        <p:nvPicPr>
-          <p:cNvPr id="5" name="Picture 4">
-            <a:extLst>
-              <a:ext uri="{FF2B5EF4-FFF2-40B4-BE49-F238E27FC236}">
-                <a16:creationId xmlns:a16="http://schemas.microsoft.com/office/drawing/2014/main" id="{E1141B2D-3D93-4F4B-AE59-B1F2116658DD}"/>
-              </a:ext>
-            </a:extLst>
-          </p:cNvPr>
-          <p:cNvPicPr>
-            <a:picLocks noChangeAspect="1"/>
-          </p:cNvPicPr>
-          <p:nvPr>
-            <p:custDataLst>
-              <p:tags r:id="rId2"/>
-            </p:custDataLst>
-          </p:nvPr>
-        </p:nvPicPr>
-        <p:blipFill>
-          <a:blip r:embed="rId5">
-            <a:extLst>
-              <a:ext uri="{28A0092B-C50C-407E-A947-70E740481C1C}">
-                <a14:useLocalDpi xmlns:a14="http://schemas.microsoft.com/office/drawing/2010/main" val="0"/>
-              </a:ext>
-            </a:extLst>
-          </a:blip>
-          <a:stretch>
-            <a:fillRect/>
-          </a:stretch>
-        </p:blipFill>
-        <p:spPr>
-          <a:xfrm>
-            <a:off x="838200" y="4600528"/>
-            <a:ext cx="8329142" cy="1507047"/>
-          </a:xfrm>
-          <a:prstGeom prst="rect">
-            <a:avLst/>
-          </a:prstGeom>
-        </p:spPr>
-      </p:pic>
+        <p:txBody>
+          <a:bodyPr>
+            <a:noAutofit/>
+          </a:bodyPr>
+          <a:lstStyle/>
+          <a:p>
+            <a:pPr marL="0" indent="0">
+              <a:buNone/>
+            </a:pPr>
+            <a:r>
+              <a:rPr lang="en-US" sz="2400" dirty="0"/>
+              <a:t>The library had support for the following operators and predicates:</a:t>
+            </a:r>
+          </a:p>
+          <a:p>
+            <a:pPr lvl="1"/>
+            <a:r>
+              <a:rPr lang="en-US" dirty="0"/>
+              <a:t>addition (+), negation (-), multiplication (•)</a:t>
+            </a:r>
+          </a:p>
+          <a:p>
+            <a:pPr lvl="1"/>
+            <a:r>
+              <a:rPr lang="en-US" dirty="0"/>
+              <a:t>bit-wise conjunction (&amp;), disjunction (|), negation (~)</a:t>
+            </a:r>
+          </a:p>
+          <a:p>
+            <a:pPr lvl="1"/>
+            <a:r>
+              <a:rPr lang="en-US" dirty="0"/>
+              <a:t>logical left (&lt;&lt;) and right shift (&gt;&gt;)</a:t>
+            </a:r>
+          </a:p>
+          <a:p>
+            <a:pPr lvl="1"/>
+            <a:r>
+              <a:rPr lang="en-US" dirty="0"/>
+              <a:t>concatenation (ₒ).</a:t>
+            </a:r>
+          </a:p>
+          <a:p>
+            <a:pPr lvl="1"/>
+            <a:r>
+              <a:rPr lang="en-US" dirty="0"/>
+              <a:t>equality (=), </a:t>
+            </a:r>
+            <a:r>
+              <a:rPr lang="en-US" dirty="0" err="1"/>
+              <a:t>unequality</a:t>
+            </a:r>
+            <a:r>
+              <a:rPr lang="en-US" dirty="0"/>
+              <a:t> (≠)</a:t>
+            </a:r>
+          </a:p>
+          <a:p>
+            <a:pPr lvl="1"/>
+            <a:r>
+              <a:rPr lang="en-US" dirty="0"/>
+              <a:t>signed and unsigned less than and greater than (&lt;</a:t>
+            </a:r>
+            <a:r>
+              <a:rPr lang="en-US" baseline="-25000" dirty="0"/>
+              <a:t>u</a:t>
+            </a:r>
+            <a:r>
+              <a:rPr lang="en-US" dirty="0"/>
+              <a:t>, &gt;</a:t>
+            </a:r>
+            <a:r>
+              <a:rPr lang="en-US" baseline="-25000" dirty="0"/>
+              <a:t>u</a:t>
+            </a:r>
+            <a:r>
+              <a:rPr lang="en-US" dirty="0"/>
+              <a:t>, &lt;</a:t>
+            </a:r>
+            <a:r>
+              <a:rPr lang="en-US" baseline="-25000" dirty="0"/>
+              <a:t>s</a:t>
+            </a:r>
+            <a:r>
+              <a:rPr lang="en-US" dirty="0"/>
+              <a:t>, &gt;</a:t>
+            </a:r>
+            <a:r>
+              <a:rPr lang="en-US" baseline="-25000" dirty="0"/>
+              <a:t>s</a:t>
+            </a:r>
+            <a:r>
+              <a:rPr lang="en-US" dirty="0"/>
+              <a:t>)</a:t>
+            </a:r>
+          </a:p>
+          <a:p>
+            <a:pPr marL="0" indent="0">
+              <a:buNone/>
+            </a:pPr>
+            <a:r>
+              <a:rPr lang="en-US" sz="2400" dirty="0"/>
+              <a:t>We extended the library with the following:</a:t>
+            </a:r>
+          </a:p>
+          <a:p>
+            <a:pPr lvl="1"/>
+            <a:r>
+              <a:rPr lang="en-US" dirty="0"/>
+              <a:t>unsigned weak inequalities (&lt;=</a:t>
+            </a:r>
+            <a:r>
+              <a:rPr lang="en-US" baseline="-25000" dirty="0"/>
+              <a:t>u</a:t>
+            </a:r>
+            <a:r>
+              <a:rPr lang="en-US" dirty="0"/>
+              <a:t>, &gt;=</a:t>
+            </a:r>
+            <a:r>
+              <a:rPr lang="en-US" baseline="-25000" dirty="0"/>
+              <a:t>u</a:t>
+            </a:r>
+            <a:r>
+              <a:rPr lang="en-US" dirty="0"/>
+              <a:t>)</a:t>
+            </a:r>
+          </a:p>
+          <a:p>
+            <a:pPr lvl="1"/>
+            <a:r>
+              <a:rPr lang="en-US" dirty="0"/>
+              <a:t>arithmetic right shift (&gt;&gt;</a:t>
+            </a:r>
+            <a:r>
+              <a:rPr lang="en-US" baseline="-25000" dirty="0"/>
+              <a:t>a</a:t>
+            </a:r>
+            <a:r>
+              <a:rPr lang="en-US" dirty="0"/>
+              <a:t>)</a:t>
+            </a:r>
+          </a:p>
+          <a:p>
+            <a:pPr lvl="1"/>
+            <a:r>
+              <a:rPr lang="en-US" dirty="0"/>
+              <a:t>new definitions of all shift operators and a proof of equivalence between the two sets of definitions</a:t>
+            </a:r>
+          </a:p>
+          <a:p>
+            <a:pPr marL="457200" lvl="1" indent="0">
+              <a:buNone/>
+            </a:pPr>
+            <a:endParaRPr lang="en-US" dirty="0"/>
+          </a:p>
+        </p:txBody>
+      </p:sp>
     </p:spTree>
     <p:extLst>
       <p:ext uri="{BB962C8B-B14F-4D97-AF65-F5344CB8AC3E}">
-        <p14:creationId xmlns:p14="http://schemas.microsoft.com/office/powerpoint/2010/main" val="1110126397"/>
+        <p14:creationId xmlns:p14="http://schemas.microsoft.com/office/powerpoint/2010/main" val="783522755"/>
       </p:ext>
     </p:extLst>
   </p:cSld>
@@ -4136,19 +4908,19 @@
         <p:spPr/>
         <p:txBody>
           <a:bodyPr>
-            <a:normAutofit fontScale="92500" lnSpcReduction="10000"/>
+            <a:normAutofit fontScale="70000" lnSpcReduction="20000"/>
           </a:bodyPr>
           <a:lstStyle/>
           <a:p>
             <a:r>
               <a:rPr lang="en-US" dirty="0"/>
-              <a:t>Aarti Gupta, Allan L. Fisher. Representation and Symbolic Manipulation of Linearly Inductive Boolean Functions. In proceedings of ICCAD '93 of the 1993 IEEE/ACM international conference on Computer-aided design, pages 192-199.</a:t>
-            </a:r>
-          </a:p>
-          <a:p>
-            <a:r>
-              <a:rPr lang="en-US" dirty="0"/>
-              <a:t>Alessandro Armando, Jacopo </a:t>
+              <a:t>[Gupta et al.] Aarti Gupta, Allan L. Fisher. Representation and Symbolic Manipulation of Linearly Inductive Boolean Functions. In proceedings of ICCAD '93 of the 1993 IEEE/ACM international conference on Computer-aided design, pages 192-199.</a:t>
+            </a:r>
+          </a:p>
+          <a:p>
+            <a:r>
+              <a:rPr lang="en-US" dirty="0"/>
+              <a:t>[Armando et al.] Alessandro Armando, Jacopo </a:t>
             </a:r>
             <a:r>
               <a:rPr lang="en-US" dirty="0" err="1"/>
@@ -4170,7 +4942,7 @@
           <a:p>
             <a:r>
               <a:rPr lang="en-US" dirty="0"/>
-              <a:t>Cristian </a:t>
+              <a:t>[</a:t>
             </a:r>
             <a:r>
               <a:rPr lang="en-US" dirty="0" err="1"/>
@@ -4178,8 +4950,119 @@
             </a:r>
             <a:r>
               <a:rPr lang="en-US" dirty="0"/>
+              <a:t> et al.] Cristian </a:t>
+            </a:r>
+            <a:r>
+              <a:rPr lang="en-US" dirty="0" err="1"/>
+              <a:t>Cadar</a:t>
+            </a:r>
+            <a:r>
+              <a:rPr lang="en-US" dirty="0"/>
               <a:t>, Vijay Ganesh, Peter M. Pawlowski, David L. Dill, Dawson R. Engler. EXE: Automatically Generating Inputs of Death.  In proceedings of CCS '06 Proceedings of the 13th ACM conference on Computer and communications security, pages 322-335.</a:t>
             </a:r>
+          </a:p>
+          <a:p>
+            <a:r>
+              <a:rPr lang="en-US" dirty="0"/>
+              <a:t>[</a:t>
+            </a:r>
+            <a:r>
+              <a:rPr lang="en-US" dirty="0" err="1"/>
+              <a:t>Niemetz</a:t>
+            </a:r>
+            <a:r>
+              <a:rPr lang="en-US" dirty="0"/>
+              <a:t> et al.] </a:t>
+            </a:r>
+            <a:r>
+              <a:rPr lang="en-US" dirty="0" err="1"/>
+              <a:t>Aina</a:t>
+            </a:r>
+            <a:r>
+              <a:rPr lang="en-US" dirty="0"/>
+              <a:t> </a:t>
+            </a:r>
+            <a:r>
+              <a:rPr lang="en-US" dirty="0" err="1"/>
+              <a:t>Niemetz</a:t>
+            </a:r>
+            <a:r>
+              <a:rPr lang="en-US" dirty="0"/>
+              <a:t>, Mathias </a:t>
+            </a:r>
+            <a:r>
+              <a:rPr lang="en-US" dirty="0" err="1"/>
+              <a:t>Preiner</a:t>
+            </a:r>
+            <a:r>
+              <a:rPr lang="en-US" dirty="0"/>
+              <a:t>, Andrew Reynolds, Clark Barrett, Cesare </a:t>
+            </a:r>
+            <a:r>
+              <a:rPr lang="en-US" dirty="0" err="1"/>
+              <a:t>Tinelli</a:t>
+            </a:r>
+            <a:r>
+              <a:rPr lang="en-US" dirty="0"/>
+              <a:t>. Solving Quantified Bit-Vectors Using Invertibility Conditions. In proceedings of International Conference on Computer Aided Verification 2018, pages 236-255.</a:t>
+            </a:r>
+          </a:p>
+          <a:p>
+            <a:r>
+              <a:rPr lang="en-US" dirty="0"/>
+              <a:t>[</a:t>
+            </a:r>
+            <a:r>
+              <a:rPr lang="en-US" dirty="0" err="1"/>
+              <a:t>Preiner</a:t>
+            </a:r>
+            <a:r>
+              <a:rPr lang="en-US" dirty="0"/>
+              <a:t> et al.] </a:t>
+            </a:r>
+            <a:r>
+              <a:rPr lang="en-US" dirty="0" err="1"/>
+              <a:t>Aina</a:t>
+            </a:r>
+            <a:r>
+              <a:rPr lang="en-US" dirty="0"/>
+              <a:t> </a:t>
+            </a:r>
+            <a:r>
+              <a:rPr lang="en-US" dirty="0" err="1"/>
+              <a:t>Niemetz</a:t>
+            </a:r>
+            <a:r>
+              <a:rPr lang="en-US" dirty="0"/>
+              <a:t>, Mathias </a:t>
+            </a:r>
+            <a:r>
+              <a:rPr lang="en-US" dirty="0" err="1"/>
+              <a:t>Preiner</a:t>
+            </a:r>
+            <a:r>
+              <a:rPr lang="en-US" dirty="0"/>
+              <a:t>, Andrew Reynolds, Yoni Zohar, Clark Barrett and Cesare </a:t>
+            </a:r>
+            <a:r>
+              <a:rPr lang="en-US" dirty="0" err="1"/>
+              <a:t>Tinelli</a:t>
+            </a:r>
+            <a:r>
+              <a:rPr lang="en-US" dirty="0"/>
+              <a:t>. </a:t>
+            </a:r>
+            <a:r>
+              <a:rPr lang="en-US" i="1" dirty="0"/>
+              <a:t>Towards Bit Width Independent Proofs in SMT Solvers.</a:t>
+            </a:r>
+            <a:r>
+              <a:rPr lang="en-US" dirty="0"/>
+              <a:t> To appear in proceedings of International Conference on Automated Deduction 2019.</a:t>
+            </a:r>
+          </a:p>
+          <a:p>
+            <a:endParaRPr lang="en-US" dirty="0"/>
           </a:p>
           <a:p>
             <a:endParaRPr lang="en-US" dirty="0"/>
@@ -4277,29 +5160,52 @@
             </a:pPr>
             <a:r>
               <a:rPr lang="en-US" sz="3500" dirty="0"/>
-              <a:t>The theory of bit-vectors can be used to model problems in many applications:</a:t>
+              <a:t>Bit-vectors have many applications:</a:t>
             </a:r>
           </a:p>
           <a:p>
             <a:pPr lvl="0"/>
             <a:r>
               <a:rPr lang="en-US" sz="3500" dirty="0"/>
-              <a:t>Hardware circuit analysis</a:t>
-            </a:r>
+              <a:t>Hardware circuit analysis </a:t>
+            </a:r>
+            <a:r>
+              <a:rPr lang="en-US" sz="3600" dirty="0"/>
+              <a:t>[Gupta et al.]</a:t>
+            </a:r>
+            <a:endParaRPr lang="en-US" sz="3500" dirty="0"/>
           </a:p>
           <a:p>
             <a:pPr lvl="0"/>
             <a:r>
               <a:rPr lang="en-US" sz="3500" dirty="0"/>
-              <a:t>Bounded model checking</a:t>
-            </a:r>
+              <a:t>Bounded model checking </a:t>
+            </a:r>
+            <a:r>
+              <a:rPr lang="en-US" sz="3600" dirty="0"/>
+              <a:t>[Armando et al.]</a:t>
+            </a:r>
+            <a:endParaRPr lang="en-US" sz="3500" dirty="0"/>
           </a:p>
           <a:p>
             <a:pPr lvl="0"/>
             <a:r>
               <a:rPr lang="en-US" sz="3500" dirty="0"/>
-              <a:t>Symbolic execution</a:t>
-            </a:r>
+              <a:t>Symbolic execution </a:t>
+            </a:r>
+            <a:r>
+              <a:rPr lang="en-US" sz="3600" dirty="0"/>
+              <a:t>[</a:t>
+            </a:r>
+            <a:r>
+              <a:rPr lang="en-US" sz="3600" dirty="0" err="1"/>
+              <a:t>Cadar</a:t>
+            </a:r>
+            <a:r>
+              <a:rPr lang="en-US" sz="3600" dirty="0"/>
+              <a:t> et al.]</a:t>
+            </a:r>
+            <a:endParaRPr lang="en-US" sz="3500" dirty="0"/>
           </a:p>
           <a:p>
             <a:pPr lvl="0"/>
@@ -4401,23 +5307,53 @@
           <a:p>
             <a:r>
               <a:rPr lang="en-US" sz="3200" dirty="0"/>
-              <a:t>It is useful to solve quantified bit-vector formulas, and to have guarantees about them</a:t>
+              <a:t>Most applications use quantified bit-vector formulas</a:t>
             </a:r>
           </a:p>
           <a:p>
             <a:r>
               <a:rPr lang="en-US" sz="3200" dirty="0"/>
-              <a:t>To solve quantified bit-vector formulas, some SMT-solvers use quantifier-instantiation.</a:t>
-            </a:r>
-          </a:p>
-          <a:p>
+              <a:t>Some SMT-solvers use quantifier-instantiation to solve quantified formulas</a:t>
+            </a:r>
+          </a:p>
+          <a:p>
+            <a:r>
+              <a:rPr lang="en-US" sz="3200" i="1" dirty="0">
+                <a:solidFill>
+                  <a:schemeClr val="accent2"/>
+                </a:solidFill>
+              </a:rPr>
+              <a:t>Invertibility conditions</a:t>
+            </a:r>
             <a:r>
               <a:rPr lang="en-US" sz="3200" i="1" dirty="0"/>
-              <a:t>Invertibility conditions </a:t>
+              <a:t> </a:t>
             </a:r>
             <a:r>
               <a:rPr lang="en-US" sz="3200" dirty="0"/>
-              <a:t>appear in quantified bit-vector equivalences (invertibility equivalences), and are a useful meta-construct, for a quantifier-instantiation technique.</a:t>
+              <a:t>are a useful meta-construct for a quantifier-instantiation technique [</a:t>
+            </a:r>
+            <a:r>
+              <a:rPr lang="en-US" sz="3200" dirty="0" err="1"/>
+              <a:t>Niemetz</a:t>
+            </a:r>
+            <a:r>
+              <a:rPr lang="en-US" sz="3200" dirty="0"/>
+              <a:t> et al.] </a:t>
+            </a:r>
+          </a:p>
+          <a:p>
+            <a:r>
+              <a:rPr lang="en-US" sz="3200" dirty="0"/>
+              <a:t>Invertibility conditions appear in </a:t>
+            </a:r>
+            <a:r>
+              <a:rPr lang="en-US" sz="3200" i="1" dirty="0">
+                <a:solidFill>
+                  <a:schemeClr val="accent2"/>
+                </a:solidFill>
+              </a:rPr>
+              <a:t>invertibility equivalences</a:t>
             </a:r>
           </a:p>
         </p:txBody>
@@ -4457,536 +5393,6 @@
           <p:cNvPr id="2" name="Title 1">
             <a:extLst>
               <a:ext uri="{FF2B5EF4-FFF2-40B4-BE49-F238E27FC236}">
-                <a16:creationId xmlns:a16="http://schemas.microsoft.com/office/drawing/2014/main" id="{FA1188A8-F7DD-41A1-A207-79FAF20656F9}"/>
-              </a:ext>
-            </a:extLst>
-          </p:cNvPr>
-          <p:cNvSpPr>
-            <a:spLocks noGrp="1"/>
-          </p:cNvSpPr>
-          <p:nvPr>
-            <p:ph type="title"/>
-          </p:nvPr>
-        </p:nvSpPr>
-        <p:spPr/>
-        <p:txBody>
-          <a:bodyPr/>
-          <a:lstStyle/>
-          <a:p>
-            <a:r>
-              <a:rPr lang="en-US" dirty="0"/>
-              <a:t>Invertibility Conditions: Example</a:t>
-            </a:r>
-          </a:p>
-        </p:txBody>
-      </p:sp>
-      <p:sp>
-        <p:nvSpPr>
-          <p:cNvPr id="3" name="Content Placeholder 2">
-            <a:extLst>
-              <a:ext uri="{FF2B5EF4-FFF2-40B4-BE49-F238E27FC236}">
-                <a16:creationId xmlns:a16="http://schemas.microsoft.com/office/drawing/2014/main" id="{861D91C3-7E92-4BA7-825C-2BE28191BD67}"/>
-              </a:ext>
-            </a:extLst>
-          </p:cNvPr>
-          <p:cNvSpPr>
-            <a:spLocks noGrp="1"/>
-          </p:cNvSpPr>
-          <p:nvPr>
-            <p:ph idx="1"/>
-          </p:nvPr>
-        </p:nvSpPr>
-        <p:spPr/>
-        <p:txBody>
-          <a:bodyPr>
-            <a:normAutofit/>
-          </a:bodyPr>
-          <a:lstStyle/>
-          <a:p>
-            <a:r>
-              <a:rPr lang="en-US" dirty="0"/>
-              <a:t>Inversion of bit-vector addition is unconditional.</a:t>
-            </a:r>
-            <a:br>
-              <a:rPr lang="en-US" dirty="0"/>
-            </a:br>
-            <a:br>
-              <a:rPr lang="en-US" dirty="0"/>
-            </a:br>
-            <a:br>
-              <a:rPr lang="en-US" dirty="0"/>
-            </a:br>
-            <a:r>
-              <a:rPr lang="en-US" dirty="0"/>
-              <a:t>(*x + s = t is always invertible for x*) The inverse is x = t – s (*and the       invertibility condition is T.*)</a:t>
-            </a:r>
-          </a:p>
-          <a:p>
-            <a:r>
-              <a:rPr lang="en-US" dirty="0"/>
-              <a:t>(*The following equation is not always invertible:</a:t>
-            </a:r>
-            <a:br>
-              <a:rPr lang="en-US" dirty="0"/>
-            </a:br>
-            <a:br>
-              <a:rPr lang="en-US" dirty="0"/>
-            </a:br>
-            <a:br>
-              <a:rPr lang="en-US" dirty="0"/>
-            </a:br>
-            <a:r>
-              <a:rPr lang="en-US" dirty="0"/>
-              <a:t>The conditions under which it is invertible for x are:*) Inversion of bit-vector multiplication is conditional</a:t>
-            </a:r>
-          </a:p>
-          <a:p>
-            <a:endParaRPr lang="en-US" dirty="0"/>
-          </a:p>
-        </p:txBody>
-      </p:sp>
-      <p:pic>
-        <p:nvPicPr>
-          <p:cNvPr id="5" name="Picture 4">
-            <a:extLst>
-              <a:ext uri="{FF2B5EF4-FFF2-40B4-BE49-F238E27FC236}">
-                <a16:creationId xmlns:a16="http://schemas.microsoft.com/office/drawing/2014/main" id="{BEC134FC-016F-430C-8A67-4B3DDF9C7D6C}"/>
-              </a:ext>
-            </a:extLst>
-          </p:cNvPr>
-          <p:cNvPicPr>
-            <a:picLocks noChangeAspect="1"/>
-          </p:cNvPicPr>
-          <p:nvPr>
-            <p:custDataLst>
-              <p:tags r:id="rId1"/>
-            </p:custDataLst>
-          </p:nvPr>
-        </p:nvPicPr>
-        <p:blipFill>
-          <a:blip r:embed="rId5">
-            <a:extLst>
-              <a:ext uri="{28A0092B-C50C-407E-A947-70E740481C1C}">
-                <a14:useLocalDpi xmlns:a14="http://schemas.microsoft.com/office/drawing/2010/main" val="0"/>
-              </a:ext>
-            </a:extLst>
-          </a:blip>
-          <a:stretch>
-            <a:fillRect/>
-          </a:stretch>
-        </p:blipFill>
-        <p:spPr>
-          <a:xfrm>
-            <a:off x="4159076" y="2447723"/>
-            <a:ext cx="2692267" cy="266667"/>
-          </a:xfrm>
-          <a:prstGeom prst="rect">
-            <a:avLst/>
-          </a:prstGeom>
-        </p:spPr>
-      </p:pic>
-      <p:pic>
-        <p:nvPicPr>
-          <p:cNvPr id="17" name="Picture 16">
-            <a:extLst>
-              <a:ext uri="{FF2B5EF4-FFF2-40B4-BE49-F238E27FC236}">
-                <a16:creationId xmlns:a16="http://schemas.microsoft.com/office/drawing/2014/main" id="{BA61942C-BF7D-47F9-B234-FAEC8C428865}"/>
-              </a:ext>
-            </a:extLst>
-          </p:cNvPr>
-          <p:cNvPicPr>
-            <a:picLocks noChangeAspect="1"/>
-          </p:cNvPicPr>
-          <p:nvPr>
-            <p:custDataLst>
-              <p:tags r:id="rId2"/>
-            </p:custDataLst>
-          </p:nvPr>
-        </p:nvPicPr>
-        <p:blipFill>
-          <a:blip r:embed="rId6">
-            <a:extLst>
-              <a:ext uri="{28A0092B-C50C-407E-A947-70E740481C1C}">
-                <a14:useLocalDpi xmlns:a14="http://schemas.microsoft.com/office/drawing/2010/main" val="0"/>
-              </a:ext>
-            </a:extLst>
-          </a:blip>
-          <a:stretch>
-            <a:fillRect/>
-          </a:stretch>
-        </p:blipFill>
-        <p:spPr>
-          <a:xfrm>
-            <a:off x="4774542" y="4486247"/>
-            <a:ext cx="1461334" cy="260267"/>
-          </a:xfrm>
-          <a:prstGeom prst="rect">
-            <a:avLst/>
-          </a:prstGeom>
-        </p:spPr>
-      </p:pic>
-      <p:pic>
-        <p:nvPicPr>
-          <p:cNvPr id="21" name="Picture 20">
-            <a:extLst>
-              <a:ext uri="{FF2B5EF4-FFF2-40B4-BE49-F238E27FC236}">
-                <a16:creationId xmlns:a16="http://schemas.microsoft.com/office/drawing/2014/main" id="{C9892EF9-0B66-47C8-ABD0-DEB895858C9E}"/>
-              </a:ext>
-            </a:extLst>
-          </p:cNvPr>
-          <p:cNvPicPr>
-            <a:picLocks noChangeAspect="1"/>
-          </p:cNvPicPr>
-          <p:nvPr>
-            <p:custDataLst>
-              <p:tags r:id="rId3"/>
-            </p:custDataLst>
-          </p:nvPr>
-        </p:nvPicPr>
-        <p:blipFill>
-          <a:blip r:embed="rId7">
-            <a:extLst>
-              <a:ext uri="{28A0092B-C50C-407E-A947-70E740481C1C}">
-                <a14:useLocalDpi xmlns:a14="http://schemas.microsoft.com/office/drawing/2010/main" val="0"/>
-              </a:ext>
-            </a:extLst>
-          </a:blip>
-          <a:stretch>
-            <a:fillRect/>
-          </a:stretch>
-        </p:blipFill>
-        <p:spPr>
-          <a:xfrm>
-            <a:off x="3801419" y="5719224"/>
-            <a:ext cx="3910400" cy="262400"/>
-          </a:xfrm>
-          <a:prstGeom prst="rect">
-            <a:avLst/>
-          </a:prstGeom>
-        </p:spPr>
-      </p:pic>
-    </p:spTree>
-    <p:extLst>
-      <p:ext uri="{BB962C8B-B14F-4D97-AF65-F5344CB8AC3E}">
-        <p14:creationId xmlns:p14="http://schemas.microsoft.com/office/powerpoint/2010/main" val="3220518952"/>
-      </p:ext>
-    </p:extLst>
-  </p:cSld>
-  <p:clrMapOvr>
-    <a:masterClrMapping/>
-  </p:clrMapOvr>
-</p:sld>
-</file>
-
-<file path=ppt/slides/slide5.xml><?xml version="1.0" encoding="utf-8"?>
-<p:sld xmlns:a="http://schemas.openxmlformats.org/drawingml/2006/main" xmlns:r="http://schemas.openxmlformats.org/officeDocument/2006/relationships" xmlns:p="http://schemas.openxmlformats.org/presentationml/2006/main">
-  <p:cSld>
-    <p:spTree>
-      <p:nvGrpSpPr>
-        <p:cNvPr id="1" name=""/>
-        <p:cNvGrpSpPr/>
-        <p:nvPr/>
-      </p:nvGrpSpPr>
-      <p:grpSpPr>
-        <a:xfrm>
-          <a:off x="0" y="0"/>
-          <a:ext cx="0" cy="0"/>
-          <a:chOff x="0" y="0"/>
-          <a:chExt cx="0" cy="0"/>
-        </a:xfrm>
-      </p:grpSpPr>
-      <p:sp>
-        <p:nvSpPr>
-          <p:cNvPr id="2" name="Title 1">
-            <a:extLst>
-              <a:ext uri="{FF2B5EF4-FFF2-40B4-BE49-F238E27FC236}">
-                <a16:creationId xmlns:a16="http://schemas.microsoft.com/office/drawing/2014/main" id="{129BC7A0-0443-4289-8FC8-74357E7F4426}"/>
-              </a:ext>
-            </a:extLst>
-          </p:cNvPr>
-          <p:cNvSpPr>
-            <a:spLocks noGrp="1"/>
-          </p:cNvSpPr>
-          <p:nvPr>
-            <p:ph type="title"/>
-          </p:nvPr>
-        </p:nvSpPr>
-        <p:spPr/>
-        <p:txBody>
-          <a:bodyPr/>
-          <a:lstStyle/>
-          <a:p>
-            <a:r>
-              <a:rPr lang="en-US" dirty="0"/>
-              <a:t>Motivation</a:t>
-            </a:r>
-          </a:p>
-        </p:txBody>
-      </p:sp>
-      <p:sp>
-        <p:nvSpPr>
-          <p:cNvPr id="3" name="Content Placeholder 2">
-            <a:extLst>
-              <a:ext uri="{FF2B5EF4-FFF2-40B4-BE49-F238E27FC236}">
-                <a16:creationId xmlns:a16="http://schemas.microsoft.com/office/drawing/2014/main" id="{11AD8CE7-6235-4B9B-A65D-64CD1FDE0470}"/>
-              </a:ext>
-            </a:extLst>
-          </p:cNvPr>
-          <p:cNvSpPr>
-            <a:spLocks noGrp="1"/>
-          </p:cNvSpPr>
-          <p:nvPr>
-            <p:ph idx="1"/>
-          </p:nvPr>
-        </p:nvSpPr>
-        <p:spPr/>
-        <p:txBody>
-          <a:bodyPr/>
-          <a:lstStyle/>
-          <a:p>
-            <a:r>
-              <a:rPr lang="en-US" dirty="0"/>
-              <a:t>This quantifier instantiation technique requires these invertibility equivalences to be true independent of their bit-width, for general correctness.</a:t>
-            </a:r>
-          </a:p>
-          <a:p>
-            <a:r>
-              <a:rPr lang="en-US" dirty="0"/>
-              <a:t>As a result, proofs of these equivalences parametric in bit-width are guarantees that bolster the results of the SMT-solvers that use them.</a:t>
-            </a:r>
-          </a:p>
-          <a:p>
-            <a:endParaRPr lang="en-US" dirty="0"/>
-          </a:p>
-        </p:txBody>
-      </p:sp>
-    </p:spTree>
-    <p:extLst>
-      <p:ext uri="{BB962C8B-B14F-4D97-AF65-F5344CB8AC3E}">
-        <p14:creationId xmlns:p14="http://schemas.microsoft.com/office/powerpoint/2010/main" val="2151843492"/>
-      </p:ext>
-    </p:extLst>
-  </p:cSld>
-  <p:clrMapOvr>
-    <a:masterClrMapping/>
-  </p:clrMapOvr>
-</p:sld>
-</file>
-
-<file path=ppt/slides/slide6.xml><?xml version="1.0" encoding="utf-8"?>
-<p:sld xmlns:a="http://schemas.openxmlformats.org/drawingml/2006/main" xmlns:r="http://schemas.openxmlformats.org/officeDocument/2006/relationships" xmlns:p="http://schemas.openxmlformats.org/presentationml/2006/main">
-  <p:cSld>
-    <p:spTree>
-      <p:nvGrpSpPr>
-        <p:cNvPr id="1" name=""/>
-        <p:cNvGrpSpPr/>
-        <p:nvPr/>
-      </p:nvGrpSpPr>
-      <p:grpSpPr>
-        <a:xfrm>
-          <a:off x="0" y="0"/>
-          <a:ext cx="0" cy="0"/>
-          <a:chOff x="0" y="0"/>
-          <a:chExt cx="0" cy="0"/>
-        </a:xfrm>
-      </p:grpSpPr>
-      <p:sp>
-        <p:nvSpPr>
-          <p:cNvPr id="2" name="Title 1">
-            <a:extLst>
-              <a:ext uri="{FF2B5EF4-FFF2-40B4-BE49-F238E27FC236}">
-                <a16:creationId xmlns:a16="http://schemas.microsoft.com/office/drawing/2014/main" id="{90A70957-8A6C-4E7C-858D-0E5BEF6663AE}"/>
-              </a:ext>
-            </a:extLst>
-          </p:cNvPr>
-          <p:cNvSpPr>
-            <a:spLocks noGrp="1"/>
-          </p:cNvSpPr>
-          <p:nvPr>
-            <p:ph type="title"/>
-          </p:nvPr>
-        </p:nvSpPr>
-        <p:spPr/>
-        <p:txBody>
-          <a:bodyPr/>
-          <a:lstStyle/>
-          <a:p>
-            <a:r>
-              <a:rPr lang="en-US" dirty="0"/>
-              <a:t>Previous Work</a:t>
-            </a:r>
-          </a:p>
-        </p:txBody>
-      </p:sp>
-      <p:sp>
-        <p:nvSpPr>
-          <p:cNvPr id="3" name="Content Placeholder 2">
-            <a:extLst>
-              <a:ext uri="{FF2B5EF4-FFF2-40B4-BE49-F238E27FC236}">
-                <a16:creationId xmlns:a16="http://schemas.microsoft.com/office/drawing/2014/main" id="{085C900B-F097-4A12-A0B8-A530DC7DB4A9}"/>
-              </a:ext>
-            </a:extLst>
-          </p:cNvPr>
-          <p:cNvSpPr>
-            <a:spLocks noGrp="1"/>
-          </p:cNvSpPr>
-          <p:nvPr>
-            <p:ph idx="1"/>
-          </p:nvPr>
-        </p:nvSpPr>
-        <p:spPr/>
-        <p:txBody>
-          <a:bodyPr>
-            <a:normAutofit/>
-          </a:bodyPr>
-          <a:lstStyle/>
-          <a:p>
-            <a:r>
-              <a:rPr lang="en-US" dirty="0"/>
-              <a:t>Previous work generated 162 of these invertibility equivalences, and proved them using SMT-solvers for bit-widths up to 65.</a:t>
-            </a:r>
-          </a:p>
-          <a:p>
-            <a:r>
-              <a:rPr lang="en-US" dirty="0"/>
-              <a:t>Another approach was to encode the equivalences in theories supported by SMT-solvers to reason about parametric bit-widths. However, this approach failed on over a quarter of the equivalences.</a:t>
-            </a:r>
-          </a:p>
-          <a:p>
-            <a:endParaRPr lang="en-US" dirty="0"/>
-          </a:p>
-        </p:txBody>
-      </p:sp>
-    </p:spTree>
-    <p:extLst>
-      <p:ext uri="{BB962C8B-B14F-4D97-AF65-F5344CB8AC3E}">
-        <p14:creationId xmlns:p14="http://schemas.microsoft.com/office/powerpoint/2010/main" val="4101757739"/>
-      </p:ext>
-    </p:extLst>
-  </p:cSld>
-  <p:clrMapOvr>
-    <a:masterClrMapping/>
-  </p:clrMapOvr>
-</p:sld>
-</file>
-
-<file path=ppt/slides/slide7.xml><?xml version="1.0" encoding="utf-8"?>
-<p:sld xmlns:a="http://schemas.openxmlformats.org/drawingml/2006/main" xmlns:r="http://schemas.openxmlformats.org/officeDocument/2006/relationships" xmlns:p="http://schemas.openxmlformats.org/presentationml/2006/main">
-  <p:cSld>
-    <p:spTree>
-      <p:nvGrpSpPr>
-        <p:cNvPr id="1" name=""/>
-        <p:cNvGrpSpPr/>
-        <p:nvPr/>
-      </p:nvGrpSpPr>
-      <p:grpSpPr>
-        <a:xfrm>
-          <a:off x="0" y="0"/>
-          <a:ext cx="0" cy="0"/>
-          <a:chOff x="0" y="0"/>
-          <a:chExt cx="0" cy="0"/>
-        </a:xfrm>
-      </p:grpSpPr>
-      <p:sp>
-        <p:nvSpPr>
-          <p:cNvPr id="2" name="Title 1">
-            <a:extLst>
-              <a:ext uri="{FF2B5EF4-FFF2-40B4-BE49-F238E27FC236}">
-                <a16:creationId xmlns:a16="http://schemas.microsoft.com/office/drawing/2014/main" id="{925AB8E8-BBFC-4026-AC10-1058F93AD1C9}"/>
-              </a:ext>
-            </a:extLst>
-          </p:cNvPr>
-          <p:cNvSpPr>
-            <a:spLocks noGrp="1"/>
-          </p:cNvSpPr>
-          <p:nvPr>
-            <p:ph type="title"/>
-          </p:nvPr>
-        </p:nvSpPr>
-        <p:spPr/>
-        <p:txBody>
-          <a:bodyPr/>
-          <a:lstStyle/>
-          <a:p>
-            <a:r>
-              <a:rPr lang="en-US" dirty="0"/>
-              <a:t>Contributions</a:t>
-            </a:r>
-          </a:p>
-        </p:txBody>
-      </p:sp>
-      <p:sp>
-        <p:nvSpPr>
-          <p:cNvPr id="3" name="Content Placeholder 2">
-            <a:extLst>
-              <a:ext uri="{FF2B5EF4-FFF2-40B4-BE49-F238E27FC236}">
-                <a16:creationId xmlns:a16="http://schemas.microsoft.com/office/drawing/2014/main" id="{21924529-45D2-4561-AEDA-CC1B55D772F4}"/>
-              </a:ext>
-            </a:extLst>
-          </p:cNvPr>
-          <p:cNvSpPr>
-            <a:spLocks noGrp="1"/>
-          </p:cNvSpPr>
-          <p:nvPr>
-            <p:ph idx="1"/>
-          </p:nvPr>
-        </p:nvSpPr>
-        <p:spPr/>
-        <p:txBody>
-          <a:bodyPr/>
-          <a:lstStyle/>
-          <a:p>
-            <a:r>
-              <a:rPr lang="en-US" dirty="0"/>
-              <a:t>Represented a subset of the 162 invertibility equivalences in Coq, and proved them for arbitrary bit-width.</a:t>
-            </a:r>
-          </a:p>
-          <a:p>
-            <a:r>
-              <a:rPr lang="en-US" dirty="0"/>
-              <a:t>Extended a Coq bit-vector library to support some of these equivalences.</a:t>
-            </a:r>
-          </a:p>
-          <a:p>
-            <a:endParaRPr lang="en-US" dirty="0"/>
-          </a:p>
-        </p:txBody>
-      </p:sp>
-    </p:spTree>
-    <p:extLst>
-      <p:ext uri="{BB962C8B-B14F-4D97-AF65-F5344CB8AC3E}">
-        <p14:creationId xmlns:p14="http://schemas.microsoft.com/office/powerpoint/2010/main" val="2019461777"/>
-      </p:ext>
-    </p:extLst>
-  </p:cSld>
-  <p:clrMapOvr>
-    <a:masterClrMapping/>
-  </p:clrMapOvr>
-</p:sld>
-</file>
-
-<file path=ppt/slides/slide8.xml><?xml version="1.0" encoding="utf-8"?>
-<p:sld xmlns:a="http://schemas.openxmlformats.org/drawingml/2006/main" xmlns:r="http://schemas.openxmlformats.org/officeDocument/2006/relationships" xmlns:p="http://schemas.openxmlformats.org/presentationml/2006/main">
-  <p:cSld>
-    <p:spTree>
-      <p:nvGrpSpPr>
-        <p:cNvPr id="1" name=""/>
-        <p:cNvGrpSpPr/>
-        <p:nvPr/>
-      </p:nvGrpSpPr>
-      <p:grpSpPr>
-        <a:xfrm>
-          <a:off x="0" y="0"/>
-          <a:ext cx="0" cy="0"/>
-          <a:chOff x="0" y="0"/>
-          <a:chExt cx="0" cy="0"/>
-        </a:xfrm>
-      </p:grpSpPr>
-      <p:sp>
-        <p:nvSpPr>
-          <p:cNvPr id="2" name="Title 1">
-            <a:extLst>
-              <a:ext uri="{FF2B5EF4-FFF2-40B4-BE49-F238E27FC236}">
                 <a16:creationId xmlns:a16="http://schemas.microsoft.com/office/drawing/2014/main" id="{9AF2338D-7CF4-4AF3-9449-3E1C71B0EED8}"/>
               </a:ext>
             </a:extLst>
@@ -5095,29 +5501,17 @@
             </a:pPr>
             <a:r>
               <a:rPr lang="en-US" dirty="0"/>
-              <a:t>We call this equivalence an </a:t>
-            </a:r>
-            <a:r>
-              <a:rPr lang="en-US" i="1" dirty="0">
-                <a:solidFill>
-                  <a:schemeClr val="accent2"/>
-                </a:solidFill>
-              </a:rPr>
-              <a:t>invertibility equivalence</a:t>
-            </a:r>
-            <a:r>
-              <a:rPr lang="en-US" dirty="0"/>
-              <a:t> (IE).</a:t>
+              <a:t>We call this equivalence an invertibility equivalence.</a:t>
             </a:r>
           </a:p>
         </p:txBody>
       </p:sp>
       <p:pic>
         <p:nvPicPr>
-          <p:cNvPr id="17" name="Picture 16">
+          <p:cNvPr id="5" name="Picture 4">
             <a:extLst>
               <a:ext uri="{FF2B5EF4-FFF2-40B4-BE49-F238E27FC236}">
-                <a16:creationId xmlns:a16="http://schemas.microsoft.com/office/drawing/2014/main" id="{8C42671C-56B2-452A-8F17-52C6D884568E}"/>
+                <a16:creationId xmlns:a16="http://schemas.microsoft.com/office/drawing/2014/main" id="{B60869B1-5809-4978-B2B4-CB7890BF36A6}"/>
               </a:ext>
             </a:extLst>
           </p:cNvPr>
@@ -5154,10 +5548,10 @@
       </p:pic>
       <p:pic>
         <p:nvPicPr>
-          <p:cNvPr id="21" name="Picture 20">
+          <p:cNvPr id="7" name="Picture 6">
             <a:extLst>
               <a:ext uri="{FF2B5EF4-FFF2-40B4-BE49-F238E27FC236}">
-                <a16:creationId xmlns:a16="http://schemas.microsoft.com/office/drawing/2014/main" id="{03C0F2DB-9C55-4642-8E9F-E2B9639F7317}"/>
+                <a16:creationId xmlns:a16="http://schemas.microsoft.com/office/drawing/2014/main" id="{A7AFBD17-4F36-4B5C-943E-0AB4AA0D8CFA}"/>
               </a:ext>
             </a:extLst>
           </p:cNvPr>
@@ -5194,10 +5588,10 @@
       </p:pic>
       <p:pic>
         <p:nvPicPr>
-          <p:cNvPr id="29" name="Picture 28">
+          <p:cNvPr id="9" name="Picture 8">
             <a:extLst>
               <a:ext uri="{FF2B5EF4-FFF2-40B4-BE49-F238E27FC236}">
-                <a16:creationId xmlns:a16="http://schemas.microsoft.com/office/drawing/2014/main" id="{4E416828-A050-4A25-8837-F7CCD29CC6EE}"/>
+                <a16:creationId xmlns:a16="http://schemas.microsoft.com/office/drawing/2014/main" id="{976A3091-CE30-467C-A650-7273D0E28873}"/>
               </a:ext>
             </a:extLst>
           </p:cNvPr>
@@ -5245,6 +5639,521 @@
 </p:sld>
 </file>
 
+<file path=ppt/slides/slide5.xml><?xml version="1.0" encoding="utf-8"?>
+<p:sld xmlns:a="http://schemas.openxmlformats.org/drawingml/2006/main" xmlns:r="http://schemas.openxmlformats.org/officeDocument/2006/relationships" xmlns:p="http://schemas.openxmlformats.org/presentationml/2006/main">
+  <p:cSld>
+    <p:spTree>
+      <p:nvGrpSpPr>
+        <p:cNvPr id="1" name=""/>
+        <p:cNvGrpSpPr/>
+        <p:nvPr/>
+      </p:nvGrpSpPr>
+      <p:grpSpPr>
+        <a:xfrm>
+          <a:off x="0" y="0"/>
+          <a:ext cx="0" cy="0"/>
+          <a:chOff x="0" y="0"/>
+          <a:chExt cx="0" cy="0"/>
+        </a:xfrm>
+      </p:grpSpPr>
+      <p:sp>
+        <p:nvSpPr>
+          <p:cNvPr id="2" name="Title 1">
+            <a:extLst>
+              <a:ext uri="{FF2B5EF4-FFF2-40B4-BE49-F238E27FC236}">
+                <a16:creationId xmlns:a16="http://schemas.microsoft.com/office/drawing/2014/main" id="{FA1188A8-F7DD-41A1-A207-79FAF20656F9}"/>
+              </a:ext>
+            </a:extLst>
+          </p:cNvPr>
+          <p:cNvSpPr>
+            <a:spLocks noGrp="1"/>
+          </p:cNvSpPr>
+          <p:nvPr>
+            <p:ph type="title"/>
+          </p:nvPr>
+        </p:nvSpPr>
+        <p:spPr/>
+        <p:txBody>
+          <a:bodyPr/>
+          <a:lstStyle/>
+          <a:p>
+            <a:r>
+              <a:rPr lang="en-US" dirty="0"/>
+              <a:t>Invertibility Conditions: Example</a:t>
+            </a:r>
+          </a:p>
+        </p:txBody>
+      </p:sp>
+      <p:sp>
+        <p:nvSpPr>
+          <p:cNvPr id="3" name="Content Placeholder 2">
+            <a:extLst>
+              <a:ext uri="{FF2B5EF4-FFF2-40B4-BE49-F238E27FC236}">
+                <a16:creationId xmlns:a16="http://schemas.microsoft.com/office/drawing/2014/main" id="{861D91C3-7E92-4BA7-825C-2BE28191BD67}"/>
+              </a:ext>
+            </a:extLst>
+          </p:cNvPr>
+          <p:cNvSpPr>
+            <a:spLocks noGrp="1"/>
+          </p:cNvSpPr>
+          <p:nvPr>
+            <p:ph idx="1"/>
+          </p:nvPr>
+        </p:nvSpPr>
+        <p:spPr/>
+        <p:txBody>
+          <a:bodyPr>
+            <a:normAutofit/>
+          </a:bodyPr>
+          <a:lstStyle/>
+          <a:p>
+            <a:r>
+              <a:rPr lang="en-US" dirty="0"/>
+              <a:t>Inversion of bit-vector addition is unconditional</a:t>
+            </a:r>
+            <a:br>
+              <a:rPr lang="en-US" dirty="0"/>
+            </a:br>
+            <a:br>
+              <a:rPr lang="en-US" dirty="0"/>
+            </a:br>
+            <a:br>
+              <a:rPr lang="en-US" dirty="0"/>
+            </a:br>
+            <a:r>
+              <a:rPr lang="en-US" dirty="0"/>
+              <a:t>The inverse is x = t – s</a:t>
+            </a:r>
+          </a:p>
+          <a:p>
+            <a:r>
+              <a:rPr lang="en-US" dirty="0"/>
+              <a:t>Inversion of bit-vector multiplication is conditional</a:t>
+            </a:r>
+          </a:p>
+          <a:p>
+            <a:endParaRPr lang="en-US" dirty="0"/>
+          </a:p>
+        </p:txBody>
+      </p:sp>
+      <p:pic>
+        <p:nvPicPr>
+          <p:cNvPr id="14" name="Picture 13">
+            <a:extLst>
+              <a:ext uri="{FF2B5EF4-FFF2-40B4-BE49-F238E27FC236}">
+                <a16:creationId xmlns:a16="http://schemas.microsoft.com/office/drawing/2014/main" id="{78232C63-6A58-4E0C-BF91-29CA7070978A}"/>
+              </a:ext>
+            </a:extLst>
+          </p:cNvPr>
+          <p:cNvPicPr>
+            <a:picLocks noChangeAspect="1"/>
+          </p:cNvPicPr>
+          <p:nvPr>
+            <p:custDataLst>
+              <p:tags r:id="rId1"/>
+            </p:custDataLst>
+          </p:nvPr>
+        </p:nvPicPr>
+        <p:blipFill>
+          <a:blip r:embed="rId4">
+            <a:extLst>
+              <a:ext uri="{28A0092B-C50C-407E-A947-70E740481C1C}">
+                <a14:useLocalDpi xmlns:a14="http://schemas.microsoft.com/office/drawing/2010/main" val="0"/>
+              </a:ext>
+            </a:extLst>
+          </a:blip>
+          <a:stretch>
+            <a:fillRect/>
+          </a:stretch>
+        </p:blipFill>
+        <p:spPr>
+          <a:xfrm>
+            <a:off x="4159076" y="2498062"/>
+            <a:ext cx="2692267" cy="266667"/>
+          </a:xfrm>
+          <a:prstGeom prst="rect">
+            <a:avLst/>
+          </a:prstGeom>
+        </p:spPr>
+      </p:pic>
+      <p:pic>
+        <p:nvPicPr>
+          <p:cNvPr id="16" name="Picture 15">
+            <a:extLst>
+              <a:ext uri="{FF2B5EF4-FFF2-40B4-BE49-F238E27FC236}">
+                <a16:creationId xmlns:a16="http://schemas.microsoft.com/office/drawing/2014/main" id="{8AF4C4FF-B431-4666-A1B5-5CA88A35DDE7}"/>
+              </a:ext>
+            </a:extLst>
+          </p:cNvPr>
+          <p:cNvPicPr>
+            <a:picLocks noChangeAspect="1"/>
+          </p:cNvPicPr>
+          <p:nvPr>
+            <p:custDataLst>
+              <p:tags r:id="rId2"/>
+            </p:custDataLst>
+          </p:nvPr>
+        </p:nvPicPr>
+        <p:blipFill>
+          <a:blip r:embed="rId5">
+            <a:extLst>
+              <a:ext uri="{28A0092B-C50C-407E-A947-70E740481C1C}">
+                <a14:useLocalDpi xmlns:a14="http://schemas.microsoft.com/office/drawing/2010/main" val="0"/>
+              </a:ext>
+            </a:extLst>
+          </a:blip>
+          <a:stretch>
+            <a:fillRect/>
+          </a:stretch>
+        </p:blipFill>
+        <p:spPr>
+          <a:xfrm>
+            <a:off x="3423915" y="4143611"/>
+            <a:ext cx="3910401" cy="262400"/>
+          </a:xfrm>
+          <a:prstGeom prst="rect">
+            <a:avLst/>
+          </a:prstGeom>
+        </p:spPr>
+      </p:pic>
+    </p:spTree>
+    <p:extLst>
+      <p:ext uri="{BB962C8B-B14F-4D97-AF65-F5344CB8AC3E}">
+        <p14:creationId xmlns:p14="http://schemas.microsoft.com/office/powerpoint/2010/main" val="3220518952"/>
+      </p:ext>
+    </p:extLst>
+  </p:cSld>
+  <p:clrMapOvr>
+    <a:masterClrMapping/>
+  </p:clrMapOvr>
+</p:sld>
+</file>
+
+<file path=ppt/slides/slide6.xml><?xml version="1.0" encoding="utf-8"?>
+<p:sld xmlns:a="http://schemas.openxmlformats.org/drawingml/2006/main" xmlns:r="http://schemas.openxmlformats.org/officeDocument/2006/relationships" xmlns:p="http://schemas.openxmlformats.org/presentationml/2006/main">
+  <p:cSld>
+    <p:spTree>
+      <p:nvGrpSpPr>
+        <p:cNvPr id="1" name=""/>
+        <p:cNvGrpSpPr/>
+        <p:nvPr/>
+      </p:nvGrpSpPr>
+      <p:grpSpPr>
+        <a:xfrm>
+          <a:off x="0" y="0"/>
+          <a:ext cx="0" cy="0"/>
+          <a:chOff x="0" y="0"/>
+          <a:chExt cx="0" cy="0"/>
+        </a:xfrm>
+      </p:grpSpPr>
+      <p:sp>
+        <p:nvSpPr>
+          <p:cNvPr id="2" name="Title 1">
+            <a:extLst>
+              <a:ext uri="{FF2B5EF4-FFF2-40B4-BE49-F238E27FC236}">
+                <a16:creationId xmlns:a16="http://schemas.microsoft.com/office/drawing/2014/main" id="{129BC7A0-0443-4289-8FC8-74357E7F4426}"/>
+              </a:ext>
+            </a:extLst>
+          </p:cNvPr>
+          <p:cNvSpPr>
+            <a:spLocks noGrp="1"/>
+          </p:cNvSpPr>
+          <p:nvPr>
+            <p:ph type="title"/>
+          </p:nvPr>
+        </p:nvSpPr>
+        <p:spPr/>
+        <p:txBody>
+          <a:bodyPr/>
+          <a:lstStyle/>
+          <a:p>
+            <a:r>
+              <a:rPr lang="en-US" dirty="0"/>
+              <a:t>Motivation</a:t>
+            </a:r>
+          </a:p>
+        </p:txBody>
+      </p:sp>
+      <p:sp>
+        <p:nvSpPr>
+          <p:cNvPr id="3" name="Content Placeholder 2">
+            <a:extLst>
+              <a:ext uri="{FF2B5EF4-FFF2-40B4-BE49-F238E27FC236}">
+                <a16:creationId xmlns:a16="http://schemas.microsoft.com/office/drawing/2014/main" id="{11AD8CE7-6235-4B9B-A65D-64CD1FDE0470}"/>
+              </a:ext>
+            </a:extLst>
+          </p:cNvPr>
+          <p:cNvSpPr>
+            <a:spLocks noGrp="1"/>
+          </p:cNvSpPr>
+          <p:nvPr>
+            <p:ph idx="1"/>
+          </p:nvPr>
+        </p:nvSpPr>
+        <p:spPr/>
+        <p:txBody>
+          <a:bodyPr/>
+          <a:lstStyle/>
+          <a:p>
+            <a:r>
+              <a:rPr lang="en-US" dirty="0"/>
+              <a:t>[</a:t>
+            </a:r>
+            <a:r>
+              <a:rPr lang="en-US" dirty="0" err="1"/>
+              <a:t>Niemetz</a:t>
+            </a:r>
+            <a:r>
+              <a:rPr lang="en-US" dirty="0"/>
+              <a:t> et al.] requires these equivalences to be true independent of bit-width</a:t>
+            </a:r>
+          </a:p>
+          <a:p>
+            <a:r>
+              <a:rPr lang="en-US" dirty="0"/>
+              <a:t>Proofs of these equivalences parametric in bit-width are guarantees that bolster the results of the SMT-solvers that use them</a:t>
+            </a:r>
+          </a:p>
+          <a:p>
+            <a:endParaRPr lang="en-US" dirty="0"/>
+          </a:p>
+        </p:txBody>
+      </p:sp>
+    </p:spTree>
+    <p:extLst>
+      <p:ext uri="{BB962C8B-B14F-4D97-AF65-F5344CB8AC3E}">
+        <p14:creationId xmlns:p14="http://schemas.microsoft.com/office/powerpoint/2010/main" val="2151843492"/>
+      </p:ext>
+    </p:extLst>
+  </p:cSld>
+  <p:clrMapOvr>
+    <a:masterClrMapping/>
+  </p:clrMapOvr>
+</p:sld>
+</file>
+
+<file path=ppt/slides/slide7.xml><?xml version="1.0" encoding="utf-8"?>
+<p:sld xmlns:a="http://schemas.openxmlformats.org/drawingml/2006/main" xmlns:r="http://schemas.openxmlformats.org/officeDocument/2006/relationships" xmlns:p="http://schemas.openxmlformats.org/presentationml/2006/main">
+  <p:cSld>
+    <p:spTree>
+      <p:nvGrpSpPr>
+        <p:cNvPr id="1" name=""/>
+        <p:cNvGrpSpPr/>
+        <p:nvPr/>
+      </p:nvGrpSpPr>
+      <p:grpSpPr>
+        <a:xfrm>
+          <a:off x="0" y="0"/>
+          <a:ext cx="0" cy="0"/>
+          <a:chOff x="0" y="0"/>
+          <a:chExt cx="0" cy="0"/>
+        </a:xfrm>
+      </p:grpSpPr>
+      <p:sp>
+        <p:nvSpPr>
+          <p:cNvPr id="2" name="Title 1">
+            <a:extLst>
+              <a:ext uri="{FF2B5EF4-FFF2-40B4-BE49-F238E27FC236}">
+                <a16:creationId xmlns:a16="http://schemas.microsoft.com/office/drawing/2014/main" id="{90A70957-8A6C-4E7C-858D-0E5BEF6663AE}"/>
+              </a:ext>
+            </a:extLst>
+          </p:cNvPr>
+          <p:cNvSpPr>
+            <a:spLocks noGrp="1"/>
+          </p:cNvSpPr>
+          <p:nvPr>
+            <p:ph type="title"/>
+          </p:nvPr>
+        </p:nvSpPr>
+        <p:spPr/>
+        <p:txBody>
+          <a:bodyPr/>
+          <a:lstStyle/>
+          <a:p>
+            <a:r>
+              <a:rPr lang="en-US" dirty="0"/>
+              <a:t>Previous Work</a:t>
+            </a:r>
+          </a:p>
+        </p:txBody>
+      </p:sp>
+      <p:sp>
+        <p:nvSpPr>
+          <p:cNvPr id="3" name="Content Placeholder 2">
+            <a:extLst>
+              <a:ext uri="{FF2B5EF4-FFF2-40B4-BE49-F238E27FC236}">
+                <a16:creationId xmlns:a16="http://schemas.microsoft.com/office/drawing/2014/main" id="{085C900B-F097-4A12-A0B8-A530DC7DB4A9}"/>
+              </a:ext>
+            </a:extLst>
+          </p:cNvPr>
+          <p:cNvSpPr>
+            <a:spLocks noGrp="1"/>
+          </p:cNvSpPr>
+          <p:nvPr>
+            <p:ph idx="1"/>
+          </p:nvPr>
+        </p:nvSpPr>
+        <p:spPr/>
+        <p:txBody>
+          <a:bodyPr>
+            <a:normAutofit/>
+          </a:bodyPr>
+          <a:lstStyle/>
+          <a:p>
+            <a:r>
+              <a:rPr lang="en-US" dirty="0"/>
+              <a:t>[</a:t>
+            </a:r>
+            <a:r>
+              <a:rPr lang="en-US" dirty="0" err="1"/>
+              <a:t>Niemetz</a:t>
+            </a:r>
+            <a:r>
+              <a:rPr lang="en-US" dirty="0"/>
+              <a:t> et al.] generated 162 invertibility equivalences, and proved them using SMT-solvers for bit-widths up to 65</a:t>
+            </a:r>
+          </a:p>
+          <a:p>
+            <a:r>
+              <a:rPr lang="en-US" dirty="0"/>
+              <a:t>[</a:t>
+            </a:r>
+            <a:r>
+              <a:rPr lang="en-US" dirty="0" err="1"/>
+              <a:t>Preiner</a:t>
+            </a:r>
+            <a:r>
+              <a:rPr lang="en-US" dirty="0"/>
+              <a:t> et al.] encoded the equivalences in theories supported by SMT-solvers to reason about parametric bit-widths</a:t>
+            </a:r>
+          </a:p>
+          <a:p>
+            <a:r>
+              <a:rPr lang="en-US" dirty="0"/>
+              <a:t>The approach by [</a:t>
+            </a:r>
+            <a:r>
+              <a:rPr lang="en-US" dirty="0" err="1"/>
+              <a:t>Preiner</a:t>
+            </a:r>
+            <a:r>
+              <a:rPr lang="en-US" dirty="0"/>
+              <a:t> et al.] failed on over a quarter of the equivalences</a:t>
+            </a:r>
+          </a:p>
+          <a:p>
+            <a:endParaRPr lang="en-US" dirty="0"/>
+          </a:p>
+        </p:txBody>
+      </p:sp>
+    </p:spTree>
+    <p:extLst>
+      <p:ext uri="{BB962C8B-B14F-4D97-AF65-F5344CB8AC3E}">
+        <p14:creationId xmlns:p14="http://schemas.microsoft.com/office/powerpoint/2010/main" val="4101757739"/>
+      </p:ext>
+    </p:extLst>
+  </p:cSld>
+  <p:clrMapOvr>
+    <a:masterClrMapping/>
+  </p:clrMapOvr>
+</p:sld>
+</file>
+
+<file path=ppt/slides/slide8.xml><?xml version="1.0" encoding="utf-8"?>
+<p:sld xmlns:a="http://schemas.openxmlformats.org/drawingml/2006/main" xmlns:r="http://schemas.openxmlformats.org/officeDocument/2006/relationships" xmlns:p="http://schemas.openxmlformats.org/presentationml/2006/main">
+  <p:cSld>
+    <p:spTree>
+      <p:nvGrpSpPr>
+        <p:cNvPr id="1" name=""/>
+        <p:cNvGrpSpPr/>
+        <p:nvPr/>
+      </p:nvGrpSpPr>
+      <p:grpSpPr>
+        <a:xfrm>
+          <a:off x="0" y="0"/>
+          <a:ext cx="0" cy="0"/>
+          <a:chOff x="0" y="0"/>
+          <a:chExt cx="0" cy="0"/>
+        </a:xfrm>
+      </p:grpSpPr>
+      <p:sp>
+        <p:nvSpPr>
+          <p:cNvPr id="2" name="Title 1">
+            <a:extLst>
+              <a:ext uri="{FF2B5EF4-FFF2-40B4-BE49-F238E27FC236}">
+                <a16:creationId xmlns:a16="http://schemas.microsoft.com/office/drawing/2014/main" id="{925AB8E8-BBFC-4026-AC10-1058F93AD1C9}"/>
+              </a:ext>
+            </a:extLst>
+          </p:cNvPr>
+          <p:cNvSpPr>
+            <a:spLocks noGrp="1"/>
+          </p:cNvSpPr>
+          <p:nvPr>
+            <p:ph type="title"/>
+          </p:nvPr>
+        </p:nvSpPr>
+        <p:spPr/>
+        <p:txBody>
+          <a:bodyPr/>
+          <a:lstStyle/>
+          <a:p>
+            <a:r>
+              <a:rPr lang="en-US" dirty="0"/>
+              <a:t>Contributions</a:t>
+            </a:r>
+          </a:p>
+        </p:txBody>
+      </p:sp>
+      <p:sp>
+        <p:nvSpPr>
+          <p:cNvPr id="3" name="Content Placeholder 2">
+            <a:extLst>
+              <a:ext uri="{FF2B5EF4-FFF2-40B4-BE49-F238E27FC236}">
+                <a16:creationId xmlns:a16="http://schemas.microsoft.com/office/drawing/2014/main" id="{21924529-45D2-4561-AEDA-CC1B55D772F4}"/>
+              </a:ext>
+            </a:extLst>
+          </p:cNvPr>
+          <p:cNvSpPr>
+            <a:spLocks noGrp="1"/>
+          </p:cNvSpPr>
+          <p:nvPr>
+            <p:ph idx="1"/>
+          </p:nvPr>
+        </p:nvSpPr>
+        <p:spPr/>
+        <p:txBody>
+          <a:bodyPr/>
+          <a:lstStyle/>
+          <a:p>
+            <a:r>
+              <a:rPr lang="en-US" dirty="0"/>
+              <a:t>Represented a subset of the 162 invertibility equivalences in Coq, and proved them for arbitrary bit-width</a:t>
+            </a:r>
+          </a:p>
+          <a:p>
+            <a:r>
+              <a:rPr lang="en-US" dirty="0"/>
+              <a:t>Extended a Coq bit-vector library to support some of these equivalences</a:t>
+            </a:r>
+          </a:p>
+          <a:p>
+            <a:endParaRPr lang="en-US" dirty="0"/>
+          </a:p>
+        </p:txBody>
+      </p:sp>
+    </p:spTree>
+    <p:extLst>
+      <p:ext uri="{BB962C8B-B14F-4D97-AF65-F5344CB8AC3E}">
+        <p14:creationId xmlns:p14="http://schemas.microsoft.com/office/powerpoint/2010/main" val="2019461777"/>
+      </p:ext>
+    </p:extLst>
+  </p:cSld>
+  <p:clrMapOvr>
+    <a:masterClrMapping/>
+  </p:clrMapOvr>
+</p:sld>
+</file>
+
 <file path=ppt/slides/slide9.xml><?xml version="1.0" encoding="utf-8"?>
 <p:sld xmlns:a="http://schemas.openxmlformats.org/drawingml/2006/main" xmlns:r="http://schemas.openxmlformats.org/officeDocument/2006/relationships" xmlns:p="http://schemas.openxmlformats.org/presentationml/2006/main">
   <p:cSld>
@@ -5292,10 +6201,10 @@
       </p:sp>
       <p:pic>
         <p:nvPicPr>
-          <p:cNvPr id="35" name="Picture 34">
+          <p:cNvPr id="10" name="Picture 9">
             <a:extLst>
               <a:ext uri="{FF2B5EF4-FFF2-40B4-BE49-F238E27FC236}">
-                <a16:creationId xmlns:a16="http://schemas.microsoft.com/office/drawing/2014/main" id="{41AA85CF-1E45-407E-92D9-CBFB10D13F06}"/>
+                <a16:creationId xmlns:a16="http://schemas.microsoft.com/office/drawing/2014/main" id="{49F7DA1D-0D4F-43B9-B08C-2E9D8A8E7662}"/>
               </a:ext>
             </a:extLst>
           </p:cNvPr>
@@ -5322,8 +6231,8 @@
         </p:blipFill>
         <p:spPr>
           <a:xfrm>
-            <a:off x="804644" y="1674398"/>
-            <a:ext cx="5752816" cy="4499899"/>
+            <a:off x="804644" y="1674399"/>
+            <a:ext cx="5752815" cy="4499902"/>
           </a:xfrm>
           <a:prstGeom prst="rect">
             <a:avLst/>
@@ -5332,10 +6241,10 @@
       </p:pic>
       <p:pic>
         <p:nvPicPr>
-          <p:cNvPr id="37" name="Picture 36">
+          <p:cNvPr id="12" name="Picture 11">
             <a:extLst>
               <a:ext uri="{FF2B5EF4-FFF2-40B4-BE49-F238E27FC236}">
-                <a16:creationId xmlns:a16="http://schemas.microsoft.com/office/drawing/2014/main" id="{D58457BC-F5E1-4515-8BDF-0942D9F52FA1}"/>
+                <a16:creationId xmlns:a16="http://schemas.microsoft.com/office/drawing/2014/main" id="{59A43907-6701-4CFA-93AD-EA9096B31568}"/>
               </a:ext>
             </a:extLst>
           </p:cNvPr>
@@ -5362,7 +6271,7 @@
         </p:blipFill>
         <p:spPr>
           <a:xfrm>
-            <a:off x="6904139" y="1674398"/>
+            <a:off x="6904141" y="1674398"/>
             <a:ext cx="5117285" cy="1018284"/>
           </a:xfrm>
           <a:prstGeom prst="rect">
@@ -5386,30 +6295,11 @@
 <file path=ppt/tags/tag1.xml><?xml version="1.0" encoding="utf-8"?>
 <p:tagLst xmlns:a="http://schemas.openxmlformats.org/drawingml/2006/main" xmlns:r="http://schemas.openxmlformats.org/officeDocument/2006/relationships" xmlns:p="http://schemas.openxmlformats.org/presentationml/2006/main">
   <p:tag name="OUTPUTDPI" val="1200"/>
-  <p:tag name="ORIGINALHEIGHT" val="93.73827"/>
-  <p:tag name="ORIGINALWIDTH" val="946.3817"/>
-  <p:tag name="LATEXADDIN" val="\documentclass{article}&#10;\usepackage{amsmath}&#10;\usepackage{xcolor}&#10;\pagestyle{empty}&#10;\begin{document}&#10;\color{blue}$x + s = t \iff \top$&#10;\end{document}"/>
+  <p:tag name="ORIGINALHEIGHT" val="123.7346"/>
+  <p:tag name="ORIGINALWIDTH" val="681.6648"/>
+  <p:tag name="LATEXADDIN" val="\documentclass{article}&#10;\usepackage{amsmath}&#10;\usepackage[dvipsnames]{xcolor}&#10;\pagestyle{empty}&#10;\begin{document}&#10;\color{NavyBlue}$\ell\ [\ x\ ,\ s\ ,\ t\ ]$&#10;\end{document}"/>
   <p:tag name="IGUANATEXSIZE" val="28"/>
-  <p:tag name="IGUANATEXCURSOR" val="112"/>
-  <p:tag name="TRANSPARENCY" val="True"/>
-  <p:tag name="FILENAME" val=""/>
-  <p:tag name="LATEXENGINEID" val="0"/>
-  <p:tag name="TEMPFOLDER" val="c:\temp\"/>
-  <p:tag name="LATEXFORMHEIGHT" val="312"/>
-  <p:tag name="LATEXFORMWIDTH" val="384"/>
-  <p:tag name="LATEXFORMWRAP" val="True"/>
-  <p:tag name="BITMAPVECTOR" val="0"/>
-</p:tagLst>
-</file>
-
-<file path=ppt/tags/tag10.xml><?xml version="1.0" encoding="utf-8"?>
-<p:tagLst xmlns:a="http://schemas.openxmlformats.org/drawingml/2006/main" xmlns:r="http://schemas.openxmlformats.org/officeDocument/2006/relationships" xmlns:p="http://schemas.openxmlformats.org/presentationml/2006/main">
-  <p:tag name="OUTPUTDPI" val="1200"/>
-  <p:tag name="ORIGINALHEIGHT" val="741.6573"/>
-  <p:tag name="ORIGINALWIDTH" val="4098.988"/>
-  <p:tag name="LATEXADDIN" val="\documentclass{article}&#10;\usepackage{amsmath}&#10;\pagestyle{empty}&#10;\begin{document}&#10;\begin{itemize}&#10;\item unsigned weak inequalities ($&lt;=_u$, $&gt;=_u$)..&#10;\item arithmetic right shift ($\mathop{&gt;\kern-.3em&gt;_a}$).&#10;\item new definitions ofo all shift operators and a proof of equivalence between the two sets of definitions.&#10;\end{itemize}&#10;\end{document}"/>
-  <p:tag name="IGUANATEXSIZE" val="20"/>
-  <p:tag name="IGUANATEXCURSOR" val="315"/>
+  <p:tag name="IGUANATEXCURSOR" val="128"/>
   <p:tag name="TRANSPARENCY" val="True"/>
   <p:tag name="FILENAME" val=""/>
   <p:tag name="LATEXENGINEID" val="0"/>
@@ -5424,11 +6314,11 @@
 <file path=ppt/tags/tag2.xml><?xml version="1.0" encoding="utf-8"?>
 <p:tagLst xmlns:a="http://schemas.openxmlformats.org/drawingml/2006/main" xmlns:r="http://schemas.openxmlformats.org/officeDocument/2006/relationships" xmlns:p="http://schemas.openxmlformats.org/presentationml/2006/main">
   <p:tag name="OUTPUTDPI" val="1200"/>
-  <p:tag name="ORIGINALHEIGHT" val="91.48859"/>
-  <p:tag name="ORIGINALWIDTH" val="513.6857"/>
-  <p:tag name="LATEXADDIN" val="\documentclass{article}&#10;\usepackage{amsmath}&#10;\pagestyle{empty}&#10;\begin{document}&#10;$x\ \&amp;\ s = t$&#10;\end{document}"/>
+  <p:tag name="ORIGINALHEIGHT" val="123.7346"/>
+  <p:tag name="ORIGINALWIDTH" val="579.6776"/>
+  <p:tag name="LATEXADDIN" val="\documentclass{article}&#10;\usepackage{amsmath}&#10;\usepackage[dvipsnames]{xcolor}&#10;\pagestyle{empty}&#10;\begin{document}&#10;\color{NavyBlue}$IC\ [\ s\ ,\ t\ ]$&#10;\end{document}"/>
   <p:tag name="IGUANATEXSIZE" val="28"/>
-  <p:tag name="IGUANATEXCURSOR" val="87"/>
+  <p:tag name="IGUANATEXCURSOR" val="128"/>
   <p:tag name="TRANSPARENCY" val="True"/>
   <p:tag name="FILENAME" val=""/>
   <p:tag name="LATEXENGINEID" val="0"/>
@@ -5443,11 +6333,11 @@
 <file path=ppt/tags/tag3.xml><?xml version="1.0" encoding="utf-8"?>
 <p:tagLst xmlns:a="http://schemas.openxmlformats.org/drawingml/2006/main" xmlns:r="http://schemas.openxmlformats.org/officeDocument/2006/relationships" xmlns:p="http://schemas.openxmlformats.org/presentationml/2006/main">
   <p:tag name="OUTPUTDPI" val="1200"/>
-  <p:tag name="ORIGINALHEIGHT" val="92.2385"/>
-  <p:tag name="ORIGINALWIDTH" val="1374.578"/>
-  <p:tag name="LATEXADDIN" val="\documentclass{article}&#10;\usepackage{amsmath}&#10;\pagestyle{empty}&#10;\begin{document}&#10;$x\ \&amp;\ s = t \iff t\ \&amp;\ s = t$&#10;&#10;&#10;&#10;\end{document}"/>
+  <p:tag name="ORIGINALHEIGHT" val="137.2328"/>
+  <p:tag name="ORIGINALWIDTH" val="2655.418"/>
+  <p:tag name="LATEXADDIN" val="\documentclass{article}&#10;\usepackage{amsmath}&#10;\usepackage[dvipsnames]{xcolor}&#10;\pagestyle{empty}&#10;\begin{document}&#10;\color{NavyBlue}$\forall s : \sigma_{[n]}.\ \forall t : \sigma_{[n]}.\ IC[s,t] \iff \exists x : \sigma_{[n]}.\ \ell[x,s,t]$&#10;\end{document}"/>
   <p:tag name="IGUANATEXSIZE" val="28"/>
-  <p:tag name="IGUANATEXCURSOR" val="111"/>
+  <p:tag name="IGUANATEXCURSOR" val="128"/>
   <p:tag name="TRANSPARENCY" val="True"/>
   <p:tag name="FILENAME" val=""/>
   <p:tag name="LATEXENGINEID" val="0"/>
@@ -5462,11 +6352,11 @@
 <file path=ppt/tags/tag4.xml><?xml version="1.0" encoding="utf-8"?>
 <p:tagLst xmlns:a="http://schemas.openxmlformats.org/drawingml/2006/main" xmlns:r="http://schemas.openxmlformats.org/officeDocument/2006/relationships" xmlns:p="http://schemas.openxmlformats.org/presentationml/2006/main">
   <p:tag name="OUTPUTDPI" val="1200"/>
-  <p:tag name="ORIGINALHEIGHT" val="123.7346"/>
-  <p:tag name="ORIGINALWIDTH" val="681.6648"/>
-  <p:tag name="LATEXADDIN" val="\documentclass{article}&#10;\usepackage{amsmath}&#10;\pagestyle{empty}&#10;\begin{document}&#10;$\ell\ [\ x\ ,\ s\ ,\ t\ ]$&#10;\end{document}"/>
+  <p:tag name="ORIGINALHEIGHT" val="93.73827"/>
+  <p:tag name="ORIGINALWIDTH" val="946.3817"/>
+  <p:tag name="LATEXADDIN" val="\documentclass{article}&#10;\usepackage{amsmath}&#10;\usepackage[dvipsnames]{xcolor}&#10;\pagestyle{empty}&#10;\begin{document}&#10;\color{NavyBlue}$x + s = t \iff \top$&#10;\end{document}"/>
   <p:tag name="IGUANATEXSIZE" val="28"/>
-  <p:tag name="IGUANATEXCURSOR" val="105"/>
+  <p:tag name="IGUANATEXCURSOR" val="123"/>
   <p:tag name="TRANSPARENCY" val="True"/>
   <p:tag name="FILENAME" val=""/>
   <p:tag name="LATEXENGINEID" val="0"/>
@@ -5481,11 +6371,11 @@
 <file path=ppt/tags/tag5.xml><?xml version="1.0" encoding="utf-8"?>
 <p:tagLst xmlns:a="http://schemas.openxmlformats.org/drawingml/2006/main" xmlns:r="http://schemas.openxmlformats.org/officeDocument/2006/relationships" xmlns:p="http://schemas.openxmlformats.org/presentationml/2006/main">
   <p:tag name="OUTPUTDPI" val="1200"/>
-  <p:tag name="ORIGINALHEIGHT" val="123.7346"/>
-  <p:tag name="ORIGINALWIDTH" val="579.6776"/>
-  <p:tag name="LATEXADDIN" val="\documentclass{article}&#10;\usepackage{amsmath}&#10;\pagestyle{empty}&#10;\begin{document}&#10;$IC\ [\ s\ ,\ t\ ]$&#10;\end{document}"/>
+  <p:tag name="ORIGINALHEIGHT" val="92.2385"/>
+  <p:tag name="ORIGINALWIDTH" val="1374.578"/>
+  <p:tag name="LATEXADDIN" val="\documentclass{article}&#10;\usepackage{amsmath}&#10;\usepackage[dvipsnames]{xcolor}&#10;\pagestyle{empty}&#10;\begin{document}&#10;\color{NavyBlue}$x\ \&amp;\ s = t \iff t\ \&amp;\ s = t$&#10;\end{document}"/>
   <p:tag name="IGUANATEXSIZE" val="28"/>
-  <p:tag name="IGUANATEXCURSOR" val="91"/>
+  <p:tag name="IGUANATEXCURSOR" val="161"/>
   <p:tag name="TRANSPARENCY" val="True"/>
   <p:tag name="FILENAME" val=""/>
   <p:tag name="LATEXENGINEID" val="0"/>
@@ -5500,11 +6390,11 @@
 <file path=ppt/tags/tag6.xml><?xml version="1.0" encoding="utf-8"?>
 <p:tagLst xmlns:a="http://schemas.openxmlformats.org/drawingml/2006/main" xmlns:r="http://schemas.openxmlformats.org/officeDocument/2006/relationships" xmlns:p="http://schemas.openxmlformats.org/presentationml/2006/main">
   <p:tag name="OUTPUTDPI" val="1200"/>
-  <p:tag name="ORIGINALHEIGHT" val="137.2328"/>
-  <p:tag name="ORIGINALWIDTH" val="2655.418"/>
-  <p:tag name="LATEXADDIN" val="\documentclass{article}&#10;\usepackage{amsmath}&#10;\pagestyle{empty}&#10;\begin{document}&#10;$\forall s : \sigma_{[n]}.\ \forall t : \sigma_{[n]}.\ IC[s,t] \iff \exists x : \sigma_{[n]}.\ \ell[x,s,t]$&#10;\end{document}"/>
+  <p:tag name="ORIGINALHEIGHT" val="2235.47"/>
+  <p:tag name="ORIGINALWIDTH" val="2857.893"/>
+  <p:tag name="LATEXADDIN" val="\documentclass{article}&#10;\usepackage{amsmath}&#10;\usepackage[dvipsnames]{xcolor}&#10;\usepackage{xspace}&#10;\usepackage{pifont}&#10;\usepackage{amssymb}&#10;\pagestyle{empty}&#10;\begin{document}&#10;\begin{table}&#10;\begin{center}&#10;{%&#10;  \renewcommand{\arraystretch}{1.2}%&#10;  \begin{tabular}{r@{\hspace{2.0em}}c@{\hspace{1.0em}}c@{\hspace{1.5em}}c@{\hspace{1.0em}}c@{\hspace{1.5em}}c@{\hspace{1.0em}}c}&#10;    \hline&#10;    \\[-2.5ex]&#10;    $\ell[x]$ &amp; $=$ &amp; $\not =$ &amp; $&lt;_u$ &amp; $&gt;_u$ &amp; $&lt;=_u$ &amp; $&gt;=_u$&#10;    \\[.5ex]&#10;    \hline&#10;    \\[-2.5ex]&#10;    $- x \bowtie t$ &amp; \color{blue}{$\checkmark$}\nolinebreak\kern-0.7em\xspace\color{OliveGreen}{$\checkmark$} &amp; \color{OliveGreen}{$\checkmark$} &amp; \color{OliveGreen}{$\checkmark$} &amp; \color{OliveGreen}{$\checkmark$}  &#10;     &amp; \color{OliveGreen}{$\checkmark$} &amp; \color{OliveGreen}{$\checkmark$} \\&#10;    $\sim x  \bowtie t$ &amp; \color{blue}{$\checkmark$}\nolinebreak\kern-0.7em\xspace\color{OliveGreen}{$\checkmark$} &amp; \color{OliveGreen}{$\checkmark$} &amp; \color{OliveGreen}{$\checkmark$} &amp; \color{OliveGreen}{$\checkmark$}  &#10;     &amp; \color{OliveGreen}{$\checkmark$} &amp; \color{OliveGreen}{$\checkmark$}  \\&#10;    $x\ \&amp;\ s \bowtie t$ &amp; \color{blue}{$\checkmark$} &amp; \color{OliveGreen}{$\checkmark$} &amp; \color{OliveGreen}{$\checkmark$} &amp; \color{OliveGreen}{$\checkmark$}  &#10;     &amp; \color{OliveGreen}{$\checkmark$} &amp; \color{OliveGreen}{$\checkmark$} \\&#10;    $x \mid s   \bowtie t$ &amp; \color{blue}{$\checkmark$} &amp; \color{OliveGreen}{$\checkmark$} &amp; \color{OliveGreen}{$\checkmark$} &amp; \color{OliveGreen}{$\checkmark$} &#10;     &amp; \color{OliveGreen}{$\checkmark$} &amp; \color{OliveGreen}{$\checkmark$} \\&#10;    $x \mathop{&lt;\kern-.3em&lt;} s  \bowtie t$ &amp; \color{blue}{$\checkmark$} &amp; \color{blue}{$\checkmark$} &amp; \color{OliveGreen}{$\checkmark$} &amp; \color{blue}{$\checkmark$}   &#10;     &amp; \color{OliveGreen}{$\checkmark$} &amp; \color{blue}{$\checkmark$} \\&#10;    $s \mathop{&lt;\kern-.3em&lt;} x  \bowtie t$ &amp; \color{blue}{$\checkmark$}\nolinebreak\kern-0.7em\xspace\color{OliveGreen}{$\checkmark$} &amp; \color{OliveGreen}{$\checkmark$} &amp; \color{OliveGreen}{$\checkmark$} &amp; \color{OliveGreen}{$\checkmark$} &#10;     &amp; \color{OliveGreen}{$\checkmark$} &amp; \color{OliveGreen}{$\checkmark$} \\&#10;    $x \mathop{&gt;\kern-.3em&gt;} s \bowtie t$ &amp; \color{blue}{$\checkmark$}\nolinebreak\kern-0.7em\xspace\color{OliveGreen}{$\checkmark$} &amp; \color{OliveGreen}{$\checkmark$} &amp; \color{OliveGreen}{$\checkmark$} &amp; \color{red}\ding{53} &#10;     &amp; \color{OliveGreen}{$\checkmark$} &amp; \color{OliveGreen}{$\checkmark$} \\&#10;    $s \mathop{&gt;\kern-.3em&gt;} x \bowtie t$ &amp; \color{blue}{$\checkmark$}\nolinebreak\kern-0.7em\xspace\color{OliveGreen}{$\checkmark$} &amp; \color{OliveGreen}{$\checkmark$} &amp; \color{OliveGreen}{$\checkmark$} &amp; \color{OliveGreen}{$\checkmark$} &#10;     &amp; \color{OliveGreen}{$\checkmark$} &amp; \color{OliveGreen}{$\checkmark$} \\&#10;    $x \mathop{&gt;\kern-.3em&gt;_a} s \bowtie t$ &amp; \color{blue}{$\checkmark$} &amp; \color{OliveGreen}{$\checkmark$} &amp; \color{OliveGreen}{$\checkmark$} &amp; \color{OliveGreen}{$\checkmark$} &#10;     &amp; \color{OliveGreen}{$\checkmark$} &amp; \color{OliveGreen}{$\checkmark$} \\&#10;    $s \mathop{&gt;\kern-.3em&gt;_a} x \bowtie t$ &amp; \color{blue}{$\checkmark$}\nolinebreak\kern-0.7em\xspace\color{OliveGreen}{$\checkmark$} &amp; \color{OliveGreen}{$\checkmark$} &amp; \color{blue}{$\checkmark$} &amp; \color{blue}{$\checkmark$}  &#10;     &amp; \color{blue}{$\checkmark$} &amp; \color{blue}{$\checkmark$} \\&#10;    $x + s   \bowtie t$ &amp; \color{blue}{$\checkmark$}\nolinebreak\kern-0.7em\xspace\color{OliveGreen}{$\checkmark$} &amp; \color{OliveGreen}{$\checkmark$} &amp; \color{OliveGreen}{$\checkmark$} &amp; \color{OliveGreen}{$\checkmark$} &#10;     &amp; \color{OliveGreen}{$\checkmark$} &amp; \color{OliveGreen}{$\checkmark$} \\&#10;  \end{tabular}%&#10;}&#10;\end{center}&#10;\end{table} &#10;\end{document}"/>
   <p:tag name="IGUANATEXSIZE" val="28"/>
-  <p:tag name="IGUANATEXCURSOR" val="175"/>
+  <p:tag name="IGUANATEXCURSOR" val="3668"/>
   <p:tag name="TRANSPARENCY" val="True"/>
   <p:tag name="FILENAME" val=""/>
   <p:tag name="LATEXENGINEID" val="0"/>
@@ -5519,49 +6409,11 @@
 <file path=ppt/tags/tag7.xml><?xml version="1.0" encoding="utf-8"?>
 <p:tagLst xmlns:a="http://schemas.openxmlformats.org/drawingml/2006/main" xmlns:r="http://schemas.openxmlformats.org/officeDocument/2006/relationships" xmlns:p="http://schemas.openxmlformats.org/presentationml/2006/main">
   <p:tag name="OUTPUTDPI" val="1200"/>
-  <p:tag name="ORIGINALHEIGHT" val="2235.47"/>
-  <p:tag name="ORIGINALWIDTH" val="2857.893"/>
-  <p:tag name="LATEXADDIN" val="\documentclass{article}&#10;\usepackage{amsmath}&#10;\usepackage{xcolor}&#10;\usepackage{xspace}&#10;\usepackage{pifont}&#10;\usepackage{amssymb}&#10;\pagestyle{empty}&#10;\begin{document}&#10;\begin{table}&#10;\begin{center}&#10;{%&#10;  \renewcommand{\arraystretch}{1.2}%&#10;  \begin{tabular}{r@{\hspace{2.0em}}c@{\hspace{1.0em}}c@{\hspace{1.5em}}c@{\hspace{1.0em}}c@{\hspace{1.5em}}c@{\hspace{1.0em}}c}&#10;    \hline&#10;    \\[-2.5ex]&#10;    $\ell[x]$ &amp; $=$ &amp; $\not =$ &amp; $&lt;_u$ &amp; $&gt;_u$ &amp; $&lt;=_u$ &amp; $&gt;=_u$&#10;    \\[.5ex]&#10;    \hline&#10;    \\[-2.5ex]&#10;    $- x \bowtie t$ &amp; \color{blue}{$\checkmark$}\nolinebreak\kern-0.7em\xspace\color{green}{$\checkmark$} &amp; \color{green}{$\checkmark$} &amp; \color{green}{$\checkmark$} &amp; \color{green}{$\checkmark$}  &#10;     &amp; \color{green}{$\checkmark$} &amp; \color{green}{$\checkmark$} \\&#10;    $\sim x  \bowtie t$ &amp; \color{blue}{$\checkmark$}\nolinebreak\kern-0.7em\xspace\color{green}{$\checkmark$} &amp; \color{green}{$\checkmark$} &amp; \color{green}{$\checkmark$} &amp; \color{green}{$\checkmark$}  &#10;     &amp; \color{green}{$\checkmark$} &amp; \color{green}{$\checkmark$}  \\&#10;    $x\ \&amp;\ s \bowtie t$ &amp; \color{blue}{$\checkmark$} &amp; \color{green}{$\checkmark$} &amp; \color{green}{$\checkmark$} &amp; \color{green}{$\checkmark$}  &#10;     &amp; \color{green}{$\checkmark$} &amp; \color{green}{$\checkmark$} \\&#10;    $x \mid s   \bowtie t$ &amp; \color{blue}{$\checkmark$} &amp; \color{green}{$\checkmark$} &amp; \color{green}{$\checkmark$} &amp; \color{green}{$\checkmark$} &#10;     &amp; \color{green}{$\checkmark$} &amp; \color{green}{$\checkmark$} \\&#10;    $x \mathop{&lt;\kern-.3em&lt;} s  \bowtie t$ &amp; \color{blue}{$\checkmark$} &amp; \color{blue}{$\checkmark$} &amp; \color{green}{$\checkmark$} &amp; \color{blue}{$\checkmark$}   &#10;     &amp; \color{green}{$\checkmark$} &amp; \color{blue}{$\checkmark$} \\&#10;    $s \mathop{&lt;\kern-.3em&lt;} x  \bowtie t$ &amp; \color{blue}{$\checkmark$}\nolinebreak\kern-0.7em\xspace\color{green}{$\checkmark$} &amp; \color{green}{$\checkmark$} &amp; \color{green}{$\checkmark$} &amp; \color{green}{$\checkmark$} &#10;     &amp; \color{green}{$\checkmark$} &amp; \color{green}{$\checkmark$} \\&#10;    $x \mathop{&gt;\kern-.3em&gt;} s \bowtie t$ &amp; \color{blue}{$\checkmark$}\nolinebreak\kern-0.7em\xspace\color{green}{$\checkmark$} &amp; \color{green}{$\checkmark$} &amp; \color{green}{$\checkmark$} &amp; \color{red}\ding{53} &#10;     &amp; \color{green}{$\checkmark$} &amp; \color{green}{$\checkmark$} \\&#10;    $s \mathop{&gt;\kern-.3em&gt;} x \bowtie t$ &amp; \color{blue}{$\checkmark$}\nolinebreak\kern-0.7em\xspace\color{green}{$\checkmark$} &amp; \color{green}{$\checkmark$} &amp; \color{green}{$\checkmark$} &amp; \color{green}{$\checkmark$} &#10;     &amp; \color{green}{$\checkmark$} &amp; \color{green}{$\checkmark$} \\&#10;    $x \mathop{&gt;\kern-.3em&gt;_a} s \bowtie t$ &amp; \color{blue}{$\checkmark$} &amp; \color{green}{$\checkmark$} &amp; \color{green}{$\checkmark$} &amp; \color{green}{$\checkmark$} &#10;     &amp; \color{green}{$\checkmark$} &amp; \color{green}{$\checkmark$} \\&#10;    $s \mathop{&gt;\kern-.3em&gt;_a} x \bowtie t$ &amp; \color{blue}{$\checkmark$}\nolinebreak\kern-0.7em\xspace\color{green}{$\checkmark$} &amp; \color{green}{$\checkmark$} &amp; \color{blue}{$\checkmark$} &amp; \color{blue}{$\checkmark$}  &#10;     &amp; \color{blue}{$\checkmark$} &amp; \color{blue}{$\checkmark$} \\&#10;    $x + s   \bowtie t$ &amp; \color{blue}{$\checkmark$}\nolinebreak\kern-0.7em\xspace\color{green}{$\checkmark$} &amp; \color{green}{$\checkmark$} &amp; \color{green}{$\checkmark$} &amp; \color{green}{$\checkmark$} &#10;     &amp; \color{green}{$\checkmark$} &amp; \color{green}{$\checkmark$} \\&#10;  \end{tabular}%&#10;}&#10;\end{center}&#10;\end{table} &#10;\end{document}"/>
-  <p:tag name="IGUANATEXSIZE" val="28"/>
-  <p:tag name="IGUANATEXCURSOR" val="3386"/>
-  <p:tag name="TRANSPARENCY" val="True"/>
-  <p:tag name="FILENAME" val=""/>
-  <p:tag name="LATEXENGINEID" val="0"/>
-  <p:tag name="TEMPFOLDER" val="c:\temp\"/>
-  <p:tag name="LATEXFORMHEIGHT" val="312"/>
-  <p:tag name="LATEXFORMWIDTH" val="384"/>
-  <p:tag name="LATEXFORMWRAP" val="True"/>
-  <p:tag name="BITMAPVECTOR" val="0"/>
-</p:tagLst>
-</file>
-
-<file path=ppt/tags/tag8.xml><?xml version="1.0" encoding="utf-8"?>
-<p:tagLst xmlns:a="http://schemas.openxmlformats.org/drawingml/2006/main" xmlns:r="http://schemas.openxmlformats.org/officeDocument/2006/relationships" xmlns:p="http://schemas.openxmlformats.org/presentationml/2006/main">
-  <p:tag name="OUTPUTDPI" val="1200"/>
   <p:tag name="ORIGINALHEIGHT" val="560.9299"/>
   <p:tag name="ORIGINALWIDTH" val="2818.898"/>
-  <p:tag name="LATEXADDIN" val="\documentclass{article}&#10;\usepackage[a4paper]{geometry}&#10;\geometry{textwidth=\paperwidth, textheight=\paperheight, noheadfoot, nomarginpar}&#10;\setlength{\topskip}{0mm}&#10;\setlength{\parindent}{0mm}&#10;\usepackage{amsmath}&#10;\usepackage{xcolor}&#10;\usepackage{xspace}&#10;\usepackage{pifont}&#10;\usepackage{amssymb}&#10;\pagestyle{empty}&#10;\begin{document}&#10;{\color{blue}{$\checkmark$}} - Verified by us in Coq for arbitrary bit-width. \\&#10;{\color{green}{$\checkmark$}} - Verified by Niemetz et al. using SMT encoding. \\&#10;{\color{blue}{$\checkmark$}\nolinebreak\kern-0.7em\xspace\color{green}{$\checkmark$}} - Verified by both us and Niemetz et al. \\&#10;{\color{red}\ding{53}} - Verified by neither us nor Niemetz et al.&#10;\end{document}"/>
+  <p:tag name="LATEXADDIN" val="\documentclass{article}&#10;\usepackage[a4paper]{geometry}&#10;\geometry{textwidth=\paperwidth, textheight=\paperheight, noheadfoot, nomarginpar}&#10;\setlength{\topskip}{0mm}&#10;\setlength{\parindent}{0mm}&#10;\usepackage{amsmath}&#10;\usepackage[dvipsnames]{xcolor}&#10;\usepackage{xspace}&#10;\usepackage{pifont}&#10;\usepackage{amssymb}&#10;\pagestyle{empty}&#10;\begin{document}&#10;{\color{blue}{$\checkmark$}} - Verified by us in Coq for arbitrary bit-width. \\&#10;{\color{OliveGreen}{$\checkmark$}} - Verified by Niemetz et al. using SMT encoding. \\&#10;{\color{blue}{$\checkmark$}\nolinebreak\kern-0.7em\xspace\color{OliveGreen}{$\checkmark$}} - Verified by both us and Preiner et al. \\&#10;{\color{red}\ding{53}} - Verified by neither us nor Preiner et al.&#10;\end{document}"/>
   <p:tag name="IGUANATEXSIZE" val="20"/>
-  <p:tag name="IGUANATEXCURSOR" val="621"/>
-  <p:tag name="TRANSPARENCY" val="True"/>
-  <p:tag name="FILENAME" val=""/>
-  <p:tag name="LATEXENGINEID" val="0"/>
-  <p:tag name="TEMPFOLDER" val="c:\temp\"/>
-  <p:tag name="LATEXFORMHEIGHT" val="312"/>
-  <p:tag name="LATEXFORMWIDTH" val="384"/>
-  <p:tag name="LATEXFORMWRAP" val="True"/>
-  <p:tag name="BITMAPVECTOR" val="0"/>
-</p:tagLst>
-</file>
-
-<file path=ppt/tags/tag9.xml><?xml version="1.0" encoding="utf-8"?>
-<p:tagLst xmlns:a="http://schemas.openxmlformats.org/drawingml/2006/main" xmlns:r="http://schemas.openxmlformats.org/officeDocument/2006/relationships" xmlns:p="http://schemas.openxmlformats.org/presentationml/2006/main">
-  <p:tag name="OUTPUTDPI" val="1200"/>
-  <p:tag name="ORIGINALHEIGHT" val="1368.579"/>
-  <p:tag name="ORIGINALWIDTH" val="3709.036"/>
-  <p:tag name="LATEXADDIN" val="\documentclass{article}&#10;\usepackage{amsmath}&#10;\pagestyle{empty}&#10;\begin{document}&#10;\begin{itemize}&#10;\item addition ($+$), negation ($-$), multiplication ($\cdot$).&#10;\item bit-wise conjunction ($\&amp;$), disjunction ($\mid$), negation ($\sim$).&#10;\item logical left ($\mathop{&lt;\kern-.3em&lt;}$) and right ($\mathop{&gt;\kern-.3em&gt;}$) shift.&#10;\item concatenation ($\circ$).&#10;\item equality ($=$), disequality ($\not=$).&#10;\item unsigned and signed less than and greater than ($&lt;_u$, $&gt;_u$, $&lt;_s$, $&gt;_s$).&#10;\end{itemize}&#10;\end{document}"/>
-  <p:tag name="IGUANATEXSIZE" val="20"/>
-  <p:tag name="IGUANATEXCURSOR" val="482"/>
+  <p:tag name="IGUANATEXCURSOR" val="436"/>
   <p:tag name="TRANSPARENCY" val="True"/>
   <p:tag name="FILENAME" val=""/>
   <p:tag name="LATEXENGINEID" val="0"/>
@@ -5832,4 +6684,299 @@
     </a:ext>
   </a:extLst>
 </a:theme>
+</file>
+
+<file path=ppt/theme/theme2.xml><?xml version="1.0" encoding="utf-8"?>
+<a:theme xmlns:a="http://schemas.openxmlformats.org/drawingml/2006/main" name="Office Theme">
+  <a:themeElements>
+    <a:clrScheme name="Office">
+      <a:dk1>
+        <a:sysClr val="windowText" lastClr="000000"/>
+      </a:dk1>
+      <a:lt1>
+        <a:sysClr val="window" lastClr="FFFFFF"/>
+      </a:lt1>
+      <a:dk2>
+        <a:srgbClr val="44546A"/>
+      </a:dk2>
+      <a:lt2>
+        <a:srgbClr val="E7E6E6"/>
+      </a:lt2>
+      <a:accent1>
+        <a:srgbClr val="4472C4"/>
+      </a:accent1>
+      <a:accent2>
+        <a:srgbClr val="ED7D31"/>
+      </a:accent2>
+      <a:accent3>
+        <a:srgbClr val="A5A5A5"/>
+      </a:accent3>
+      <a:accent4>
+        <a:srgbClr val="FFC000"/>
+      </a:accent4>
+      <a:accent5>
+        <a:srgbClr val="5B9BD5"/>
+      </a:accent5>
+      <a:accent6>
+        <a:srgbClr val="70AD47"/>
+      </a:accent6>
+      <a:hlink>
+        <a:srgbClr val="0563C1"/>
+      </a:hlink>
+      <a:folHlink>
+        <a:srgbClr val="954F72"/>
+      </a:folHlink>
+    </a:clrScheme>
+    <a:fontScheme name="Office">
+      <a:majorFont>
+        <a:latin typeface="Calibri Light" panose="020F0302020204030204"/>
+        <a:ea typeface=""/>
+        <a:cs typeface=""/>
+        <a:font script="Jpan" typeface="游ゴシック Light"/>
+        <a:font script="Hang" typeface="맑은 고딕"/>
+        <a:font script="Hans" typeface="等线 Light"/>
+        <a:font script="Hant" typeface="新細明體"/>
+        <a:font script="Arab" typeface="Times New Roman"/>
+        <a:font script="Hebr" typeface="Times New Roman"/>
+        <a:font script="Thai" typeface="Angsana New"/>
+        <a:font script="Ethi" typeface="Nyala"/>
+        <a:font script="Beng" typeface="Vrinda"/>
+        <a:font script="Gujr" typeface="Shruti"/>
+        <a:font script="Khmr" typeface="MoolBoran"/>
+        <a:font script="Knda" typeface="Tunga"/>
+        <a:font script="Guru" typeface="Raavi"/>
+        <a:font script="Cans" typeface="Euphemia"/>
+        <a:font script="Cher" typeface="Plantagenet Cherokee"/>
+        <a:font script="Yiii" typeface="Microsoft Yi Baiti"/>
+        <a:font script="Tibt" typeface="Microsoft Himalaya"/>
+        <a:font script="Thaa" typeface="MV Boli"/>
+        <a:font script="Deva" typeface="Mangal"/>
+        <a:font script="Telu" typeface="Gautami"/>
+        <a:font script="Taml" typeface="Latha"/>
+        <a:font script="Syrc" typeface="Estrangelo Edessa"/>
+        <a:font script="Orya" typeface="Kalinga"/>
+        <a:font script="Mlym" typeface="Kartika"/>
+        <a:font script="Laoo" typeface="DokChampa"/>
+        <a:font script="Sinh" typeface="Iskoola Pota"/>
+        <a:font script="Mong" typeface="Mongolian Baiti"/>
+        <a:font script="Viet" typeface="Times New Roman"/>
+        <a:font script="Uigh" typeface="Microsoft Uighur"/>
+        <a:font script="Geor" typeface="Sylfaen"/>
+        <a:font script="Armn" typeface="Arial"/>
+        <a:font script="Bugi" typeface="Leelawadee UI"/>
+        <a:font script="Bopo" typeface="Microsoft JhengHei"/>
+        <a:font script="Java" typeface="Javanese Text"/>
+        <a:font script="Lisu" typeface="Segoe UI"/>
+        <a:font script="Mymr" typeface="Myanmar Text"/>
+        <a:font script="Nkoo" typeface="Ebrima"/>
+        <a:font script="Olck" typeface="Nirmala UI"/>
+        <a:font script="Osma" typeface="Ebrima"/>
+        <a:font script="Phag" typeface="Phagspa"/>
+        <a:font script="Syrn" typeface="Estrangelo Edessa"/>
+        <a:font script="Syrj" typeface="Estrangelo Edessa"/>
+        <a:font script="Syre" typeface="Estrangelo Edessa"/>
+        <a:font script="Sora" typeface="Nirmala UI"/>
+        <a:font script="Tale" typeface="Microsoft Tai Le"/>
+        <a:font script="Talu" typeface="Microsoft New Tai Lue"/>
+        <a:font script="Tfng" typeface="Ebrima"/>
+      </a:majorFont>
+      <a:minorFont>
+        <a:latin typeface="Calibri" panose="020F0502020204030204"/>
+        <a:ea typeface=""/>
+        <a:cs typeface=""/>
+        <a:font script="Jpan" typeface="游ゴシック"/>
+        <a:font script="Hang" typeface="맑은 고딕"/>
+        <a:font script="Hans" typeface="等线"/>
+        <a:font script="Hant" typeface="新細明體"/>
+        <a:font script="Arab" typeface="Arial"/>
+        <a:font script="Hebr" typeface="Arial"/>
+        <a:font script="Thai" typeface="Cordia New"/>
+        <a:font script="Ethi" typeface="Nyala"/>
+        <a:font script="Beng" typeface="Vrinda"/>
+        <a:font script="Gujr" typeface="Shruti"/>
+        <a:font script="Khmr" typeface="DaunPenh"/>
+        <a:font script="Knda" typeface="Tunga"/>
+        <a:font script="Guru" typeface="Raavi"/>
+        <a:font script="Cans" typeface="Euphemia"/>
+        <a:font script="Cher" typeface="Plantagenet Cherokee"/>
+        <a:font script="Yiii" typeface="Microsoft Yi Baiti"/>
+        <a:font script="Tibt" typeface="Microsoft Himalaya"/>
+        <a:font script="Thaa" typeface="MV Boli"/>
+        <a:font script="Deva" typeface="Mangal"/>
+        <a:font script="Telu" typeface="Gautami"/>
+        <a:font script="Taml" typeface="Latha"/>
+        <a:font script="Syrc" typeface="Estrangelo Edessa"/>
+        <a:font script="Orya" typeface="Kalinga"/>
+        <a:font script="Mlym" typeface="Kartika"/>
+        <a:font script="Laoo" typeface="DokChampa"/>
+        <a:font script="Sinh" typeface="Iskoola Pota"/>
+        <a:font script="Mong" typeface="Mongolian Baiti"/>
+        <a:font script="Viet" typeface="Arial"/>
+        <a:font script="Uigh" typeface="Microsoft Uighur"/>
+        <a:font script="Geor" typeface="Sylfaen"/>
+        <a:font script="Armn" typeface="Arial"/>
+        <a:font script="Bugi" typeface="Leelawadee UI"/>
+        <a:font script="Bopo" typeface="Microsoft JhengHei"/>
+        <a:font script="Java" typeface="Javanese Text"/>
+        <a:font script="Lisu" typeface="Segoe UI"/>
+        <a:font script="Mymr" typeface="Myanmar Text"/>
+        <a:font script="Nkoo" typeface="Ebrima"/>
+        <a:font script="Olck" typeface="Nirmala UI"/>
+        <a:font script="Osma" typeface="Ebrima"/>
+        <a:font script="Phag" typeface="Phagspa"/>
+        <a:font script="Syrn" typeface="Estrangelo Edessa"/>
+        <a:font script="Syrj" typeface="Estrangelo Edessa"/>
+        <a:font script="Syre" typeface="Estrangelo Edessa"/>
+        <a:font script="Sora" typeface="Nirmala UI"/>
+        <a:font script="Tale" typeface="Microsoft Tai Le"/>
+        <a:font script="Talu" typeface="Microsoft New Tai Lue"/>
+        <a:font script="Tfng" typeface="Ebrima"/>
+      </a:minorFont>
+    </a:fontScheme>
+    <a:fmtScheme name="Office">
+      <a:fillStyleLst>
+        <a:solidFill>
+          <a:schemeClr val="phClr"/>
+        </a:solidFill>
+        <a:gradFill rotWithShape="1">
+          <a:gsLst>
+            <a:gs pos="0">
+              <a:schemeClr val="phClr">
+                <a:lumMod val="110000"/>
+                <a:satMod val="105000"/>
+                <a:tint val="67000"/>
+              </a:schemeClr>
+            </a:gs>
+            <a:gs pos="50000">
+              <a:schemeClr val="phClr">
+                <a:lumMod val="105000"/>
+                <a:satMod val="103000"/>
+                <a:tint val="73000"/>
+              </a:schemeClr>
+            </a:gs>
+            <a:gs pos="100000">
+              <a:schemeClr val="phClr">
+                <a:lumMod val="105000"/>
+                <a:satMod val="109000"/>
+                <a:tint val="81000"/>
+              </a:schemeClr>
+            </a:gs>
+          </a:gsLst>
+          <a:lin ang="5400000" scaled="0"/>
+        </a:gradFill>
+        <a:gradFill rotWithShape="1">
+          <a:gsLst>
+            <a:gs pos="0">
+              <a:schemeClr val="phClr">
+                <a:satMod val="103000"/>
+                <a:lumMod val="102000"/>
+                <a:tint val="94000"/>
+              </a:schemeClr>
+            </a:gs>
+            <a:gs pos="50000">
+              <a:schemeClr val="phClr">
+                <a:satMod val="110000"/>
+                <a:lumMod val="100000"/>
+                <a:shade val="100000"/>
+              </a:schemeClr>
+            </a:gs>
+            <a:gs pos="100000">
+              <a:schemeClr val="phClr">
+                <a:lumMod val="99000"/>
+                <a:satMod val="120000"/>
+                <a:shade val="78000"/>
+              </a:schemeClr>
+            </a:gs>
+          </a:gsLst>
+          <a:lin ang="5400000" scaled="0"/>
+        </a:gradFill>
+      </a:fillStyleLst>
+      <a:lnStyleLst>
+        <a:ln w="6350" cap="flat" cmpd="sng" algn="ctr">
+          <a:solidFill>
+            <a:schemeClr val="phClr"/>
+          </a:solidFill>
+          <a:prstDash val="solid"/>
+          <a:miter lim="800000"/>
+        </a:ln>
+        <a:ln w="12700" cap="flat" cmpd="sng" algn="ctr">
+          <a:solidFill>
+            <a:schemeClr val="phClr"/>
+          </a:solidFill>
+          <a:prstDash val="solid"/>
+          <a:miter lim="800000"/>
+        </a:ln>
+        <a:ln w="19050" cap="flat" cmpd="sng" algn="ctr">
+          <a:solidFill>
+            <a:schemeClr val="phClr"/>
+          </a:solidFill>
+          <a:prstDash val="solid"/>
+          <a:miter lim="800000"/>
+        </a:ln>
+      </a:lnStyleLst>
+      <a:effectStyleLst>
+        <a:effectStyle>
+          <a:effectLst/>
+        </a:effectStyle>
+        <a:effectStyle>
+          <a:effectLst/>
+        </a:effectStyle>
+        <a:effectStyle>
+          <a:effectLst>
+            <a:outerShdw blurRad="57150" dist="19050" dir="5400000" algn="ctr" rotWithShape="0">
+              <a:srgbClr val="000000">
+                <a:alpha val="63000"/>
+              </a:srgbClr>
+            </a:outerShdw>
+          </a:effectLst>
+        </a:effectStyle>
+      </a:effectStyleLst>
+      <a:bgFillStyleLst>
+        <a:solidFill>
+          <a:schemeClr val="phClr"/>
+        </a:solidFill>
+        <a:solidFill>
+          <a:schemeClr val="phClr">
+            <a:tint val="95000"/>
+            <a:satMod val="170000"/>
+          </a:schemeClr>
+        </a:solidFill>
+        <a:gradFill rotWithShape="1">
+          <a:gsLst>
+            <a:gs pos="0">
+              <a:schemeClr val="phClr">
+                <a:tint val="93000"/>
+                <a:satMod val="150000"/>
+                <a:shade val="98000"/>
+                <a:lumMod val="102000"/>
+              </a:schemeClr>
+            </a:gs>
+            <a:gs pos="50000">
+              <a:schemeClr val="phClr">
+                <a:tint val="98000"/>
+                <a:satMod val="130000"/>
+                <a:shade val="90000"/>
+                <a:lumMod val="103000"/>
+              </a:schemeClr>
+            </a:gs>
+            <a:gs pos="100000">
+              <a:schemeClr val="phClr">
+                <a:shade val="63000"/>
+                <a:satMod val="120000"/>
+              </a:schemeClr>
+            </a:gs>
+          </a:gsLst>
+          <a:lin ang="5400000" scaled="0"/>
+        </a:gradFill>
+      </a:bgFillStyleLst>
+    </a:fmtScheme>
+  </a:themeElements>
+  <a:objectDefaults/>
+  <a:extraClrSchemeLst/>
+  <a:extLst>
+    <a:ext uri="{05A4C25C-085E-4340-85A3-A5531E510DB2}">
+      <thm15:themeFamily xmlns:thm15="http://schemas.microsoft.com/office/thememl/2012/main" name="Office Theme" id="{62F939B6-93AF-4DB8-9C6B-D6C7DFDC589F}" vid="{4A3C46E8-61CC-4603-A589-7422A47A8E4A}"/>
+    </a:ext>
+  </a:extLst>
+</a:theme>
 </file>
</xml_diff>

<commit_message>
Feedback from meeting Cesare
</commit_message>
<xml_diff>
--- a/Presentation.pptx
+++ b/Presentation.pptx
@@ -214,7 +214,7 @@
           <a:p>
             <a:fld id="{4F5BAD48-3E9D-44CA-B663-82E68EEB1E08}" type="datetimeFigureOut">
               <a:rPr lang="en-US" smtClean="0"/>
-              <a:t>8/5/2019</a:t>
+              <a:t>8/9/2019</a:t>
             </a:fld>
             <a:endParaRPr lang="en-US"/>
           </a:p>
@@ -525,18 +525,7 @@
           <a:bodyPr/>
           <a:lstStyle/>
           <a:p>
-            <a:r>
-              <a:rPr lang="en-US" dirty="0"/>
-              <a:t>For general correctness, the quantifier instantiation technique introduced by [</a:t>
-            </a:r>
-            <a:r>
-              <a:rPr lang="en-US" dirty="0" err="1"/>
-              <a:t>Niemetz</a:t>
-            </a:r>
-            <a:r>
-              <a:rPr lang="en-US" dirty="0"/>
-              <a:t> et al.] requires the equivalences to be true.</a:t>
-            </a:r>
+            <a:endParaRPr lang="en-US" dirty="0"/>
           </a:p>
         </p:txBody>
       </p:sp>
@@ -557,7 +546,7 @@
           <a:p>
             <a:fld id="{354FD78B-5075-4CBB-A78B-67D8560C3DC5}" type="slidenum">
               <a:rPr lang="en-US" smtClean="0"/>
-              <a:t>6</a:t>
+              <a:t>2</a:t>
             </a:fld>
             <a:endParaRPr lang="en-US"/>
           </a:p>
@@ -566,7 +555,7 @@
     </p:spTree>
     <p:extLst>
       <p:ext uri="{BB962C8B-B14F-4D97-AF65-F5344CB8AC3E}">
-        <p14:creationId xmlns:p14="http://schemas.microsoft.com/office/powerpoint/2010/main" val="3304338321"/>
+        <p14:creationId xmlns:p14="http://schemas.microsoft.com/office/powerpoint/2010/main" val="3968100743"/>
       </p:ext>
     </p:extLst>
   </p:cSld>
@@ -622,7 +611,313 @@
           <a:p>
             <a:r>
               <a:rPr lang="en-US" dirty="0"/>
-              <a:t>Read bit-vectors MSB-&gt;LSB</a:t>
+              <a:t>For general correctness, the quantifier instantiation technique introduced by [</a:t>
+            </a:r>
+            <a:r>
+              <a:rPr lang="en-US" dirty="0" err="1"/>
+              <a:t>Niemetz</a:t>
+            </a:r>
+            <a:r>
+              <a:rPr lang="en-US" dirty="0"/>
+              <a:t> et al.] requires the equivalences to be true.</a:t>
+            </a:r>
+          </a:p>
+        </p:txBody>
+      </p:sp>
+      <p:sp>
+        <p:nvSpPr>
+          <p:cNvPr id="4" name="Slide Number Placeholder 3"/>
+          <p:cNvSpPr>
+            <a:spLocks noGrp="1"/>
+          </p:cNvSpPr>
+          <p:nvPr>
+            <p:ph type="sldNum" sz="quarter" idx="5"/>
+          </p:nvPr>
+        </p:nvSpPr>
+        <p:spPr/>
+        <p:txBody>
+          <a:bodyPr/>
+          <a:lstStyle/>
+          <a:p>
+            <a:fld id="{354FD78B-5075-4CBB-A78B-67D8560C3DC5}" type="slidenum">
+              <a:rPr lang="en-US" smtClean="0"/>
+              <a:t>6</a:t>
+            </a:fld>
+            <a:endParaRPr lang="en-US"/>
+          </a:p>
+        </p:txBody>
+      </p:sp>
+    </p:spTree>
+    <p:extLst>
+      <p:ext uri="{BB962C8B-B14F-4D97-AF65-F5344CB8AC3E}">
+        <p14:creationId xmlns:p14="http://schemas.microsoft.com/office/powerpoint/2010/main" val="3304338321"/>
+      </p:ext>
+    </p:extLst>
+  </p:cSld>
+  <p:clrMapOvr>
+    <a:masterClrMapping/>
+  </p:clrMapOvr>
+</p:notes>
+</file>
+
+<file path=ppt/notesSlides/notesSlide3.xml><?xml version="1.0" encoding="utf-8"?>
+<p:notes xmlns:a="http://schemas.openxmlformats.org/drawingml/2006/main" xmlns:r="http://schemas.openxmlformats.org/officeDocument/2006/relationships" xmlns:p="http://schemas.openxmlformats.org/presentationml/2006/main">
+  <p:cSld>
+    <p:spTree>
+      <p:nvGrpSpPr>
+        <p:cNvPr id="1" name=""/>
+        <p:cNvGrpSpPr/>
+        <p:nvPr/>
+      </p:nvGrpSpPr>
+      <p:grpSpPr>
+        <a:xfrm>
+          <a:off x="0" y="0"/>
+          <a:ext cx="0" cy="0"/>
+          <a:chOff x="0" y="0"/>
+          <a:chExt cx="0" cy="0"/>
+        </a:xfrm>
+      </p:grpSpPr>
+      <p:sp>
+        <p:nvSpPr>
+          <p:cNvPr id="2" name="Slide Image Placeholder 1"/>
+          <p:cNvSpPr>
+            <a:spLocks noGrp="1" noRot="1" noChangeAspect="1"/>
+          </p:cNvSpPr>
+          <p:nvPr>
+            <p:ph type="sldImg"/>
+          </p:nvPr>
+        </p:nvSpPr>
+        <p:spPr/>
+      </p:sp>
+      <p:sp>
+        <p:nvSpPr>
+          <p:cNvPr id="3" name="Notes Placeholder 2"/>
+          <p:cNvSpPr>
+            <a:spLocks noGrp="1"/>
+          </p:cNvSpPr>
+          <p:nvPr>
+            <p:ph type="body" idx="1"/>
+          </p:nvPr>
+        </p:nvSpPr>
+        <p:spPr/>
+        <p:txBody>
+          <a:bodyPr/>
+          <a:lstStyle/>
+          <a:p>
+            <a:endParaRPr lang="en-US" dirty="0"/>
+          </a:p>
+        </p:txBody>
+      </p:sp>
+      <p:sp>
+        <p:nvSpPr>
+          <p:cNvPr id="4" name="Slide Number Placeholder 3"/>
+          <p:cNvSpPr>
+            <a:spLocks noGrp="1"/>
+          </p:cNvSpPr>
+          <p:nvPr>
+            <p:ph type="sldNum" sz="quarter" idx="5"/>
+          </p:nvPr>
+        </p:nvSpPr>
+        <p:spPr/>
+        <p:txBody>
+          <a:bodyPr/>
+          <a:lstStyle/>
+          <a:p>
+            <a:fld id="{354FD78B-5075-4CBB-A78B-67D8560C3DC5}" type="slidenum">
+              <a:rPr lang="en-US" smtClean="0"/>
+              <a:t>11</a:t>
+            </a:fld>
+            <a:endParaRPr lang="en-US"/>
+          </a:p>
+        </p:txBody>
+      </p:sp>
+    </p:spTree>
+    <p:extLst>
+      <p:ext uri="{BB962C8B-B14F-4D97-AF65-F5344CB8AC3E}">
+        <p14:creationId xmlns:p14="http://schemas.microsoft.com/office/powerpoint/2010/main" val="4112896303"/>
+      </p:ext>
+    </p:extLst>
+  </p:cSld>
+  <p:clrMapOvr>
+    <a:masterClrMapping/>
+  </p:clrMapOvr>
+</p:notes>
+</file>
+
+<file path=ppt/notesSlides/notesSlide4.xml><?xml version="1.0" encoding="utf-8"?>
+<p:notes xmlns:a="http://schemas.openxmlformats.org/drawingml/2006/main" xmlns:r="http://schemas.openxmlformats.org/officeDocument/2006/relationships" xmlns:p="http://schemas.openxmlformats.org/presentationml/2006/main">
+  <p:cSld>
+    <p:spTree>
+      <p:nvGrpSpPr>
+        <p:cNvPr id="1" name=""/>
+        <p:cNvGrpSpPr/>
+        <p:nvPr/>
+      </p:nvGrpSpPr>
+      <p:grpSpPr>
+        <a:xfrm>
+          <a:off x="0" y="0"/>
+          <a:ext cx="0" cy="0"/>
+          <a:chOff x="0" y="0"/>
+          <a:chExt cx="0" cy="0"/>
+        </a:xfrm>
+      </p:grpSpPr>
+      <p:sp>
+        <p:nvSpPr>
+          <p:cNvPr id="2" name="Slide Image Placeholder 1"/>
+          <p:cNvSpPr>
+            <a:spLocks noGrp="1" noRot="1" noChangeAspect="1"/>
+          </p:cNvSpPr>
+          <p:nvPr>
+            <p:ph type="sldImg"/>
+          </p:nvPr>
+        </p:nvSpPr>
+        <p:spPr/>
+      </p:sp>
+      <p:sp>
+        <p:nvSpPr>
+          <p:cNvPr id="3" name="Notes Placeholder 2"/>
+          <p:cNvSpPr>
+            <a:spLocks noGrp="1"/>
+          </p:cNvSpPr>
+          <p:nvPr>
+            <p:ph type="body" idx="1"/>
+          </p:nvPr>
+        </p:nvSpPr>
+        <p:spPr/>
+        <p:txBody>
+          <a:bodyPr/>
+          <a:lstStyle/>
+          <a:p>
+            <a:r>
+              <a:rPr lang="en-US" dirty="0"/>
+              <a:t>Organize into columns starting with symbols</a:t>
+            </a:r>
+          </a:p>
+        </p:txBody>
+      </p:sp>
+      <p:sp>
+        <p:nvSpPr>
+          <p:cNvPr id="4" name="Slide Number Placeholder 3"/>
+          <p:cNvSpPr>
+            <a:spLocks noGrp="1"/>
+          </p:cNvSpPr>
+          <p:nvPr>
+            <p:ph type="sldNum" sz="quarter" idx="5"/>
+          </p:nvPr>
+        </p:nvSpPr>
+        <p:spPr/>
+        <p:txBody>
+          <a:bodyPr/>
+          <a:lstStyle/>
+          <a:p>
+            <a:fld id="{354FD78B-5075-4CBB-A78B-67D8560C3DC5}" type="slidenum">
+              <a:rPr lang="en-US" smtClean="0"/>
+              <a:t>12</a:t>
+            </a:fld>
+            <a:endParaRPr lang="en-US"/>
+          </a:p>
+        </p:txBody>
+      </p:sp>
+    </p:spTree>
+    <p:extLst>
+      <p:ext uri="{BB962C8B-B14F-4D97-AF65-F5344CB8AC3E}">
+        <p14:creationId xmlns:p14="http://schemas.microsoft.com/office/powerpoint/2010/main" val="1636785527"/>
+      </p:ext>
+    </p:extLst>
+  </p:cSld>
+  <p:clrMapOvr>
+    <a:masterClrMapping/>
+  </p:clrMapOvr>
+</p:notes>
+</file>
+
+<file path=ppt/notesSlides/notesSlide5.xml><?xml version="1.0" encoding="utf-8"?>
+<p:notes xmlns:a="http://schemas.openxmlformats.org/drawingml/2006/main" xmlns:r="http://schemas.openxmlformats.org/officeDocument/2006/relationships" xmlns:p="http://schemas.openxmlformats.org/presentationml/2006/main">
+  <p:cSld>
+    <p:spTree>
+      <p:nvGrpSpPr>
+        <p:cNvPr id="1" name=""/>
+        <p:cNvGrpSpPr/>
+        <p:nvPr/>
+      </p:nvGrpSpPr>
+      <p:grpSpPr>
+        <a:xfrm>
+          <a:off x="0" y="0"/>
+          <a:ext cx="0" cy="0"/>
+          <a:chOff x="0" y="0"/>
+          <a:chExt cx="0" cy="0"/>
+        </a:xfrm>
+      </p:grpSpPr>
+      <p:sp>
+        <p:nvSpPr>
+          <p:cNvPr id="2" name="Slide Image Placeholder 1"/>
+          <p:cNvSpPr>
+            <a:spLocks noGrp="1" noRot="1" noChangeAspect="1"/>
+          </p:cNvSpPr>
+          <p:nvPr>
+            <p:ph type="sldImg"/>
+          </p:nvPr>
+        </p:nvSpPr>
+        <p:spPr/>
+      </p:sp>
+      <p:sp>
+        <p:nvSpPr>
+          <p:cNvPr id="3" name="Notes Placeholder 2"/>
+          <p:cNvSpPr>
+            <a:spLocks noGrp="1"/>
+          </p:cNvSpPr>
+          <p:nvPr>
+            <p:ph type="body" idx="1"/>
+          </p:nvPr>
+        </p:nvSpPr>
+        <p:spPr/>
+        <p:txBody>
+          <a:bodyPr/>
+          <a:lstStyle/>
+          <a:p>
+            <a:r>
+              <a:rPr lang="en-US" dirty="0"/>
+              <a:t>In other words, </a:t>
+            </a:r>
+            <a:r>
+              <a:rPr lang="en-US" dirty="0" err="1"/>
+              <a:t>msb_zero</a:t>
+            </a:r>
+            <a:r>
+              <a:rPr lang="en-US" dirty="0"/>
+              <a:t> states that when </a:t>
+            </a:r>
+            <a:r>
+              <a:rPr lang="en-US" dirty="0" err="1"/>
+              <a:t>n_s</a:t>
+            </a:r>
+            <a:r>
+              <a:rPr lang="en-US" dirty="0"/>
+              <a:t> &lt; </a:t>
+            </a:r>
+            <a:r>
+              <a:rPr lang="en-US" dirty="0" err="1"/>
+              <a:t>l_s</a:t>
+            </a:r>
+            <a:r>
+              <a:rPr lang="en-US" dirty="0"/>
+              <a:t> the most significant </a:t>
+            </a:r>
+            <a:r>
+              <a:rPr lang="en-US" dirty="0" err="1"/>
+              <a:t>l_s</a:t>
+            </a:r>
+            <a:r>
+              <a:rPr lang="en-US" dirty="0"/>
+              <a:t> – </a:t>
+            </a:r>
+            <a:r>
+              <a:rPr lang="en-US" dirty="0" err="1"/>
+              <a:t>n_s</a:t>
+            </a:r>
+            <a:r>
+              <a:rPr lang="en-US" dirty="0"/>
+              <a:t> bits of s are 0.</a:t>
             </a:r>
           </a:p>
         </p:txBody>
@@ -654,6 +949,101 @@
     <p:extLst>
       <p:ext uri="{BB962C8B-B14F-4D97-AF65-F5344CB8AC3E}">
         <p14:creationId xmlns:p14="http://schemas.microsoft.com/office/powerpoint/2010/main" val="1009000"/>
+      </p:ext>
+    </p:extLst>
+  </p:cSld>
+  <p:clrMapOvr>
+    <a:masterClrMapping/>
+  </p:clrMapOvr>
+</p:notes>
+</file>
+
+<file path=ppt/notesSlides/notesSlide6.xml><?xml version="1.0" encoding="utf-8"?>
+<p:notes xmlns:a="http://schemas.openxmlformats.org/drawingml/2006/main" xmlns:r="http://schemas.openxmlformats.org/officeDocument/2006/relationships" xmlns:p="http://schemas.openxmlformats.org/presentationml/2006/main">
+  <p:cSld>
+    <p:spTree>
+      <p:nvGrpSpPr>
+        <p:cNvPr id="1" name=""/>
+        <p:cNvGrpSpPr/>
+        <p:nvPr/>
+      </p:nvGrpSpPr>
+      <p:grpSpPr>
+        <a:xfrm>
+          <a:off x="0" y="0"/>
+          <a:ext cx="0" cy="0"/>
+          <a:chOff x="0" y="0"/>
+          <a:chExt cx="0" cy="0"/>
+        </a:xfrm>
+      </p:grpSpPr>
+      <p:sp>
+        <p:nvSpPr>
+          <p:cNvPr id="2" name="Slide Image Placeholder 1"/>
+          <p:cNvSpPr>
+            <a:spLocks noGrp="1" noRot="1" noChangeAspect="1"/>
+          </p:cNvSpPr>
+          <p:nvPr>
+            <p:ph type="sldImg"/>
+          </p:nvPr>
+        </p:nvSpPr>
+        <p:spPr/>
+      </p:sp>
+      <p:sp>
+        <p:nvSpPr>
+          <p:cNvPr id="3" name="Notes Placeholder 2"/>
+          <p:cNvSpPr>
+            <a:spLocks noGrp="1"/>
+          </p:cNvSpPr>
+          <p:nvPr>
+            <p:ph type="body" idx="1"/>
+          </p:nvPr>
+        </p:nvSpPr>
+        <p:spPr/>
+        <p:txBody>
+          <a:bodyPr/>
+          <a:lstStyle/>
+          <a:p>
+            <a:r>
+              <a:rPr lang="en-US" dirty="0"/>
+              <a:t>Change to </a:t>
+            </a:r>
+            <a:r>
+              <a:rPr lang="en-US" dirty="0" err="1"/>
+              <a:t>texsf</a:t>
+            </a:r>
+            <a:r>
+              <a:rPr lang="en-US" dirty="0"/>
+              <a:t>. To align, make separate aligns and add \phantom{S}</a:t>
+            </a:r>
+          </a:p>
+        </p:txBody>
+      </p:sp>
+      <p:sp>
+        <p:nvSpPr>
+          <p:cNvPr id="4" name="Slide Number Placeholder 3"/>
+          <p:cNvSpPr>
+            <a:spLocks noGrp="1"/>
+          </p:cNvSpPr>
+          <p:nvPr>
+            <p:ph type="sldNum" sz="quarter" idx="5"/>
+          </p:nvPr>
+        </p:nvSpPr>
+        <p:spPr/>
+        <p:txBody>
+          <a:bodyPr/>
+          <a:lstStyle/>
+          <a:p>
+            <a:fld id="{354FD78B-5075-4CBB-A78B-67D8560C3DC5}" type="slidenum">
+              <a:rPr lang="en-US" smtClean="0"/>
+              <a:t>15</a:t>
+            </a:fld>
+            <a:endParaRPr lang="en-US"/>
+          </a:p>
+        </p:txBody>
+      </p:sp>
+    </p:spTree>
+    <p:extLst>
+      <p:ext uri="{BB962C8B-B14F-4D97-AF65-F5344CB8AC3E}">
+        <p14:creationId xmlns:p14="http://schemas.microsoft.com/office/powerpoint/2010/main" val="1489697911"/>
       </p:ext>
     </p:extLst>
   </p:cSld>
@@ -794,7 +1184,7 @@
           <a:p>
             <a:fld id="{C8A3F418-5BE6-4764-B372-575D89EC1E3D}" type="datetimeFigureOut">
               <a:rPr lang="en-US" smtClean="0"/>
-              <a:t>8/5/2019</a:t>
+              <a:t>8/9/2019</a:t>
             </a:fld>
             <a:endParaRPr lang="en-US"/>
           </a:p>
@@ -964,7 +1354,7 @@
           <a:p>
             <a:fld id="{C8A3F418-5BE6-4764-B372-575D89EC1E3D}" type="datetimeFigureOut">
               <a:rPr lang="en-US" smtClean="0"/>
-              <a:t>8/5/2019</a:t>
+              <a:t>8/9/2019</a:t>
             </a:fld>
             <a:endParaRPr lang="en-US"/>
           </a:p>
@@ -1144,7 +1534,7 @@
           <a:p>
             <a:fld id="{C8A3F418-5BE6-4764-B372-575D89EC1E3D}" type="datetimeFigureOut">
               <a:rPr lang="en-US" smtClean="0"/>
-              <a:t>8/5/2019</a:t>
+              <a:t>8/9/2019</a:t>
             </a:fld>
             <a:endParaRPr lang="en-US"/>
           </a:p>
@@ -1314,7 +1704,7 @@
           <a:p>
             <a:fld id="{C8A3F418-5BE6-4764-B372-575D89EC1E3D}" type="datetimeFigureOut">
               <a:rPr lang="en-US" smtClean="0"/>
-              <a:t>8/5/2019</a:t>
+              <a:t>8/9/2019</a:t>
             </a:fld>
             <a:endParaRPr lang="en-US"/>
           </a:p>
@@ -1560,7 +1950,7 @@
           <a:p>
             <a:fld id="{C8A3F418-5BE6-4764-B372-575D89EC1E3D}" type="datetimeFigureOut">
               <a:rPr lang="en-US" smtClean="0"/>
-              <a:t>8/5/2019</a:t>
+              <a:t>8/9/2019</a:t>
             </a:fld>
             <a:endParaRPr lang="en-US"/>
           </a:p>
@@ -1792,7 +2182,7 @@
           <a:p>
             <a:fld id="{C8A3F418-5BE6-4764-B372-575D89EC1E3D}" type="datetimeFigureOut">
               <a:rPr lang="en-US" smtClean="0"/>
-              <a:t>8/5/2019</a:t>
+              <a:t>8/9/2019</a:t>
             </a:fld>
             <a:endParaRPr lang="en-US"/>
           </a:p>
@@ -2159,7 +2549,7 @@
           <a:p>
             <a:fld id="{C8A3F418-5BE6-4764-B372-575D89EC1E3D}" type="datetimeFigureOut">
               <a:rPr lang="en-US" smtClean="0"/>
-              <a:t>8/5/2019</a:t>
+              <a:t>8/9/2019</a:t>
             </a:fld>
             <a:endParaRPr lang="en-US"/>
           </a:p>
@@ -2277,7 +2667,7 @@
           <a:p>
             <a:fld id="{C8A3F418-5BE6-4764-B372-575D89EC1E3D}" type="datetimeFigureOut">
               <a:rPr lang="en-US" smtClean="0"/>
-              <a:t>8/5/2019</a:t>
+              <a:t>8/9/2019</a:t>
             </a:fld>
             <a:endParaRPr lang="en-US"/>
           </a:p>
@@ -2372,7 +2762,7 @@
           <a:p>
             <a:fld id="{C8A3F418-5BE6-4764-B372-575D89EC1E3D}" type="datetimeFigureOut">
               <a:rPr lang="en-US" smtClean="0"/>
-              <a:t>8/5/2019</a:t>
+              <a:t>8/9/2019</a:t>
             </a:fld>
             <a:endParaRPr lang="en-US"/>
           </a:p>
@@ -2649,7 +3039,7 @@
           <a:p>
             <a:fld id="{C8A3F418-5BE6-4764-B372-575D89EC1E3D}" type="datetimeFigureOut">
               <a:rPr lang="en-US" smtClean="0"/>
-              <a:t>8/5/2019</a:t>
+              <a:t>8/9/2019</a:t>
             </a:fld>
             <a:endParaRPr lang="en-US"/>
           </a:p>
@@ -2906,7 +3296,7 @@
           <a:p>
             <a:fld id="{C8A3F418-5BE6-4764-B372-575D89EC1E3D}" type="datetimeFigureOut">
               <a:rPr lang="en-US" smtClean="0"/>
-              <a:t>8/5/2019</a:t>
+              <a:t>8/9/2019</a:t>
             </a:fld>
             <a:endParaRPr lang="en-US"/>
           </a:p>
@@ -3119,7 +3509,7 @@
           <a:p>
             <a:fld id="{C8A3F418-5BE6-4764-B372-575D89EC1E3D}" type="datetimeFigureOut">
               <a:rPr lang="en-US" smtClean="0"/>
-              <a:t>8/5/2019</a:t>
+              <a:t>8/9/2019</a:t>
             </a:fld>
             <a:endParaRPr lang="en-US"/>
           </a:p>
@@ -3875,7 +4265,7 @@
         </p:nvSpPr>
         <p:spPr>
           <a:xfrm>
-            <a:off x="838200" y="1561370"/>
+            <a:off x="838200" y="1352354"/>
             <a:ext cx="10515600" cy="4732796"/>
           </a:xfrm>
         </p:spPr>
@@ -3903,7 +4293,7 @@
             </a:r>
             <a:r>
               <a:rPr lang="en-US" sz="2600" dirty="0"/>
-              <a:t> et al.]</a:t>
+              <a:t> et al., 2017]</a:t>
             </a:r>
           </a:p>
           <a:p>
@@ -3993,8 +4383,8 @@
         </p:nvSpPr>
         <p:spPr>
           <a:xfrm rot="5400000">
-            <a:off x="3662173" y="5004204"/>
-            <a:ext cx="1161111" cy="381698"/>
+            <a:off x="3674885" y="5016916"/>
+            <a:ext cx="1135688" cy="381698"/>
           </a:xfrm>
           <a:prstGeom prst="rightArrow">
             <a:avLst/>
@@ -4410,14 +4800,14 @@
             <p:ph idx="1"/>
             <p:extLst>
               <p:ext uri="{D42A27DB-BD31-4B8C-83A1-F6EECF244321}">
-                <p14:modId xmlns:p14="http://schemas.microsoft.com/office/powerpoint/2010/main" val="2690988068"/>
+                <p14:modId xmlns:p14="http://schemas.microsoft.com/office/powerpoint/2010/main" val="2064071708"/>
               </p:ext>
             </p:extLst>
           </p:nvPr>
         </p:nvGraphicFramePr>
         <p:xfrm>
           <a:off x="838200" y="1825625"/>
-          <a:ext cx="10515600" cy="4507176"/>
+          <a:ext cx="10515600" cy="4426639"/>
         </p:xfrm>
         <a:graphic>
           <a:graphicData uri="http://schemas.openxmlformats.org/drawingml/2006/table">
@@ -4458,6 +4848,22 @@
                         <a:rPr lang="en-US" sz="2200" dirty="0" err="1"/>
                         <a:t>SMTLib</a:t>
                       </a:r>
+                      <a:r>
+                        <a:rPr lang="en-US" sz="2200" dirty="0"/>
+                        <a:t> </a:t>
+                      </a:r>
+                      <a:r>
+                        <a:rPr lang="en-US" sz="2400" dirty="0"/>
+                        <a:t>[</a:t>
+                      </a:r>
+                      <a:r>
+                        <a:rPr lang="en-US" sz="2400" dirty="0" err="1"/>
+                        <a:t>Niemetz</a:t>
+                      </a:r>
+                      <a:r>
+                        <a:rPr lang="en-US" sz="2400" dirty="0"/>
+                        <a:t> et al., 2018]</a:t>
+                      </a:r>
                       <a:endParaRPr lang="en-US" sz="2200" dirty="0"/>
                     </a:p>
                   </a:txBody>
@@ -4469,13 +4875,18 @@
                     <a:lstStyle/>
                     <a:p>
                       <a:r>
-                        <a:rPr lang="en-US" sz="2200" dirty="0" err="1"/>
-                        <a:t>Preiner</a:t>
+                        <a:rPr lang="en-US" sz="2400" dirty="0"/>
+                        <a:t>[</a:t>
                       </a:r>
                       <a:r>
-                        <a:rPr lang="en-US" sz="2200" dirty="0"/>
-                        <a:t> et al.</a:t>
+                        <a:rPr lang="en-US" sz="2400" dirty="0" err="1"/>
+                        <a:t>Niemetz</a:t>
                       </a:r>
+                      <a:r>
+                        <a:rPr lang="en-US" sz="2400" dirty="0"/>
+                        <a:t> et al., 2019]</a:t>
+                      </a:r>
+                      <a:endParaRPr lang="en-US" sz="2200" dirty="0"/>
                     </a:p>
                   </a:txBody>
                   <a:tcPr/>
@@ -4515,7 +4926,7 @@
                             <a:schemeClr val="tx2"/>
                           </a:solidFill>
                         </a:rPr>
-                        <a:t>Bit-vector n, with one sort for each n</a:t>
+                        <a:t>Bit-vector n, one sort for each n</a:t>
                       </a:r>
                     </a:p>
                     <a:p>
@@ -4557,7 +4968,7 @@
                             <a:schemeClr val="tx2"/>
                           </a:solidFill>
                         </a:rPr>
-                        <a:t>Automatic proofs using SMT-solvers for all equivalences over values of n = 1 to 65</a:t>
+                        <a:t>Automatic proofs using SMT-solvers for n = 1 to 65</a:t>
                       </a:r>
                     </a:p>
                   </a:txBody>
@@ -4578,7 +4989,7 @@
                             <a:schemeClr val="tx2"/>
                           </a:solidFill>
                         </a:rPr>
-                        <a:t>Bit-vector n, translated to non-linear integer arithmetic and uninterpreted functions</a:t>
+                        <a:t>Bit-vector n, translated to NIA and UF</a:t>
                       </a:r>
                     </a:p>
                     <a:p>
@@ -4592,7 +5003,7 @@
                             <a:schemeClr val="tx2"/>
                           </a:solidFill>
                         </a:rPr>
-                        <a:t>This translation allows quantification over n</a:t>
+                        <a:t>Allows quantification over n</a:t>
                       </a:r>
                     </a:p>
                     <a:p>
@@ -4606,7 +5017,7 @@
                             <a:schemeClr val="tx2"/>
                           </a:solidFill>
                         </a:rPr>
-                        <a:t>Automatic proofs using SMT-solvers for around 75% of the invertibility equivalences</a:t>
+                        <a:t>Automatic proofs using SMT-solvers for 75% of equivalences</a:t>
                       </a:r>
                     </a:p>
                   </a:txBody>
@@ -4641,7 +5052,7 @@
                             <a:schemeClr val="tx2"/>
                           </a:solidFill>
                         </a:rPr>
-                        <a:t>Raw bit-vectors are non-dependent bit-vectors with external size guarantees</a:t>
+                        <a:t>Raw bit-vectors have external size guarantees</a:t>
                       </a:r>
                     </a:p>
                     <a:p>
@@ -4777,7 +5188,7 @@
         </p:nvSpPr>
         <p:spPr>
           <a:xfrm>
-            <a:off x="838200" y="1747243"/>
+            <a:off x="838200" y="1721116"/>
             <a:ext cx="10515600" cy="4853849"/>
           </a:xfrm>
         </p:spPr>
@@ -4792,90 +5203,108 @@
             </a:pPr>
             <a:r>
               <a:rPr lang="en-US" sz="2400" dirty="0"/>
-              <a:t>The library had support for the following operators and predicates:</a:t>
-            </a:r>
-          </a:p>
-          <a:p>
-            <a:pPr lvl="1"/>
-            <a:r>
-              <a:rPr lang="en-US" dirty="0"/>
-              <a:t>addition (+), negation (-), multiplication (•)</a:t>
-            </a:r>
-          </a:p>
-          <a:p>
-            <a:pPr lvl="1"/>
-            <a:r>
-              <a:rPr lang="en-US" dirty="0"/>
-              <a:t>bit-wise conjunction (&amp;), disjunction (|), negation (~)</a:t>
-            </a:r>
-          </a:p>
-          <a:p>
-            <a:pPr lvl="1"/>
-            <a:r>
-              <a:rPr lang="en-US" dirty="0"/>
-              <a:t>logical left (&lt;&lt;) and right shift (&gt;&gt;)</a:t>
-            </a:r>
-          </a:p>
-          <a:p>
-            <a:pPr lvl="1"/>
-            <a:r>
-              <a:rPr lang="en-US" dirty="0"/>
-              <a:t>concatenation (ₒ).</a:t>
-            </a:r>
-          </a:p>
-          <a:p>
-            <a:pPr lvl="1"/>
-            <a:r>
-              <a:rPr lang="en-US" dirty="0"/>
-              <a:t>equality (=), </a:t>
-            </a:r>
-            <a:r>
-              <a:rPr lang="en-US" dirty="0" err="1"/>
+              <a:t>Basic signature:</a:t>
+            </a:r>
+            <a:br>
+              <a:rPr lang="en-US" sz="2400" dirty="0"/>
+            </a:br>
+            <a:r>
+              <a:rPr lang="en-US" sz="2400" dirty="0"/>
+              <a:t>+	(addition)			 ₒ   	(concatenation)</a:t>
+            </a:r>
+            <a:br>
+              <a:rPr lang="en-US" sz="2400" dirty="0"/>
+            </a:br>
+            <a:r>
+              <a:rPr lang="en-US" sz="2400" dirty="0"/>
+              <a:t>-  	(negation)			 =  	(equality) </a:t>
+            </a:r>
+            <a:br>
+              <a:rPr lang="en-US" sz="2400" dirty="0"/>
+            </a:br>
+            <a:r>
+              <a:rPr lang="en-US" sz="2400" dirty="0"/>
+              <a:t>• 	(multiplication)		 ≠  	(</a:t>
+            </a:r>
+            <a:r>
+              <a:rPr lang="en-US" sz="2400" dirty="0" err="1"/>
               <a:t>unequality</a:t>
             </a:r>
             <a:r>
-              <a:rPr lang="en-US" dirty="0"/>
-              <a:t> (≠)</a:t>
-            </a:r>
-          </a:p>
-          <a:p>
-            <a:pPr lvl="1"/>
-            <a:r>
-              <a:rPr lang="en-US" dirty="0"/>
-              <a:t>signed and unsigned less than and greater than (&lt;</a:t>
-            </a:r>
-            <a:r>
-              <a:rPr lang="en-US" baseline="-25000" dirty="0"/>
+              <a:rPr lang="en-US" sz="2400" dirty="0"/>
+              <a:t>)</a:t>
+            </a:r>
+            <a:br>
+              <a:rPr lang="en-US" sz="2400" dirty="0"/>
+            </a:br>
+            <a:r>
+              <a:rPr lang="en-US" sz="2400" dirty="0"/>
+              <a:t>&amp; 	(bit-wise conjunction)		 &lt;</a:t>
+            </a:r>
+            <a:r>
+              <a:rPr lang="en-US" sz="2400" baseline="-25000" dirty="0"/>
               <a:t>u</a:t>
             </a:r>
             <a:r>
-              <a:rPr lang="en-US" dirty="0"/>
-              <a:t>, &gt;</a:t>
-            </a:r>
-            <a:r>
-              <a:rPr lang="en-US" baseline="-25000" dirty="0"/>
+              <a:rPr lang="en-US" sz="2400" dirty="0"/>
+              <a:t>	(unsigned less than)</a:t>
+            </a:r>
+            <a:br>
+              <a:rPr lang="en-US" sz="2400" dirty="0"/>
+            </a:br>
+            <a:r>
+              <a:rPr lang="en-US" sz="2400" dirty="0"/>
+              <a:t>|  	(bit-wise disjunction)	 	 &gt;</a:t>
+            </a:r>
+            <a:r>
+              <a:rPr lang="en-US" sz="2400" baseline="-25000" dirty="0"/>
               <a:t>u</a:t>
             </a:r>
             <a:r>
-              <a:rPr lang="en-US" dirty="0"/>
-              <a:t>, &lt;</a:t>
-            </a:r>
-            <a:r>
-              <a:rPr lang="en-US" baseline="-25000" dirty="0"/>
+              <a:rPr lang="en-US" sz="2400" dirty="0"/>
+              <a:t>	(unsigned greater than)</a:t>
+            </a:r>
+            <a:br>
+              <a:rPr lang="en-US" sz="2400" dirty="0"/>
+            </a:br>
+            <a:r>
+              <a:rPr lang="en-US" sz="2400" dirty="0"/>
+              <a:t>~ 	(bit-wise negation)		 &lt;</a:t>
+            </a:r>
+            <a:r>
+              <a:rPr lang="en-US" sz="2400" baseline="-25000" dirty="0"/>
               <a:t>s</a:t>
             </a:r>
             <a:r>
-              <a:rPr lang="en-US" dirty="0"/>
-              <a:t>, &gt;</a:t>
-            </a:r>
-            <a:r>
-              <a:rPr lang="en-US" baseline="-25000" dirty="0"/>
+              <a:rPr lang="en-US" sz="2400" dirty="0"/>
+              <a:t>	(signed less than)</a:t>
+            </a:r>
+            <a:br>
+              <a:rPr lang="en-US" sz="2400" dirty="0"/>
+            </a:br>
+            <a:r>
+              <a:rPr lang="en-US" sz="2400" dirty="0"/>
+              <a:t>&lt;&lt; 	(logical left)			 &gt;</a:t>
+            </a:r>
+            <a:r>
+              <a:rPr lang="en-US" sz="2400" baseline="-25000" dirty="0"/>
               <a:t>s</a:t>
             </a:r>
             <a:r>
-              <a:rPr lang="en-US" dirty="0"/>
-              <a:t>)</a:t>
-            </a:r>
+              <a:rPr lang="en-US" sz="2400" dirty="0"/>
+              <a:t> 	(signed greater than)</a:t>
+            </a:r>
+            <a:br>
+              <a:rPr lang="en-US" sz="2400" dirty="0"/>
+            </a:br>
+            <a:r>
+              <a:rPr lang="en-US" sz="2400" dirty="0"/>
+              <a:t>&gt;&gt; 	(and right shift )</a:t>
+            </a:r>
+            <a:br>
+              <a:rPr lang="en-US" sz="2400" dirty="0"/>
+            </a:br>
+            <a:endParaRPr lang="en-US" sz="2400" dirty="0"/>
           </a:p>
           <a:p>
             <a:pPr marL="0" indent="0">
@@ -4883,52 +5312,52 @@
             </a:pPr>
             <a:r>
               <a:rPr lang="en-US" sz="2400" dirty="0"/>
-              <a:t>We extended the library with the following:</a:t>
-            </a:r>
-          </a:p>
-          <a:p>
-            <a:pPr lvl="1"/>
-            <a:r>
-              <a:rPr lang="en-US" dirty="0"/>
-              <a:t>unsigned weak inequalities (≤</a:t>
-            </a:r>
-            <a:r>
-              <a:rPr lang="en-US" baseline="-25000" dirty="0"/>
-              <a:t>u</a:t>
-            </a:r>
-            <a:r>
-              <a:rPr lang="en-US" dirty="0"/>
-              <a:t>, ≥</a:t>
-            </a:r>
-            <a:r>
-              <a:rPr lang="en-US" baseline="-25000" dirty="0"/>
-              <a:t>u</a:t>
-            </a:r>
-            <a:r>
-              <a:rPr lang="en-US" dirty="0"/>
-              <a:t>)</a:t>
-            </a:r>
-          </a:p>
-          <a:p>
-            <a:pPr lvl="1"/>
-            <a:r>
-              <a:rPr lang="en-US" dirty="0"/>
-              <a:t>arithmetic right shift (&gt;&gt;</a:t>
-            </a:r>
-            <a:r>
-              <a:rPr lang="en-US" baseline="-25000" dirty="0"/>
+              <a:t>Extended signature:</a:t>
+            </a:r>
+            <a:br>
+              <a:rPr lang="en-US" sz="2400" dirty="0"/>
+            </a:br>
+            <a:r>
+              <a:rPr lang="en-US" sz="2400" dirty="0"/>
+              <a:t>≤</a:t>
+            </a:r>
+            <a:r>
+              <a:rPr lang="en-US" sz="2400" baseline="-25000" dirty="0"/>
+              <a:t>u </a:t>
+            </a:r>
+            <a:r>
+              <a:rPr lang="en-US" sz="2400" dirty="0"/>
+              <a:t>	(unsigned weak less than)		new definitions of &lt;&lt; and &gt;&gt;</a:t>
+            </a:r>
+            <a:br>
+              <a:rPr lang="en-US" sz="2400" dirty="0"/>
+            </a:br>
+            <a:r>
+              <a:rPr lang="en-US" sz="2400" dirty="0"/>
+              <a:t>≥</a:t>
+            </a:r>
+            <a:r>
+              <a:rPr lang="en-US" sz="2400" baseline="-25000" dirty="0"/>
+              <a:t>u </a:t>
+            </a:r>
+            <a:r>
+              <a:rPr lang="en-US" sz="2400" dirty="0"/>
+              <a:t>	(unsigned weak greater than)</a:t>
+            </a:r>
+            <a:br>
+              <a:rPr lang="en-US" sz="2400" dirty="0"/>
+            </a:br>
+            <a:r>
+              <a:rPr lang="en-US" sz="2400" dirty="0"/>
+              <a:t>&gt;&gt;</a:t>
+            </a:r>
+            <a:r>
+              <a:rPr lang="en-US" sz="2400" baseline="-25000" dirty="0"/>
               <a:t>a</a:t>
             </a:r>
             <a:r>
-              <a:rPr lang="en-US" dirty="0"/>
-              <a:t>)</a:t>
-            </a:r>
-          </a:p>
-          <a:p>
-            <a:pPr lvl="1"/>
-            <a:r>
-              <a:rPr lang="en-US" dirty="0"/>
-              <a:t>new definitions of all shift operators and a proof of equivalence between the two sets of definitions</a:t>
+              <a:rPr lang="en-US" sz="2400" dirty="0"/>
+              <a:t>	(arithmetic right shift)</a:t>
             </a:r>
           </a:p>
           <a:p>
@@ -5016,7 +5445,7 @@
           </p:nvPr>
         </p:nvPicPr>
         <p:blipFill>
-          <a:blip r:embed="rId4">
+          <a:blip r:embed="rId5">
             <a:extLst>
               <a:ext uri="{28A0092B-C50C-407E-A947-70E740481C1C}">
                 <a14:useLocalDpi xmlns:a14="http://schemas.microsoft.com/office/drawing/2010/main" val="0"/>
@@ -5039,10 +5468,10 @@
       </p:pic>
       <p:pic>
         <p:nvPicPr>
-          <p:cNvPr id="12" name="Picture 11">
+          <p:cNvPr id="18" name="Picture 17">
             <a:extLst>
               <a:ext uri="{FF2B5EF4-FFF2-40B4-BE49-F238E27FC236}">
-                <a16:creationId xmlns:a16="http://schemas.microsoft.com/office/drawing/2014/main" id="{59A43907-6701-4CFA-93AD-EA9096B31568}"/>
+                <a16:creationId xmlns:a16="http://schemas.microsoft.com/office/drawing/2014/main" id="{F26C8B27-4E67-440B-943D-EBD4E448BC97}"/>
               </a:ext>
             </a:extLst>
           </p:cNvPr>
@@ -5056,7 +5485,7 @@
           </p:nvPr>
         </p:nvPicPr>
         <p:blipFill>
-          <a:blip r:embed="rId5">
+          <a:blip r:embed="rId6">
             <a:extLst>
               <a:ext uri="{28A0092B-C50C-407E-A947-70E740481C1C}">
                 <a14:useLocalDpi xmlns:a14="http://schemas.microsoft.com/office/drawing/2010/main" val="0"/>
@@ -5069,8 +5498,8 @@
         </p:blipFill>
         <p:spPr>
           <a:xfrm>
-            <a:off x="6904141" y="1674398"/>
-            <a:ext cx="5117285" cy="1018284"/>
+            <a:off x="6641965" y="1690688"/>
+            <a:ext cx="5248726" cy="824721"/>
           </a:xfrm>
           <a:prstGeom prst="rect">
             <a:avLst/>
@@ -5129,6 +5558,46 @@
           </a:p>
         </p:txBody>
       </p:sp>
+      <p:pic>
+        <p:nvPicPr>
+          <p:cNvPr id="26" name="Picture 25">
+            <a:extLst>
+              <a:ext uri="{FF2B5EF4-FFF2-40B4-BE49-F238E27FC236}">
+                <a16:creationId xmlns:a16="http://schemas.microsoft.com/office/drawing/2014/main" id="{C17AF1A1-99FC-49D7-8794-8424F4404AD8}"/>
+              </a:ext>
+            </a:extLst>
+          </p:cNvPr>
+          <p:cNvPicPr>
+            <a:picLocks noChangeAspect="1"/>
+          </p:cNvPicPr>
+          <p:nvPr>
+            <p:custDataLst>
+              <p:tags r:id="rId3"/>
+            </p:custDataLst>
+          </p:nvPr>
+        </p:nvPicPr>
+        <p:blipFill>
+          <a:blip r:embed="rId7">
+            <a:extLst>
+              <a:ext uri="{28A0092B-C50C-407E-A947-70E740481C1C}">
+                <a14:useLocalDpi xmlns:a14="http://schemas.microsoft.com/office/drawing/2010/main" val="0"/>
+              </a:ext>
+            </a:extLst>
+          </a:blip>
+          <a:stretch>
+            <a:fillRect/>
+          </a:stretch>
+        </p:blipFill>
+        <p:spPr>
+          <a:xfrm>
+            <a:off x="7041567" y="4323104"/>
+            <a:ext cx="4344121" cy="593595"/>
+          </a:xfrm>
+          <a:prstGeom prst="rect">
+            <a:avLst/>
+          </a:prstGeom>
+        </p:spPr>
+      </p:pic>
     </p:spTree>
     <p:extLst>
       <p:ext uri="{BB962C8B-B14F-4D97-AF65-F5344CB8AC3E}">
@@ -5203,7 +5672,7 @@
             <p:ph idx="1"/>
             <p:extLst>
               <p:ext uri="{D42A27DB-BD31-4B8C-83A1-F6EECF244321}">
-                <p14:modId xmlns:p14="http://schemas.microsoft.com/office/powerpoint/2010/main" val="1265929568"/>
+                <p14:modId xmlns:p14="http://schemas.microsoft.com/office/powerpoint/2010/main" val="791453638"/>
               </p:ext>
             </p:extLst>
           </p:nvPr>
@@ -5262,7 +5731,11 @@
                     <a:p>
                       <a:r>
                         <a:rPr lang="en-US" dirty="0"/>
-                        <a:t>S</a:t>
+                        <a:t>n</a:t>
+                      </a:r>
+                      <a:r>
+                        <a:rPr lang="en-US" baseline="-25000" dirty="0"/>
+                        <a:t>s</a:t>
                       </a:r>
                     </a:p>
                   </a:txBody>
@@ -5283,8 +5756,13 @@
                       </a:r>
                       <a:r>
                         <a:rPr lang="en-US" dirty="0"/>
-                        <a:t> – S</a:t>
+                        <a:t> – n</a:t>
                       </a:r>
+                      <a:r>
+                        <a:rPr lang="en-US" baseline="-25000" dirty="0"/>
+                        <a:t>s</a:t>
+                      </a:r>
+                      <a:endParaRPr lang="en-US" dirty="0"/>
                     </a:p>
                   </a:txBody>
                   <a:tcPr/>
@@ -5563,7 +6041,7 @@
         </p:blipFill>
         <p:spPr>
           <a:xfrm>
-            <a:off x="838200" y="1690688"/>
+            <a:off x="838200" y="1560053"/>
             <a:ext cx="9331997" cy="305994"/>
           </a:xfrm>
           <a:prstGeom prst="rect">
@@ -5573,10 +6051,10 @@
       </p:pic>
       <p:pic>
         <p:nvPicPr>
-          <p:cNvPr id="10" name="Picture 9">
+          <p:cNvPr id="6" name="Picture 5">
             <a:extLst>
               <a:ext uri="{FF2B5EF4-FFF2-40B4-BE49-F238E27FC236}">
-                <a16:creationId xmlns:a16="http://schemas.microsoft.com/office/drawing/2014/main" id="{A0254F08-EA02-45F6-ACBA-4229C4155CA9}"/>
+                <a16:creationId xmlns:a16="http://schemas.microsoft.com/office/drawing/2014/main" id="{4C3A0D39-73B6-4B37-B250-E2BB864C9618}"/>
               </a:ext>
             </a:extLst>
           </p:cNvPr>
@@ -5603,8 +6081,8 @@
         </p:blipFill>
         <p:spPr>
           <a:xfrm>
-            <a:off x="864328" y="2291545"/>
-            <a:ext cx="6962625" cy="305994"/>
+            <a:off x="838200" y="2254910"/>
+            <a:ext cx="7159932" cy="305994"/>
           </a:xfrm>
           <a:prstGeom prst="rect">
             <a:avLst/>
@@ -5613,10 +6091,10 @@
       </p:pic>
       <p:pic>
         <p:nvPicPr>
-          <p:cNvPr id="61" name="Picture 60">
+          <p:cNvPr id="23" name="Picture 22">
             <a:extLst>
               <a:ext uri="{FF2B5EF4-FFF2-40B4-BE49-F238E27FC236}">
-                <a16:creationId xmlns:a16="http://schemas.microsoft.com/office/drawing/2014/main" id="{A7A5FF1E-7EC8-4CDA-9CF9-14DD1DD7AE85}"/>
+                <a16:creationId xmlns:a16="http://schemas.microsoft.com/office/drawing/2014/main" id="{4228FBEE-16DC-402F-BE89-6E30358C7BF5}"/>
               </a:ext>
             </a:extLst>
           </p:cNvPr>
@@ -5643,315 +6121,39 @@
         </p:blipFill>
         <p:spPr>
           <a:xfrm>
-            <a:off x="838200" y="2832656"/>
-            <a:ext cx="8714666" cy="1452191"/>
+            <a:off x="838200" y="2974205"/>
+            <a:ext cx="3017142" cy="1452191"/>
           </a:xfrm>
           <a:prstGeom prst="rect">
             <a:avLst/>
           </a:prstGeom>
         </p:spPr>
       </p:pic>
-      <p:sp>
-        <p:nvSpPr>
-          <p:cNvPr id="55" name="Content Placeholder 2">
-            <a:extLst>
-              <a:ext uri="{FF2B5EF4-FFF2-40B4-BE49-F238E27FC236}">
-                <a16:creationId xmlns:a16="http://schemas.microsoft.com/office/drawing/2014/main" id="{2A6A8C6C-0F7D-431A-8328-EBC01D9FEA91}"/>
-              </a:ext>
-            </a:extLst>
-          </p:cNvPr>
-          <p:cNvSpPr txBox="1">
-            <a:spLocks/>
-          </p:cNvSpPr>
-          <p:nvPr/>
-        </p:nvSpPr>
-        <p:spPr>
-          <a:xfrm>
-            <a:off x="2926080" y="4830537"/>
-            <a:ext cx="10515600" cy="1697971"/>
-          </a:xfrm>
-          <a:prstGeom prst="rect">
-            <a:avLst/>
-          </a:prstGeom>
-        </p:spPr>
-        <p:txBody>
-          <a:bodyPr vert="horz" lIns="91440" tIns="45720" rIns="91440" bIns="45720" rtlCol="0">
-            <a:noAutofit/>
-          </a:bodyPr>
-          <a:lstStyle>
-            <a:lvl1pPr marL="228600" indent="-228600" algn="l" defTabSz="914400" rtl="0" eaLnBrk="1" latinLnBrk="0" hangingPunct="1">
-              <a:lnSpc>
-                <a:spcPct val="90000"/>
-              </a:lnSpc>
-              <a:spcBef>
-                <a:spcPts val="1000"/>
-              </a:spcBef>
-              <a:buFont typeface="Arial" panose="020B0604020202020204" pitchFamily="34" charset="0"/>
-              <a:buChar char="•"/>
-              <a:defRPr sz="2800" kern="1200">
-                <a:solidFill>
-                  <a:schemeClr val="tx1"/>
-                </a:solidFill>
-                <a:latin typeface="+mn-lt"/>
-                <a:ea typeface="+mn-ea"/>
-                <a:cs typeface="+mn-cs"/>
-              </a:defRPr>
-            </a:lvl1pPr>
-            <a:lvl2pPr marL="685800" indent="-228600" algn="l" defTabSz="914400" rtl="0" eaLnBrk="1" latinLnBrk="0" hangingPunct="1">
-              <a:lnSpc>
-                <a:spcPct val="90000"/>
-              </a:lnSpc>
-              <a:spcBef>
-                <a:spcPts val="500"/>
-              </a:spcBef>
-              <a:buFont typeface="Arial" panose="020B0604020202020204" pitchFamily="34" charset="0"/>
-              <a:buChar char="•"/>
-              <a:defRPr sz="2400" kern="1200">
-                <a:solidFill>
-                  <a:schemeClr val="tx1"/>
-                </a:solidFill>
-                <a:latin typeface="+mn-lt"/>
-                <a:ea typeface="+mn-ea"/>
-                <a:cs typeface="+mn-cs"/>
-              </a:defRPr>
-            </a:lvl2pPr>
-            <a:lvl3pPr marL="1143000" indent="-228600" algn="l" defTabSz="914400" rtl="0" eaLnBrk="1" latinLnBrk="0" hangingPunct="1">
-              <a:lnSpc>
-                <a:spcPct val="90000"/>
-              </a:lnSpc>
-              <a:spcBef>
-                <a:spcPts val="500"/>
-              </a:spcBef>
-              <a:buFont typeface="Arial" panose="020B0604020202020204" pitchFamily="34" charset="0"/>
-              <a:buChar char="•"/>
-              <a:defRPr sz="2000" kern="1200">
-                <a:solidFill>
-                  <a:schemeClr val="tx1"/>
-                </a:solidFill>
-                <a:latin typeface="+mn-lt"/>
-                <a:ea typeface="+mn-ea"/>
-                <a:cs typeface="+mn-cs"/>
-              </a:defRPr>
-            </a:lvl3pPr>
-            <a:lvl4pPr marL="1600200" indent="-228600" algn="l" defTabSz="914400" rtl="0" eaLnBrk="1" latinLnBrk="0" hangingPunct="1">
-              <a:lnSpc>
-                <a:spcPct val="90000"/>
-              </a:lnSpc>
-              <a:spcBef>
-                <a:spcPts val="500"/>
-              </a:spcBef>
-              <a:buFont typeface="Arial" panose="020B0604020202020204" pitchFamily="34" charset="0"/>
-              <a:buChar char="•"/>
-              <a:defRPr sz="1800" kern="1200">
-                <a:solidFill>
-                  <a:schemeClr val="tx1"/>
-                </a:solidFill>
-                <a:latin typeface="+mn-lt"/>
-                <a:ea typeface="+mn-ea"/>
-                <a:cs typeface="+mn-cs"/>
-              </a:defRPr>
-            </a:lvl4pPr>
-            <a:lvl5pPr marL="2057400" indent="-228600" algn="l" defTabSz="914400" rtl="0" eaLnBrk="1" latinLnBrk="0" hangingPunct="1">
-              <a:lnSpc>
-                <a:spcPct val="90000"/>
-              </a:lnSpc>
-              <a:spcBef>
-                <a:spcPts val="500"/>
-              </a:spcBef>
-              <a:buFont typeface="Arial" panose="020B0604020202020204" pitchFamily="34" charset="0"/>
-              <a:buChar char="•"/>
-              <a:defRPr sz="1800" kern="1200">
-                <a:solidFill>
-                  <a:schemeClr val="tx1"/>
-                </a:solidFill>
-                <a:latin typeface="+mn-lt"/>
-                <a:ea typeface="+mn-ea"/>
-                <a:cs typeface="+mn-cs"/>
-              </a:defRPr>
-            </a:lvl5pPr>
-            <a:lvl6pPr marL="2514600" indent="-228600" algn="l" defTabSz="914400" rtl="0" eaLnBrk="1" latinLnBrk="0" hangingPunct="1">
-              <a:lnSpc>
-                <a:spcPct val="90000"/>
-              </a:lnSpc>
-              <a:spcBef>
-                <a:spcPts val="500"/>
-              </a:spcBef>
-              <a:buFont typeface="Arial" panose="020B0604020202020204" pitchFamily="34" charset="0"/>
-              <a:buChar char="•"/>
-              <a:defRPr sz="1800" kern="1200">
-                <a:solidFill>
-                  <a:schemeClr val="tx1"/>
-                </a:solidFill>
-                <a:latin typeface="+mn-lt"/>
-                <a:ea typeface="+mn-ea"/>
-                <a:cs typeface="+mn-cs"/>
-              </a:defRPr>
-            </a:lvl6pPr>
-            <a:lvl7pPr marL="2971800" indent="-228600" algn="l" defTabSz="914400" rtl="0" eaLnBrk="1" latinLnBrk="0" hangingPunct="1">
-              <a:lnSpc>
-                <a:spcPct val="90000"/>
-              </a:lnSpc>
-              <a:spcBef>
-                <a:spcPts val="500"/>
-              </a:spcBef>
-              <a:buFont typeface="Arial" panose="020B0604020202020204" pitchFamily="34" charset="0"/>
-              <a:buChar char="•"/>
-              <a:defRPr sz="1800" kern="1200">
-                <a:solidFill>
-                  <a:schemeClr val="tx1"/>
-                </a:solidFill>
-                <a:latin typeface="+mn-lt"/>
-                <a:ea typeface="+mn-ea"/>
-                <a:cs typeface="+mn-cs"/>
-              </a:defRPr>
-            </a:lvl7pPr>
-            <a:lvl8pPr marL="3429000" indent="-228600" algn="l" defTabSz="914400" rtl="0" eaLnBrk="1" latinLnBrk="0" hangingPunct="1">
-              <a:lnSpc>
-                <a:spcPct val="90000"/>
-              </a:lnSpc>
-              <a:spcBef>
-                <a:spcPts val="500"/>
-              </a:spcBef>
-              <a:buFont typeface="Arial" panose="020B0604020202020204" pitchFamily="34" charset="0"/>
-              <a:buChar char="•"/>
-              <a:defRPr sz="1800" kern="1200">
-                <a:solidFill>
-                  <a:schemeClr val="tx1"/>
-                </a:solidFill>
-                <a:latin typeface="+mn-lt"/>
-                <a:ea typeface="+mn-ea"/>
-                <a:cs typeface="+mn-cs"/>
-              </a:defRPr>
-            </a:lvl8pPr>
-            <a:lvl9pPr marL="3886200" indent="-228600" algn="l" defTabSz="914400" rtl="0" eaLnBrk="1" latinLnBrk="0" hangingPunct="1">
-              <a:lnSpc>
-                <a:spcPct val="90000"/>
-              </a:lnSpc>
-              <a:spcBef>
-                <a:spcPts val="500"/>
-              </a:spcBef>
-              <a:buFont typeface="Arial" panose="020B0604020202020204" pitchFamily="34" charset="0"/>
-              <a:buChar char="•"/>
-              <a:defRPr sz="1800" kern="1200">
-                <a:solidFill>
-                  <a:schemeClr val="tx1"/>
-                </a:solidFill>
-                <a:latin typeface="+mn-lt"/>
-                <a:ea typeface="+mn-ea"/>
-                <a:cs typeface="+mn-cs"/>
-              </a:defRPr>
-            </a:lvl9pPr>
-          </a:lstStyle>
-          <a:p>
-            <a:pPr marL="457200" lvl="1" indent="0">
-              <a:buFont typeface="Arial" panose="020B0604020202020204" pitchFamily="34" charset="0"/>
-              <a:buNone/>
-            </a:pPr>
-            <a:r>
-              <a:rPr lang="en-US" dirty="0"/>
-              <a:t>S = </a:t>
-            </a:r>
-            <a:r>
-              <a:rPr lang="en-US" dirty="0" err="1"/>
-              <a:t>toNat</a:t>
-            </a:r>
-            <a:r>
-              <a:rPr lang="en-US" dirty="0"/>
-              <a:t>(s)</a:t>
-            </a:r>
-          </a:p>
-          <a:p>
-            <a:pPr marL="457200" lvl="1" indent="0">
-              <a:buFont typeface="Arial" panose="020B0604020202020204" pitchFamily="34" charset="0"/>
-              <a:buNone/>
-            </a:pPr>
-            <a:r>
-              <a:rPr lang="en-US" dirty="0"/>
-              <a:t>l</a:t>
-            </a:r>
-            <a:r>
-              <a:rPr lang="en-US" baseline="-25000" dirty="0"/>
-              <a:t>s</a:t>
-            </a:r>
-            <a:r>
-              <a:rPr lang="en-US" dirty="0"/>
-              <a:t> = length(s)</a:t>
-            </a:r>
-          </a:p>
-          <a:p>
-            <a:pPr marL="457200" lvl="1" indent="0">
-              <a:buFont typeface="Arial" panose="020B0604020202020204" pitchFamily="34" charset="0"/>
-              <a:buNone/>
-            </a:pPr>
-            <a:r>
-              <a:rPr lang="en-US" dirty="0"/>
-              <a:t>In other words, </a:t>
-            </a:r>
-            <a:r>
-              <a:rPr lang="en-US" dirty="0" err="1"/>
-              <a:t>msb_zero</a:t>
-            </a:r>
-            <a:r>
-              <a:rPr lang="en-US" dirty="0"/>
-              <a:t> states that when S &lt; l</a:t>
-            </a:r>
-            <a:r>
-              <a:rPr lang="en-US" baseline="-25000" dirty="0"/>
-              <a:t>s</a:t>
-            </a:r>
-            <a:r>
-              <a:rPr lang="en-US" dirty="0"/>
-              <a:t>, the most significant l</a:t>
-            </a:r>
-            <a:r>
-              <a:rPr lang="en-US" baseline="-25000" dirty="0"/>
-              <a:t>s</a:t>
-            </a:r>
-            <a:r>
-              <a:rPr lang="en-US" dirty="0"/>
-              <a:t> – S bits of s are 0.</a:t>
-            </a:r>
-          </a:p>
-          <a:p>
-            <a:pPr marL="457200" lvl="1" indent="0">
-              <a:buFont typeface="Arial" panose="020B0604020202020204" pitchFamily="34" charset="0"/>
-              <a:buNone/>
-            </a:pPr>
-            <a:r>
-              <a:rPr lang="en-US" dirty="0"/>
-              <a:t>For example, consider l</a:t>
-            </a:r>
-            <a:r>
-              <a:rPr lang="en-US" baseline="-25000" dirty="0"/>
-              <a:t>s</a:t>
-            </a:r>
-            <a:r>
-              <a:rPr lang="en-US" dirty="0"/>
-              <a:t> = 4</a:t>
-            </a:r>
-          </a:p>
-        </p:txBody>
-      </p:sp>
       <p:cxnSp>
         <p:nvCxnSpPr>
-          <p:cNvPr id="4" name="Connector: Elbow 3">
+          <p:cNvPr id="7" name="Straight Connector 6">
             <a:extLst>
               <a:ext uri="{FF2B5EF4-FFF2-40B4-BE49-F238E27FC236}">
-                <a16:creationId xmlns:a16="http://schemas.microsoft.com/office/drawing/2014/main" id="{9269F7E0-68DD-4574-90DB-C81096EFF766}"/>
+                <a16:creationId xmlns:a16="http://schemas.microsoft.com/office/drawing/2014/main" id="{FD04ACB1-4542-4272-8F9C-FD998EE3A147}"/>
               </a:ext>
             </a:extLst>
           </p:cNvPr>
-          <p:cNvCxnSpPr/>
+          <p:cNvCxnSpPr>
+            <a:cxnSpLocks/>
+          </p:cNvCxnSpPr>
           <p:nvPr/>
         </p:nvCxnSpPr>
         <p:spPr>
-          <a:xfrm rot="5400000">
-            <a:off x="1117692" y="5158468"/>
-            <a:ext cx="803909" cy="148046"/>
+          <a:xfrm>
+            <a:off x="1567540" y="4894217"/>
+            <a:ext cx="0" cy="361402"/>
           </a:xfrm>
-          <a:prstGeom prst="bentConnector3">
+          <a:prstGeom prst="line">
             <a:avLst/>
           </a:prstGeom>
+          <a:ln w="28575">
+            <a:prstDash val="sysDot"/>
+          </a:ln>
         </p:spPr>
         <p:style>
           <a:lnRef idx="1">
@@ -5970,24 +6172,29 @@
       </p:cxnSp>
       <p:cxnSp>
         <p:nvCxnSpPr>
-          <p:cNvPr id="14" name="Connector: Elbow 13">
+          <p:cNvPr id="17" name="Straight Connector 16">
             <a:extLst>
               <a:ext uri="{FF2B5EF4-FFF2-40B4-BE49-F238E27FC236}">
-                <a16:creationId xmlns:a16="http://schemas.microsoft.com/office/drawing/2014/main" id="{5E0109FB-C30B-48C4-B4A2-FB53C2DEEF86}"/>
+                <a16:creationId xmlns:a16="http://schemas.microsoft.com/office/drawing/2014/main" id="{DB25180A-20C4-4180-897F-9B6A57DF1B82}"/>
               </a:ext>
             </a:extLst>
           </p:cNvPr>
-          <p:cNvCxnSpPr/>
+          <p:cNvCxnSpPr>
+            <a:cxnSpLocks/>
+          </p:cNvCxnSpPr>
           <p:nvPr/>
         </p:nvCxnSpPr>
         <p:spPr>
-          <a:xfrm rot="5400000">
-            <a:off x="869494" y="5903057"/>
-            <a:ext cx="803909" cy="148046"/>
+          <a:xfrm>
+            <a:off x="1449973" y="5255619"/>
+            <a:ext cx="0" cy="361402"/>
           </a:xfrm>
-          <a:prstGeom prst="bentConnector3">
+          <a:prstGeom prst="line">
             <a:avLst/>
           </a:prstGeom>
+          <a:ln w="28575">
+            <a:prstDash val="sysDot"/>
+          </a:ln>
         </p:spPr>
         <p:style>
           <a:lnRef idx="1">
@@ -6004,6 +6211,275 @@
           </a:fontRef>
         </p:style>
       </p:cxnSp>
+      <p:cxnSp>
+        <p:nvCxnSpPr>
+          <p:cNvPr id="18" name="Straight Connector 17">
+            <a:extLst>
+              <a:ext uri="{FF2B5EF4-FFF2-40B4-BE49-F238E27FC236}">
+                <a16:creationId xmlns:a16="http://schemas.microsoft.com/office/drawing/2014/main" id="{A075DF4A-5400-4FD8-BC61-403B2526D586}"/>
+              </a:ext>
+            </a:extLst>
+          </p:cNvPr>
+          <p:cNvCxnSpPr>
+            <a:cxnSpLocks/>
+          </p:cNvCxnSpPr>
+          <p:nvPr/>
+        </p:nvCxnSpPr>
+        <p:spPr>
+          <a:xfrm>
+            <a:off x="1341111" y="5617029"/>
+            <a:ext cx="0" cy="361402"/>
+          </a:xfrm>
+          <a:prstGeom prst="line">
+            <a:avLst/>
+          </a:prstGeom>
+          <a:ln w="28575">
+            <a:prstDash val="sysDot"/>
+          </a:ln>
+        </p:spPr>
+        <p:style>
+          <a:lnRef idx="1">
+            <a:schemeClr val="accent1"/>
+          </a:lnRef>
+          <a:fillRef idx="0">
+            <a:schemeClr val="accent1"/>
+          </a:fillRef>
+          <a:effectRef idx="0">
+            <a:schemeClr val="accent1"/>
+          </a:effectRef>
+          <a:fontRef idx="minor">
+            <a:schemeClr val="tx1"/>
+          </a:fontRef>
+        </p:style>
+      </p:cxnSp>
+      <p:cxnSp>
+        <p:nvCxnSpPr>
+          <p:cNvPr id="19" name="Straight Connector 18">
+            <a:extLst>
+              <a:ext uri="{FF2B5EF4-FFF2-40B4-BE49-F238E27FC236}">
+                <a16:creationId xmlns:a16="http://schemas.microsoft.com/office/drawing/2014/main" id="{06987126-E24A-439E-B76B-3057C6855766}"/>
+              </a:ext>
+            </a:extLst>
+          </p:cNvPr>
+          <p:cNvCxnSpPr>
+            <a:cxnSpLocks/>
+          </p:cNvCxnSpPr>
+          <p:nvPr/>
+        </p:nvCxnSpPr>
+        <p:spPr>
+          <a:xfrm>
+            <a:off x="1214837" y="5978439"/>
+            <a:ext cx="0" cy="361402"/>
+          </a:xfrm>
+          <a:prstGeom prst="line">
+            <a:avLst/>
+          </a:prstGeom>
+          <a:ln w="28575">
+            <a:prstDash val="sysDot"/>
+          </a:ln>
+        </p:spPr>
+        <p:style>
+          <a:lnRef idx="1">
+            <a:schemeClr val="accent1"/>
+          </a:lnRef>
+          <a:fillRef idx="0">
+            <a:schemeClr val="accent1"/>
+          </a:fillRef>
+          <a:effectRef idx="0">
+            <a:schemeClr val="accent1"/>
+          </a:effectRef>
+          <a:fontRef idx="minor">
+            <a:schemeClr val="tx1"/>
+          </a:fontRef>
+        </p:style>
+      </p:cxnSp>
+      <p:cxnSp>
+        <p:nvCxnSpPr>
+          <p:cNvPr id="12" name="Straight Connector 11">
+            <a:extLst>
+              <a:ext uri="{FF2B5EF4-FFF2-40B4-BE49-F238E27FC236}">
+                <a16:creationId xmlns:a16="http://schemas.microsoft.com/office/drawing/2014/main" id="{5B2C2150-0A1E-4B1F-BF1A-C8E6B9DFD3DE}"/>
+              </a:ext>
+            </a:extLst>
+          </p:cNvPr>
+          <p:cNvCxnSpPr/>
+          <p:nvPr/>
+        </p:nvCxnSpPr>
+        <p:spPr>
+          <a:xfrm flipH="1">
+            <a:off x="1449973" y="5255619"/>
+            <a:ext cx="117567" cy="0"/>
+          </a:xfrm>
+          <a:prstGeom prst="line">
+            <a:avLst/>
+          </a:prstGeom>
+          <a:ln w="28575">
+            <a:prstDash val="sysDot"/>
+          </a:ln>
+        </p:spPr>
+        <p:style>
+          <a:lnRef idx="1">
+            <a:schemeClr val="accent1"/>
+          </a:lnRef>
+          <a:fillRef idx="0">
+            <a:schemeClr val="accent1"/>
+          </a:fillRef>
+          <a:effectRef idx="0">
+            <a:schemeClr val="accent1"/>
+          </a:effectRef>
+          <a:fontRef idx="minor">
+            <a:schemeClr val="tx1"/>
+          </a:fontRef>
+        </p:style>
+      </p:cxnSp>
+      <p:cxnSp>
+        <p:nvCxnSpPr>
+          <p:cNvPr id="16" name="Straight Connector 15">
+            <a:extLst>
+              <a:ext uri="{FF2B5EF4-FFF2-40B4-BE49-F238E27FC236}">
+                <a16:creationId xmlns:a16="http://schemas.microsoft.com/office/drawing/2014/main" id="{459FEABD-2C7E-4038-924B-CA3A2165F8ED}"/>
+              </a:ext>
+            </a:extLst>
+          </p:cNvPr>
+          <p:cNvCxnSpPr/>
+          <p:nvPr/>
+        </p:nvCxnSpPr>
+        <p:spPr>
+          <a:xfrm flipH="1">
+            <a:off x="1341111" y="5617021"/>
+            <a:ext cx="108862" cy="0"/>
+          </a:xfrm>
+          <a:prstGeom prst="line">
+            <a:avLst/>
+          </a:prstGeom>
+          <a:ln w="28575">
+            <a:prstDash val="sysDot"/>
+          </a:ln>
+        </p:spPr>
+        <p:style>
+          <a:lnRef idx="1">
+            <a:schemeClr val="accent1"/>
+          </a:lnRef>
+          <a:fillRef idx="0">
+            <a:schemeClr val="accent1"/>
+          </a:fillRef>
+          <a:effectRef idx="0">
+            <a:schemeClr val="accent1"/>
+          </a:effectRef>
+          <a:fontRef idx="minor">
+            <a:schemeClr val="tx1"/>
+          </a:fontRef>
+        </p:style>
+      </p:cxnSp>
+      <p:cxnSp>
+        <p:nvCxnSpPr>
+          <p:cNvPr id="21" name="Straight Connector 20">
+            <a:extLst>
+              <a:ext uri="{FF2B5EF4-FFF2-40B4-BE49-F238E27FC236}">
+                <a16:creationId xmlns:a16="http://schemas.microsoft.com/office/drawing/2014/main" id="{6A7135B7-53CE-40DE-ABF0-47706182E435}"/>
+              </a:ext>
+            </a:extLst>
+          </p:cNvPr>
+          <p:cNvCxnSpPr/>
+          <p:nvPr/>
+        </p:nvCxnSpPr>
+        <p:spPr>
+          <a:xfrm flipH="1">
+            <a:off x="1214837" y="5978431"/>
+            <a:ext cx="126274" cy="0"/>
+          </a:xfrm>
+          <a:prstGeom prst="line">
+            <a:avLst/>
+          </a:prstGeom>
+          <a:ln w="28575">
+            <a:prstDash val="sysDot"/>
+          </a:ln>
+        </p:spPr>
+        <p:style>
+          <a:lnRef idx="1">
+            <a:schemeClr val="accent1"/>
+          </a:lnRef>
+          <a:fillRef idx="0">
+            <a:schemeClr val="accent1"/>
+          </a:fillRef>
+          <a:effectRef idx="0">
+            <a:schemeClr val="accent1"/>
+          </a:effectRef>
+          <a:fontRef idx="minor">
+            <a:schemeClr val="tx1"/>
+          </a:fontRef>
+        </p:style>
+      </p:cxnSp>
+      <p:sp>
+        <p:nvSpPr>
+          <p:cNvPr id="22" name="TextBox 21">
+            <a:extLst>
+              <a:ext uri="{FF2B5EF4-FFF2-40B4-BE49-F238E27FC236}">
+                <a16:creationId xmlns:a16="http://schemas.microsoft.com/office/drawing/2014/main" id="{4D2C2CB4-60E2-4338-B01D-340C4239DDE6}"/>
+              </a:ext>
+            </a:extLst>
+          </p:cNvPr>
+          <p:cNvSpPr txBox="1"/>
+          <p:nvPr/>
+        </p:nvSpPr>
+        <p:spPr>
+          <a:xfrm>
+            <a:off x="866499" y="1845041"/>
+            <a:ext cx="1713409" cy="369332"/>
+          </a:xfrm>
+          <a:prstGeom prst="rect">
+            <a:avLst/>
+          </a:prstGeom>
+          <a:noFill/>
+        </p:spPr>
+        <p:txBody>
+          <a:bodyPr wrap="square" rtlCol="0">
+            <a:spAutoFit/>
+          </a:bodyPr>
+          <a:lstStyle/>
+          <a:p>
+            <a:r>
+              <a:rPr lang="en-US" dirty="0"/>
+              <a:t>reduces to</a:t>
+            </a:r>
+          </a:p>
+        </p:txBody>
+      </p:sp>
+      <p:sp>
+        <p:nvSpPr>
+          <p:cNvPr id="27" name="TextBox 26">
+            <a:extLst>
+              <a:ext uri="{FF2B5EF4-FFF2-40B4-BE49-F238E27FC236}">
+                <a16:creationId xmlns:a16="http://schemas.microsoft.com/office/drawing/2014/main" id="{3061FA6F-8268-4AA1-8685-ACDF209C9D77}"/>
+              </a:ext>
+            </a:extLst>
+          </p:cNvPr>
+          <p:cNvSpPr txBox="1"/>
+          <p:nvPr/>
+        </p:nvSpPr>
+        <p:spPr>
+          <a:xfrm>
+            <a:off x="866499" y="2582888"/>
+            <a:ext cx="1713409" cy="369332"/>
+          </a:xfrm>
+          <a:prstGeom prst="rect">
+            <a:avLst/>
+          </a:prstGeom>
+          <a:noFill/>
+        </p:spPr>
+        <p:txBody>
+          <a:bodyPr wrap="square" rtlCol="0">
+            <a:spAutoFit/>
+          </a:bodyPr>
+          <a:lstStyle/>
+          <a:p>
+            <a:r>
+              <a:rPr lang="en-US" dirty="0"/>
+              <a:t>where</a:t>
+            </a:r>
+          </a:p>
+        </p:txBody>
+      </p:sp>
     </p:spTree>
     <p:extLst>
       <p:ext uri="{BB962C8B-B14F-4D97-AF65-F5344CB8AC3E}">
@@ -6097,10 +6573,10 @@
       </p:sp>
       <p:pic>
         <p:nvPicPr>
-          <p:cNvPr id="85" name="Picture 84">
+          <p:cNvPr id="9" name="Picture 8">
             <a:extLst>
               <a:ext uri="{FF2B5EF4-FFF2-40B4-BE49-F238E27FC236}">
-                <a16:creationId xmlns:a16="http://schemas.microsoft.com/office/drawing/2014/main" id="{66A22C63-CE94-466F-8128-01DEFD5758DB}"/>
+                <a16:creationId xmlns:a16="http://schemas.microsoft.com/office/drawing/2014/main" id="{6E9B7EF0-0D0E-492A-8890-0F473B0408BD}"/>
               </a:ext>
             </a:extLst>
           </p:cNvPr>
@@ -6114,7 +6590,7 @@
           </p:nvPr>
         </p:nvPicPr>
         <p:blipFill>
-          <a:blip r:embed="rId9">
+          <a:blip r:embed="rId10">
             <a:extLst>
               <a:ext uri="{28A0092B-C50C-407E-A947-70E740481C1C}">
                 <a14:useLocalDpi xmlns:a14="http://schemas.microsoft.com/office/drawing/2010/main" val="0"/>
@@ -6154,7 +6630,7 @@
           </p:nvPr>
         </p:nvPicPr>
         <p:blipFill>
-          <a:blip r:embed="rId10">
+          <a:blip r:embed="rId11">
             <a:extLst>
               <a:ext uri="{28A0092B-C50C-407E-A947-70E740481C1C}">
                 <a14:useLocalDpi xmlns:a14="http://schemas.microsoft.com/office/drawing/2010/main" val="0"/>
@@ -6177,10 +6653,10 @@
       </p:pic>
       <p:pic>
         <p:nvPicPr>
-          <p:cNvPr id="83" name="Picture 82">
+          <p:cNvPr id="7" name="Picture 6">
             <a:extLst>
               <a:ext uri="{FF2B5EF4-FFF2-40B4-BE49-F238E27FC236}">
-                <a16:creationId xmlns:a16="http://schemas.microsoft.com/office/drawing/2014/main" id="{FA286CAF-76F3-439A-B7CD-9995809C117B}"/>
+                <a16:creationId xmlns:a16="http://schemas.microsoft.com/office/drawing/2014/main" id="{63896054-56FF-43E2-B777-06EB432D7EE3}"/>
               </a:ext>
             </a:extLst>
           </p:cNvPr>
@@ -6194,7 +6670,7 @@
           </p:nvPr>
         </p:nvPicPr>
         <p:blipFill>
-          <a:blip r:embed="rId11">
+          <a:blip r:embed="rId12">
             <a:extLst>
               <a:ext uri="{28A0092B-C50C-407E-A947-70E740481C1C}">
                 <a14:useLocalDpi xmlns:a14="http://schemas.microsoft.com/office/drawing/2010/main" val="0"/>
@@ -6208,7 +6684,7 @@
         <p:spPr>
           <a:xfrm>
             <a:off x="8335651" y="3189070"/>
-            <a:ext cx="3568521" cy="469169"/>
+            <a:ext cx="3420662" cy="469169"/>
           </a:xfrm>
           <a:prstGeom prst="rect">
             <a:avLst/>
@@ -6234,7 +6710,7 @@
           </p:nvPr>
         </p:nvPicPr>
         <p:blipFill>
-          <a:blip r:embed="rId12">
+          <a:blip r:embed="rId13">
             <a:extLst>
               <a:ext uri="{28A0092B-C50C-407E-A947-70E740481C1C}">
                 <a14:useLocalDpi xmlns:a14="http://schemas.microsoft.com/office/drawing/2010/main" val="0"/>
@@ -6274,7 +6750,7 @@
           </p:nvPr>
         </p:nvPicPr>
         <p:blipFill>
-          <a:blip r:embed="rId13">
+          <a:blip r:embed="rId14">
             <a:extLst>
               <a:ext uri="{28A0092B-C50C-407E-A947-70E740481C1C}">
                 <a14:useLocalDpi xmlns:a14="http://schemas.microsoft.com/office/drawing/2010/main" val="0"/>
@@ -6314,7 +6790,7 @@
           </p:nvPr>
         </p:nvPicPr>
         <p:blipFill>
-          <a:blip r:embed="rId14">
+          <a:blip r:embed="rId15">
             <a:extLst>
               <a:ext uri="{28A0092B-C50C-407E-A947-70E740481C1C}">
                 <a14:useLocalDpi xmlns:a14="http://schemas.microsoft.com/office/drawing/2010/main" val="0"/>
@@ -6327,7 +6803,7 @@
         </p:blipFill>
         <p:spPr>
           <a:xfrm>
-            <a:off x="10406103" y="2933467"/>
+            <a:off x="10333757" y="2907340"/>
             <a:ext cx="572952" cy="182857"/>
           </a:xfrm>
           <a:prstGeom prst="rect">
@@ -6354,7 +6830,7 @@
           </p:nvPr>
         </p:nvPicPr>
         <p:blipFill>
-          <a:blip r:embed="rId15">
+          <a:blip r:embed="rId16">
             <a:extLst>
               <a:ext uri="{28A0092B-C50C-407E-A947-70E740481C1C}">
                 <a14:useLocalDpi xmlns:a14="http://schemas.microsoft.com/office/drawing/2010/main" val="0"/>
@@ -6499,11 +6975,19 @@
             </a:r>
             <a:r>
               <a:rPr lang="en-US" dirty="0" err="1"/>
-              <a:t>Preiner</a:t>
-            </a:r>
-            <a:r>
-              <a:rPr lang="en-US" dirty="0"/>
-              <a:t> et al.] in proving all but one invertibility equivalences from the 162 presented by [</a:t>
+              <a:t>Niemetz</a:t>
+            </a:r>
+            <a:r>
+              <a:rPr lang="en-US" dirty="0"/>
+              <a:t> et al</a:t>
+            </a:r>
+            <a:r>
+              <a:rPr lang="en-US"/>
+              <a:t>., CADE 2019</a:t>
+            </a:r>
+            <a:r>
+              <a:rPr lang="en-US" dirty="0"/>
+              <a:t>] in proving all but one invertibility equivalences from the 162 presented by [</a:t>
             </a:r>
             <a:r>
               <a:rPr lang="en-US" dirty="0" err="1"/>
@@ -6511,13 +6995,7 @@
             </a:r>
             <a:r>
               <a:rPr lang="en-US" dirty="0"/>
-              <a:t> et al.]</a:t>
-            </a:r>
-          </a:p>
-          <a:p>
-            <a:r>
-              <a:rPr lang="en-US" dirty="0"/>
-              <a:t>We did this in the Coq proof assistant</a:t>
+              <a:t> et al., CAV 2018] We did this in the Coq proof assistant</a:t>
             </a:r>
           </a:p>
           <a:p>
@@ -6738,13 +7216,13 @@
           <a:p>
             <a:r>
               <a:rPr lang="en-US" dirty="0"/>
-              <a:t>[Gupta et al.] Aarti Gupta, Allan L. Fisher. Representation and Symbolic Manipulation of Linearly Inductive Boolean Functions. In proceedings of ICCAD '93 of the 1993 IEEE/ACM international conference on Computer-aided design, pages 192-199.</a:t>
-            </a:r>
-          </a:p>
-          <a:p>
-            <a:r>
-              <a:rPr lang="en-US" dirty="0"/>
-              <a:t>[Armando et al.] Alessandro Armando, Jacopo </a:t>
+              <a:t>[Gupta et al., 1993] Aarti Gupta, Allan L. Fisher. Representation and Symbolic Manipulation of Linearly Inductive Boolean Functions. In proceedings of ICCAD '93 of the 1993 IEEE/ACM international conference on Computer-aided design, pages 192-199.</a:t>
+            </a:r>
+          </a:p>
+          <a:p>
+            <a:r>
+              <a:rPr lang="en-US" dirty="0"/>
+              <a:t>[Armando et al., 2006] Alessandro Armando, Jacopo </a:t>
             </a:r>
             <a:r>
               <a:rPr lang="en-US" dirty="0" err="1"/>
@@ -6774,7 +7252,7 @@
             </a:r>
             <a:r>
               <a:rPr lang="en-US" dirty="0"/>
-              <a:t> et al.] Cristian </a:t>
+              <a:t> et al., 2006] Cristian </a:t>
             </a:r>
             <a:r>
               <a:rPr lang="en-US" dirty="0" err="1"/>
@@ -6796,7 +7274,7 @@
             </a:r>
             <a:r>
               <a:rPr lang="en-US" dirty="0"/>
-              <a:t> et al.] </a:t>
+              <a:t> et al., CAV 2018] </a:t>
             </a:r>
             <a:r>
               <a:rPr lang="en-US" dirty="0" err="1"/>
@@ -6838,11 +7316,11 @@
             </a:r>
             <a:r>
               <a:rPr lang="en-US" dirty="0" err="1"/>
-              <a:t>Preiner</a:t>
-            </a:r>
-            <a:r>
-              <a:rPr lang="en-US" dirty="0"/>
-              <a:t> et al.] </a:t>
+              <a:t>Niemetz</a:t>
+            </a:r>
+            <a:r>
+              <a:rPr lang="en-US" dirty="0"/>
+              <a:t> et al., CADE 2019] </a:t>
             </a:r>
             <a:r>
               <a:rPr lang="en-US" dirty="0" err="1"/>
@@ -6896,7 +7374,7 @@
             </a:r>
             <a:r>
               <a:rPr lang="en-US" dirty="0"/>
-              <a:t> et al.] </a:t>
+              <a:t> et al., 2017] </a:t>
             </a:r>
             <a:r>
               <a:rPr lang="en-US" dirty="0" err="1"/>
@@ -7057,7 +7535,7 @@
             </a:r>
             <a:r>
               <a:rPr lang="en-US" sz="3600" dirty="0"/>
-              <a:t>[Gupta et al.]</a:t>
+              <a:t>[Gupta et al., 1993]</a:t>
             </a:r>
             <a:endParaRPr lang="en-US" sz="3500" dirty="0"/>
           </a:p>
@@ -7069,7 +7547,7 @@
             </a:r>
             <a:r>
               <a:rPr lang="en-US" sz="3600" dirty="0"/>
-              <a:t>[Armando et al.]</a:t>
+              <a:t>[Armando et al., 2006]</a:t>
             </a:r>
             <a:endParaRPr lang="en-US" sz="3500" dirty="0"/>
           </a:p>
@@ -7089,7 +7567,7 @@
             </a:r>
             <a:r>
               <a:rPr lang="en-US" sz="3600" dirty="0"/>
-              <a:t> et al.]</a:t>
+              <a:t> et al., 2006 ]</a:t>
             </a:r>
             <a:endParaRPr lang="en-US" sz="3500" dirty="0"/>
           </a:p>
@@ -7225,7 +7703,7 @@
             </a:r>
             <a:r>
               <a:rPr lang="en-US" sz="3200" dirty="0"/>
-              <a:t> et al.] </a:t>
+              <a:t> et al., CAV 2018] </a:t>
             </a:r>
           </a:p>
           <a:p>
@@ -7387,7 +7865,7 @@
             </a:pPr>
             <a:r>
               <a:rPr lang="en-US" dirty="0"/>
-              <a:t>We call this equivalence an invertibility equivalence.</a:t>
+              <a:t>We call this equivalence an invertibility equivalence</a:t>
             </a:r>
           </a:p>
         </p:txBody>
@@ -7791,7 +8269,7 @@
             </a:r>
             <a:r>
               <a:rPr lang="en-US" dirty="0"/>
-              <a:t> et al.] requires these equivalences to be true independent of bit-width</a:t>
+              <a:t> et al., CAV 2018] requires these equivalences to be true independent of bit-width</a:t>
             </a:r>
           </a:p>
           <a:p>
@@ -7896,7 +8374,7 @@
             </a:r>
             <a:r>
               <a:rPr lang="en-US" dirty="0"/>
-              <a:t> et al.] generated 162 invertibility equivalences, and proved them using SMT-solvers for bit-widths up to 65</a:t>
+              <a:t> et al., CAV 2018] generated 162 invertibility equivalences, and proved them using SMT-solvers for bit-widths up to 65</a:t>
             </a:r>
           </a:p>
           <a:p>
@@ -7906,11 +8384,11 @@
             </a:r>
             <a:r>
               <a:rPr lang="en-US" dirty="0" err="1"/>
-              <a:t>Preiner</a:t>
-            </a:r>
-            <a:r>
-              <a:rPr lang="en-US" dirty="0"/>
-              <a:t> et al.] encoded the equivalences in theories supported by SMT-solvers to reason about parametric bit-widths</a:t>
+              <a:t>Niemetz</a:t>
+            </a:r>
+            <a:r>
+              <a:rPr lang="en-US" dirty="0"/>
+              <a:t> et al., CADE 2019] encoded the equivalences in theories supported by SMT-solvers to reason about parametric bit-widths</a:t>
             </a:r>
           </a:p>
           <a:p>
@@ -7920,11 +8398,11 @@
             </a:r>
             <a:r>
               <a:rPr lang="en-US" dirty="0" err="1"/>
-              <a:t>Preiner</a:t>
-            </a:r>
-            <a:r>
-              <a:rPr lang="en-US" dirty="0"/>
-              <a:t> et al.] failed on over a quarter of the equivalences</a:t>
+              <a:t>Niemetz</a:t>
+            </a:r>
+            <a:r>
+              <a:rPr lang="en-US" dirty="0"/>
+              <a:t> et al., CADE 2019] failed on over a quarter of the equivalences</a:t>
             </a:r>
           </a:p>
           <a:p>
@@ -8127,10 +8605,10 @@
       </p:pic>
       <p:pic>
         <p:nvPicPr>
-          <p:cNvPr id="12" name="Picture 11">
+          <p:cNvPr id="6" name="Picture 5">
             <a:extLst>
               <a:ext uri="{FF2B5EF4-FFF2-40B4-BE49-F238E27FC236}">
-                <a16:creationId xmlns:a16="http://schemas.microsoft.com/office/drawing/2014/main" id="{59A43907-6701-4CFA-93AD-EA9096B31568}"/>
+                <a16:creationId xmlns:a16="http://schemas.microsoft.com/office/drawing/2014/main" id="{094FD448-50EC-46A5-835A-025DE843DC4B}"/>
               </a:ext>
             </a:extLst>
           </p:cNvPr>
@@ -8157,8 +8635,8 @@
         </p:blipFill>
         <p:spPr>
           <a:xfrm>
-            <a:off x="6904141" y="1674398"/>
-            <a:ext cx="5117285" cy="1018284"/>
+            <a:off x="6676799" y="1690688"/>
+            <a:ext cx="5248726" cy="824721"/>
           </a:xfrm>
           <a:prstGeom prst="rect">
             <a:avLst/>
@@ -8200,6 +8678,25 @@
 <file path=ppt/tags/tag10.xml><?xml version="1.0" encoding="utf-8"?>
 <p:tagLst xmlns:a="http://schemas.openxmlformats.org/drawingml/2006/main" xmlns:r="http://schemas.openxmlformats.org/officeDocument/2006/relationships" xmlns:p="http://schemas.openxmlformats.org/presentationml/2006/main">
   <p:tag name="OUTPUTDPI" val="1200"/>
+  <p:tag name="ORIGINALHEIGHT" val="266.2167"/>
+  <p:tag name="ORIGINALWIDTH" val="1948.256"/>
+  <p:tag name="LATEXADDIN" val="\documentclass{article}&#10;\usepackage{amsmath}&#10;\usepackage{xspace}&#10;\usepackage[dvipsnames]{xcolor}&#10;\pagestyle{empty}&#10;\begin{document}&#10;\noindent \color{NavyBlue}&#10;$\texttt{bvshr\_ugt\_rtl:}\ \forall n.\ \forall x, s, t : \sigma_{[n]}.\ $ \\ &#10;$\phantom{\quad} (x &gt;\kern-.3em&gt; s) &lt;_u t&#10;\ \to \ &#10; t &lt;_u ({\ensuremath{{\sim}\,}\xspace} s &gt;\kern-.3em&gt; s)$&#10;\end{document}"/>
+  <p:tag name="IGUANATEXSIZE" val="28"/>
+  <p:tag name="IGUANATEXCURSOR" val="186"/>
+  <p:tag name="TRANSPARENCY" val="True"/>
+  <p:tag name="FILENAME" val=""/>
+  <p:tag name="LATEXENGINEID" val="0"/>
+  <p:tag name="TEMPFOLDER" val="c:\temp\"/>
+  <p:tag name="LATEXFORMHEIGHT" val="312"/>
+  <p:tag name="LATEXFORMWIDTH" val="384"/>
+  <p:tag name="LATEXFORMWRAP" val="True"/>
+  <p:tag name="BITMAPVECTOR" val="0"/>
+</p:tagLst>
+</file>
+
+<file path=ppt/tags/tag11.xml><?xml version="1.0" encoding="utf-8"?>
+<p:tagLst xmlns:a="http://schemas.openxmlformats.org/drawingml/2006/main" xmlns:r="http://schemas.openxmlformats.org/officeDocument/2006/relationships" xmlns:p="http://schemas.openxmlformats.org/presentationml/2006/main">
+  <p:tag name="OUTPUTDPI" val="1200"/>
   <p:tag name="ORIGINALHEIGHT" val="137.2328"/>
   <p:tag name="ORIGINALWIDTH" val="4185.227"/>
   <p:tag name="LATEXADDIN" val="\documentclass{article}&#10;\usepackage{amsmath}&#10;\usepackage{xspace}&#10;\usepackage[dvipsnames]{xcolor}&#10;\pagestyle{empty}&#10;\begin{document}&#10;\noindent\color{NavyBlue}$\texttt{bvshr\_ugt\_rtl: } \forall n.\ \forall s, t : \sigma_{[n]}.\  &#10;(\exists x : \sigma_{[n]}.\ (x &gt;\kern-.3em&gt; s) &lt;_u t)&#10;\to t &lt;_u ({\ensuremath{{\sim}\,}\xspace} s &gt;\kern-.3em&gt; s)$&#10;\end{document}"/>
@@ -8216,7 +8713,64 @@
 </p:tagLst>
 </file>
 
-<file path=ppt/tags/tag11.xml><?xml version="1.0" encoding="utf-8"?>
+<file path=ppt/tags/tag12.xml><?xml version="1.0" encoding="utf-8"?>
+<p:tagLst xmlns:a="http://schemas.openxmlformats.org/drawingml/2006/main" xmlns:r="http://schemas.openxmlformats.org/officeDocument/2006/relationships" xmlns:p="http://schemas.openxmlformats.org/presentationml/2006/main">
+  <p:tag name="OUTPUTDPI" val="1200"/>
+  <p:tag name="ORIGINALHEIGHT" val="137.2328"/>
+  <p:tag name="ORIGINALWIDTH" val="3211.099"/>
+  <p:tag name="LATEXADDIN" val="\documentclass{article}&#10;\usepackage{amsmath}&#10;\usepackage{xspace}&#10;\usepackage[dvipsnames]{xcolor}&#10;\pagestyle{empty}&#10;\begin{document}&#10;\color{NavyBlue}$\texttt{msb\_zero: }\forall n.\ \forall s : \sigma_{[n]}.\ n_s &lt; l_s \to s[(l_s - 1)...n_s] = [0...0]$&#10;\end{document}"/>
+  <p:tag name="IGUANATEXSIZE" val="20"/>
+  <p:tag name="IGUANATEXCURSOR" val="239"/>
+  <p:tag name="TRANSPARENCY" val="True"/>
+  <p:tag name="FILENAME" val=""/>
+  <p:tag name="LATEXENGINEID" val="0"/>
+  <p:tag name="TEMPFOLDER" val="c:\temp\"/>
+  <p:tag name="LATEXFORMHEIGHT" val="312"/>
+  <p:tag name="LATEXFORMWIDTH" val="384"/>
+  <p:tag name="LATEXFORMWRAP" val="True"/>
+  <p:tag name="BITMAPVECTOR" val="0"/>
+</p:tagLst>
+</file>
+
+<file path=ppt/tags/tag13.xml><?xml version="1.0" encoding="utf-8"?>
+<p:tagLst xmlns:a="http://schemas.openxmlformats.org/drawingml/2006/main" xmlns:r="http://schemas.openxmlformats.org/officeDocument/2006/relationships" xmlns:p="http://schemas.openxmlformats.org/presentationml/2006/main">
+  <p:tag name="OUTPUTDPI" val="1200"/>
+  <p:tag name="ORIGINALHEIGHT" val="714.6606"/>
+  <p:tag name="ORIGINALWIDTH" val="1484.814"/>
+  <p:tag name="LATEXADDIN" val="\documentclass{article}&#10;\usepackage{amsmath}&#10;\usepackage{xspace}&#10;\usepackage[dvipsnames]{xcolor}&#10;\pagestyle{empty}&#10;\begin{document}&#10;\noindent \color{NavyBlue} $n_s = toNat(s)$ \newline&#10;$l_s = length(s)$ \newline&#10;\\&#10;\\&#10;\noindent \color{black} \textsf{For example, consider} $l_s = 4$&#10;\end{document}"/>
+  <p:tag name="IGUANATEXSIZE" val="20"/>
+  <p:tag name="IGUANATEXCURSOR" val="272"/>
+  <p:tag name="TRANSPARENCY" val="True"/>
+  <p:tag name="FILENAME" val=""/>
+  <p:tag name="LATEXENGINEID" val="0"/>
+  <p:tag name="TEMPFOLDER" val="c:\temp\"/>
+  <p:tag name="LATEXFORMHEIGHT" val="312"/>
+  <p:tag name="LATEXFORMWIDTH" val="384"/>
+  <p:tag name="LATEXFORMWRAP" val="True"/>
+  <p:tag name="BITMAPVECTOR" val="0"/>
+</p:tagLst>
+</file>
+
+<file path=ppt/tags/tag14.xml><?xml version="1.0" encoding="utf-8"?>
+<p:tagLst xmlns:a="http://schemas.openxmlformats.org/drawingml/2006/main" xmlns:r="http://schemas.openxmlformats.org/officeDocument/2006/relationships" xmlns:p="http://schemas.openxmlformats.org/presentationml/2006/main">
+  <p:tag name="OUTPUTDPI" val="1200"/>
+  <p:tag name="ORIGINALHEIGHT" val="1367.829"/>
+  <p:tag name="ORIGINALWIDTH" val="3229.096"/>
+  <p:tag name="LATEXADDIN" val="\documentclass{article}&#10;\usepackage{amsmath}&#10;\usepackage{xspace}&#10;\usepackage[dvipsnames]{xcolor}&#10;\pagestyle{empty}&#10;\begin{document}&#10;\color{NavyBlue}&#10;\begin{align*}&#10;S &amp;= \sum_{i=0}^{l_s - 1} s[i] \cdot 2^i \\&#10; &amp;= s[l_s - 1] \cdot 2^{l_s - 1} + ... + s[1] \cdot 2^1 + s[0] \cdot 2^0 \\&#10;&amp;\color{black}\textsf{But } S &lt; l_s\\&#10;\color{NavyBlue}&#10; &amp;= s[l_s - 1] \cdot 2^{l_s - 1} + ... + s[S] \cdot 2^S + ... + s[1] \cdot 2^1 + s[0] \cdot 2^0 \\&#10;&amp;\color{black}&#10;S &lt; 2^S &lt; 2^{S+1} &lt; ... &lt; 2^{l_s - 1}\\&#10;&amp;\color{black}\textsf{Thus, the coefficients of } 2^S, ..., 2^{l_s - 1} \textsf{ are }0.&#10;\end{align*}&#10;\end{document}"/>
+  <p:tag name="IGUANATEXSIZE" val="20"/>
+  <p:tag name="IGUANATEXCURSOR" val="572"/>
+  <p:tag name="TRANSPARENCY" val="True"/>
+  <p:tag name="FILENAME" val=""/>
+  <p:tag name="LATEXENGINEID" val="0"/>
+  <p:tag name="TEMPFOLDER" val="c:\temp\"/>
+  <p:tag name="LATEXFORMHEIGHT" val="312"/>
+  <p:tag name="LATEXFORMWIDTH" val="384"/>
+  <p:tag name="LATEXFORMWRAP" val="True"/>
+  <p:tag name="BITMAPVECTOR" val="0"/>
+</p:tagLst>
+</file>
+
+<file path=ppt/tags/tag15.xml><?xml version="1.0" encoding="utf-8"?>
 <p:tagLst xmlns:a="http://schemas.openxmlformats.org/drawingml/2006/main" xmlns:r="http://schemas.openxmlformats.org/officeDocument/2006/relationships" xmlns:p="http://schemas.openxmlformats.org/presentationml/2006/main">
   <p:tag name="OUTPUTDPI" val="1200"/>
   <p:tag name="ORIGINALHEIGHT" val="137.2328"/>
@@ -8235,14 +8789,14 @@
 </p:tagLst>
 </file>
 
-<file path=ppt/tags/tag12.xml><?xml version="1.0" encoding="utf-8"?>
+<file path=ppt/tags/tag16.xml><?xml version="1.0" encoding="utf-8"?>
 <p:tagLst xmlns:a="http://schemas.openxmlformats.org/drawingml/2006/main" xmlns:r="http://schemas.openxmlformats.org/officeDocument/2006/relationships" xmlns:p="http://schemas.openxmlformats.org/presentationml/2006/main">
   <p:tag name="OUTPUTDPI" val="1200"/>
-  <p:tag name="ORIGINALHEIGHT" val="714.6606"/>
-  <p:tag name="ORIGINALWIDTH" val="4288.714"/>
-  <p:tag name="LATEXADDIN" val="\documentclass{article}&#10;\usepackage{amsmath}&#10;\usepackage{xspace}&#10;\usepackage[dvipsnames]{xcolor}&#10;\pagestyle{empty}&#10;\begin{document}&#10;\noindent $S = toNat(s)$ \newline&#10;$l_s = length(s)$ \newline&#10;In other words, \texttt{msb\_zero} states that when $S &lt; l_s$, the most significant $l_s - S$ bits of $s$ are $0$. \newline&#10;For example, consider $l_s = 4$&#10;\end{document}"/>
+  <p:tag name="ORIGINALHEIGHT" val="123.7346"/>
+  <p:tag name="ORIGINALWIDTH" val="902.1373"/>
+  <p:tag name="LATEXADDIN" val="\documentclass{article}&#10;\usepackage{amsmath}&#10;\pagestyle{empty}&#10;\begin{document}&#10;s: $[\ 0\ ... \ 0\ \_\ ... \ \_\ ]$&#10;\end{document}"/>
   <p:tag name="IGUANATEXSIZE" val="20"/>
-  <p:tag name="IGUANATEXCURSOR" val="227"/>
+  <p:tag name="IGUANATEXCURSOR" val="111"/>
   <p:tag name="TRANSPARENCY" val="True"/>
   <p:tag name="FILENAME" val=""/>
   <p:tag name="LATEXENGINEID" val="0"/>
@@ -8254,64 +8808,7 @@
 </p:tagLst>
 </file>
 
-<file path=ppt/tags/tag13.xml><?xml version="1.0" encoding="utf-8"?>
-<p:tagLst xmlns:a="http://schemas.openxmlformats.org/drawingml/2006/main" xmlns:r="http://schemas.openxmlformats.org/officeDocument/2006/relationships" xmlns:p="http://schemas.openxmlformats.org/presentationml/2006/main">
-  <p:tag name="OUTPUTDPI" val="1200"/>
-  <p:tag name="ORIGINALHEIGHT" val="1367.829"/>
-  <p:tag name="ORIGINALWIDTH" val="3229.096"/>
-  <p:tag name="LATEXADDIN" val="\documentclass{article}&#10;\usepackage{amsmath}&#10;\usepackage{xspace}&#10;\usepackage[dvipsnames]{xcolor}&#10;\pagestyle{empty}&#10;\begin{document}&#10;\color{NavyBlue}&#10;\begin{align*}&#10;S &amp;= \sum_{i=0}^{l_s - 1} s[i] \cdot 2^i \\&#10; &amp;= s[l_s - 1] \cdot 2^{l_s - 1} + ... + s[1] \cdot 2^1 + s[0] \cdot 2^0 \\&#10;&amp;\color{black}\text{But } S &lt; l_s\\&#10;\color{NavyBlue}&#10; &amp;= s[l_s - 1] \cdot 2^{l_s - 1} + ... + s[S] \cdot 2^S + ... + s[1] \cdot 2^1 + s[0] \cdot 2^0 \\&#10;&amp;\color{black}&#10;S &lt; 2^S &lt; 2^{S+1} &lt; ... &lt; 2^{l_s - 1}\\&#10;&amp;\color{black}\text{Thus, the coefficients of } 2^S, ..., 2^{l_s - 1} \text{ are }0.&#10;\end{align*}&#10;\end{document}"/>
-  <p:tag name="IGUANATEXSIZE" val="20"/>
-  <p:tag name="IGUANATEXCURSOR" val="519"/>
-  <p:tag name="TRANSPARENCY" val="True"/>
-  <p:tag name="FILENAME" val=""/>
-  <p:tag name="LATEXENGINEID" val="0"/>
-  <p:tag name="TEMPFOLDER" val="c:\temp\"/>
-  <p:tag name="LATEXFORMHEIGHT" val="312"/>
-  <p:tag name="LATEXFORMWIDTH" val="384"/>
-  <p:tag name="LATEXFORMWRAP" val="True"/>
-  <p:tag name="BITMAPVECTOR" val="0"/>
-</p:tagLst>
-</file>
-
-<file path=ppt/tags/tag14.xml><?xml version="1.0" encoding="utf-8"?>
-<p:tagLst xmlns:a="http://schemas.openxmlformats.org/drawingml/2006/main" xmlns:r="http://schemas.openxmlformats.org/officeDocument/2006/relationships" xmlns:p="http://schemas.openxmlformats.org/presentationml/2006/main">
-  <p:tag name="OUTPUTDPI" val="1200"/>
-  <p:tag name="ORIGINALHEIGHT" val="137.2328"/>
-  <p:tag name="ORIGINALWIDTH" val="3122.61"/>
-  <p:tag name="LATEXADDIN" val="\documentclass{article}&#10;\usepackage{amsmath}&#10;\usepackage{xspace}&#10;\usepackage[dvipsnames]{xcolor}&#10;\pagestyle{empty}&#10;\begin{document}&#10;\color{NavyBlue}$\texttt{msb\_zero: }\forall n.\ \forall s : \sigma_{[n]}.\ S &lt; l_s \to s[(l_s - 1)...S] = [0...0]$&#10;\end{document}"/>
-  <p:tag name="IGUANATEXSIZE" val="20"/>
-  <p:tag name="IGUANATEXCURSOR" val="235"/>
-  <p:tag name="TRANSPARENCY" val="True"/>
-  <p:tag name="FILENAME" val=""/>
-  <p:tag name="LATEXENGINEID" val="0"/>
-  <p:tag name="TEMPFOLDER" val="c:\temp\"/>
-  <p:tag name="LATEXFORMHEIGHT" val="312"/>
-  <p:tag name="LATEXFORMWIDTH" val="384"/>
-  <p:tag name="LATEXFORMWRAP" val="True"/>
-  <p:tag name="BITMAPVECTOR" val="0"/>
-</p:tagLst>
-</file>
-
-<file path=ppt/tags/tag15.xml><?xml version="1.0" encoding="utf-8"?>
-<p:tagLst xmlns:a="http://schemas.openxmlformats.org/drawingml/2006/main" xmlns:r="http://schemas.openxmlformats.org/officeDocument/2006/relationships" xmlns:p="http://schemas.openxmlformats.org/presentationml/2006/main">
-  <p:tag name="OUTPUTDPI" val="1200"/>
-  <p:tag name="ORIGINALHEIGHT" val="123.7346"/>
-  <p:tag name="ORIGINALWIDTH" val="941.1324"/>
-  <p:tag name="LATEXADDIN" val="\documentclass{article}&#10;\usepackage{amsmath}&#10;\pagestyle{empty}&#10;\begin{document}&#10;s: $[\ 0\ ... \ 0\ \text{\sffamily x}\ ... \ x\ ]$&#10;\end{document}"/>
-  <p:tag name="IGUANATEXSIZE" val="20"/>
-  <p:tag name="IGUANATEXCURSOR" val="116"/>
-  <p:tag name="TRANSPARENCY" val="True"/>
-  <p:tag name="FILENAME" val=""/>
-  <p:tag name="LATEXENGINEID" val="0"/>
-  <p:tag name="TEMPFOLDER" val="c:\temp\"/>
-  <p:tag name="LATEXFORMHEIGHT" val="312"/>
-  <p:tag name="LATEXFORMWIDTH" val="384"/>
-  <p:tag name="LATEXFORMWRAP" val="True"/>
-  <p:tag name="BITMAPVECTOR" val="0"/>
-</p:tagLst>
-</file>
-
-<file path=ppt/tags/tag16.xml><?xml version="1.0" encoding="utf-8"?>
+<file path=ppt/tags/tag17.xml><?xml version="1.0" encoding="utf-8"?>
 <p:tagLst xmlns:a="http://schemas.openxmlformats.org/drawingml/2006/main" xmlns:r="http://schemas.openxmlformats.org/officeDocument/2006/relationships" xmlns:p="http://schemas.openxmlformats.org/presentationml/2006/main">
   <p:tag name="OUTPUTDPI" val="1200"/>
   <p:tag name="ORIGINALHEIGHT" val="105.7368"/>
@@ -8330,7 +8827,7 @@
 </p:tagLst>
 </file>
 
-<file path=ppt/tags/tag17.xml><?xml version="1.0" encoding="utf-8"?>
+<file path=ppt/tags/tag18.xml><?xml version="1.0" encoding="utf-8"?>
 <p:tagLst xmlns:a="http://schemas.openxmlformats.org/drawingml/2006/main" xmlns:r="http://schemas.openxmlformats.org/officeDocument/2006/relationships" xmlns:p="http://schemas.openxmlformats.org/presentationml/2006/main">
   <p:tag name="OUTPUTDPI" val="1200"/>
   <p:tag name="ORIGINALHEIGHT" val="89.98874"/>
@@ -8349,7 +8846,7 @@
 </p:tagLst>
 </file>
 
-<file path=ppt/tags/tag18.xml><?xml version="1.0" encoding="utf-8"?>
+<file path=ppt/tags/tag19.xml><?xml version="1.0" encoding="utf-8"?>
 <p:tagLst xmlns:a="http://schemas.openxmlformats.org/drawingml/2006/main" xmlns:r="http://schemas.openxmlformats.org/officeDocument/2006/relationships" xmlns:p="http://schemas.openxmlformats.org/presentationml/2006/main">
   <p:tag name="OUTPUTDPI" val="1200"/>
   <p:tag name="ORIGINALHEIGHT" val="89.98874"/>
@@ -8357,25 +8854,6 @@
   <p:tag name="LATEXADDIN" val="\documentclass{article}&#10;\usepackage{amsmath}&#10;\pagestyle{empty}&#10;\begin{document}&#10;$S-1$&#10;\end{document}"/>
   <p:tag name="IGUANATEXSIZE" val="20"/>
   <p:tag name="IGUANATEXCURSOR" val="84"/>
-  <p:tag name="TRANSPARENCY" val="True"/>
-  <p:tag name="FILENAME" val=""/>
-  <p:tag name="LATEXENGINEID" val="0"/>
-  <p:tag name="TEMPFOLDER" val="c:\temp\"/>
-  <p:tag name="LATEXFORMHEIGHT" val="312"/>
-  <p:tag name="LATEXFORMWIDTH" val="384"/>
-  <p:tag name="LATEXFORMWRAP" val="True"/>
-  <p:tag name="BITMAPVECTOR" val="0"/>
-</p:tagLst>
-</file>
-
-<file path=ppt/tags/tag19.xml><?xml version="1.0" encoding="utf-8"?>
-<p:tagLst xmlns:a="http://schemas.openxmlformats.org/drawingml/2006/main" xmlns:r="http://schemas.openxmlformats.org/officeDocument/2006/relationships" xmlns:p="http://schemas.openxmlformats.org/presentationml/2006/main">
-  <p:tag name="OUTPUTDPI" val="1200"/>
-  <p:tag name="ORIGINALHEIGHT" val="85.48929"/>
-  <p:tag name="ORIGINALWIDTH" val="53.24331"/>
-  <p:tag name="LATEXADDIN" val="\documentclass{article}&#10;\usepackage{amsmath}&#10;\pagestyle{empty}&#10;\begin{document}&#10;$0$&#10;\end{document}"/>
-  <p:tag name="IGUANATEXSIZE" val="20"/>
-  <p:tag name="IGUANATEXCURSOR" val="82"/>
   <p:tag name="TRANSPARENCY" val="True"/>
   <p:tag name="FILENAME" val=""/>
   <p:tag name="LATEXENGINEID" val="0"/>
@@ -8395,6 +8873,25 @@
   <p:tag name="LATEXADDIN" val="\documentclass{article}&#10;\usepackage{amsmath}&#10;\usepackage[dvipsnames]{xcolor}&#10;\pagestyle{empty}&#10;\begin{document}&#10;\color{NavyBlue}$IC\ [\ s\ ,\ t\ ]$&#10;\end{document}"/>
   <p:tag name="IGUANATEXSIZE" val="28"/>
   <p:tag name="IGUANATEXCURSOR" val="128"/>
+  <p:tag name="TRANSPARENCY" val="True"/>
+  <p:tag name="FILENAME" val=""/>
+  <p:tag name="LATEXENGINEID" val="0"/>
+  <p:tag name="TEMPFOLDER" val="c:\temp\"/>
+  <p:tag name="LATEXFORMHEIGHT" val="312"/>
+  <p:tag name="LATEXFORMWIDTH" val="384"/>
+  <p:tag name="LATEXFORMWRAP" val="True"/>
+  <p:tag name="BITMAPVECTOR" val="0"/>
+</p:tagLst>
+</file>
+
+<file path=ppt/tags/tag20.xml><?xml version="1.0" encoding="utf-8"?>
+<p:tagLst xmlns:a="http://schemas.openxmlformats.org/drawingml/2006/main" xmlns:r="http://schemas.openxmlformats.org/officeDocument/2006/relationships" xmlns:p="http://schemas.openxmlformats.org/presentationml/2006/main">
+  <p:tag name="OUTPUTDPI" val="1200"/>
+  <p:tag name="ORIGINALHEIGHT" val="85.48929"/>
+  <p:tag name="ORIGINALWIDTH" val="53.24331"/>
+  <p:tag name="LATEXADDIN" val="\documentclass{article}&#10;\usepackage{amsmath}&#10;\pagestyle{empty}&#10;\begin{document}&#10;$0$&#10;\end{document}"/>
+  <p:tag name="IGUANATEXSIZE" val="20"/>
+  <p:tag name="IGUANATEXCURSOR" val="82"/>
   <p:tag name="TRANSPARENCY" val="True"/>
   <p:tag name="FILENAME" val=""/>
   <p:tag name="LATEXENGINEID" val="0"/>
@@ -8485,11 +8982,11 @@
 <file path=ppt/tags/tag7.xml><?xml version="1.0" encoding="utf-8"?>
 <p:tagLst xmlns:a="http://schemas.openxmlformats.org/drawingml/2006/main" xmlns:r="http://schemas.openxmlformats.org/officeDocument/2006/relationships" xmlns:p="http://schemas.openxmlformats.org/presentationml/2006/main">
   <p:tag name="OUTPUTDPI" val="1200"/>
-  <p:tag name="ORIGINALHEIGHT" val="560.9299"/>
-  <p:tag name="ORIGINALWIDTH" val="2818.898"/>
-  <p:tag name="LATEXADDIN" val="\documentclass{article}&#10;\usepackage[a4paper]{geometry}&#10;\geometry{textwidth=\paperwidth, textheight=\paperheight, noheadfoot, nomarginpar}&#10;\setlength{\topskip}{0mm}&#10;\setlength{\parindent}{0mm}&#10;\usepackage{amsmath}&#10;\usepackage[dvipsnames]{xcolor}&#10;\usepackage{xspace}&#10;\usepackage{pifont}&#10;\usepackage{amssymb}&#10;\pagestyle{empty}&#10;\begin{document}&#10;{\color{blue}{$\checkmark$}} - Verified by us in Coq for arbitrary bit-width. \\&#10;{\color{OliveGreen}{$\checkmark$}} - Verified by Niemetz et al. using SMT encoding. \\&#10;{\color{blue}{$\checkmark$}\nolinebreak\kern-0.7em\xspace\color{OliveGreen}{$\checkmark$}} - Verified by both us and Preiner et al. \\&#10;{\color{red}\ding{53}} - Verified by neither us nor Preiner et al.&#10;\end{document}"/>
+  <p:tag name="ORIGINALHEIGHT" val="566.1792"/>
+  <p:tag name="ORIGINALWIDTH" val="3603.3"/>
+  <p:tag name="LATEXADDIN" val="\documentclass{article}&#10;\usepackage[a4paper]{geometry}&#10;\geometry{textwidth=\paperwidth, textheight=\paperheight, noheadfoot, nomarginpar}&#10;\setlength{\topskip}{0mm}&#10;\setlength{\parindent}{0mm}&#10;\usepackage{amsmath}&#10;\usepackage[dvipsnames]{xcolor}&#10;\usepackage{xspace}&#10;\usepackage{pifont}&#10;\usepackage{amssymb}&#10;\pagestyle{empty}&#10;\begin{document}&#10;{\color{blue}{$\checkmark$}} - Verified by us in Coq for arbitrary bit-width. \\&#10;{\color{OliveGreen}{$\checkmark$}} - Verified by [Niemetz et al., CADE 2019] using SMT encoding. \\&#10;{\color{blue}{$\checkmark$}\nolinebreak\kern-0.7em\xspace\color{OliveGreen}{$\checkmark$}} - Verified by both us and [Niemetz et al., CADE 2019] \\&#10;{\color{red}\ding{53}} - Verified by neither us nor [Niemetz et al., CADE 2019]&#10;\end{document}"/>
   <p:tag name="IGUANATEXSIZE" val="20"/>
-  <p:tag name="IGUANATEXCURSOR" val="436"/>
+  <p:tag name="IGUANATEXCURSOR" val="743"/>
   <p:tag name="TRANSPARENCY" val="True"/>
   <p:tag name="FILENAME" val=""/>
   <p:tag name="LATEXENGINEID" val="0"/>
@@ -8523,11 +9020,11 @@
 <file path=ppt/tags/tag9.xml><?xml version="1.0" encoding="utf-8"?>
 <p:tagLst xmlns:a="http://schemas.openxmlformats.org/drawingml/2006/main" xmlns:r="http://schemas.openxmlformats.org/officeDocument/2006/relationships" xmlns:p="http://schemas.openxmlformats.org/presentationml/2006/main">
   <p:tag name="OUTPUTDPI" val="1200"/>
-  <p:tag name="ORIGINALHEIGHT" val="560.9299"/>
-  <p:tag name="ORIGINALWIDTH" val="2818.898"/>
-  <p:tag name="LATEXADDIN" val="\documentclass{article}&#10;\usepackage[a4paper]{geometry}&#10;\geometry{textwidth=\paperwidth, textheight=\paperheight, noheadfoot, nomarginpar}&#10;\setlength{\topskip}{0mm}&#10;\setlength{\parindent}{0mm}&#10;\usepackage{amsmath}&#10;\usepackage[dvipsnames]{xcolor}&#10;\usepackage{xspace}&#10;\usepackage{pifont}&#10;\usepackage{amssymb}&#10;\pagestyle{empty}&#10;\begin{document}&#10;{\color{blue}{$\checkmark$}} - Verified by us in Coq for arbitrary bit-width. \\&#10;{\color{OliveGreen}{$\checkmark$}} - Verified by Niemetz et al. using SMT encoding. \\&#10;{\color{blue}{$\checkmark$}\nolinebreak\kern-0.7em\xspace\color{OliveGreen}{$\checkmark$}} - Verified by both us and Preiner et al. \\&#10;{\color{red}\ding{53}} - Verified by neither us nor Preiner et al.&#10;\end{document}"/>
+  <p:tag name="ORIGINALHEIGHT" val="566.1792"/>
+  <p:tag name="ORIGINALWIDTH" val="3603.3"/>
+  <p:tag name="LATEXADDIN" val="\documentclass{article}&#10;\usepackage[a4paper]{geometry}&#10;\geometry{textwidth=\paperwidth, textheight=\paperheight, noheadfoot, nomarginpar}&#10;\setlength{\topskip}{0mm}&#10;\setlength{\parindent}{0mm}&#10;\usepackage{amsmath}&#10;\usepackage[dvipsnames]{xcolor}&#10;\usepackage{xspace}&#10;\usepackage{pifont}&#10;\usepackage{amssymb}&#10;\pagestyle{empty}&#10;\begin{document}&#10;{\color{blue}{$\checkmark$}} - Verified by us in Coq for arbitrary bit-width. \\&#10;{\color{OliveGreen}{$\checkmark$}} - Verified by [Niemetz et al., CADE 2019] using SMT encoding. \\&#10;{\color{blue}{$\checkmark$}\nolinebreak\kern-0.7em\xspace\color{OliveGreen}{$\checkmark$}} - Verified by both us and [Niemetz et al., CADE 2019] \\&#10;{\color{red}\ding{53}} - Verified by neither us nor [Niemetz et al., CADE 2019]&#10;\end{document}"/>
   <p:tag name="IGUANATEXSIZE" val="20"/>
-  <p:tag name="IGUANATEXCURSOR" val="436"/>
+  <p:tag name="IGUANATEXCURSOR" val="743"/>
   <p:tag name="TRANSPARENCY" val="True"/>
   <p:tag name="FILENAME" val=""/>
   <p:tag name="LATEXENGINEID" val="0"/>

</xml_diff>

<commit_message>
Added slides about shifts
</commit_message>
<xml_diff>
--- a/Presentation.pptx
+++ b/Presentation.pptx
@@ -5,7 +5,7 @@
     <p:sldMasterId id="2147483725" r:id="rId1"/>
   </p:sldMasterIdLst>
   <p:notesMasterIdLst>
-    <p:notesMasterId r:id="rId20"/>
+    <p:notesMasterId r:id="rId23"/>
   </p:notesMasterIdLst>
   <p:sldIdLst>
     <p:sldId id="256" r:id="rId2"/>
@@ -23,9 +23,12 @@
     <p:sldId id="272" r:id="rId14"/>
     <p:sldId id="271" r:id="rId15"/>
     <p:sldId id="273" r:id="rId16"/>
-    <p:sldId id="274" r:id="rId17"/>
-    <p:sldId id="275" r:id="rId18"/>
-    <p:sldId id="263" r:id="rId19"/>
+    <p:sldId id="276" r:id="rId17"/>
+    <p:sldId id="277" r:id="rId18"/>
+    <p:sldId id="278" r:id="rId19"/>
+    <p:sldId id="274" r:id="rId20"/>
+    <p:sldId id="275" r:id="rId21"/>
+    <p:sldId id="263" r:id="rId22"/>
   </p:sldIdLst>
   <p:sldSz cx="12192000" cy="6858000"/>
   <p:notesSz cx="6858000" cy="9144000"/>
@@ -214,7 +217,7 @@
           <a:p>
             <a:fld id="{4F5BAD48-3E9D-44CA-B663-82E68EEB1E08}" type="datetimeFigureOut">
               <a:rPr lang="en-US" smtClean="0"/>
-              <a:t>8/9/2019</a:t>
+              <a:t>8/12/2019</a:t>
             </a:fld>
             <a:endParaRPr lang="en-US"/>
           </a:p>
@@ -1184,7 +1187,7 @@
           <a:p>
             <a:fld id="{C8A3F418-5BE6-4764-B372-575D89EC1E3D}" type="datetimeFigureOut">
               <a:rPr lang="en-US" smtClean="0"/>
-              <a:t>8/9/2019</a:t>
+              <a:t>8/12/2019</a:t>
             </a:fld>
             <a:endParaRPr lang="en-US"/>
           </a:p>
@@ -1354,7 +1357,7 @@
           <a:p>
             <a:fld id="{C8A3F418-5BE6-4764-B372-575D89EC1E3D}" type="datetimeFigureOut">
               <a:rPr lang="en-US" smtClean="0"/>
-              <a:t>8/9/2019</a:t>
+              <a:t>8/12/2019</a:t>
             </a:fld>
             <a:endParaRPr lang="en-US"/>
           </a:p>
@@ -1534,7 +1537,7 @@
           <a:p>
             <a:fld id="{C8A3F418-5BE6-4764-B372-575D89EC1E3D}" type="datetimeFigureOut">
               <a:rPr lang="en-US" smtClean="0"/>
-              <a:t>8/9/2019</a:t>
+              <a:t>8/12/2019</a:t>
             </a:fld>
             <a:endParaRPr lang="en-US"/>
           </a:p>
@@ -1704,7 +1707,7 @@
           <a:p>
             <a:fld id="{C8A3F418-5BE6-4764-B372-575D89EC1E3D}" type="datetimeFigureOut">
               <a:rPr lang="en-US" smtClean="0"/>
-              <a:t>8/9/2019</a:t>
+              <a:t>8/12/2019</a:t>
             </a:fld>
             <a:endParaRPr lang="en-US"/>
           </a:p>
@@ -1950,7 +1953,7 @@
           <a:p>
             <a:fld id="{C8A3F418-5BE6-4764-B372-575D89EC1E3D}" type="datetimeFigureOut">
               <a:rPr lang="en-US" smtClean="0"/>
-              <a:t>8/9/2019</a:t>
+              <a:t>8/12/2019</a:t>
             </a:fld>
             <a:endParaRPr lang="en-US"/>
           </a:p>
@@ -2182,7 +2185,7 @@
           <a:p>
             <a:fld id="{C8A3F418-5BE6-4764-B372-575D89EC1E3D}" type="datetimeFigureOut">
               <a:rPr lang="en-US" smtClean="0"/>
-              <a:t>8/9/2019</a:t>
+              <a:t>8/12/2019</a:t>
             </a:fld>
             <a:endParaRPr lang="en-US"/>
           </a:p>
@@ -2549,7 +2552,7 @@
           <a:p>
             <a:fld id="{C8A3F418-5BE6-4764-B372-575D89EC1E3D}" type="datetimeFigureOut">
               <a:rPr lang="en-US" smtClean="0"/>
-              <a:t>8/9/2019</a:t>
+              <a:t>8/12/2019</a:t>
             </a:fld>
             <a:endParaRPr lang="en-US"/>
           </a:p>
@@ -2667,7 +2670,7 @@
           <a:p>
             <a:fld id="{C8A3F418-5BE6-4764-B372-575D89EC1E3D}" type="datetimeFigureOut">
               <a:rPr lang="en-US" smtClean="0"/>
-              <a:t>8/9/2019</a:t>
+              <a:t>8/12/2019</a:t>
             </a:fld>
             <a:endParaRPr lang="en-US"/>
           </a:p>
@@ -2762,7 +2765,7 @@
           <a:p>
             <a:fld id="{C8A3F418-5BE6-4764-B372-575D89EC1E3D}" type="datetimeFigureOut">
               <a:rPr lang="en-US" smtClean="0"/>
-              <a:t>8/9/2019</a:t>
+              <a:t>8/12/2019</a:t>
             </a:fld>
             <a:endParaRPr lang="en-US"/>
           </a:p>
@@ -3039,7 +3042,7 @@
           <a:p>
             <a:fld id="{C8A3F418-5BE6-4764-B372-575D89EC1E3D}" type="datetimeFigureOut">
               <a:rPr lang="en-US" smtClean="0"/>
-              <a:t>8/9/2019</a:t>
+              <a:t>8/12/2019</a:t>
             </a:fld>
             <a:endParaRPr lang="en-US"/>
           </a:p>
@@ -3296,7 +3299,7 @@
           <a:p>
             <a:fld id="{C8A3F418-5BE6-4764-B372-575D89EC1E3D}" type="datetimeFigureOut">
               <a:rPr lang="en-US" smtClean="0"/>
-              <a:t>8/9/2019</a:t>
+              <a:t>8/12/2019</a:t>
             </a:fld>
             <a:endParaRPr lang="en-US"/>
           </a:p>
@@ -3509,7 +3512,7 @@
           <a:p>
             <a:fld id="{C8A3F418-5BE6-4764-B372-575D89EC1E3D}" type="datetimeFigureOut">
               <a:rPr lang="en-US" smtClean="0"/>
-              <a:t>8/9/2019</a:t>
+              <a:t>8/12/2019</a:t>
             </a:fld>
             <a:endParaRPr lang="en-US"/>
           </a:p>
@@ -6925,7 +6928,7 @@
           <p:cNvPr id="2" name="Title 1">
             <a:extLst>
               <a:ext uri="{FF2B5EF4-FFF2-40B4-BE49-F238E27FC236}">
-                <a16:creationId xmlns:a16="http://schemas.microsoft.com/office/drawing/2014/main" id="{74724F7D-A2A7-413F-8A5D-63FDD844CDB6}"/>
+                <a16:creationId xmlns:a16="http://schemas.microsoft.com/office/drawing/2014/main" id="{93F188A5-F597-4554-B098-258504E498B9}"/>
               </a:ext>
             </a:extLst>
           </p:cNvPr>
@@ -6943,81 +6946,55 @@
           <a:p>
             <a:r>
               <a:rPr lang="en-US" dirty="0"/>
-              <a:t>Conclusion</a:t>
-            </a:r>
-          </a:p>
-        </p:txBody>
-      </p:sp>
-      <p:sp>
-        <p:nvSpPr>
-          <p:cNvPr id="3" name="Content Placeholder 2">
+              <a:t>Definition of Shift</a:t>
+            </a:r>
+          </a:p>
+        </p:txBody>
+      </p:sp>
+      <p:pic>
+        <p:nvPicPr>
+          <p:cNvPr id="53" name="Picture 52">
             <a:extLst>
               <a:ext uri="{FF2B5EF4-FFF2-40B4-BE49-F238E27FC236}">
-                <a16:creationId xmlns:a16="http://schemas.microsoft.com/office/drawing/2014/main" id="{62F0D559-E3A1-4CF8-AA96-7C19771E7359}"/>
+                <a16:creationId xmlns:a16="http://schemas.microsoft.com/office/drawing/2014/main" id="{DCF4466C-E10F-4099-AABE-8F8CBBDF39B1}"/>
               </a:ext>
             </a:extLst>
           </p:cNvPr>
-          <p:cNvSpPr>
-            <a:spLocks noGrp="1"/>
-          </p:cNvSpPr>
-          <p:nvPr>
-            <p:ph idx="1"/>
-          </p:nvPr>
-        </p:nvSpPr>
-        <p:spPr/>
-        <p:txBody>
-          <a:bodyPr/>
-          <a:lstStyle/>
-          <a:p>
-            <a:r>
-              <a:rPr lang="en-US" dirty="0"/>
-              <a:t>We complemented [</a:t>
-            </a:r>
-            <a:r>
-              <a:rPr lang="en-US" dirty="0" err="1"/>
-              <a:t>Niemetz</a:t>
-            </a:r>
-            <a:r>
-              <a:rPr lang="en-US" dirty="0"/>
-              <a:t> et al</a:t>
-            </a:r>
-            <a:r>
-              <a:rPr lang="en-US"/>
-              <a:t>., CADE 2019</a:t>
-            </a:r>
-            <a:r>
-              <a:rPr lang="en-US" dirty="0"/>
-              <a:t>] in proving all but one invertibility equivalences from the 162 presented by [</a:t>
-            </a:r>
-            <a:r>
-              <a:rPr lang="en-US" dirty="0" err="1"/>
-              <a:t>Niemetz</a:t>
-            </a:r>
-            <a:r>
-              <a:rPr lang="en-US" dirty="0"/>
-              <a:t> et al., CAV 2018] We did this in the Coq proof assistant</a:t>
-            </a:r>
-          </a:p>
-          <a:p>
-            <a:r>
-              <a:rPr lang="en-US" dirty="0"/>
-              <a:t>We extended the Coq bit-vector library for </a:t>
-            </a:r>
-            <a:r>
-              <a:rPr lang="en-US" dirty="0" err="1"/>
-              <a:t>SMTCoq</a:t>
-            </a:r>
-            <a:r>
-              <a:rPr lang="en-US" dirty="0"/>
-              <a:t> to do this</a:t>
-            </a:r>
-          </a:p>
-        </p:txBody>
-      </p:sp>
+          <p:cNvPicPr>
+            <a:picLocks noChangeAspect="1"/>
+          </p:cNvPicPr>
+          <p:nvPr>
+            <p:custDataLst>
+              <p:tags r:id="rId1"/>
+            </p:custDataLst>
+          </p:nvPr>
+        </p:nvPicPr>
+        <p:blipFill>
+          <a:blip r:embed="rId3">
+            <a:extLst>
+              <a:ext uri="{28A0092B-C50C-407E-A947-70E740481C1C}">
+                <a14:useLocalDpi xmlns:a14="http://schemas.microsoft.com/office/drawing/2010/main" val="0"/>
+              </a:ext>
+            </a:extLst>
+          </a:blip>
+          <a:stretch>
+            <a:fillRect/>
+          </a:stretch>
+        </p:blipFill>
+        <p:spPr>
+          <a:xfrm>
+            <a:off x="838200" y="1619593"/>
+            <a:ext cx="9012462" cy="4707112"/>
+          </a:xfrm>
+          <a:prstGeom prst="rect">
+            <a:avLst/>
+          </a:prstGeom>
+        </p:spPr>
+      </p:pic>
     </p:spTree>
     <p:extLst>
       <p:ext uri="{BB962C8B-B14F-4D97-AF65-F5344CB8AC3E}">
-        <p14:creationId xmlns:p14="http://schemas.microsoft.com/office/powerpoint/2010/main" val="1291011716"/>
+        <p14:creationId xmlns:p14="http://schemas.microsoft.com/office/powerpoint/2010/main" val="1737740637"/>
       </p:ext>
     </p:extLst>
   </p:cSld>
@@ -7049,7 +7026,7 @@
           <p:cNvPr id="2" name="Title 1">
             <a:extLst>
               <a:ext uri="{FF2B5EF4-FFF2-40B4-BE49-F238E27FC236}">
-                <a16:creationId xmlns:a16="http://schemas.microsoft.com/office/drawing/2014/main" id="{EB61E60F-4DDA-4D08-94BB-BDE8BF4C05CC}"/>
+                <a16:creationId xmlns:a16="http://schemas.microsoft.com/office/drawing/2014/main" id="{FCD28C54-629C-49FF-89FE-A8A714611122}"/>
               </a:ext>
             </a:extLst>
           </p:cNvPr>
@@ -7067,76 +7044,55 @@
           <a:p>
             <a:r>
               <a:rPr lang="en-US" dirty="0"/>
-              <a:t>Future Work</a:t>
-            </a:r>
-          </a:p>
-        </p:txBody>
-      </p:sp>
-      <p:sp>
-        <p:nvSpPr>
-          <p:cNvPr id="3" name="Content Placeholder 2">
+              <a:t>Shift Redefined</a:t>
+            </a:r>
+          </a:p>
+        </p:txBody>
+      </p:sp>
+      <p:pic>
+        <p:nvPicPr>
+          <p:cNvPr id="13" name="Picture 12">
             <a:extLst>
               <a:ext uri="{FF2B5EF4-FFF2-40B4-BE49-F238E27FC236}">
-                <a16:creationId xmlns:a16="http://schemas.microsoft.com/office/drawing/2014/main" id="{AA6DBE64-56CE-4CC2-B44F-92EA147B0246}"/>
+                <a16:creationId xmlns:a16="http://schemas.microsoft.com/office/drawing/2014/main" id="{1826F604-4491-4713-8D40-AD5B6C9BF26F}"/>
               </a:ext>
             </a:extLst>
           </p:cNvPr>
-          <p:cNvSpPr>
-            <a:spLocks noGrp="1"/>
-          </p:cNvSpPr>
-          <p:nvPr>
-            <p:ph idx="1"/>
-          </p:nvPr>
-        </p:nvSpPr>
-        <p:spPr/>
-        <p:txBody>
-          <a:bodyPr/>
-          <a:lstStyle/>
-          <a:p>
-            <a:r>
-              <a:rPr lang="en-US" dirty="0"/>
-              <a:t>Make the extended bit-vector library compatible with </a:t>
-            </a:r>
-            <a:r>
-              <a:rPr lang="en-US" dirty="0" err="1"/>
-              <a:t>SMTCoq</a:t>
-            </a:r>
-            <a:endParaRPr lang="en-US" dirty="0"/>
-          </a:p>
-          <a:p>
-            <a:r>
-              <a:rPr lang="en-US" dirty="0"/>
-              <a:t>Extend the library with division (/), modulus (%), and weak signed comparison operators (≤</a:t>
-            </a:r>
-            <a:r>
-              <a:rPr lang="en-US" baseline="-25000" dirty="0"/>
-              <a:t>s</a:t>
-            </a:r>
-            <a:r>
-              <a:rPr lang="en-US" dirty="0"/>
-              <a:t>, ≥</a:t>
-            </a:r>
-            <a:r>
-              <a:rPr lang="en-US" baseline="-25000" dirty="0"/>
-              <a:t>s</a:t>
-            </a:r>
-            <a:r>
-              <a:rPr lang="en-US" dirty="0"/>
-              <a:t>) and prove equivalences over them</a:t>
-            </a:r>
-          </a:p>
-          <a:p>
-            <a:r>
-              <a:rPr lang="en-US" dirty="0"/>
-              <a:t>Organize the library as one for SMTLib2 bit-vectors</a:t>
-            </a:r>
-          </a:p>
-        </p:txBody>
-      </p:sp>
+          <p:cNvPicPr>
+            <a:picLocks noChangeAspect="1"/>
+          </p:cNvPicPr>
+          <p:nvPr>
+            <p:custDataLst>
+              <p:tags r:id="rId1"/>
+            </p:custDataLst>
+          </p:nvPr>
+        </p:nvPicPr>
+        <p:blipFill>
+          <a:blip r:embed="rId3">
+            <a:extLst>
+              <a:ext uri="{28A0092B-C50C-407E-A947-70E740481C1C}">
+                <a14:useLocalDpi xmlns:a14="http://schemas.microsoft.com/office/drawing/2010/main" val="0"/>
+              </a:ext>
+            </a:extLst>
+          </a:blip>
+          <a:stretch>
+            <a:fillRect/>
+          </a:stretch>
+        </p:blipFill>
+        <p:spPr>
+          <a:xfrm>
+            <a:off x="838200" y="1825624"/>
+            <a:ext cx="10622106" cy="4043954"/>
+          </a:xfrm>
+          <a:prstGeom prst="rect">
+            <a:avLst/>
+          </a:prstGeom>
+        </p:spPr>
+      </p:pic>
     </p:spTree>
     <p:extLst>
       <p:ext uri="{BB962C8B-B14F-4D97-AF65-F5344CB8AC3E}">
-        <p14:creationId xmlns:p14="http://schemas.microsoft.com/office/powerpoint/2010/main" val="1566632447"/>
+        <p14:creationId xmlns:p14="http://schemas.microsoft.com/office/powerpoint/2010/main" val="2591436915"/>
       </p:ext>
     </p:extLst>
   </p:cSld>
@@ -7168,7 +7124,7 @@
           <p:cNvPr id="2" name="Title 1">
             <a:extLst>
               <a:ext uri="{FF2B5EF4-FFF2-40B4-BE49-F238E27FC236}">
-                <a16:creationId xmlns:a16="http://schemas.microsoft.com/office/drawing/2014/main" id="{9B8AE531-BE0A-47C4-A97A-0228506D2F66}"/>
+                <a16:creationId xmlns:a16="http://schemas.microsoft.com/office/drawing/2014/main" id="{61100F9F-C2F8-41BE-B08E-92E7292A51AD}"/>
               </a:ext>
             </a:extLst>
           </p:cNvPr>
@@ -7186,257 +7142,179 @@
           <a:p>
             <a:r>
               <a:rPr lang="en-US" dirty="0"/>
-              <a:t>References</a:t>
-            </a:r>
-          </a:p>
-        </p:txBody>
-      </p:sp>
-      <p:sp>
-        <p:nvSpPr>
-          <p:cNvPr id="3" name="Content Placeholder 2">
+              <a:t>Useful Lemmas</a:t>
+            </a:r>
+          </a:p>
+        </p:txBody>
+      </p:sp>
+      <p:pic>
+        <p:nvPicPr>
+          <p:cNvPr id="23" name="Picture 22">
             <a:extLst>
               <a:ext uri="{FF2B5EF4-FFF2-40B4-BE49-F238E27FC236}">
-                <a16:creationId xmlns:a16="http://schemas.microsoft.com/office/drawing/2014/main" id="{C1639CB6-0E1A-4ACF-9658-4FB11AF819AF}"/>
+                <a16:creationId xmlns:a16="http://schemas.microsoft.com/office/drawing/2014/main" id="{03CBE1A8-57BB-4FAB-B88C-11C85F3FFDBC}"/>
               </a:ext>
             </a:extLst>
           </p:cNvPr>
-          <p:cNvSpPr>
-            <a:spLocks noGrp="1"/>
-          </p:cNvSpPr>
-          <p:nvPr>
-            <p:ph idx="1"/>
-          </p:nvPr>
-        </p:nvSpPr>
-        <p:spPr/>
-        <p:txBody>
-          <a:bodyPr>
-            <a:normAutofit fontScale="62500" lnSpcReduction="20000"/>
-          </a:bodyPr>
-          <a:lstStyle/>
-          <a:p>
-            <a:r>
-              <a:rPr lang="en-US" dirty="0"/>
-              <a:t>[Gupta et al., 1993] Aarti Gupta, Allan L. Fisher. Representation and Symbolic Manipulation of Linearly Inductive Boolean Functions. In proceedings of ICCAD '93 of the 1993 IEEE/ACM international conference on Computer-aided design, pages 192-199.</a:t>
-            </a:r>
-          </a:p>
-          <a:p>
-            <a:r>
-              <a:rPr lang="en-US" dirty="0"/>
-              <a:t>[Armando et al., 2006] Alessandro Armando, Jacopo </a:t>
-            </a:r>
-            <a:r>
-              <a:rPr lang="en-US" dirty="0" err="1"/>
-              <a:t>Mantovani</a:t>
-            </a:r>
-            <a:r>
-              <a:rPr lang="en-US" dirty="0"/>
-              <a:t>, Lorenzo </a:t>
-            </a:r>
-            <a:r>
-              <a:rPr lang="en-US" dirty="0" err="1"/>
-              <a:t>Platania</a:t>
-            </a:r>
-            <a:r>
-              <a:rPr lang="en-US" dirty="0"/>
-              <a:t>. Bounded Model Checking of Software Using SMT Solvers Instead of SAT Solvers. In proceedings of International SPIN Workshop on Model Checking of Software. SPIN 2006: Model Checking Software, pages 146-162.</a:t>
-            </a:r>
-          </a:p>
-          <a:p>
-            <a:r>
-              <a:rPr lang="en-US" dirty="0"/>
-              <a:t>[</a:t>
-            </a:r>
-            <a:r>
-              <a:rPr lang="en-US" dirty="0" err="1"/>
-              <a:t>Cadar</a:t>
-            </a:r>
-            <a:r>
-              <a:rPr lang="en-US" dirty="0"/>
-              <a:t> et al., 2006] Cristian </a:t>
-            </a:r>
-            <a:r>
-              <a:rPr lang="en-US" dirty="0" err="1"/>
-              <a:t>Cadar</a:t>
-            </a:r>
-            <a:r>
-              <a:rPr lang="en-US" dirty="0"/>
-              <a:t>, Vijay Ganesh, Peter M. Pawlowski, David L. Dill, Dawson R. Engler. EXE: Automatically Generating Inputs of Death.  In proceedings of CCS '06 Proceedings of the 13th ACM conference on Computer and communications security, pages 322-335.</a:t>
-            </a:r>
-          </a:p>
-          <a:p>
-            <a:r>
-              <a:rPr lang="en-US" dirty="0"/>
-              <a:t>[</a:t>
-            </a:r>
-            <a:r>
-              <a:rPr lang="en-US" dirty="0" err="1"/>
-              <a:t>Niemetz</a:t>
-            </a:r>
-            <a:r>
-              <a:rPr lang="en-US" dirty="0"/>
-              <a:t> et al., CAV 2018] </a:t>
-            </a:r>
-            <a:r>
-              <a:rPr lang="en-US" dirty="0" err="1"/>
-              <a:t>Aina</a:t>
-            </a:r>
-            <a:r>
-              <a:rPr lang="en-US" dirty="0"/>
-              <a:t> </a:t>
-            </a:r>
-            <a:r>
-              <a:rPr lang="en-US" dirty="0" err="1"/>
-              <a:t>Niemetz</a:t>
-            </a:r>
-            <a:r>
-              <a:rPr lang="en-US" dirty="0"/>
-              <a:t>, Mathias </a:t>
-            </a:r>
-            <a:r>
-              <a:rPr lang="en-US" dirty="0" err="1"/>
-              <a:t>Preiner</a:t>
-            </a:r>
-            <a:r>
-              <a:rPr lang="en-US" dirty="0"/>
-              <a:t>, Andrew Reynolds, Clark Barrett, Cesare </a:t>
-            </a:r>
-            <a:r>
-              <a:rPr lang="en-US" dirty="0" err="1"/>
-              <a:t>Tinelli</a:t>
-            </a:r>
-            <a:r>
-              <a:rPr lang="en-US" dirty="0"/>
-              <a:t>. Solving Quantified Bit-Vectors Using Invertibility Conditions. In proceedings of International Conference on Computer Aided Verification 2018, pages 236-255.</a:t>
-            </a:r>
-          </a:p>
-          <a:p>
-            <a:r>
-              <a:rPr lang="en-US" dirty="0"/>
-              <a:t>[</a:t>
-            </a:r>
-            <a:r>
-              <a:rPr lang="en-US" dirty="0" err="1"/>
-              <a:t>Niemetz</a:t>
-            </a:r>
-            <a:r>
-              <a:rPr lang="en-US" dirty="0"/>
-              <a:t> et al., CADE 2019] </a:t>
-            </a:r>
-            <a:r>
-              <a:rPr lang="en-US" dirty="0" err="1"/>
-              <a:t>Aina</a:t>
-            </a:r>
-            <a:r>
-              <a:rPr lang="en-US" dirty="0"/>
-              <a:t> </a:t>
-            </a:r>
-            <a:r>
-              <a:rPr lang="en-US" dirty="0" err="1"/>
-              <a:t>Niemetz</a:t>
-            </a:r>
-            <a:r>
-              <a:rPr lang="en-US" dirty="0"/>
-              <a:t>, Mathias </a:t>
-            </a:r>
-            <a:r>
-              <a:rPr lang="en-US" dirty="0" err="1"/>
-              <a:t>Preiner</a:t>
-            </a:r>
-            <a:r>
-              <a:rPr lang="en-US" dirty="0"/>
-              <a:t>, Andrew Reynolds, Yoni Zohar, Clark Barrett and Cesare </a:t>
-            </a:r>
-            <a:r>
-              <a:rPr lang="en-US" dirty="0" err="1"/>
-              <a:t>Tinelli</a:t>
-            </a:r>
-            <a:r>
-              <a:rPr lang="en-US" dirty="0"/>
-              <a:t>. </a:t>
-            </a:r>
-            <a:r>
-              <a:rPr lang="en-US" i="1" dirty="0"/>
-              <a:t>Towards Bit Width Independent Proofs in SMT Solvers.</a:t>
-            </a:r>
-            <a:r>
-              <a:rPr lang="en-US" dirty="0"/>
-              <a:t> To appear in proceedings of International Conference on Automated Deduction 2019.</a:t>
-            </a:r>
-          </a:p>
-          <a:p>
-            <a:r>
-              <a:rPr lang="en-US" dirty="0"/>
-              <a:t>[</a:t>
-            </a:r>
-            <a:r>
-              <a:rPr lang="en-US" dirty="0" err="1"/>
-              <a:t>Ekici</a:t>
-            </a:r>
-            <a:r>
-              <a:rPr lang="en-US" dirty="0"/>
-              <a:t> et al., 2017] </a:t>
-            </a:r>
-            <a:r>
-              <a:rPr lang="en-US" dirty="0" err="1"/>
-              <a:t>Burak</a:t>
-            </a:r>
-            <a:r>
-              <a:rPr lang="en-US" dirty="0"/>
-              <a:t> </a:t>
-            </a:r>
-            <a:r>
-              <a:rPr lang="en-US" dirty="0" err="1"/>
-              <a:t>Ekici</a:t>
-            </a:r>
-            <a:r>
-              <a:rPr lang="en-US" dirty="0"/>
-              <a:t>, Alain </a:t>
-            </a:r>
-            <a:r>
-              <a:rPr lang="en-US" dirty="0" err="1"/>
-              <a:t>Mebsout</a:t>
-            </a:r>
-            <a:r>
-              <a:rPr lang="en-US" dirty="0"/>
-              <a:t>, Cesare </a:t>
-            </a:r>
-            <a:r>
-              <a:rPr lang="en-US" dirty="0" err="1"/>
-              <a:t>Tinelli</a:t>
-            </a:r>
-            <a:r>
-              <a:rPr lang="en-US" dirty="0"/>
-              <a:t>, Chantal Keller, Guy Katz, Andrew Reynolds, Clark Barrett. </a:t>
-            </a:r>
-            <a:r>
-              <a:rPr lang="en-US" dirty="0" err="1"/>
-              <a:t>SMTCoq</a:t>
-            </a:r>
-            <a:r>
-              <a:rPr lang="en-US" dirty="0"/>
-              <a:t>: A Plug-in for Integrating SMT Solvers into Coq. In proceedings of 29</a:t>
-            </a:r>
-            <a:r>
-              <a:rPr lang="en-US" baseline="30000" dirty="0"/>
-              <a:t>th</a:t>
-            </a:r>
-            <a:r>
-              <a:rPr lang="en-US" dirty="0"/>
-              <a:t> International Conference of Computer Aided Verification 2017.</a:t>
-            </a:r>
-          </a:p>
-          <a:p>
-            <a:endParaRPr lang="en-US" dirty="0"/>
-          </a:p>
-          <a:p>
-            <a:endParaRPr lang="en-US" dirty="0"/>
-          </a:p>
-        </p:txBody>
-      </p:sp>
+          <p:cNvPicPr>
+            <a:picLocks noChangeAspect="1"/>
+          </p:cNvPicPr>
+          <p:nvPr>
+            <p:custDataLst>
+              <p:tags r:id="rId1"/>
+            </p:custDataLst>
+          </p:nvPr>
+        </p:nvPicPr>
+        <p:blipFill>
+          <a:blip r:embed="rId3">
+            <a:extLst>
+              <a:ext uri="{28A0092B-C50C-407E-A947-70E740481C1C}">
+                <a14:useLocalDpi xmlns:a14="http://schemas.microsoft.com/office/drawing/2010/main" val="0"/>
+              </a:ext>
+            </a:extLst>
+          </a:blip>
+          <a:stretch>
+            <a:fillRect/>
+          </a:stretch>
+        </p:blipFill>
+        <p:spPr>
+          <a:xfrm>
+            <a:off x="838202" y="2008776"/>
+            <a:ext cx="9147431" cy="3571810"/>
+          </a:xfrm>
+          <a:prstGeom prst="rect">
+            <a:avLst/>
+          </a:prstGeom>
+        </p:spPr>
+      </p:pic>
     </p:spTree>
     <p:extLst>
       <p:ext uri="{BB962C8B-B14F-4D97-AF65-F5344CB8AC3E}">
-        <p14:creationId xmlns:p14="http://schemas.microsoft.com/office/powerpoint/2010/main" val="1805401439"/>
+        <p14:creationId xmlns:p14="http://schemas.microsoft.com/office/powerpoint/2010/main" val="2144407639"/>
+      </p:ext>
+    </p:extLst>
+  </p:cSld>
+  <p:clrMapOvr>
+    <a:masterClrMapping/>
+  </p:clrMapOvr>
+</p:sld>
+</file>
+
+<file path=ppt/slides/slide19.xml><?xml version="1.0" encoding="utf-8"?>
+<p:sld xmlns:a="http://schemas.openxmlformats.org/drawingml/2006/main" xmlns:r="http://schemas.openxmlformats.org/officeDocument/2006/relationships" xmlns:p="http://schemas.openxmlformats.org/presentationml/2006/main">
+  <p:cSld>
+    <p:spTree>
+      <p:nvGrpSpPr>
+        <p:cNvPr id="1" name=""/>
+        <p:cNvGrpSpPr/>
+        <p:nvPr/>
+      </p:nvGrpSpPr>
+      <p:grpSpPr>
+        <a:xfrm>
+          <a:off x="0" y="0"/>
+          <a:ext cx="0" cy="0"/>
+          <a:chOff x="0" y="0"/>
+          <a:chExt cx="0" cy="0"/>
+        </a:xfrm>
+      </p:grpSpPr>
+      <p:sp>
+        <p:nvSpPr>
+          <p:cNvPr id="2" name="Title 1">
+            <a:extLst>
+              <a:ext uri="{FF2B5EF4-FFF2-40B4-BE49-F238E27FC236}">
+                <a16:creationId xmlns:a16="http://schemas.microsoft.com/office/drawing/2014/main" id="{74724F7D-A2A7-413F-8A5D-63FDD844CDB6}"/>
+              </a:ext>
+            </a:extLst>
+          </p:cNvPr>
+          <p:cNvSpPr>
+            <a:spLocks noGrp="1"/>
+          </p:cNvSpPr>
+          <p:nvPr>
+            <p:ph type="title"/>
+          </p:nvPr>
+        </p:nvSpPr>
+        <p:spPr/>
+        <p:txBody>
+          <a:bodyPr/>
+          <a:lstStyle/>
+          <a:p>
+            <a:r>
+              <a:rPr lang="en-US" dirty="0"/>
+              <a:t>Conclusion</a:t>
+            </a:r>
+          </a:p>
+        </p:txBody>
+      </p:sp>
+      <p:sp>
+        <p:nvSpPr>
+          <p:cNvPr id="3" name="Content Placeholder 2">
+            <a:extLst>
+              <a:ext uri="{FF2B5EF4-FFF2-40B4-BE49-F238E27FC236}">
+                <a16:creationId xmlns:a16="http://schemas.microsoft.com/office/drawing/2014/main" id="{62F0D559-E3A1-4CF8-AA96-7C19771E7359}"/>
+              </a:ext>
+            </a:extLst>
+          </p:cNvPr>
+          <p:cNvSpPr>
+            <a:spLocks noGrp="1"/>
+          </p:cNvSpPr>
+          <p:nvPr>
+            <p:ph idx="1"/>
+          </p:nvPr>
+        </p:nvSpPr>
+        <p:spPr/>
+        <p:txBody>
+          <a:bodyPr/>
+          <a:lstStyle/>
+          <a:p>
+            <a:r>
+              <a:rPr lang="en-US" dirty="0"/>
+              <a:t>We complemented [</a:t>
+            </a:r>
+            <a:r>
+              <a:rPr lang="en-US" dirty="0" err="1"/>
+              <a:t>Niemetz</a:t>
+            </a:r>
+            <a:r>
+              <a:rPr lang="en-US" dirty="0"/>
+              <a:t> et al</a:t>
+            </a:r>
+            <a:r>
+              <a:rPr lang="en-US"/>
+              <a:t>., CADE 2019</a:t>
+            </a:r>
+            <a:r>
+              <a:rPr lang="en-US" dirty="0"/>
+              <a:t>] in proving all but one invertibility equivalences from the 162 presented by [</a:t>
+            </a:r>
+            <a:r>
+              <a:rPr lang="en-US" dirty="0" err="1"/>
+              <a:t>Niemetz</a:t>
+            </a:r>
+            <a:r>
+              <a:rPr lang="en-US" dirty="0"/>
+              <a:t> et al., CAV 2018] We did this in the Coq proof assistant</a:t>
+            </a:r>
+          </a:p>
+          <a:p>
+            <a:r>
+              <a:rPr lang="en-US" dirty="0"/>
+              <a:t>We extended the Coq bit-vector library for </a:t>
+            </a:r>
+            <a:r>
+              <a:rPr lang="en-US" dirty="0" err="1"/>
+              <a:t>SMTCoq</a:t>
+            </a:r>
+            <a:r>
+              <a:rPr lang="en-US" dirty="0"/>
+              <a:t> to do this</a:t>
+            </a:r>
+          </a:p>
+        </p:txBody>
+      </p:sp>
+    </p:spTree>
+    <p:extLst>
+      <p:ext uri="{BB962C8B-B14F-4D97-AF65-F5344CB8AC3E}">
+        <p14:creationId xmlns:p14="http://schemas.microsoft.com/office/powerpoint/2010/main" val="1291011716"/>
       </p:ext>
     </p:extLst>
   </p:cSld>
@@ -7587,6 +7465,425 @@
     <p:extLst>
       <p:ext uri="{BB962C8B-B14F-4D97-AF65-F5344CB8AC3E}">
         <p14:creationId xmlns:p14="http://schemas.microsoft.com/office/powerpoint/2010/main" val="3052004660"/>
+      </p:ext>
+    </p:extLst>
+  </p:cSld>
+  <p:clrMapOvr>
+    <a:masterClrMapping/>
+  </p:clrMapOvr>
+</p:sld>
+</file>
+
+<file path=ppt/slides/slide20.xml><?xml version="1.0" encoding="utf-8"?>
+<p:sld xmlns:a="http://schemas.openxmlformats.org/drawingml/2006/main" xmlns:r="http://schemas.openxmlformats.org/officeDocument/2006/relationships" xmlns:p="http://schemas.openxmlformats.org/presentationml/2006/main">
+  <p:cSld>
+    <p:spTree>
+      <p:nvGrpSpPr>
+        <p:cNvPr id="1" name=""/>
+        <p:cNvGrpSpPr/>
+        <p:nvPr/>
+      </p:nvGrpSpPr>
+      <p:grpSpPr>
+        <a:xfrm>
+          <a:off x="0" y="0"/>
+          <a:ext cx="0" cy="0"/>
+          <a:chOff x="0" y="0"/>
+          <a:chExt cx="0" cy="0"/>
+        </a:xfrm>
+      </p:grpSpPr>
+      <p:sp>
+        <p:nvSpPr>
+          <p:cNvPr id="2" name="Title 1">
+            <a:extLst>
+              <a:ext uri="{FF2B5EF4-FFF2-40B4-BE49-F238E27FC236}">
+                <a16:creationId xmlns:a16="http://schemas.microsoft.com/office/drawing/2014/main" id="{EB61E60F-4DDA-4D08-94BB-BDE8BF4C05CC}"/>
+              </a:ext>
+            </a:extLst>
+          </p:cNvPr>
+          <p:cNvSpPr>
+            <a:spLocks noGrp="1"/>
+          </p:cNvSpPr>
+          <p:nvPr>
+            <p:ph type="title"/>
+          </p:nvPr>
+        </p:nvSpPr>
+        <p:spPr/>
+        <p:txBody>
+          <a:bodyPr/>
+          <a:lstStyle/>
+          <a:p>
+            <a:r>
+              <a:rPr lang="en-US" dirty="0"/>
+              <a:t>Future Work</a:t>
+            </a:r>
+          </a:p>
+        </p:txBody>
+      </p:sp>
+      <p:sp>
+        <p:nvSpPr>
+          <p:cNvPr id="3" name="Content Placeholder 2">
+            <a:extLst>
+              <a:ext uri="{FF2B5EF4-FFF2-40B4-BE49-F238E27FC236}">
+                <a16:creationId xmlns:a16="http://schemas.microsoft.com/office/drawing/2014/main" id="{AA6DBE64-56CE-4CC2-B44F-92EA147B0246}"/>
+              </a:ext>
+            </a:extLst>
+          </p:cNvPr>
+          <p:cNvSpPr>
+            <a:spLocks noGrp="1"/>
+          </p:cNvSpPr>
+          <p:nvPr>
+            <p:ph idx="1"/>
+          </p:nvPr>
+        </p:nvSpPr>
+        <p:spPr/>
+        <p:txBody>
+          <a:bodyPr/>
+          <a:lstStyle/>
+          <a:p>
+            <a:r>
+              <a:rPr lang="en-US" dirty="0"/>
+              <a:t>Make the extended bit-vector library compatible with </a:t>
+            </a:r>
+            <a:r>
+              <a:rPr lang="en-US" dirty="0" err="1"/>
+              <a:t>SMTCoq</a:t>
+            </a:r>
+            <a:endParaRPr lang="en-US" dirty="0"/>
+          </a:p>
+          <a:p>
+            <a:r>
+              <a:rPr lang="en-US" dirty="0"/>
+              <a:t>Extend the library with division (/), modulus (%), and weak signed comparison operators (≤</a:t>
+            </a:r>
+            <a:r>
+              <a:rPr lang="en-US" baseline="-25000" dirty="0"/>
+              <a:t>s</a:t>
+            </a:r>
+            <a:r>
+              <a:rPr lang="en-US" dirty="0"/>
+              <a:t>, ≥</a:t>
+            </a:r>
+            <a:r>
+              <a:rPr lang="en-US" baseline="-25000" dirty="0"/>
+              <a:t>s</a:t>
+            </a:r>
+            <a:r>
+              <a:rPr lang="en-US" dirty="0"/>
+              <a:t>) and prove equivalences over them</a:t>
+            </a:r>
+          </a:p>
+          <a:p>
+            <a:r>
+              <a:rPr lang="en-US" dirty="0"/>
+              <a:t>Organize the library as one for SMTLib2 bit-vectors</a:t>
+            </a:r>
+          </a:p>
+        </p:txBody>
+      </p:sp>
+    </p:spTree>
+    <p:extLst>
+      <p:ext uri="{BB962C8B-B14F-4D97-AF65-F5344CB8AC3E}">
+        <p14:creationId xmlns:p14="http://schemas.microsoft.com/office/powerpoint/2010/main" val="1566632447"/>
+      </p:ext>
+    </p:extLst>
+  </p:cSld>
+  <p:clrMapOvr>
+    <a:masterClrMapping/>
+  </p:clrMapOvr>
+</p:sld>
+</file>
+
+<file path=ppt/slides/slide21.xml><?xml version="1.0" encoding="utf-8"?>
+<p:sld xmlns:a="http://schemas.openxmlformats.org/drawingml/2006/main" xmlns:r="http://schemas.openxmlformats.org/officeDocument/2006/relationships" xmlns:p="http://schemas.openxmlformats.org/presentationml/2006/main">
+  <p:cSld>
+    <p:spTree>
+      <p:nvGrpSpPr>
+        <p:cNvPr id="1" name=""/>
+        <p:cNvGrpSpPr/>
+        <p:nvPr/>
+      </p:nvGrpSpPr>
+      <p:grpSpPr>
+        <a:xfrm>
+          <a:off x="0" y="0"/>
+          <a:ext cx="0" cy="0"/>
+          <a:chOff x="0" y="0"/>
+          <a:chExt cx="0" cy="0"/>
+        </a:xfrm>
+      </p:grpSpPr>
+      <p:sp>
+        <p:nvSpPr>
+          <p:cNvPr id="2" name="Title 1">
+            <a:extLst>
+              <a:ext uri="{FF2B5EF4-FFF2-40B4-BE49-F238E27FC236}">
+                <a16:creationId xmlns:a16="http://schemas.microsoft.com/office/drawing/2014/main" id="{9B8AE531-BE0A-47C4-A97A-0228506D2F66}"/>
+              </a:ext>
+            </a:extLst>
+          </p:cNvPr>
+          <p:cNvSpPr>
+            <a:spLocks noGrp="1"/>
+          </p:cNvSpPr>
+          <p:nvPr>
+            <p:ph type="title"/>
+          </p:nvPr>
+        </p:nvSpPr>
+        <p:spPr/>
+        <p:txBody>
+          <a:bodyPr/>
+          <a:lstStyle/>
+          <a:p>
+            <a:r>
+              <a:rPr lang="en-US" dirty="0"/>
+              <a:t>References</a:t>
+            </a:r>
+          </a:p>
+        </p:txBody>
+      </p:sp>
+      <p:sp>
+        <p:nvSpPr>
+          <p:cNvPr id="3" name="Content Placeholder 2">
+            <a:extLst>
+              <a:ext uri="{FF2B5EF4-FFF2-40B4-BE49-F238E27FC236}">
+                <a16:creationId xmlns:a16="http://schemas.microsoft.com/office/drawing/2014/main" id="{C1639CB6-0E1A-4ACF-9658-4FB11AF819AF}"/>
+              </a:ext>
+            </a:extLst>
+          </p:cNvPr>
+          <p:cNvSpPr>
+            <a:spLocks noGrp="1"/>
+          </p:cNvSpPr>
+          <p:nvPr>
+            <p:ph idx="1"/>
+          </p:nvPr>
+        </p:nvSpPr>
+        <p:spPr/>
+        <p:txBody>
+          <a:bodyPr>
+            <a:normAutofit fontScale="62500" lnSpcReduction="20000"/>
+          </a:bodyPr>
+          <a:lstStyle/>
+          <a:p>
+            <a:r>
+              <a:rPr lang="en-US" dirty="0"/>
+              <a:t>[Gupta et al., 1993] Aarti Gupta, Allan L. Fisher. Representation and Symbolic Manipulation of Linearly Inductive Boolean Functions. In proceedings of ICCAD '93 of the 1993 IEEE/ACM international conference on Computer-aided design, pages 192-199.</a:t>
+            </a:r>
+          </a:p>
+          <a:p>
+            <a:r>
+              <a:rPr lang="en-US" dirty="0"/>
+              <a:t>[Armando et al., 2006] Alessandro Armando, Jacopo </a:t>
+            </a:r>
+            <a:r>
+              <a:rPr lang="en-US" dirty="0" err="1"/>
+              <a:t>Mantovani</a:t>
+            </a:r>
+            <a:r>
+              <a:rPr lang="en-US" dirty="0"/>
+              <a:t>, Lorenzo </a:t>
+            </a:r>
+            <a:r>
+              <a:rPr lang="en-US" dirty="0" err="1"/>
+              <a:t>Platania</a:t>
+            </a:r>
+            <a:r>
+              <a:rPr lang="en-US" dirty="0"/>
+              <a:t>. Bounded Model Checking of Software Using SMT Solvers Instead of SAT Solvers. In proceedings of International SPIN Workshop on Model Checking of Software. SPIN 2006: Model Checking Software, pages 146-162.</a:t>
+            </a:r>
+          </a:p>
+          <a:p>
+            <a:r>
+              <a:rPr lang="en-US" dirty="0"/>
+              <a:t>[</a:t>
+            </a:r>
+            <a:r>
+              <a:rPr lang="en-US" dirty="0" err="1"/>
+              <a:t>Cadar</a:t>
+            </a:r>
+            <a:r>
+              <a:rPr lang="en-US" dirty="0"/>
+              <a:t> et al., 2006] Cristian </a:t>
+            </a:r>
+            <a:r>
+              <a:rPr lang="en-US" dirty="0" err="1"/>
+              <a:t>Cadar</a:t>
+            </a:r>
+            <a:r>
+              <a:rPr lang="en-US" dirty="0"/>
+              <a:t>, Vijay Ganesh, Peter M. Pawlowski, David L. Dill, Dawson R. Engler. EXE: Automatically Generating Inputs of Death.  In proceedings of CCS '06 Proceedings of the 13th ACM conference on Computer and communications security, pages 322-335.</a:t>
+            </a:r>
+          </a:p>
+          <a:p>
+            <a:r>
+              <a:rPr lang="en-US" dirty="0"/>
+              <a:t>[</a:t>
+            </a:r>
+            <a:r>
+              <a:rPr lang="en-US" dirty="0" err="1"/>
+              <a:t>Niemetz</a:t>
+            </a:r>
+            <a:r>
+              <a:rPr lang="en-US" dirty="0"/>
+              <a:t> et al., CAV 2018] </a:t>
+            </a:r>
+            <a:r>
+              <a:rPr lang="en-US" dirty="0" err="1"/>
+              <a:t>Aina</a:t>
+            </a:r>
+            <a:r>
+              <a:rPr lang="en-US" dirty="0"/>
+              <a:t> </a:t>
+            </a:r>
+            <a:r>
+              <a:rPr lang="en-US" dirty="0" err="1"/>
+              <a:t>Niemetz</a:t>
+            </a:r>
+            <a:r>
+              <a:rPr lang="en-US" dirty="0"/>
+              <a:t>, Mathias </a:t>
+            </a:r>
+            <a:r>
+              <a:rPr lang="en-US" dirty="0" err="1"/>
+              <a:t>Preiner</a:t>
+            </a:r>
+            <a:r>
+              <a:rPr lang="en-US" dirty="0"/>
+              <a:t>, Andrew Reynolds, Clark Barrett, Cesare </a:t>
+            </a:r>
+            <a:r>
+              <a:rPr lang="en-US" dirty="0" err="1"/>
+              <a:t>Tinelli</a:t>
+            </a:r>
+            <a:r>
+              <a:rPr lang="en-US" dirty="0"/>
+              <a:t>. Solving Quantified Bit-Vectors Using Invertibility Conditions. In proceedings of International Conference on Computer Aided Verification 2018, pages 236-255.</a:t>
+            </a:r>
+          </a:p>
+          <a:p>
+            <a:r>
+              <a:rPr lang="en-US" dirty="0"/>
+              <a:t>[</a:t>
+            </a:r>
+            <a:r>
+              <a:rPr lang="en-US" dirty="0" err="1"/>
+              <a:t>Niemetz</a:t>
+            </a:r>
+            <a:r>
+              <a:rPr lang="en-US" dirty="0"/>
+              <a:t> et al., CADE 2019] </a:t>
+            </a:r>
+            <a:r>
+              <a:rPr lang="en-US" dirty="0" err="1"/>
+              <a:t>Aina</a:t>
+            </a:r>
+            <a:r>
+              <a:rPr lang="en-US" dirty="0"/>
+              <a:t> </a:t>
+            </a:r>
+            <a:r>
+              <a:rPr lang="en-US" dirty="0" err="1"/>
+              <a:t>Niemetz</a:t>
+            </a:r>
+            <a:r>
+              <a:rPr lang="en-US" dirty="0"/>
+              <a:t>, Mathias </a:t>
+            </a:r>
+            <a:r>
+              <a:rPr lang="en-US" dirty="0" err="1"/>
+              <a:t>Preiner</a:t>
+            </a:r>
+            <a:r>
+              <a:rPr lang="en-US" dirty="0"/>
+              <a:t>, Andrew Reynolds, Yoni Zohar, Clark Barrett and Cesare </a:t>
+            </a:r>
+            <a:r>
+              <a:rPr lang="en-US" dirty="0" err="1"/>
+              <a:t>Tinelli</a:t>
+            </a:r>
+            <a:r>
+              <a:rPr lang="en-US" dirty="0"/>
+              <a:t>. </a:t>
+            </a:r>
+            <a:r>
+              <a:rPr lang="en-US" i="1" dirty="0"/>
+              <a:t>Towards Bit Width Independent Proofs in SMT Solvers.</a:t>
+            </a:r>
+            <a:r>
+              <a:rPr lang="en-US" dirty="0"/>
+              <a:t> To appear in proceedings of International Conference on Automated Deduction 2019.</a:t>
+            </a:r>
+          </a:p>
+          <a:p>
+            <a:r>
+              <a:rPr lang="en-US" dirty="0"/>
+              <a:t>[</a:t>
+            </a:r>
+            <a:r>
+              <a:rPr lang="en-US" dirty="0" err="1"/>
+              <a:t>Ekici</a:t>
+            </a:r>
+            <a:r>
+              <a:rPr lang="en-US" dirty="0"/>
+              <a:t> et al., 2017] </a:t>
+            </a:r>
+            <a:r>
+              <a:rPr lang="en-US" dirty="0" err="1"/>
+              <a:t>Burak</a:t>
+            </a:r>
+            <a:r>
+              <a:rPr lang="en-US" dirty="0"/>
+              <a:t> </a:t>
+            </a:r>
+            <a:r>
+              <a:rPr lang="en-US" dirty="0" err="1"/>
+              <a:t>Ekici</a:t>
+            </a:r>
+            <a:r>
+              <a:rPr lang="en-US" dirty="0"/>
+              <a:t>, Alain </a:t>
+            </a:r>
+            <a:r>
+              <a:rPr lang="en-US" dirty="0" err="1"/>
+              <a:t>Mebsout</a:t>
+            </a:r>
+            <a:r>
+              <a:rPr lang="en-US" dirty="0"/>
+              <a:t>, Cesare </a:t>
+            </a:r>
+            <a:r>
+              <a:rPr lang="en-US" dirty="0" err="1"/>
+              <a:t>Tinelli</a:t>
+            </a:r>
+            <a:r>
+              <a:rPr lang="en-US" dirty="0"/>
+              <a:t>, Chantal Keller, Guy Katz, Andrew Reynolds, Clark Barrett. </a:t>
+            </a:r>
+            <a:r>
+              <a:rPr lang="en-US" dirty="0" err="1"/>
+              <a:t>SMTCoq</a:t>
+            </a:r>
+            <a:r>
+              <a:rPr lang="en-US" dirty="0"/>
+              <a:t>: A Plug-in for Integrating SMT Solvers into Coq. In proceedings of 29</a:t>
+            </a:r>
+            <a:r>
+              <a:rPr lang="en-US" baseline="30000" dirty="0"/>
+              <a:t>th</a:t>
+            </a:r>
+            <a:r>
+              <a:rPr lang="en-US" dirty="0"/>
+              <a:t> International Conference of Computer Aided Verification 2017.</a:t>
+            </a:r>
+          </a:p>
+          <a:p>
+            <a:endParaRPr lang="en-US" dirty="0"/>
+          </a:p>
+          <a:p>
+            <a:endParaRPr lang="en-US" dirty="0"/>
+          </a:p>
+        </p:txBody>
+      </p:sp>
+    </p:spTree>
+    <p:extLst>
+      <p:ext uri="{BB962C8B-B14F-4D97-AF65-F5344CB8AC3E}">
+        <p14:creationId xmlns:p14="http://schemas.microsoft.com/office/powerpoint/2010/main" val="1805401439"/>
       </p:ext>
     </p:extLst>
   </p:cSld>
@@ -8892,6 +9189,63 @@
   <p:tag name="LATEXADDIN" val="\documentclass{article}&#10;\usepackage{amsmath}&#10;\pagestyle{empty}&#10;\begin{document}&#10;$0$&#10;\end{document}"/>
   <p:tag name="IGUANATEXSIZE" val="20"/>
   <p:tag name="IGUANATEXCURSOR" val="82"/>
+  <p:tag name="TRANSPARENCY" val="True"/>
+  <p:tag name="FILENAME" val=""/>
+  <p:tag name="LATEXENGINEID" val="0"/>
+  <p:tag name="TEMPFOLDER" val="c:\temp\"/>
+  <p:tag name="LATEXFORMHEIGHT" val="312"/>
+  <p:tag name="LATEXFORMWIDTH" val="384"/>
+  <p:tag name="LATEXFORMWRAP" val="True"/>
+  <p:tag name="BITMAPVECTOR" val="0"/>
+</p:tagLst>
+</file>
+
+<file path=ppt/tags/tag21.xml><?xml version="1.0" encoding="utf-8"?>
+<p:tagLst xmlns:a="http://schemas.openxmlformats.org/drawingml/2006/main" xmlns:r="http://schemas.openxmlformats.org/officeDocument/2006/relationships" xmlns:p="http://schemas.openxmlformats.org/presentationml/2006/main">
+  <p:tag name="OUTPUTDPI" val="1200"/>
+  <p:tag name="ORIGINALHEIGHT" val="2038.245"/>
+  <p:tag name="ORIGINALWIDTH" val="3902.512"/>
+  <p:tag name="LATEXADDIN" val="\documentclass{article}&#10;\usepackage{amsmath}&#10;\usepackage[dvipsnames]{xcolor}&#10;\usepackage{bold-extra}&#10;\pagestyle{empty}&#10;\begin{document}&#10;\color{NavyBlue}\noindent \texttt{\textbf{Definition} shl\_one\_bit  (a: list bool) : list bool :=} \\&#10;\phantom{\quad}\texttt{  match a with} \\&#10;\phantom{\quad}\phantom{\quad}\texttt{    | [] =&gt; []} \\&#10;\phantom{\quad}\phantom{\quad}\texttt{    | \_  =&gt; false :: removelast a } \\&#10;\phantom{\quad}\texttt{  end.} \\&#10;&#10;\noindent\texttt{\textbf{Fixpoint} shl\_n\_bits  (a: list bool) (n: nat): list bool :=} \\&#10;\phantom{\quad}\texttt{  match n with} \\&#10;\phantom{\quad}\phantom{\quad}\texttt{    | O    =&gt; a} \\&#10;\phantom{\quad}\phantom{\quad}\texttt{    | S n' =&gt; shl\_n\_bits (shl\_one\_bit a) n'  } \\&#10;\phantom{\quad}\texttt{    end.} \\&#10;&#10;\noindent\texttt{\textbf{Definition} shl\_aux  (a b: list bool): list bool :=} \\&#10;\phantom{\quad}\texttt{shl\_n\_bits a (list2nat\_be\_a b).} \\&#10;&#10;\end{document}"/>
+  <p:tag name="IGUANATEXSIZE" val="28"/>
+  <p:tag name="IGUANATEXCURSOR" val="504"/>
+  <p:tag name="TRANSPARENCY" val="True"/>
+  <p:tag name="FILENAME" val=""/>
+  <p:tag name="LATEXENGINEID" val="0"/>
+  <p:tag name="TEMPFOLDER" val="c:\temp\"/>
+  <p:tag name="LATEXFORMHEIGHT" val="312"/>
+  <p:tag name="LATEXFORMWIDTH" val="384"/>
+  <p:tag name="LATEXFORMWRAP" val="True"/>
+  <p:tag name="BITMAPVECTOR" val="0"/>
+</p:tagLst>
+</file>
+
+<file path=ppt/tags/tag22.xml><?xml version="1.0" encoding="utf-8"?>
+<p:tagLst xmlns:a="http://schemas.openxmlformats.org/drawingml/2006/main" xmlns:r="http://schemas.openxmlformats.org/officeDocument/2006/relationships" xmlns:p="http://schemas.openxmlformats.org/presentationml/2006/main">
+  <p:tag name="OUTPUTDPI" val="1200"/>
+  <p:tag name="ORIGINALHEIGHT" val="1580.802"/>
+  <p:tag name="ORIGINALWIDTH" val="4152.231"/>
+  <p:tag name="LATEXADDIN" val="\documentclass{article}&#10;\usepackage{amsmath}&#10;\usepackage[dvipsnames]{xcolor}&#10;\usepackage{bold-extra}&#10;\pagestyle{empty}&#10;\begin{document}&#10;\color{NavyBlue}&#10;\noindent\texttt{\textbf{Definition} shl\_n\_bits\_a  (a: list bool) (n: nat): list bool :=} \\&#10;\phantom{\quad}\texttt{  if (n &lt;? length a)\%nat then} \\&#10;\phantom{\quad}\phantom{\quad}\texttt{    mk\_list\_false n ++ firstn (length a - n) a}\\&#10;\phantom{\quad}\texttt{  else }\\&#10;\phantom{\quad}\phantom{\quad}\texttt{    mk\_list\_false (length a).}\\&#10;&#10;\noindent\texttt{\textbf{Definition} bv\_shl\_a (a b: bitvector) : bitvector :=}\\&#10;\phantom{\quad}\texttt{  if ((@size a) =? (@size b)) then }\\&#10;\phantom{\quad}\phantom{\quad}\texttt{    shl\_n\_bits\_a a (list2nat\_be\_a b)}\\&#10;\phantom{\quad}\texttt{  else }\\&#10;\phantom{\quad}\phantom{\quad}\texttt{    nil.}\\&#10;&#10;&#10;&#10;\end{document}"/>
+  <p:tag name="IGUANATEXSIZE" val="20"/>
+  <p:tag name="IGUANATEXCURSOR" val="557"/>
+  <p:tag name="TRANSPARENCY" val="True"/>
+  <p:tag name="FILENAME" val=""/>
+  <p:tag name="LATEXENGINEID" val="0"/>
+  <p:tag name="TEMPFOLDER" val="c:\temp\"/>
+  <p:tag name="LATEXFORMHEIGHT" val="312"/>
+  <p:tag name="LATEXFORMWIDTH" val="384"/>
+  <p:tag name="LATEXFORMWRAP" val="True"/>
+  <p:tag name="BITMAPVECTOR" val="0"/>
+</p:tagLst>
+</file>
+
+<file path=ppt/tags/tag23.xml><?xml version="1.0" encoding="utf-8"?>
+<p:tagLst xmlns:a="http://schemas.openxmlformats.org/drawingml/2006/main" xmlns:r="http://schemas.openxmlformats.org/officeDocument/2006/relationships" xmlns:p="http://schemas.openxmlformats.org/presentationml/2006/main">
+  <p:tag name="OUTPUTDPI" val="1200"/>
+  <p:tag name="ORIGINALHEIGHT" val="1757.78"/>
+  <p:tag name="ORIGINALWIDTH" val="4501.687"/>
+  <p:tag name="LATEXADDIN" val="\documentclass{article}&#10;\usepackage{amsmath}&#10;\usepackage{amsmath}&#10;\usepackage[dvipsnames]{xcolor}&#10;\usepackage{bold-extra}&#10;\pagestyle{empty}&#10;\begin{document}&#10;\color{NavyBlue}&#10;\noindent\texttt{\textbf{Lemma} firstn\_all l: firstn (length l) l = l.}\\&#10;&#10;\noindent\texttt{\textbf{Lemma} firstn\_length\_le: forall l:list A, forall n:nat,&#10;  n &lt;= length l -&gt; length (firstn n l) = n.}\\&#10;&#10;\noindent\texttt{\textbf{Lemma} firstn\_length: forall n l, length (firstn n l) = min n (length l).}\\&#10;&#10;\noindent\texttt{\textbf{Theorem} app\_nil\_r: forall l:list A, l ++ [] = l.}\\&#10;&#10;\noindent\texttt{\textbf{Lemma} app\_length: forall l l': list A, length (l++l') = length l + length l'.}&#10;\end{document}"/>
+  <p:tag name="IGUANATEXSIZE" val="20"/>
+  <p:tag name="IGUANATEXCURSOR" val="622"/>
   <p:tag name="TRANSPARENCY" val="True"/>
   <p:tag name="FILENAME" val=""/>
   <p:tag name="LATEXENGINEID" val="0"/>

</xml_diff>